<commit_message>
Add some more slides
</commit_message>
<xml_diff>
--- a/t18-event-mongodb.pptx
+++ b/t18-event-mongodb.pptx
@@ -5,13 +5,17 @@
     <p:sldMasterId id="2147483756" r:id="rId1"/>
   </p:sldMasterIdLst>
   <p:notesMasterIdLst>
-    <p:notesMasterId r:id="rId6"/>
+    <p:notesMasterId r:id="rId10"/>
   </p:notesMasterIdLst>
   <p:sldIdLst>
     <p:sldId id="258" r:id="rId2"/>
     <p:sldId id="260" r:id="rId3"/>
     <p:sldId id="259" r:id="rId4"/>
     <p:sldId id="261" r:id="rId5"/>
+    <p:sldId id="262" r:id="rId6"/>
+    <p:sldId id="264" r:id="rId7"/>
+    <p:sldId id="263" r:id="rId8"/>
+    <p:sldId id="265" r:id="rId9"/>
   </p:sldIdLst>
   <p:sldSz cx="12192000" cy="6858000"/>
   <p:notesSz cx="6858000" cy="9144000"/>
@@ -200,7 +204,7 @@
           <a:p>
             <a:fld id="{DBCC800D-31EB-4931-99D3-EDB5CCBB0CE8}" type="datetimeFigureOut">
               <a:rPr lang="en-US" smtClean="0"/>
-              <a:t>11/23/2018</a:t>
+              <a:t>11/24/2018</a:t>
             </a:fld>
             <a:endParaRPr lang="en-US"/>
           </a:p>
@@ -859,29 +863,13 @@
           <a:lstStyle/>
           <a:p>
             <a:r>
-              <a:rPr lang="en-US" dirty="0" smtClean="0"/>
-              <a:t>Multiple components</a:t>
-            </a:r>
-          </a:p>
-          <a:p>
-            <a:endParaRPr lang="en-US" dirty="0" smtClean="0"/>
-          </a:p>
-          <a:p>
-            <a:r>
-              <a:rPr lang="en-US" dirty="0" smtClean="0"/>
-              <a:t>State change notifications</a:t>
-            </a:r>
-          </a:p>
-          <a:p>
-            <a:endParaRPr lang="en-US" dirty="0" smtClean="0"/>
-          </a:p>
-          <a:p>
-            <a:r>
-              <a:rPr lang="en-US" dirty="0" smtClean="0"/>
-              <a:t>Reactive</a:t>
-            </a:r>
-          </a:p>
-          <a:p>
+              <a:rPr lang="en-US" smtClean="0"/>
+              <a:t>Multiple</a:t>
+            </a:r>
+            <a:r>
+              <a:rPr lang="en-US" baseline="0" smtClean="0"/>
+              <a:t> components, same goal</a:t>
+            </a:r>
             <a:endParaRPr lang="en-US" dirty="0"/>
           </a:p>
         </p:txBody>
@@ -966,6 +954,28 @@
           <a:bodyPr/>
           <a:lstStyle/>
           <a:p>
+            <a:r>
+              <a:rPr lang="en-US" dirty="0" smtClean="0"/>
+              <a:t>Multiple components</a:t>
+            </a:r>
+          </a:p>
+          <a:p>
+            <a:endParaRPr lang="en-US" dirty="0" smtClean="0"/>
+          </a:p>
+          <a:p>
+            <a:r>
+              <a:rPr lang="en-US" dirty="0" smtClean="0"/>
+              <a:t>State change notifications</a:t>
+            </a:r>
+          </a:p>
+          <a:p>
+            <a:endParaRPr lang="en-US" dirty="0" smtClean="0"/>
+          </a:p>
+          <a:p>
+            <a:r>
+              <a:rPr lang="en-US" dirty="0" smtClean="0"/>
+              <a:t>Reactive</a:t>
+            </a:r>
             <a:endParaRPr lang="en-US" dirty="0"/>
           </a:p>
         </p:txBody>
@@ -997,6 +1007,451 @@
     <p:extLst>
       <p:ext uri="{BB962C8B-B14F-4D97-AF65-F5344CB8AC3E}">
         <p14:creationId xmlns:p14="http://schemas.microsoft.com/office/powerpoint/2010/main" val="552390821"/>
+      </p:ext>
+    </p:extLst>
+  </p:cSld>
+  <p:clrMapOvr>
+    <a:masterClrMapping/>
+  </p:clrMapOvr>
+</p:notes>
+</file>
+
+<file path=ppt/notesSlides/notesSlide5.xml><?xml version="1.0" encoding="utf-8"?>
+<p:notes xmlns:a="http://schemas.openxmlformats.org/drawingml/2006/main" xmlns:r="http://schemas.openxmlformats.org/officeDocument/2006/relationships" xmlns:p="http://schemas.openxmlformats.org/presentationml/2006/main">
+  <p:cSld>
+    <p:spTree>
+      <p:nvGrpSpPr>
+        <p:cNvPr id="1" name=""/>
+        <p:cNvGrpSpPr/>
+        <p:nvPr/>
+      </p:nvGrpSpPr>
+      <p:grpSpPr>
+        <a:xfrm>
+          <a:off x="0" y="0"/>
+          <a:ext cx="0" cy="0"/>
+          <a:chOff x="0" y="0"/>
+          <a:chExt cx="0" cy="0"/>
+        </a:xfrm>
+      </p:grpSpPr>
+      <p:sp>
+        <p:nvSpPr>
+          <p:cNvPr id="2" name="Slide Image Placeholder 1"/>
+          <p:cNvSpPr>
+            <a:spLocks noGrp="1" noRot="1" noChangeAspect="1"/>
+          </p:cNvSpPr>
+          <p:nvPr>
+            <p:ph type="sldImg"/>
+          </p:nvPr>
+        </p:nvSpPr>
+        <p:spPr/>
+      </p:sp>
+      <p:sp>
+        <p:nvSpPr>
+          <p:cNvPr id="3" name="Notes Placeholder 2"/>
+          <p:cNvSpPr>
+            <a:spLocks noGrp="1"/>
+          </p:cNvSpPr>
+          <p:nvPr>
+            <p:ph type="body" idx="1"/>
+          </p:nvPr>
+        </p:nvSpPr>
+        <p:spPr/>
+        <p:txBody>
+          <a:bodyPr/>
+          <a:lstStyle/>
+          <a:p>
+            <a:r>
+              <a:rPr lang="en-US" smtClean="0"/>
+              <a:t>Failure scenario</a:t>
+            </a:r>
+            <a:endParaRPr lang="en-US" dirty="0"/>
+          </a:p>
+        </p:txBody>
+      </p:sp>
+      <p:sp>
+        <p:nvSpPr>
+          <p:cNvPr id="4" name="Slide Number Placeholder 3"/>
+          <p:cNvSpPr>
+            <a:spLocks noGrp="1"/>
+          </p:cNvSpPr>
+          <p:nvPr>
+            <p:ph type="sldNum" sz="quarter" idx="10"/>
+          </p:nvPr>
+        </p:nvSpPr>
+        <p:spPr/>
+        <p:txBody>
+          <a:bodyPr/>
+          <a:lstStyle/>
+          <a:p>
+            <a:fld id="{40EA4F9F-6CEF-4B9D-BEB3-40FCF0DF71AE}" type="slidenum">
+              <a:rPr lang="en-US" smtClean="0"/>
+              <a:t>5</a:t>
+            </a:fld>
+            <a:endParaRPr lang="en-US"/>
+          </a:p>
+        </p:txBody>
+      </p:sp>
+    </p:spTree>
+    <p:extLst>
+      <p:ext uri="{BB962C8B-B14F-4D97-AF65-F5344CB8AC3E}">
+        <p14:creationId xmlns:p14="http://schemas.microsoft.com/office/powerpoint/2010/main" val="3384025134"/>
+      </p:ext>
+    </p:extLst>
+  </p:cSld>
+  <p:clrMapOvr>
+    <a:masterClrMapping/>
+  </p:clrMapOvr>
+</p:notes>
+</file>
+
+<file path=ppt/notesSlides/notesSlide6.xml><?xml version="1.0" encoding="utf-8"?>
+<p:notes xmlns:a="http://schemas.openxmlformats.org/drawingml/2006/main" xmlns:r="http://schemas.openxmlformats.org/officeDocument/2006/relationships" xmlns:p="http://schemas.openxmlformats.org/presentationml/2006/main">
+  <p:cSld>
+    <p:spTree>
+      <p:nvGrpSpPr>
+        <p:cNvPr id="1" name=""/>
+        <p:cNvGrpSpPr/>
+        <p:nvPr/>
+      </p:nvGrpSpPr>
+      <p:grpSpPr>
+        <a:xfrm>
+          <a:off x="0" y="0"/>
+          <a:ext cx="0" cy="0"/>
+          <a:chOff x="0" y="0"/>
+          <a:chExt cx="0" cy="0"/>
+        </a:xfrm>
+      </p:grpSpPr>
+      <p:sp>
+        <p:nvSpPr>
+          <p:cNvPr id="2" name="Slide Image Placeholder 1"/>
+          <p:cNvSpPr>
+            <a:spLocks noGrp="1" noRot="1" noChangeAspect="1"/>
+          </p:cNvSpPr>
+          <p:nvPr>
+            <p:ph type="sldImg"/>
+          </p:nvPr>
+        </p:nvSpPr>
+        <p:spPr/>
+      </p:sp>
+      <p:sp>
+        <p:nvSpPr>
+          <p:cNvPr id="3" name="Notes Placeholder 2"/>
+          <p:cNvSpPr>
+            <a:spLocks noGrp="1"/>
+          </p:cNvSpPr>
+          <p:nvPr>
+            <p:ph type="body" idx="1"/>
+          </p:nvPr>
+        </p:nvSpPr>
+        <p:spPr/>
+        <p:txBody>
+          <a:bodyPr/>
+          <a:lstStyle/>
+          <a:p>
+            <a:r>
+              <a:rPr lang="en-US" dirty="0" smtClean="0"/>
+              <a:t>TPC</a:t>
+            </a:r>
+          </a:p>
+          <a:p>
+            <a:r>
+              <a:rPr lang="en-US" dirty="0" smtClean="0"/>
+              <a:t>    Degraded</a:t>
+            </a:r>
+            <a:r>
+              <a:rPr lang="en-US" baseline="0" dirty="0" smtClean="0"/>
+              <a:t> performance</a:t>
+            </a:r>
+          </a:p>
+          <a:p>
+            <a:r>
+              <a:rPr lang="en-US" baseline="0" dirty="0" smtClean="0"/>
+              <a:t>    No support by message brokers</a:t>
+            </a:r>
+            <a:endParaRPr lang="en-US" dirty="0" smtClean="0"/>
+          </a:p>
+          <a:p>
+            <a:endParaRPr lang="en-US" dirty="0" smtClean="0"/>
+          </a:p>
+          <a:p>
+            <a:r>
+              <a:rPr lang="en-US" dirty="0" smtClean="0"/>
+              <a:t>Write</a:t>
+            </a:r>
+            <a:r>
+              <a:rPr lang="en-US" baseline="0" dirty="0" smtClean="0"/>
+              <a:t> ahead logging</a:t>
+            </a:r>
+          </a:p>
+          <a:p>
+            <a:r>
+              <a:rPr lang="en-US" baseline="0" dirty="0" smtClean="0"/>
+              <a:t>    To complex for simple cases</a:t>
+            </a:r>
+            <a:endParaRPr lang="en-US" dirty="0" smtClean="0"/>
+          </a:p>
+          <a:p>
+            <a:endParaRPr lang="en-US" dirty="0" smtClean="0"/>
+          </a:p>
+          <a:p>
+            <a:r>
+              <a:rPr lang="en-US" dirty="0" smtClean="0"/>
+              <a:t>Options?</a:t>
+            </a:r>
+            <a:endParaRPr lang="en-US" dirty="0"/>
+          </a:p>
+        </p:txBody>
+      </p:sp>
+      <p:sp>
+        <p:nvSpPr>
+          <p:cNvPr id="4" name="Slide Number Placeholder 3"/>
+          <p:cNvSpPr>
+            <a:spLocks noGrp="1"/>
+          </p:cNvSpPr>
+          <p:nvPr>
+            <p:ph type="sldNum" sz="quarter" idx="10"/>
+          </p:nvPr>
+        </p:nvSpPr>
+        <p:spPr/>
+        <p:txBody>
+          <a:bodyPr/>
+          <a:lstStyle/>
+          <a:p>
+            <a:fld id="{40EA4F9F-6CEF-4B9D-BEB3-40FCF0DF71AE}" type="slidenum">
+              <a:rPr lang="en-US" smtClean="0"/>
+              <a:t>6</a:t>
+            </a:fld>
+            <a:endParaRPr lang="en-US"/>
+          </a:p>
+        </p:txBody>
+      </p:sp>
+    </p:spTree>
+    <p:extLst>
+      <p:ext uri="{BB962C8B-B14F-4D97-AF65-F5344CB8AC3E}">
+        <p14:creationId xmlns:p14="http://schemas.microsoft.com/office/powerpoint/2010/main" val="3983230249"/>
+      </p:ext>
+    </p:extLst>
+  </p:cSld>
+  <p:clrMapOvr>
+    <a:masterClrMapping/>
+  </p:clrMapOvr>
+</p:notes>
+</file>
+
+<file path=ppt/notesSlides/notesSlide7.xml><?xml version="1.0" encoding="utf-8"?>
+<p:notes xmlns:a="http://schemas.openxmlformats.org/drawingml/2006/main" xmlns:r="http://schemas.openxmlformats.org/officeDocument/2006/relationships" xmlns:p="http://schemas.openxmlformats.org/presentationml/2006/main">
+  <p:cSld>
+    <p:spTree>
+      <p:nvGrpSpPr>
+        <p:cNvPr id="1" name=""/>
+        <p:cNvGrpSpPr/>
+        <p:nvPr/>
+      </p:nvGrpSpPr>
+      <p:grpSpPr>
+        <a:xfrm>
+          <a:off x="0" y="0"/>
+          <a:ext cx="0" cy="0"/>
+          <a:chOff x="0" y="0"/>
+          <a:chExt cx="0" cy="0"/>
+        </a:xfrm>
+      </p:grpSpPr>
+      <p:sp>
+        <p:nvSpPr>
+          <p:cNvPr id="2" name="Slide Image Placeholder 1"/>
+          <p:cNvSpPr>
+            <a:spLocks noGrp="1" noRot="1" noChangeAspect="1"/>
+          </p:cNvSpPr>
+          <p:nvPr>
+            <p:ph type="sldImg"/>
+          </p:nvPr>
+        </p:nvSpPr>
+        <p:spPr/>
+      </p:sp>
+      <p:sp>
+        <p:nvSpPr>
+          <p:cNvPr id="3" name="Notes Placeholder 2"/>
+          <p:cNvSpPr>
+            <a:spLocks noGrp="1"/>
+          </p:cNvSpPr>
+          <p:nvPr>
+            <p:ph type="body" idx="1"/>
+          </p:nvPr>
+        </p:nvSpPr>
+        <p:spPr/>
+        <p:txBody>
+          <a:bodyPr/>
+          <a:lstStyle/>
+          <a:p>
+            <a:endParaRPr lang="en-US" dirty="0" smtClean="0"/>
+          </a:p>
+          <a:p>
+            <a:r>
+              <a:rPr lang="en-US" dirty="0" smtClean="0"/>
+              <a:t>Best where applicable</a:t>
+            </a:r>
+          </a:p>
+          <a:p>
+            <a:endParaRPr lang="en-US" dirty="0" smtClean="0"/>
+          </a:p>
+          <a:p>
+            <a:r>
+              <a:rPr lang="en-US" dirty="0" smtClean="0"/>
+              <a:t>No applicable for us</a:t>
+            </a:r>
+          </a:p>
+          <a:p>
+            <a:r>
+              <a:rPr lang="en-US" baseline="0" dirty="0" smtClean="0"/>
+              <a:t>    Required significant code rewrite</a:t>
+            </a:r>
+            <a:endParaRPr lang="en-US" dirty="0" smtClean="0"/>
+          </a:p>
+        </p:txBody>
+      </p:sp>
+      <p:sp>
+        <p:nvSpPr>
+          <p:cNvPr id="4" name="Slide Number Placeholder 3"/>
+          <p:cNvSpPr>
+            <a:spLocks noGrp="1"/>
+          </p:cNvSpPr>
+          <p:nvPr>
+            <p:ph type="sldNum" sz="quarter" idx="10"/>
+          </p:nvPr>
+        </p:nvSpPr>
+        <p:spPr/>
+        <p:txBody>
+          <a:bodyPr/>
+          <a:lstStyle/>
+          <a:p>
+            <a:fld id="{40EA4F9F-6CEF-4B9D-BEB3-40FCF0DF71AE}" type="slidenum">
+              <a:rPr lang="en-US" smtClean="0"/>
+              <a:t>7</a:t>
+            </a:fld>
+            <a:endParaRPr lang="en-US"/>
+          </a:p>
+        </p:txBody>
+      </p:sp>
+    </p:spTree>
+    <p:extLst>
+      <p:ext uri="{BB962C8B-B14F-4D97-AF65-F5344CB8AC3E}">
+        <p14:creationId xmlns:p14="http://schemas.microsoft.com/office/powerpoint/2010/main" val="2514363315"/>
+      </p:ext>
+    </p:extLst>
+  </p:cSld>
+  <p:clrMapOvr>
+    <a:masterClrMapping/>
+  </p:clrMapOvr>
+</p:notes>
+</file>
+
+<file path=ppt/notesSlides/notesSlide8.xml><?xml version="1.0" encoding="utf-8"?>
+<p:notes xmlns:a="http://schemas.openxmlformats.org/drawingml/2006/main" xmlns:r="http://schemas.openxmlformats.org/officeDocument/2006/relationships" xmlns:p="http://schemas.openxmlformats.org/presentationml/2006/main">
+  <p:cSld>
+    <p:spTree>
+      <p:nvGrpSpPr>
+        <p:cNvPr id="1" name=""/>
+        <p:cNvGrpSpPr/>
+        <p:nvPr/>
+      </p:nvGrpSpPr>
+      <p:grpSpPr>
+        <a:xfrm>
+          <a:off x="0" y="0"/>
+          <a:ext cx="0" cy="0"/>
+          <a:chOff x="0" y="0"/>
+          <a:chExt cx="0" cy="0"/>
+        </a:xfrm>
+      </p:grpSpPr>
+      <p:sp>
+        <p:nvSpPr>
+          <p:cNvPr id="2" name="Slide Image Placeholder 1"/>
+          <p:cNvSpPr>
+            <a:spLocks noGrp="1" noRot="1" noChangeAspect="1"/>
+          </p:cNvSpPr>
+          <p:nvPr>
+            <p:ph type="sldImg"/>
+          </p:nvPr>
+        </p:nvSpPr>
+        <p:spPr/>
+      </p:sp>
+      <p:sp>
+        <p:nvSpPr>
+          <p:cNvPr id="3" name="Notes Placeholder 2"/>
+          <p:cNvSpPr>
+            <a:spLocks noGrp="1"/>
+          </p:cNvSpPr>
+          <p:nvPr>
+            <p:ph type="body" idx="1"/>
+          </p:nvPr>
+        </p:nvSpPr>
+        <p:spPr/>
+        <p:txBody>
+          <a:bodyPr/>
+          <a:lstStyle/>
+          <a:p>
+            <a:endParaRPr lang="en-US" dirty="0" smtClean="0"/>
+          </a:p>
+          <a:p>
+            <a:r>
+              <a:rPr lang="en-US" dirty="0" smtClean="0"/>
+              <a:t>A</a:t>
+            </a:r>
+            <a:r>
+              <a:rPr lang="en-US" baseline="0" dirty="0" smtClean="0"/>
+              <a:t>ll ACID SQL DB engines</a:t>
+            </a:r>
+          </a:p>
+          <a:p>
+            <a:endParaRPr lang="en-US" baseline="0" dirty="0" smtClean="0"/>
+          </a:p>
+          <a:p>
+            <a:r>
+              <a:rPr lang="en-US" baseline="0" dirty="0" smtClean="0"/>
+              <a:t>Some No-SQL DB engines</a:t>
+            </a:r>
+          </a:p>
+          <a:p>
+            <a:endParaRPr lang="en-US" baseline="0" dirty="0" smtClean="0"/>
+          </a:p>
+          <a:p>
+            <a:r>
+              <a:rPr lang="en-US" baseline="0" dirty="0" smtClean="0"/>
+              <a:t>Only supported </a:t>
+            </a:r>
+            <a:r>
+              <a:rPr lang="en-US" baseline="0" smtClean="0"/>
+              <a:t>in MongoDB 4.0+</a:t>
+            </a:r>
+            <a:endParaRPr lang="en-US" dirty="0"/>
+          </a:p>
+        </p:txBody>
+      </p:sp>
+      <p:sp>
+        <p:nvSpPr>
+          <p:cNvPr id="4" name="Slide Number Placeholder 3"/>
+          <p:cNvSpPr>
+            <a:spLocks noGrp="1"/>
+          </p:cNvSpPr>
+          <p:nvPr>
+            <p:ph type="sldNum" sz="quarter" idx="10"/>
+          </p:nvPr>
+        </p:nvSpPr>
+        <p:spPr/>
+        <p:txBody>
+          <a:bodyPr/>
+          <a:lstStyle/>
+          <a:p>
+            <a:fld id="{40EA4F9F-6CEF-4B9D-BEB3-40FCF0DF71AE}" type="slidenum">
+              <a:rPr lang="en-US" smtClean="0"/>
+              <a:t>8</a:t>
+            </a:fld>
+            <a:endParaRPr lang="en-US"/>
+          </a:p>
+        </p:txBody>
+      </p:sp>
+    </p:spTree>
+    <p:extLst>
+      <p:ext uri="{BB962C8B-B14F-4D97-AF65-F5344CB8AC3E}">
+        <p14:creationId xmlns:p14="http://schemas.microsoft.com/office/powerpoint/2010/main" val="169814653"/>
       </p:ext>
     </p:extLst>
   </p:cSld>
@@ -1174,7 +1629,7 @@
           <a:p>
             <a:fld id="{5EE630CB-3638-41B1-AFF1-A77D5CAA11B6}" type="datetimeFigureOut">
               <a:rPr lang="en-US" smtClean="0"/>
-              <a:t>11/23/2018</a:t>
+              <a:t>11/24/2018</a:t>
             </a:fld>
             <a:endParaRPr lang="en-US"/>
           </a:p>
@@ -1402,7 +1857,7 @@
           <a:p>
             <a:fld id="{5EE630CB-3638-41B1-AFF1-A77D5CAA11B6}" type="datetimeFigureOut">
               <a:rPr lang="en-US" smtClean="0"/>
-              <a:t>11/23/2018</a:t>
+              <a:t>11/24/2018</a:t>
             </a:fld>
             <a:endParaRPr lang="en-US"/>
           </a:p>
@@ -1582,7 +2037,7 @@
           <a:p>
             <a:fld id="{5EE630CB-3638-41B1-AFF1-A77D5CAA11B6}" type="datetimeFigureOut">
               <a:rPr lang="en-US" smtClean="0"/>
-              <a:t>11/23/2018</a:t>
+              <a:t>11/24/2018</a:t>
             </a:fld>
             <a:endParaRPr lang="en-US"/>
           </a:p>
@@ -1752,7 +2207,7 @@
           <a:p>
             <a:fld id="{5EE630CB-3638-41B1-AFF1-A77D5CAA11B6}" type="datetimeFigureOut">
               <a:rPr lang="en-US" smtClean="0"/>
-              <a:t>11/23/2018</a:t>
+              <a:t>11/24/2018</a:t>
             </a:fld>
             <a:endParaRPr lang="en-US"/>
           </a:p>
@@ -2006,7 +2461,7 @@
           <a:p>
             <a:fld id="{5EE630CB-3638-41B1-AFF1-A77D5CAA11B6}" type="datetimeFigureOut">
               <a:rPr lang="en-US" smtClean="0"/>
-              <a:t>11/23/2018</a:t>
+              <a:t>11/24/2018</a:t>
             </a:fld>
             <a:endParaRPr lang="en-US"/>
           </a:p>
@@ -2332,7 +2787,7 @@
           <a:p>
             <a:fld id="{5EE630CB-3638-41B1-AFF1-A77D5CAA11B6}" type="datetimeFigureOut">
               <a:rPr lang="en-US" smtClean="0"/>
-              <a:t>11/23/2018</a:t>
+              <a:t>11/24/2018</a:t>
             </a:fld>
             <a:endParaRPr lang="en-US"/>
           </a:p>
@@ -2783,7 +3238,7 @@
           <a:p>
             <a:fld id="{5EE630CB-3638-41B1-AFF1-A77D5CAA11B6}" type="datetimeFigureOut">
               <a:rPr lang="en-US" smtClean="0"/>
-              <a:t>11/23/2018</a:t>
+              <a:t>11/24/2018</a:t>
             </a:fld>
             <a:endParaRPr lang="en-US"/>
           </a:p>
@@ -2901,7 +3356,7 @@
           <a:p>
             <a:fld id="{5EE630CB-3638-41B1-AFF1-A77D5CAA11B6}" type="datetimeFigureOut">
               <a:rPr lang="en-US" smtClean="0"/>
-              <a:t>11/23/2018</a:t>
+              <a:t>11/24/2018</a:t>
             </a:fld>
             <a:endParaRPr lang="en-US"/>
           </a:p>
@@ -2996,7 +3451,7 @@
           <a:p>
             <a:fld id="{5EE630CB-3638-41B1-AFF1-A77D5CAA11B6}" type="datetimeFigureOut">
               <a:rPr lang="en-US" smtClean="0"/>
-              <a:t>11/23/2018</a:t>
+              <a:t>11/24/2018</a:t>
             </a:fld>
             <a:endParaRPr lang="en-US"/>
           </a:p>
@@ -3283,7 +3738,7 @@
           <a:p>
             <a:fld id="{5EE630CB-3638-41B1-AFF1-A77D5CAA11B6}" type="datetimeFigureOut">
               <a:rPr lang="en-US" smtClean="0"/>
-              <a:t>11/23/2018</a:t>
+              <a:t>11/24/2018</a:t>
             </a:fld>
             <a:endParaRPr lang="en-US"/>
           </a:p>
@@ -3605,7 +4060,7 @@
           <a:p>
             <a:fld id="{5EE630CB-3638-41B1-AFF1-A77D5CAA11B6}" type="datetimeFigureOut">
               <a:rPr lang="en-US" smtClean="0"/>
-              <a:t>11/23/2018</a:t>
+              <a:t>11/24/2018</a:t>
             </a:fld>
             <a:endParaRPr lang="en-US"/>
           </a:p>
@@ -3859,7 +4314,7 @@
           <a:p>
             <a:fld id="{5EE630CB-3638-41B1-AFF1-A77D5CAA11B6}" type="datetimeFigureOut">
               <a:rPr lang="en-US" smtClean="0"/>
-              <a:t>11/23/2018</a:t>
+              <a:t>11/24/2018</a:t>
             </a:fld>
             <a:endParaRPr lang="en-US"/>
           </a:p>
@@ -4535,7 +4990,15 @@
             </a:r>
             <a:r>
               <a:rPr lang="en-US" dirty="0" smtClean="0"/>
-              <a:t>system is all about</a:t>
+              <a:t>architecture</a:t>
+            </a:r>
+            <a:r>
+              <a:rPr lang="en-US" dirty="0" smtClean="0"/>
+              <a:t> </a:t>
+            </a:r>
+            <a:r>
+              <a:rPr lang="en-US" dirty="0" smtClean="0"/>
+              <a:t>is all about</a:t>
             </a:r>
             <a:r>
               <a:rPr lang="en-US" dirty="0"/>
@@ -4608,7 +5071,7 @@
         </p:nvCxnSpPr>
         <p:spPr>
           <a:xfrm>
-            <a:off x="7952184" y="2027224"/>
+            <a:off x="7952185" y="1854227"/>
             <a:ext cx="1961878" cy="6501"/>
           </a:xfrm>
           <a:prstGeom prst="straightConnector1">
@@ -4939,7 +5402,7 @@
         </p:nvSpPr>
         <p:spPr>
           <a:xfrm>
-            <a:off x="1543780" y="4466496"/>
+            <a:off x="1543781" y="5146447"/>
             <a:ext cx="1444387" cy="1324708"/>
           </a:xfrm>
           <a:prstGeom prst="flowChartMagneticDisk">
@@ -4987,9 +5450,9 @@
           <p:nvPr/>
         </p:nvCxnSpPr>
         <p:spPr>
-          <a:xfrm flipH="1">
-            <a:off x="2265974" y="2974484"/>
-            <a:ext cx="1" cy="1492012"/>
+          <a:xfrm>
+            <a:off x="2265975" y="2974484"/>
+            <a:ext cx="0" cy="2171963"/>
           </a:xfrm>
           <a:prstGeom prst="straightConnector1">
             <a:avLst/>
@@ -5026,7 +5489,7 @@
         </p:nvCxnSpPr>
         <p:spPr>
           <a:xfrm flipV="1">
-            <a:off x="2988167" y="2028774"/>
+            <a:off x="2988167" y="1855777"/>
             <a:ext cx="3592416" cy="11473"/>
           </a:xfrm>
           <a:prstGeom prst="straightConnector1">
@@ -5058,14 +5521,188 @@
       </p:cxnSp>
       <p:sp>
         <p:nvSpPr>
-          <p:cNvPr id="15" name="Flowchart: Document 14"/>
+          <p:cNvPr id="35" name="Rectangle 34"/>
           <p:cNvSpPr/>
           <p:nvPr/>
         </p:nvSpPr>
         <p:spPr>
           <a:xfrm>
-            <a:off x="4345143" y="1298117"/>
-            <a:ext cx="853345" cy="515815"/>
+            <a:off x="6580584" y="242393"/>
+            <a:ext cx="1371600" cy="6154615"/>
+          </a:xfrm>
+          <a:prstGeom prst="rect">
+            <a:avLst/>
+          </a:prstGeom>
+          <a:ln w="57150">
+            <a:prstDash val="sysDot"/>
+          </a:ln>
+        </p:spPr>
+        <p:style>
+          <a:lnRef idx="1">
+            <a:schemeClr val="accent3"/>
+          </a:lnRef>
+          <a:fillRef idx="2">
+            <a:schemeClr val="accent3"/>
+          </a:fillRef>
+          <a:effectRef idx="1">
+            <a:schemeClr val="accent3"/>
+          </a:effectRef>
+          <a:fontRef idx="minor">
+            <a:schemeClr val="dk1"/>
+          </a:fontRef>
+        </p:style>
+        <p:txBody>
+          <a:bodyPr vert="wordArtVert" rtlCol="0" anchor="ctr"/>
+          <a:lstStyle/>
+          <a:p>
+            <a:pPr algn="ctr"/>
+            <a:r>
+              <a:rPr lang="en-US" dirty="0" smtClean="0">
+                <a:solidFill>
+                  <a:schemeClr val="accent3">
+                    <a:lumMod val="50000"/>
+                  </a:schemeClr>
+                </a:solidFill>
+              </a:rPr>
+              <a:t>Message broker</a:t>
+            </a:r>
+          </a:p>
+        </p:txBody>
+      </p:sp>
+      <p:cxnSp>
+        <p:nvCxnSpPr>
+          <p:cNvPr id="21" name="Straight Arrow Connector 20"/>
+          <p:cNvCxnSpPr>
+            <a:endCxn id="4" idx="3"/>
+          </p:cNvCxnSpPr>
+          <p:nvPr/>
+        </p:nvCxnSpPr>
+        <p:spPr>
+          <a:xfrm>
+            <a:off x="2265973" y="342735"/>
+            <a:ext cx="2" cy="962060"/>
+          </a:xfrm>
+          <a:prstGeom prst="straightConnector1">
+            <a:avLst/>
+          </a:prstGeom>
+          <a:ln w="38100">
+            <a:solidFill>
+              <a:schemeClr val="accent3">
+                <a:lumMod val="75000"/>
+              </a:schemeClr>
+            </a:solidFill>
+            <a:tailEnd type="triangle"/>
+          </a:ln>
+        </p:spPr>
+        <p:style>
+          <a:lnRef idx="1">
+            <a:schemeClr val="accent1"/>
+          </a:lnRef>
+          <a:fillRef idx="0">
+            <a:schemeClr val="accent1"/>
+          </a:fillRef>
+          <a:effectRef idx="0">
+            <a:schemeClr val="accent1"/>
+          </a:effectRef>
+          <a:fontRef idx="minor">
+            <a:schemeClr val="tx1"/>
+          </a:fontRef>
+        </p:style>
+      </p:cxnSp>
+      <p:sp>
+        <p:nvSpPr>
+          <p:cNvPr id="24" name="Flowchart: Document 23"/>
+          <p:cNvSpPr/>
+          <p:nvPr/>
+        </p:nvSpPr>
+        <p:spPr>
+          <a:xfrm>
+            <a:off x="750399" y="430895"/>
+            <a:ext cx="1251115" cy="785740"/>
+          </a:xfrm>
+          <a:prstGeom prst="flowChartDocument">
+            <a:avLst/>
+          </a:prstGeom>
+        </p:spPr>
+        <p:style>
+          <a:lnRef idx="1">
+            <a:schemeClr val="accent2"/>
+          </a:lnRef>
+          <a:fillRef idx="3">
+            <a:schemeClr val="accent2"/>
+          </a:fillRef>
+          <a:effectRef idx="2">
+            <a:schemeClr val="accent2"/>
+          </a:effectRef>
+          <a:fontRef idx="minor">
+            <a:schemeClr val="lt1"/>
+          </a:fontRef>
+        </p:style>
+        <p:txBody>
+          <a:bodyPr rtlCol="0" anchor="ctr"/>
+          <a:lstStyle/>
+          <a:p>
+            <a:pPr algn="ctr"/>
+            <a:r>
+              <a:rPr lang="en-US" dirty="0" smtClean="0"/>
+              <a:t>Command</a:t>
+            </a:r>
+            <a:endParaRPr lang="en-US" dirty="0" smtClean="0"/>
+          </a:p>
+        </p:txBody>
+      </p:sp>
+      <p:sp>
+        <p:nvSpPr>
+          <p:cNvPr id="25" name="Flowchart: Document 24"/>
+          <p:cNvSpPr/>
+          <p:nvPr/>
+        </p:nvSpPr>
+        <p:spPr>
+          <a:xfrm>
+            <a:off x="2559456" y="3900783"/>
+            <a:ext cx="1251115" cy="785740"/>
+          </a:xfrm>
+          <a:prstGeom prst="flowChartDocument">
+            <a:avLst/>
+          </a:prstGeom>
+        </p:spPr>
+        <p:style>
+          <a:lnRef idx="1">
+            <a:schemeClr val="accent4"/>
+          </a:lnRef>
+          <a:fillRef idx="3">
+            <a:schemeClr val="accent4"/>
+          </a:fillRef>
+          <a:effectRef idx="2">
+            <a:schemeClr val="accent4"/>
+          </a:effectRef>
+          <a:fontRef idx="minor">
+            <a:schemeClr val="lt1"/>
+          </a:fontRef>
+        </p:style>
+        <p:txBody>
+          <a:bodyPr rtlCol="0" anchor="ctr"/>
+          <a:lstStyle/>
+          <a:p>
+            <a:pPr algn="ctr"/>
+            <a:r>
+              <a:rPr lang="en-US" dirty="0" smtClean="0"/>
+              <a:t>Entity 1</a:t>
+            </a:r>
+            <a:endParaRPr lang="en-US" dirty="0" smtClean="0"/>
+          </a:p>
+        </p:txBody>
+      </p:sp>
+      <p:sp>
+        <p:nvSpPr>
+          <p:cNvPr id="26" name="Flowchart: Document 25"/>
+          <p:cNvSpPr/>
+          <p:nvPr/>
+        </p:nvSpPr>
+        <p:spPr>
+          <a:xfrm>
+            <a:off x="4156024" y="846947"/>
+            <a:ext cx="1251115" cy="785740"/>
           </a:xfrm>
           <a:prstGeom prst="flowChartDocument">
             <a:avLst/>
@@ -5092,34 +5729,162 @@
             <a:pPr algn="ctr"/>
             <a:r>
               <a:rPr lang="en-US" dirty="0" smtClean="0"/>
-              <a:t>Event</a:t>
-            </a:r>
-          </a:p>
-        </p:txBody>
-      </p:sp>
-      <p:sp>
-        <p:nvSpPr>
-          <p:cNvPr id="16" name="Flowchart: Document 15"/>
+              <a:t>Event 1</a:t>
+            </a:r>
+          </a:p>
+        </p:txBody>
+      </p:sp>
+      <p:sp>
+        <p:nvSpPr>
+          <p:cNvPr id="27" name="Flowchart: Document 26"/>
           <p:cNvSpPr/>
           <p:nvPr/>
         </p:nvSpPr>
         <p:spPr>
           <a:xfrm>
-            <a:off x="2461846" y="3413886"/>
-            <a:ext cx="853345" cy="515815"/>
+            <a:off x="8307566" y="846947"/>
+            <a:ext cx="1251115" cy="785740"/>
           </a:xfrm>
           <a:prstGeom prst="flowChartDocument">
             <a:avLst/>
           </a:prstGeom>
+        </p:spPr>
+        <p:style>
+          <a:lnRef idx="1">
+            <a:schemeClr val="accent6"/>
+          </a:lnRef>
+          <a:fillRef idx="3">
+            <a:schemeClr val="accent6"/>
+          </a:fillRef>
+          <a:effectRef idx="2">
+            <a:schemeClr val="accent6"/>
+          </a:effectRef>
+          <a:fontRef idx="minor">
+            <a:schemeClr val="lt1"/>
+          </a:fontRef>
+        </p:style>
+        <p:txBody>
+          <a:bodyPr rtlCol="0" anchor="ctr"/>
+          <a:lstStyle/>
+          <a:p>
+            <a:pPr algn="ctr"/>
+            <a:r>
+              <a:rPr lang="en-US" dirty="0" smtClean="0"/>
+              <a:t>Event 1</a:t>
+            </a:r>
+          </a:p>
+        </p:txBody>
+      </p:sp>
+      <p:cxnSp>
+        <p:nvCxnSpPr>
+          <p:cNvPr id="28" name="Straight Arrow Connector 27"/>
+          <p:cNvCxnSpPr/>
+          <p:nvPr/>
+        </p:nvCxnSpPr>
+        <p:spPr>
+          <a:xfrm rot="10800000">
+            <a:off x="7952184" y="2180092"/>
+            <a:ext cx="1961878" cy="6501"/>
+          </a:xfrm>
+          <a:prstGeom prst="straightConnector1">
+            <a:avLst/>
+          </a:prstGeom>
+          <a:ln w="38100">
+            <a:solidFill>
+              <a:schemeClr val="accent3">
+                <a:lumMod val="75000"/>
+              </a:schemeClr>
+            </a:solidFill>
+            <a:tailEnd type="triangle"/>
+          </a:ln>
         </p:spPr>
         <p:style>
           <a:lnRef idx="1">
             <a:schemeClr val="accent1"/>
           </a:lnRef>
-          <a:fillRef idx="3">
+          <a:fillRef idx="0">
             <a:schemeClr val="accent1"/>
           </a:fillRef>
+          <a:effectRef idx="0">
+            <a:schemeClr val="accent1"/>
+          </a:effectRef>
+          <a:fontRef idx="minor">
+            <a:schemeClr val="tx1"/>
+          </a:fontRef>
+        </p:style>
+      </p:cxnSp>
+      <p:sp>
+        <p:nvSpPr>
+          <p:cNvPr id="29" name="Flowchart: Document 28"/>
+          <p:cNvSpPr/>
+          <p:nvPr/>
+        </p:nvSpPr>
+        <p:spPr>
+          <a:xfrm>
+            <a:off x="8307565" y="2505958"/>
+            <a:ext cx="1251115" cy="785740"/>
+          </a:xfrm>
+          <a:prstGeom prst="flowChartDocument">
+            <a:avLst/>
+          </a:prstGeom>
+        </p:spPr>
+        <p:style>
+          <a:lnRef idx="1">
+            <a:schemeClr val="accent6"/>
+          </a:lnRef>
+          <a:fillRef idx="3">
+            <a:schemeClr val="accent6"/>
+          </a:fillRef>
           <a:effectRef idx="2">
+            <a:schemeClr val="accent6"/>
+          </a:effectRef>
+          <a:fontRef idx="minor">
+            <a:schemeClr val="lt1"/>
+          </a:fontRef>
+        </p:style>
+        <p:txBody>
+          <a:bodyPr rtlCol="0" anchor="ctr"/>
+          <a:lstStyle/>
+          <a:p>
+            <a:pPr algn="ctr"/>
+            <a:r>
+              <a:rPr lang="en-US" dirty="0" smtClean="0"/>
+              <a:t>Event 2</a:t>
+            </a:r>
+          </a:p>
+        </p:txBody>
+      </p:sp>
+      <p:sp>
+        <p:nvSpPr>
+          <p:cNvPr id="30" name="Flowchart: Magnetic Disk 29"/>
+          <p:cNvSpPr/>
+          <p:nvPr/>
+        </p:nvSpPr>
+        <p:spPr>
+          <a:xfrm>
+            <a:off x="9914062" y="5072300"/>
+            <a:ext cx="1444387" cy="1324708"/>
+          </a:xfrm>
+          <a:prstGeom prst="flowChartMagneticDisk">
+            <a:avLst/>
+          </a:prstGeom>
+          <a:ln w="38100"/>
+          <a:effectLst>
+            <a:outerShdw blurRad="50800" dist="38100" dir="5400000" algn="t" rotWithShape="0">
+              <a:prstClr val="black">
+                <a:alpha val="40000"/>
+              </a:prstClr>
+            </a:outerShdw>
+          </a:effectLst>
+        </p:spPr>
+        <p:style>
+          <a:lnRef idx="3">
+            <a:schemeClr val="lt1"/>
+          </a:lnRef>
+          <a:fillRef idx="1">
+            <a:schemeClr val="accent1"/>
+          </a:fillRef>
+          <a:effectRef idx="1">
             <a:schemeClr val="accent1"/>
           </a:effectRef>
           <a:fontRef idx="minor">
@@ -5131,10 +5896,745 @@
           <a:lstStyle/>
           <a:p>
             <a:pPr algn="ctr"/>
+            <a:endParaRPr lang="en-US"/>
+          </a:p>
+        </p:txBody>
+      </p:sp>
+      <p:cxnSp>
+        <p:nvCxnSpPr>
+          <p:cNvPr id="33" name="Straight Arrow Connector 32"/>
+          <p:cNvCxnSpPr>
+            <a:stCxn id="6" idx="0"/>
+            <a:endCxn id="30" idx="1"/>
+          </p:cNvCxnSpPr>
+          <p:nvPr/>
+        </p:nvCxnSpPr>
+        <p:spPr>
+          <a:xfrm flipH="1">
+            <a:off x="10636256" y="2954567"/>
+            <a:ext cx="1" cy="2117733"/>
+          </a:xfrm>
+          <a:prstGeom prst="straightConnector1">
+            <a:avLst/>
+          </a:prstGeom>
+          <a:ln w="38100">
+            <a:solidFill>
+              <a:schemeClr val="accent3">
+                <a:lumMod val="75000"/>
+              </a:schemeClr>
+            </a:solidFill>
+            <a:tailEnd type="triangle"/>
+          </a:ln>
+        </p:spPr>
+        <p:style>
+          <a:lnRef idx="1">
+            <a:schemeClr val="accent1"/>
+          </a:lnRef>
+          <a:fillRef idx="0">
+            <a:schemeClr val="accent1"/>
+          </a:fillRef>
+          <a:effectRef idx="0">
+            <a:schemeClr val="accent1"/>
+          </a:effectRef>
+          <a:fontRef idx="minor">
+            <a:schemeClr val="tx1"/>
+          </a:fontRef>
+        </p:style>
+      </p:cxnSp>
+      <p:sp>
+        <p:nvSpPr>
+          <p:cNvPr id="36" name="Flowchart: Document 35"/>
+          <p:cNvSpPr/>
+          <p:nvPr/>
+        </p:nvSpPr>
+        <p:spPr>
+          <a:xfrm>
+            <a:off x="9125629" y="3821047"/>
+            <a:ext cx="1251115" cy="785740"/>
+          </a:xfrm>
+          <a:prstGeom prst="flowChartDocument">
+            <a:avLst/>
+          </a:prstGeom>
+        </p:spPr>
+        <p:style>
+          <a:lnRef idx="1">
+            <a:schemeClr val="accent4"/>
+          </a:lnRef>
+          <a:fillRef idx="3">
+            <a:schemeClr val="accent4"/>
+          </a:fillRef>
+          <a:effectRef idx="2">
+            <a:schemeClr val="accent4"/>
+          </a:effectRef>
+          <a:fontRef idx="minor">
+            <a:schemeClr val="lt1"/>
+          </a:fontRef>
+        </p:style>
+        <p:txBody>
+          <a:bodyPr rtlCol="0" anchor="ctr"/>
+          <a:lstStyle/>
+          <a:p>
+            <a:pPr algn="ctr"/>
             <a:r>
               <a:rPr lang="en-US" dirty="0" smtClean="0"/>
-              <a:t>State</a:t>
-            </a:r>
+              <a:t>Entity 2</a:t>
+            </a:r>
+            <a:endParaRPr lang="en-US" dirty="0" smtClean="0"/>
+          </a:p>
+        </p:txBody>
+      </p:sp>
+      <p:cxnSp>
+        <p:nvCxnSpPr>
+          <p:cNvPr id="38" name="Straight Arrow Connector 37"/>
+          <p:cNvCxnSpPr/>
+          <p:nvPr/>
+        </p:nvCxnSpPr>
+        <p:spPr>
+          <a:xfrm flipH="1" flipV="1">
+            <a:off x="3012209" y="2180093"/>
+            <a:ext cx="3568374" cy="6501"/>
+          </a:xfrm>
+          <a:prstGeom prst="straightConnector1">
+            <a:avLst/>
+          </a:prstGeom>
+          <a:ln w="38100">
+            <a:solidFill>
+              <a:schemeClr val="accent3">
+                <a:lumMod val="75000"/>
+              </a:schemeClr>
+            </a:solidFill>
+            <a:tailEnd type="triangle"/>
+          </a:ln>
+        </p:spPr>
+        <p:style>
+          <a:lnRef idx="1">
+            <a:schemeClr val="accent1"/>
+          </a:lnRef>
+          <a:fillRef idx="0">
+            <a:schemeClr val="accent1"/>
+          </a:fillRef>
+          <a:effectRef idx="0">
+            <a:schemeClr val="accent1"/>
+          </a:effectRef>
+          <a:fontRef idx="minor">
+            <a:schemeClr val="tx1"/>
+          </a:fontRef>
+        </p:style>
+      </p:cxnSp>
+      <p:sp>
+        <p:nvSpPr>
+          <p:cNvPr id="40" name="Flowchart: Document 39"/>
+          <p:cNvSpPr/>
+          <p:nvPr/>
+        </p:nvSpPr>
+        <p:spPr>
+          <a:xfrm>
+            <a:off x="4170838" y="2581614"/>
+            <a:ext cx="1251115" cy="785740"/>
+          </a:xfrm>
+          <a:prstGeom prst="flowChartDocument">
+            <a:avLst/>
+          </a:prstGeom>
+        </p:spPr>
+        <p:style>
+          <a:lnRef idx="1">
+            <a:schemeClr val="accent6"/>
+          </a:lnRef>
+          <a:fillRef idx="3">
+            <a:schemeClr val="accent6"/>
+          </a:fillRef>
+          <a:effectRef idx="2">
+            <a:schemeClr val="accent6"/>
+          </a:effectRef>
+          <a:fontRef idx="minor">
+            <a:schemeClr val="lt1"/>
+          </a:fontRef>
+        </p:style>
+        <p:txBody>
+          <a:bodyPr rtlCol="0" anchor="ctr"/>
+          <a:lstStyle/>
+          <a:p>
+            <a:pPr algn="ctr"/>
+            <a:r>
+              <a:rPr lang="en-US" dirty="0" smtClean="0"/>
+              <a:t>Event 2</a:t>
+            </a:r>
+          </a:p>
+        </p:txBody>
+      </p:sp>
+    </p:spTree>
+    <p:extLst>
+      <p:ext uri="{BB962C8B-B14F-4D97-AF65-F5344CB8AC3E}">
+        <p14:creationId xmlns:p14="http://schemas.microsoft.com/office/powerpoint/2010/main" val="2862742030"/>
+      </p:ext>
+    </p:extLst>
+  </p:cSld>
+  <p:clrMapOvr>
+    <a:masterClrMapping/>
+  </p:clrMapOvr>
+  <p:timing>
+    <p:tnLst>
+      <p:par>
+        <p:cTn id="1" dur="indefinite" restart="never" nodeType="tmRoot"/>
+      </p:par>
+    </p:tnLst>
+  </p:timing>
+</p:sld>
+</file>
+
+<file path=ppt/slides/slide5.xml><?xml version="1.0" encoding="utf-8"?>
+<p:sld xmlns:a="http://schemas.openxmlformats.org/drawingml/2006/main" xmlns:r="http://schemas.openxmlformats.org/officeDocument/2006/relationships" xmlns:p="http://schemas.openxmlformats.org/presentationml/2006/main">
+  <p:cSld>
+    <p:spTree>
+      <p:nvGrpSpPr>
+        <p:cNvPr id="1" name=""/>
+        <p:cNvGrpSpPr/>
+        <p:nvPr/>
+      </p:nvGrpSpPr>
+      <p:grpSpPr>
+        <a:xfrm>
+          <a:off x="0" y="0"/>
+          <a:ext cx="0" cy="0"/>
+          <a:chOff x="0" y="0"/>
+          <a:chExt cx="0" cy="0"/>
+        </a:xfrm>
+      </p:grpSpPr>
+      <p:cxnSp>
+        <p:nvCxnSpPr>
+          <p:cNvPr id="37" name="Straight Arrow Connector 36"/>
+          <p:cNvCxnSpPr/>
+          <p:nvPr/>
+        </p:nvCxnSpPr>
+        <p:spPr>
+          <a:xfrm>
+            <a:off x="7952184" y="2027224"/>
+            <a:ext cx="1961878" cy="6501"/>
+          </a:xfrm>
+          <a:prstGeom prst="straightConnector1">
+            <a:avLst/>
+          </a:prstGeom>
+          <a:ln w="38100">
+            <a:solidFill>
+              <a:schemeClr val="accent3">
+                <a:lumMod val="75000"/>
+              </a:schemeClr>
+            </a:solidFill>
+            <a:tailEnd type="triangle"/>
+          </a:ln>
+        </p:spPr>
+        <p:style>
+          <a:lnRef idx="1">
+            <a:schemeClr val="accent1"/>
+          </a:lnRef>
+          <a:fillRef idx="0">
+            <a:schemeClr val="accent1"/>
+          </a:fillRef>
+          <a:effectRef idx="0">
+            <a:schemeClr val="accent1"/>
+          </a:effectRef>
+          <a:fontRef idx="minor">
+            <a:schemeClr val="tx1"/>
+          </a:fontRef>
+        </p:style>
+      </p:cxnSp>
+      <p:sp>
+        <p:nvSpPr>
+          <p:cNvPr id="4" name="Hexagon 3"/>
+          <p:cNvSpPr/>
+          <p:nvPr/>
+        </p:nvSpPr>
+        <p:spPr>
+          <a:xfrm rot="5400000">
+            <a:off x="1431130" y="1417446"/>
+            <a:ext cx="1669689" cy="1444386"/>
+          </a:xfrm>
+          <a:prstGeom prst="hexagon">
+            <a:avLst/>
+          </a:prstGeom>
+          <a:solidFill>
+            <a:schemeClr val="accent3">
+              <a:lumMod val="40000"/>
+              <a:lumOff val="60000"/>
+            </a:schemeClr>
+          </a:solidFill>
+          <a:ln w="38100">
+            <a:solidFill>
+              <a:schemeClr val="accent3">
+                <a:lumMod val="75000"/>
+              </a:schemeClr>
+            </a:solidFill>
+          </a:ln>
+          <a:effectLst>
+            <a:outerShdw blurRad="50800" dist="38100" dir="5400000" algn="t" rotWithShape="0">
+              <a:prstClr val="black">
+                <a:alpha val="40000"/>
+              </a:prstClr>
+            </a:outerShdw>
+          </a:effectLst>
+        </p:spPr>
+        <p:style>
+          <a:lnRef idx="1">
+            <a:schemeClr val="accent3"/>
+          </a:lnRef>
+          <a:fillRef idx="2">
+            <a:schemeClr val="accent3"/>
+          </a:fillRef>
+          <a:effectRef idx="1">
+            <a:schemeClr val="accent3"/>
+          </a:effectRef>
+          <a:fontRef idx="minor">
+            <a:schemeClr val="dk1"/>
+          </a:fontRef>
+        </p:style>
+        <p:txBody>
+          <a:bodyPr rtlCol="0" anchor="ctr"/>
+          <a:lstStyle/>
+          <a:p>
+            <a:pPr algn="ctr"/>
+            <a:endParaRPr lang="en-US" dirty="0"/>
+          </a:p>
+        </p:txBody>
+      </p:sp>
+      <p:sp>
+        <p:nvSpPr>
+          <p:cNvPr id="5" name="Diamond 4"/>
+          <p:cNvSpPr/>
+          <p:nvPr/>
+        </p:nvSpPr>
+        <p:spPr>
+          <a:xfrm>
+            <a:off x="1543782" y="1293320"/>
+            <a:ext cx="1444386" cy="735454"/>
+          </a:xfrm>
+          <a:prstGeom prst="diamond">
+            <a:avLst/>
+          </a:prstGeom>
+          <a:solidFill>
+            <a:schemeClr val="accent3">
+              <a:lumMod val="75000"/>
+            </a:schemeClr>
+          </a:solidFill>
+          <a:ln w="38100">
+            <a:solidFill>
+              <a:schemeClr val="accent3">
+                <a:lumMod val="75000"/>
+              </a:schemeClr>
+            </a:solidFill>
+          </a:ln>
+        </p:spPr>
+        <p:style>
+          <a:lnRef idx="1">
+            <a:schemeClr val="accent3"/>
+          </a:lnRef>
+          <a:fillRef idx="2">
+            <a:schemeClr val="accent3"/>
+          </a:fillRef>
+          <a:effectRef idx="1">
+            <a:schemeClr val="accent3"/>
+          </a:effectRef>
+          <a:fontRef idx="minor">
+            <a:schemeClr val="dk1"/>
+          </a:fontRef>
+        </p:style>
+        <p:txBody>
+          <a:bodyPr rtlCol="0" anchor="ctr"/>
+          <a:lstStyle/>
+          <a:p>
+            <a:pPr algn="ctr"/>
+            <a:endParaRPr lang="en-US"/>
+          </a:p>
+        </p:txBody>
+      </p:sp>
+      <p:sp>
+        <p:nvSpPr>
+          <p:cNvPr id="2" name="TextBox 1"/>
+          <p:cNvSpPr txBox="1"/>
+          <p:nvPr/>
+        </p:nvSpPr>
+        <p:spPr>
+          <a:xfrm>
+            <a:off x="1751795" y="2139639"/>
+            <a:ext cx="1028358" cy="369332"/>
+          </a:xfrm>
+          <a:prstGeom prst="rect">
+            <a:avLst/>
+          </a:prstGeom>
+          <a:noFill/>
+        </p:spPr>
+        <p:txBody>
+          <a:bodyPr wrap="none" rtlCol="0">
+            <a:spAutoFit/>
+          </a:bodyPr>
+          <a:lstStyle/>
+          <a:p>
+            <a:r>
+              <a:rPr lang="en-US" dirty="0" smtClean="0">
+                <a:solidFill>
+                  <a:schemeClr val="accent3">
+                    <a:lumMod val="50000"/>
+                  </a:schemeClr>
+                </a:solidFill>
+              </a:rPr>
+              <a:t>Service 1</a:t>
+            </a:r>
+            <a:endParaRPr lang="en-US" dirty="0">
+              <a:solidFill>
+                <a:schemeClr val="accent3">
+                  <a:lumMod val="50000"/>
+                </a:schemeClr>
+              </a:solidFill>
+            </a:endParaRPr>
+          </a:p>
+        </p:txBody>
+      </p:sp>
+      <p:sp>
+        <p:nvSpPr>
+          <p:cNvPr id="6" name="Hexagon 5"/>
+          <p:cNvSpPr/>
+          <p:nvPr/>
+        </p:nvSpPr>
+        <p:spPr>
+          <a:xfrm rot="5400000">
+            <a:off x="9801412" y="1397529"/>
+            <a:ext cx="1669689" cy="1444386"/>
+          </a:xfrm>
+          <a:prstGeom prst="hexagon">
+            <a:avLst/>
+          </a:prstGeom>
+          <a:solidFill>
+            <a:schemeClr val="accent3">
+              <a:lumMod val="40000"/>
+              <a:lumOff val="60000"/>
+            </a:schemeClr>
+          </a:solidFill>
+          <a:ln w="38100">
+            <a:solidFill>
+              <a:schemeClr val="accent3">
+                <a:lumMod val="75000"/>
+              </a:schemeClr>
+            </a:solidFill>
+          </a:ln>
+          <a:effectLst>
+            <a:outerShdw blurRad="50800" dist="38100" dir="5400000" algn="t" rotWithShape="0">
+              <a:prstClr val="black">
+                <a:alpha val="40000"/>
+              </a:prstClr>
+            </a:outerShdw>
+          </a:effectLst>
+        </p:spPr>
+        <p:style>
+          <a:lnRef idx="1">
+            <a:schemeClr val="accent3"/>
+          </a:lnRef>
+          <a:fillRef idx="2">
+            <a:schemeClr val="accent3"/>
+          </a:fillRef>
+          <a:effectRef idx="1">
+            <a:schemeClr val="accent3"/>
+          </a:effectRef>
+          <a:fontRef idx="minor">
+            <a:schemeClr val="dk1"/>
+          </a:fontRef>
+        </p:style>
+        <p:txBody>
+          <a:bodyPr rtlCol="0" anchor="ctr"/>
+          <a:lstStyle/>
+          <a:p>
+            <a:pPr algn="ctr"/>
+            <a:endParaRPr lang="en-US" dirty="0"/>
+          </a:p>
+        </p:txBody>
+      </p:sp>
+      <p:sp>
+        <p:nvSpPr>
+          <p:cNvPr id="7" name="Diamond 6"/>
+          <p:cNvSpPr/>
+          <p:nvPr/>
+        </p:nvSpPr>
+        <p:spPr>
+          <a:xfrm>
+            <a:off x="9914064" y="1273403"/>
+            <a:ext cx="1444386" cy="735454"/>
+          </a:xfrm>
+          <a:prstGeom prst="diamond">
+            <a:avLst/>
+          </a:prstGeom>
+          <a:solidFill>
+            <a:schemeClr val="accent3">
+              <a:lumMod val="75000"/>
+            </a:schemeClr>
+          </a:solidFill>
+          <a:ln w="38100">
+            <a:solidFill>
+              <a:schemeClr val="accent3">
+                <a:lumMod val="75000"/>
+              </a:schemeClr>
+            </a:solidFill>
+          </a:ln>
+        </p:spPr>
+        <p:style>
+          <a:lnRef idx="1">
+            <a:schemeClr val="accent3"/>
+          </a:lnRef>
+          <a:fillRef idx="2">
+            <a:schemeClr val="accent3"/>
+          </a:fillRef>
+          <a:effectRef idx="1">
+            <a:schemeClr val="accent3"/>
+          </a:effectRef>
+          <a:fontRef idx="minor">
+            <a:schemeClr val="dk1"/>
+          </a:fontRef>
+        </p:style>
+        <p:txBody>
+          <a:bodyPr rtlCol="0" anchor="ctr"/>
+          <a:lstStyle/>
+          <a:p>
+            <a:pPr algn="ctr"/>
+            <a:endParaRPr lang="en-US"/>
+          </a:p>
+        </p:txBody>
+      </p:sp>
+      <p:sp>
+        <p:nvSpPr>
+          <p:cNvPr id="8" name="TextBox 7"/>
+          <p:cNvSpPr txBox="1"/>
+          <p:nvPr/>
+        </p:nvSpPr>
+        <p:spPr>
+          <a:xfrm>
+            <a:off x="10122077" y="2119722"/>
+            <a:ext cx="1028358" cy="369332"/>
+          </a:xfrm>
+          <a:prstGeom prst="rect">
+            <a:avLst/>
+          </a:prstGeom>
+          <a:noFill/>
+        </p:spPr>
+        <p:txBody>
+          <a:bodyPr wrap="none" rtlCol="0">
+            <a:spAutoFit/>
+          </a:bodyPr>
+          <a:lstStyle/>
+          <a:p>
+            <a:r>
+              <a:rPr lang="en-US" dirty="0" smtClean="0">
+                <a:solidFill>
+                  <a:schemeClr val="accent3">
+                    <a:lumMod val="50000"/>
+                  </a:schemeClr>
+                </a:solidFill>
+              </a:rPr>
+              <a:t>Service 2</a:t>
+            </a:r>
+          </a:p>
+        </p:txBody>
+      </p:sp>
+      <p:sp>
+        <p:nvSpPr>
+          <p:cNvPr id="3" name="Flowchart: Magnetic Disk 2"/>
+          <p:cNvSpPr/>
+          <p:nvPr/>
+        </p:nvSpPr>
+        <p:spPr>
+          <a:xfrm>
+            <a:off x="1543780" y="4466496"/>
+            <a:ext cx="1444387" cy="1324708"/>
+          </a:xfrm>
+          <a:prstGeom prst="flowChartMagneticDisk">
+            <a:avLst/>
+          </a:prstGeom>
+          <a:ln w="38100"/>
+          <a:effectLst>
+            <a:outerShdw blurRad="50800" dist="38100" dir="5400000" algn="t" rotWithShape="0">
+              <a:prstClr val="black">
+                <a:alpha val="40000"/>
+              </a:prstClr>
+            </a:outerShdw>
+          </a:effectLst>
+        </p:spPr>
+        <p:style>
+          <a:lnRef idx="3">
+            <a:schemeClr val="lt1"/>
+          </a:lnRef>
+          <a:fillRef idx="1">
+            <a:schemeClr val="accent1"/>
+          </a:fillRef>
+          <a:effectRef idx="1">
+            <a:schemeClr val="accent1"/>
+          </a:effectRef>
+          <a:fontRef idx="minor">
+            <a:schemeClr val="lt1"/>
+          </a:fontRef>
+        </p:style>
+        <p:txBody>
+          <a:bodyPr rtlCol="0" anchor="ctr"/>
+          <a:lstStyle/>
+          <a:p>
+            <a:pPr algn="ctr"/>
+            <a:endParaRPr lang="en-US"/>
+          </a:p>
+        </p:txBody>
+      </p:sp>
+      <p:cxnSp>
+        <p:nvCxnSpPr>
+          <p:cNvPr id="10" name="Straight Arrow Connector 9"/>
+          <p:cNvCxnSpPr>
+            <a:stCxn id="4" idx="0"/>
+            <a:endCxn id="3" idx="1"/>
+          </p:cNvCxnSpPr>
+          <p:nvPr/>
+        </p:nvCxnSpPr>
+        <p:spPr>
+          <a:xfrm flipH="1">
+            <a:off x="2265974" y="2974484"/>
+            <a:ext cx="1" cy="1492012"/>
+          </a:xfrm>
+          <a:prstGeom prst="straightConnector1">
+            <a:avLst/>
+          </a:prstGeom>
+          <a:ln w="38100">
+            <a:solidFill>
+              <a:schemeClr val="accent3">
+                <a:lumMod val="75000"/>
+              </a:schemeClr>
+            </a:solidFill>
+            <a:tailEnd type="triangle"/>
+          </a:ln>
+        </p:spPr>
+        <p:style>
+          <a:lnRef idx="1">
+            <a:schemeClr val="accent1"/>
+          </a:lnRef>
+          <a:fillRef idx="0">
+            <a:schemeClr val="accent1"/>
+          </a:fillRef>
+          <a:effectRef idx="0">
+            <a:schemeClr val="accent1"/>
+          </a:effectRef>
+          <a:fontRef idx="minor">
+            <a:schemeClr val="tx1"/>
+          </a:fontRef>
+        </p:style>
+      </p:cxnSp>
+      <p:cxnSp>
+        <p:nvCxnSpPr>
+          <p:cNvPr id="11" name="Straight Arrow Connector 10"/>
+          <p:cNvCxnSpPr/>
+          <p:nvPr/>
+        </p:nvCxnSpPr>
+        <p:spPr>
+          <a:xfrm flipV="1">
+            <a:off x="2988167" y="2028774"/>
+            <a:ext cx="3592416" cy="11473"/>
+          </a:xfrm>
+          <a:prstGeom prst="straightConnector1">
+            <a:avLst/>
+          </a:prstGeom>
+          <a:ln w="38100">
+            <a:solidFill>
+              <a:schemeClr val="accent3">
+                <a:lumMod val="75000"/>
+              </a:schemeClr>
+            </a:solidFill>
+            <a:tailEnd type="triangle"/>
+          </a:ln>
+        </p:spPr>
+        <p:style>
+          <a:lnRef idx="1">
+            <a:schemeClr val="accent1"/>
+          </a:lnRef>
+          <a:fillRef idx="0">
+            <a:schemeClr val="accent1"/>
+          </a:fillRef>
+          <a:effectRef idx="0">
+            <a:schemeClr val="accent1"/>
+          </a:effectRef>
+          <a:fontRef idx="minor">
+            <a:schemeClr val="tx1"/>
+          </a:fontRef>
+        </p:style>
+      </p:cxnSp>
+      <p:sp>
+        <p:nvSpPr>
+          <p:cNvPr id="15" name="Flowchart: Document 14"/>
+          <p:cNvSpPr/>
+          <p:nvPr/>
+        </p:nvSpPr>
+        <p:spPr>
+          <a:xfrm>
+            <a:off x="4345143" y="1298117"/>
+            <a:ext cx="853345" cy="515815"/>
+          </a:xfrm>
+          <a:prstGeom prst="flowChartDocument">
+            <a:avLst/>
+          </a:prstGeom>
+        </p:spPr>
+        <p:style>
+          <a:lnRef idx="1">
+            <a:schemeClr val="accent6"/>
+          </a:lnRef>
+          <a:fillRef idx="3">
+            <a:schemeClr val="accent6"/>
+          </a:fillRef>
+          <a:effectRef idx="2">
+            <a:schemeClr val="accent6"/>
+          </a:effectRef>
+          <a:fontRef idx="minor">
+            <a:schemeClr val="lt1"/>
+          </a:fontRef>
+        </p:style>
+        <p:txBody>
+          <a:bodyPr rtlCol="0" anchor="ctr"/>
+          <a:lstStyle/>
+          <a:p>
+            <a:pPr algn="ctr"/>
+            <a:r>
+              <a:rPr lang="en-US" dirty="0" smtClean="0"/>
+              <a:t>Event</a:t>
+            </a:r>
+          </a:p>
+        </p:txBody>
+      </p:sp>
+      <p:sp>
+        <p:nvSpPr>
+          <p:cNvPr id="16" name="Flowchart: Document 15"/>
+          <p:cNvSpPr/>
+          <p:nvPr/>
+        </p:nvSpPr>
+        <p:spPr>
+          <a:xfrm>
+            <a:off x="2461846" y="3413886"/>
+            <a:ext cx="853345" cy="515815"/>
+          </a:xfrm>
+          <a:prstGeom prst="flowChartDocument">
+            <a:avLst/>
+          </a:prstGeom>
+        </p:spPr>
+        <p:style>
+          <a:lnRef idx="1">
+            <a:schemeClr val="accent4"/>
+          </a:lnRef>
+          <a:fillRef idx="3">
+            <a:schemeClr val="accent4"/>
+          </a:fillRef>
+          <a:effectRef idx="2">
+            <a:schemeClr val="accent4"/>
+          </a:effectRef>
+          <a:fontRef idx="minor">
+            <a:schemeClr val="lt1"/>
+          </a:fontRef>
+        </p:style>
+        <p:txBody>
+          <a:bodyPr rtlCol="0" anchor="ctr"/>
+          <a:lstStyle/>
+          <a:p>
+            <a:pPr algn="ctr"/>
+            <a:r>
+              <a:rPr lang="en-US" dirty="0" smtClean="0"/>
+              <a:t>Entity</a:t>
+            </a:r>
+            <a:endParaRPr lang="en-US" dirty="0" smtClean="0"/>
           </a:p>
         </p:txBody>
       </p:sp>
@@ -5387,7 +6887,7 @@
     </p:spTree>
     <p:extLst>
       <p:ext uri="{BB962C8B-B14F-4D97-AF65-F5344CB8AC3E}">
-        <p14:creationId xmlns:p14="http://schemas.microsoft.com/office/powerpoint/2010/main" val="2862742030"/>
+        <p14:creationId xmlns:p14="http://schemas.microsoft.com/office/powerpoint/2010/main" val="4137956010"/>
       </p:ext>
     </p:extLst>
   </p:cSld>
@@ -5609,6 +7109,2453 @@
       <p:bldP spid="32" grpId="0"/>
       <p:bldP spid="34" grpId="0"/>
     </p:bldLst>
+  </p:timing>
+</p:sld>
+</file>
+
+<file path=ppt/slides/slide6.xml><?xml version="1.0" encoding="utf-8"?>
+<p:sld xmlns:a="http://schemas.openxmlformats.org/drawingml/2006/main" xmlns:r="http://schemas.openxmlformats.org/officeDocument/2006/relationships" xmlns:p="http://schemas.openxmlformats.org/presentationml/2006/main">
+  <p:cSld>
+    <p:spTree>
+      <p:nvGrpSpPr>
+        <p:cNvPr id="1" name=""/>
+        <p:cNvGrpSpPr/>
+        <p:nvPr/>
+      </p:nvGrpSpPr>
+      <p:grpSpPr>
+        <a:xfrm>
+          <a:off x="0" y="0"/>
+          <a:ext cx="0" cy="0"/>
+          <a:chOff x="0" y="0"/>
+          <a:chExt cx="0" cy="0"/>
+        </a:xfrm>
+      </p:grpSpPr>
+      <p:sp>
+        <p:nvSpPr>
+          <p:cNvPr id="2" name="Title 1"/>
+          <p:cNvSpPr>
+            <a:spLocks noGrp="1"/>
+          </p:cNvSpPr>
+          <p:nvPr>
+            <p:ph type="ctrTitle"/>
+          </p:nvPr>
+        </p:nvSpPr>
+        <p:spPr/>
+        <p:txBody>
+          <a:bodyPr/>
+          <a:lstStyle/>
+          <a:p>
+            <a:r>
+              <a:rPr lang="en-US" dirty="0" smtClean="0">
+                <a:solidFill>
+                  <a:srgbClr val="FFFF00"/>
+                </a:solidFill>
+              </a:rPr>
+              <a:t>Key takeaway: </a:t>
+            </a:r>
+            <a:r>
+              <a:rPr lang="en-US" dirty="0" smtClean="0"/>
+              <a:t/>
+            </a:r>
+            <a:br>
+              <a:rPr lang="en-US" dirty="0" smtClean="0"/>
+            </a:br>
+            <a:r>
+              <a:rPr lang="en-US" dirty="0" smtClean="0"/>
+              <a:t>persist state and publish event </a:t>
+            </a:r>
+            <a:r>
+              <a:rPr lang="en-US" dirty="0" smtClean="0">
+                <a:solidFill>
+                  <a:srgbClr val="92D050"/>
+                </a:solidFill>
+              </a:rPr>
+              <a:t>atomically</a:t>
+            </a:r>
+            <a:endParaRPr lang="en-US" dirty="0">
+              <a:solidFill>
+                <a:srgbClr val="92D050"/>
+              </a:solidFill>
+            </a:endParaRPr>
+          </a:p>
+        </p:txBody>
+      </p:sp>
+      <p:sp>
+        <p:nvSpPr>
+          <p:cNvPr id="3" name="Subtitle 2"/>
+          <p:cNvSpPr>
+            <a:spLocks noGrp="1"/>
+          </p:cNvSpPr>
+          <p:nvPr>
+            <p:ph type="subTitle" idx="1"/>
+          </p:nvPr>
+        </p:nvSpPr>
+        <p:spPr/>
+        <p:txBody>
+          <a:bodyPr/>
+          <a:lstStyle/>
+          <a:p>
+            <a:endParaRPr lang="en-US" dirty="0"/>
+          </a:p>
+        </p:txBody>
+      </p:sp>
+    </p:spTree>
+    <p:extLst>
+      <p:ext uri="{BB962C8B-B14F-4D97-AF65-F5344CB8AC3E}">
+        <p14:creationId xmlns:p14="http://schemas.microsoft.com/office/powerpoint/2010/main" val="233618984"/>
+      </p:ext>
+    </p:extLst>
+  </p:cSld>
+  <p:clrMapOvr>
+    <a:masterClrMapping/>
+  </p:clrMapOvr>
+  <p:timing>
+    <p:tnLst>
+      <p:par>
+        <p:cTn id="1" dur="indefinite" restart="never" nodeType="tmRoot"/>
+      </p:par>
+    </p:tnLst>
+  </p:timing>
+</p:sld>
+</file>
+
+<file path=ppt/slides/slide7.xml><?xml version="1.0" encoding="utf-8"?>
+<p:sld xmlns:a="http://schemas.openxmlformats.org/drawingml/2006/main" xmlns:r="http://schemas.openxmlformats.org/officeDocument/2006/relationships" xmlns:p="http://schemas.openxmlformats.org/presentationml/2006/main">
+  <p:cSld>
+    <p:spTree>
+      <p:nvGrpSpPr>
+        <p:cNvPr id="1" name=""/>
+        <p:cNvGrpSpPr/>
+        <p:nvPr/>
+      </p:nvGrpSpPr>
+      <p:grpSpPr>
+        <a:xfrm>
+          <a:off x="0" y="0"/>
+          <a:ext cx="0" cy="0"/>
+          <a:chOff x="0" y="0"/>
+          <a:chExt cx="0" cy="0"/>
+        </a:xfrm>
+      </p:grpSpPr>
+      <p:sp>
+        <p:nvSpPr>
+          <p:cNvPr id="2" name="Title 1"/>
+          <p:cNvSpPr>
+            <a:spLocks noGrp="1"/>
+          </p:cNvSpPr>
+          <p:nvPr>
+            <p:ph type="ctrTitle"/>
+          </p:nvPr>
+        </p:nvSpPr>
+        <p:spPr>
+          <a:xfrm>
+            <a:off x="1261872" y="383065"/>
+            <a:ext cx="9418320" cy="1062681"/>
+          </a:xfrm>
+        </p:spPr>
+        <p:txBody>
+          <a:bodyPr>
+            <a:normAutofit/>
+          </a:bodyPr>
+          <a:lstStyle/>
+          <a:p>
+            <a:r>
+              <a:rPr lang="en-US" dirty="0" smtClean="0"/>
+              <a:t>Event Sourcing</a:t>
+            </a:r>
+            <a:endParaRPr lang="en-US" dirty="0"/>
+          </a:p>
+        </p:txBody>
+      </p:sp>
+      <p:sp>
+        <p:nvSpPr>
+          <p:cNvPr id="4" name="Hexagon 3"/>
+          <p:cNvSpPr/>
+          <p:nvPr/>
+        </p:nvSpPr>
+        <p:spPr>
+          <a:xfrm rot="5400000">
+            <a:off x="1431129" y="1874646"/>
+            <a:ext cx="1669689" cy="1444386"/>
+          </a:xfrm>
+          <a:prstGeom prst="hexagon">
+            <a:avLst/>
+          </a:prstGeom>
+          <a:solidFill>
+            <a:schemeClr val="accent3">
+              <a:lumMod val="40000"/>
+              <a:lumOff val="60000"/>
+            </a:schemeClr>
+          </a:solidFill>
+          <a:ln w="38100">
+            <a:solidFill>
+              <a:schemeClr val="accent3">
+                <a:lumMod val="75000"/>
+              </a:schemeClr>
+            </a:solidFill>
+          </a:ln>
+          <a:effectLst>
+            <a:outerShdw blurRad="50800" dist="38100" dir="5400000" algn="t" rotWithShape="0">
+              <a:prstClr val="black">
+                <a:alpha val="40000"/>
+              </a:prstClr>
+            </a:outerShdw>
+          </a:effectLst>
+        </p:spPr>
+        <p:style>
+          <a:lnRef idx="1">
+            <a:schemeClr val="accent3"/>
+          </a:lnRef>
+          <a:fillRef idx="2">
+            <a:schemeClr val="accent3"/>
+          </a:fillRef>
+          <a:effectRef idx="1">
+            <a:schemeClr val="accent3"/>
+          </a:effectRef>
+          <a:fontRef idx="minor">
+            <a:schemeClr val="dk1"/>
+          </a:fontRef>
+        </p:style>
+        <p:txBody>
+          <a:bodyPr rtlCol="0" anchor="ctr"/>
+          <a:lstStyle/>
+          <a:p>
+            <a:pPr algn="ctr"/>
+            <a:endParaRPr lang="en-US" dirty="0"/>
+          </a:p>
+        </p:txBody>
+      </p:sp>
+      <p:sp>
+        <p:nvSpPr>
+          <p:cNvPr id="5" name="Diamond 4"/>
+          <p:cNvSpPr/>
+          <p:nvPr/>
+        </p:nvSpPr>
+        <p:spPr>
+          <a:xfrm>
+            <a:off x="1543781" y="1750520"/>
+            <a:ext cx="1444386" cy="735454"/>
+          </a:xfrm>
+          <a:prstGeom prst="diamond">
+            <a:avLst/>
+          </a:prstGeom>
+          <a:solidFill>
+            <a:schemeClr val="accent3">
+              <a:lumMod val="75000"/>
+            </a:schemeClr>
+          </a:solidFill>
+          <a:ln w="38100">
+            <a:solidFill>
+              <a:schemeClr val="accent3">
+                <a:lumMod val="75000"/>
+              </a:schemeClr>
+            </a:solidFill>
+          </a:ln>
+        </p:spPr>
+        <p:style>
+          <a:lnRef idx="1">
+            <a:schemeClr val="accent3"/>
+          </a:lnRef>
+          <a:fillRef idx="2">
+            <a:schemeClr val="accent3"/>
+          </a:fillRef>
+          <a:effectRef idx="1">
+            <a:schemeClr val="accent3"/>
+          </a:effectRef>
+          <a:fontRef idx="minor">
+            <a:schemeClr val="dk1"/>
+          </a:fontRef>
+        </p:style>
+        <p:txBody>
+          <a:bodyPr rtlCol="0" anchor="ctr"/>
+          <a:lstStyle/>
+          <a:p>
+            <a:pPr algn="ctr"/>
+            <a:endParaRPr lang="en-US"/>
+          </a:p>
+        </p:txBody>
+      </p:sp>
+      <p:sp>
+        <p:nvSpPr>
+          <p:cNvPr id="6" name="TextBox 5"/>
+          <p:cNvSpPr txBox="1"/>
+          <p:nvPr/>
+        </p:nvSpPr>
+        <p:spPr>
+          <a:xfrm>
+            <a:off x="1751794" y="2596839"/>
+            <a:ext cx="1028358" cy="369332"/>
+          </a:xfrm>
+          <a:prstGeom prst="rect">
+            <a:avLst/>
+          </a:prstGeom>
+          <a:noFill/>
+        </p:spPr>
+        <p:txBody>
+          <a:bodyPr wrap="none" rtlCol="0">
+            <a:spAutoFit/>
+          </a:bodyPr>
+          <a:lstStyle/>
+          <a:p>
+            <a:r>
+              <a:rPr lang="en-US" dirty="0" smtClean="0">
+                <a:solidFill>
+                  <a:schemeClr val="accent3">
+                    <a:lumMod val="50000"/>
+                  </a:schemeClr>
+                </a:solidFill>
+              </a:rPr>
+              <a:t>Service 1</a:t>
+            </a:r>
+            <a:endParaRPr lang="en-US" dirty="0">
+              <a:solidFill>
+                <a:schemeClr val="accent3">
+                  <a:lumMod val="50000"/>
+                </a:schemeClr>
+              </a:solidFill>
+            </a:endParaRPr>
+          </a:p>
+        </p:txBody>
+      </p:sp>
+      <p:cxnSp>
+        <p:nvCxnSpPr>
+          <p:cNvPr id="8" name="Straight Arrow Connector 7"/>
+          <p:cNvCxnSpPr>
+            <a:stCxn id="4" idx="0"/>
+          </p:cNvCxnSpPr>
+          <p:nvPr/>
+        </p:nvCxnSpPr>
+        <p:spPr>
+          <a:xfrm>
+            <a:off x="2265974" y="3431684"/>
+            <a:ext cx="15108" cy="1853933"/>
+          </a:xfrm>
+          <a:prstGeom prst="straightConnector1">
+            <a:avLst/>
+          </a:prstGeom>
+          <a:ln w="38100">
+            <a:solidFill>
+              <a:schemeClr val="accent3">
+                <a:lumMod val="75000"/>
+              </a:schemeClr>
+            </a:solidFill>
+            <a:tailEnd type="triangle"/>
+          </a:ln>
+        </p:spPr>
+        <p:style>
+          <a:lnRef idx="1">
+            <a:schemeClr val="accent1"/>
+          </a:lnRef>
+          <a:fillRef idx="0">
+            <a:schemeClr val="accent1"/>
+          </a:fillRef>
+          <a:effectRef idx="0">
+            <a:schemeClr val="accent1"/>
+          </a:effectRef>
+          <a:fontRef idx="minor">
+            <a:schemeClr val="tx1"/>
+          </a:fontRef>
+        </p:style>
+      </p:cxnSp>
+      <p:sp>
+        <p:nvSpPr>
+          <p:cNvPr id="11" name="Flowchart: Document 10"/>
+          <p:cNvSpPr/>
+          <p:nvPr/>
+        </p:nvSpPr>
+        <p:spPr>
+          <a:xfrm>
+            <a:off x="2733935" y="3673797"/>
+            <a:ext cx="1119192" cy="623294"/>
+          </a:xfrm>
+          <a:prstGeom prst="flowChartDocument">
+            <a:avLst/>
+          </a:prstGeom>
+        </p:spPr>
+        <p:style>
+          <a:lnRef idx="1">
+            <a:schemeClr val="accent6"/>
+          </a:lnRef>
+          <a:fillRef idx="3">
+            <a:schemeClr val="accent6"/>
+          </a:fillRef>
+          <a:effectRef idx="2">
+            <a:schemeClr val="accent6"/>
+          </a:effectRef>
+          <a:fontRef idx="minor">
+            <a:schemeClr val="lt1"/>
+          </a:fontRef>
+        </p:style>
+        <p:txBody>
+          <a:bodyPr rtlCol="0" anchor="ctr"/>
+          <a:lstStyle/>
+          <a:p>
+            <a:pPr algn="ctr"/>
+            <a:r>
+              <a:rPr lang="en-US" dirty="0" smtClean="0"/>
+              <a:t>Event 1</a:t>
+            </a:r>
+          </a:p>
+        </p:txBody>
+      </p:sp>
+      <p:sp>
+        <p:nvSpPr>
+          <p:cNvPr id="12" name="Flowchart: Document 11"/>
+          <p:cNvSpPr/>
+          <p:nvPr/>
+        </p:nvSpPr>
+        <p:spPr>
+          <a:xfrm>
+            <a:off x="2886335" y="3826197"/>
+            <a:ext cx="1119192" cy="623294"/>
+          </a:xfrm>
+          <a:prstGeom prst="flowChartDocument">
+            <a:avLst/>
+          </a:prstGeom>
+        </p:spPr>
+        <p:style>
+          <a:lnRef idx="1">
+            <a:schemeClr val="accent6"/>
+          </a:lnRef>
+          <a:fillRef idx="3">
+            <a:schemeClr val="accent6"/>
+          </a:fillRef>
+          <a:effectRef idx="2">
+            <a:schemeClr val="accent6"/>
+          </a:effectRef>
+          <a:fontRef idx="minor">
+            <a:schemeClr val="lt1"/>
+          </a:fontRef>
+        </p:style>
+        <p:txBody>
+          <a:bodyPr rtlCol="0" anchor="ctr"/>
+          <a:lstStyle/>
+          <a:p>
+            <a:pPr algn="ctr"/>
+            <a:r>
+              <a:rPr lang="en-US" dirty="0" smtClean="0"/>
+              <a:t>Event 1</a:t>
+            </a:r>
+          </a:p>
+        </p:txBody>
+      </p:sp>
+      <p:sp>
+        <p:nvSpPr>
+          <p:cNvPr id="13" name="Flowchart: Document 12"/>
+          <p:cNvSpPr/>
+          <p:nvPr/>
+        </p:nvSpPr>
+        <p:spPr>
+          <a:xfrm>
+            <a:off x="3038735" y="3978597"/>
+            <a:ext cx="1119192" cy="623294"/>
+          </a:xfrm>
+          <a:prstGeom prst="flowChartDocument">
+            <a:avLst/>
+          </a:prstGeom>
+        </p:spPr>
+        <p:style>
+          <a:lnRef idx="1">
+            <a:schemeClr val="accent6"/>
+          </a:lnRef>
+          <a:fillRef idx="3">
+            <a:schemeClr val="accent6"/>
+          </a:fillRef>
+          <a:effectRef idx="2">
+            <a:schemeClr val="accent6"/>
+          </a:effectRef>
+          <a:fontRef idx="minor">
+            <a:schemeClr val="lt1"/>
+          </a:fontRef>
+        </p:style>
+        <p:txBody>
+          <a:bodyPr rtlCol="0" anchor="ctr"/>
+          <a:lstStyle/>
+          <a:p>
+            <a:pPr algn="ctr"/>
+            <a:r>
+              <a:rPr lang="en-US" dirty="0" smtClean="0"/>
+              <a:t>Event 1</a:t>
+            </a:r>
+          </a:p>
+        </p:txBody>
+      </p:sp>
+      <p:sp>
+        <p:nvSpPr>
+          <p:cNvPr id="14" name="Flowchart: Document 13"/>
+          <p:cNvSpPr/>
+          <p:nvPr/>
+        </p:nvSpPr>
+        <p:spPr>
+          <a:xfrm>
+            <a:off x="3191135" y="4130997"/>
+            <a:ext cx="1119192" cy="623294"/>
+          </a:xfrm>
+          <a:prstGeom prst="flowChartDocument">
+            <a:avLst/>
+          </a:prstGeom>
+        </p:spPr>
+        <p:style>
+          <a:lnRef idx="1">
+            <a:schemeClr val="accent6"/>
+          </a:lnRef>
+          <a:fillRef idx="3">
+            <a:schemeClr val="accent6"/>
+          </a:fillRef>
+          <a:effectRef idx="2">
+            <a:schemeClr val="accent6"/>
+          </a:effectRef>
+          <a:fontRef idx="minor">
+            <a:schemeClr val="lt1"/>
+          </a:fontRef>
+        </p:style>
+        <p:txBody>
+          <a:bodyPr rtlCol="0" anchor="ctr"/>
+          <a:lstStyle/>
+          <a:p>
+            <a:pPr algn="ctr"/>
+            <a:r>
+              <a:rPr lang="en-US" dirty="0" smtClean="0"/>
+              <a:t>Event 1</a:t>
+            </a:r>
+          </a:p>
+        </p:txBody>
+      </p:sp>
+      <p:sp>
+        <p:nvSpPr>
+          <p:cNvPr id="15" name="Flowchart: Document 14"/>
+          <p:cNvSpPr/>
+          <p:nvPr/>
+        </p:nvSpPr>
+        <p:spPr>
+          <a:xfrm>
+            <a:off x="3343535" y="4283397"/>
+            <a:ext cx="1119192" cy="623294"/>
+          </a:xfrm>
+          <a:prstGeom prst="flowChartDocument">
+            <a:avLst/>
+          </a:prstGeom>
+        </p:spPr>
+        <p:style>
+          <a:lnRef idx="1">
+            <a:schemeClr val="accent6"/>
+          </a:lnRef>
+          <a:fillRef idx="3">
+            <a:schemeClr val="accent6"/>
+          </a:fillRef>
+          <a:effectRef idx="2">
+            <a:schemeClr val="accent6"/>
+          </a:effectRef>
+          <a:fontRef idx="minor">
+            <a:schemeClr val="lt1"/>
+          </a:fontRef>
+        </p:style>
+        <p:txBody>
+          <a:bodyPr rtlCol="0" anchor="ctr"/>
+          <a:lstStyle/>
+          <a:p>
+            <a:pPr algn="ctr"/>
+            <a:r>
+              <a:rPr lang="en-US" dirty="0" smtClean="0"/>
+              <a:t>Event</a:t>
+            </a:r>
+          </a:p>
+        </p:txBody>
+      </p:sp>
+      <p:sp>
+        <p:nvSpPr>
+          <p:cNvPr id="16" name="Chevron 15"/>
+          <p:cNvSpPr/>
+          <p:nvPr/>
+        </p:nvSpPr>
+        <p:spPr>
+          <a:xfrm>
+            <a:off x="915766" y="5310331"/>
+            <a:ext cx="1144943" cy="962081"/>
+          </a:xfrm>
+          <a:prstGeom prst="chevron">
+            <a:avLst/>
+          </a:prstGeom>
+        </p:spPr>
+        <p:style>
+          <a:lnRef idx="0">
+            <a:schemeClr val="accent3"/>
+          </a:lnRef>
+          <a:fillRef idx="3">
+            <a:schemeClr val="accent3"/>
+          </a:fillRef>
+          <a:effectRef idx="3">
+            <a:schemeClr val="accent3"/>
+          </a:effectRef>
+          <a:fontRef idx="minor">
+            <a:schemeClr val="lt1"/>
+          </a:fontRef>
+        </p:style>
+        <p:txBody>
+          <a:bodyPr rtlCol="0" anchor="ctr"/>
+          <a:lstStyle/>
+          <a:p>
+            <a:pPr algn="ctr"/>
+            <a:endParaRPr lang="en-US">
+              <a:solidFill>
+                <a:schemeClr val="tx1"/>
+              </a:solidFill>
+            </a:endParaRPr>
+          </a:p>
+        </p:txBody>
+      </p:sp>
+      <p:sp>
+        <p:nvSpPr>
+          <p:cNvPr id="18" name="Chevron 17"/>
+          <p:cNvSpPr/>
+          <p:nvPr/>
+        </p:nvSpPr>
+        <p:spPr>
+          <a:xfrm>
+            <a:off x="1782973" y="5298847"/>
+            <a:ext cx="1144943" cy="962081"/>
+          </a:xfrm>
+          <a:prstGeom prst="chevron">
+            <a:avLst/>
+          </a:prstGeom>
+        </p:spPr>
+        <p:style>
+          <a:lnRef idx="0">
+            <a:schemeClr val="accent3"/>
+          </a:lnRef>
+          <a:fillRef idx="3">
+            <a:schemeClr val="accent3"/>
+          </a:fillRef>
+          <a:effectRef idx="3">
+            <a:schemeClr val="accent3"/>
+          </a:effectRef>
+          <a:fontRef idx="minor">
+            <a:schemeClr val="lt1"/>
+          </a:fontRef>
+        </p:style>
+        <p:txBody>
+          <a:bodyPr rtlCol="0" anchor="ctr"/>
+          <a:lstStyle/>
+          <a:p>
+            <a:pPr algn="ctr"/>
+            <a:endParaRPr lang="en-US">
+              <a:solidFill>
+                <a:schemeClr val="tx1"/>
+              </a:solidFill>
+            </a:endParaRPr>
+          </a:p>
+        </p:txBody>
+      </p:sp>
+      <p:sp>
+        <p:nvSpPr>
+          <p:cNvPr id="19" name="Chevron 18"/>
+          <p:cNvSpPr/>
+          <p:nvPr/>
+        </p:nvSpPr>
+        <p:spPr>
+          <a:xfrm>
+            <a:off x="2642179" y="5298846"/>
+            <a:ext cx="1144943" cy="962081"/>
+          </a:xfrm>
+          <a:prstGeom prst="chevron">
+            <a:avLst/>
+          </a:prstGeom>
+        </p:spPr>
+        <p:style>
+          <a:lnRef idx="0">
+            <a:schemeClr val="accent3"/>
+          </a:lnRef>
+          <a:fillRef idx="3">
+            <a:schemeClr val="accent3"/>
+          </a:fillRef>
+          <a:effectRef idx="3">
+            <a:schemeClr val="accent3"/>
+          </a:effectRef>
+          <a:fontRef idx="minor">
+            <a:schemeClr val="lt1"/>
+          </a:fontRef>
+        </p:style>
+        <p:txBody>
+          <a:bodyPr rtlCol="0" anchor="ctr"/>
+          <a:lstStyle/>
+          <a:p>
+            <a:pPr algn="ctr"/>
+            <a:endParaRPr lang="en-US">
+              <a:solidFill>
+                <a:schemeClr val="tx1"/>
+              </a:solidFill>
+            </a:endParaRPr>
+          </a:p>
+        </p:txBody>
+      </p:sp>
+      <p:sp>
+        <p:nvSpPr>
+          <p:cNvPr id="20" name="Chevron 19"/>
+          <p:cNvSpPr/>
+          <p:nvPr/>
+        </p:nvSpPr>
+        <p:spPr>
+          <a:xfrm>
+            <a:off x="3509386" y="5310331"/>
+            <a:ext cx="1144943" cy="962081"/>
+          </a:xfrm>
+          <a:prstGeom prst="chevron">
+            <a:avLst/>
+          </a:prstGeom>
+        </p:spPr>
+        <p:style>
+          <a:lnRef idx="0">
+            <a:schemeClr val="accent3"/>
+          </a:lnRef>
+          <a:fillRef idx="3">
+            <a:schemeClr val="accent3"/>
+          </a:fillRef>
+          <a:effectRef idx="3">
+            <a:schemeClr val="accent3"/>
+          </a:effectRef>
+          <a:fontRef idx="minor">
+            <a:schemeClr val="lt1"/>
+          </a:fontRef>
+        </p:style>
+        <p:txBody>
+          <a:bodyPr rtlCol="0" anchor="ctr"/>
+          <a:lstStyle/>
+          <a:p>
+            <a:pPr algn="ctr"/>
+            <a:endParaRPr lang="en-US">
+              <a:solidFill>
+                <a:schemeClr val="tx1"/>
+              </a:solidFill>
+            </a:endParaRPr>
+          </a:p>
+        </p:txBody>
+      </p:sp>
+      <p:sp>
+        <p:nvSpPr>
+          <p:cNvPr id="21" name="Chevron 20"/>
+          <p:cNvSpPr/>
+          <p:nvPr/>
+        </p:nvSpPr>
+        <p:spPr>
+          <a:xfrm>
+            <a:off x="4376593" y="5310331"/>
+            <a:ext cx="1144943" cy="962081"/>
+          </a:xfrm>
+          <a:prstGeom prst="chevron">
+            <a:avLst/>
+          </a:prstGeom>
+        </p:spPr>
+        <p:style>
+          <a:lnRef idx="0">
+            <a:schemeClr val="accent3"/>
+          </a:lnRef>
+          <a:fillRef idx="3">
+            <a:schemeClr val="accent3"/>
+          </a:fillRef>
+          <a:effectRef idx="3">
+            <a:schemeClr val="accent3"/>
+          </a:effectRef>
+          <a:fontRef idx="minor">
+            <a:schemeClr val="lt1"/>
+          </a:fontRef>
+        </p:style>
+        <p:txBody>
+          <a:bodyPr rtlCol="0" anchor="ctr"/>
+          <a:lstStyle/>
+          <a:p>
+            <a:pPr algn="ctr"/>
+            <a:endParaRPr lang="en-US">
+              <a:solidFill>
+                <a:schemeClr val="tx1"/>
+              </a:solidFill>
+            </a:endParaRPr>
+          </a:p>
+        </p:txBody>
+      </p:sp>
+      <p:sp>
+        <p:nvSpPr>
+          <p:cNvPr id="22" name="Chevron 21"/>
+          <p:cNvSpPr/>
+          <p:nvPr/>
+        </p:nvSpPr>
+        <p:spPr>
+          <a:xfrm>
+            <a:off x="5243800" y="5298847"/>
+            <a:ext cx="1144943" cy="962081"/>
+          </a:xfrm>
+          <a:prstGeom prst="chevron">
+            <a:avLst/>
+          </a:prstGeom>
+        </p:spPr>
+        <p:style>
+          <a:lnRef idx="0">
+            <a:schemeClr val="accent3"/>
+          </a:lnRef>
+          <a:fillRef idx="3">
+            <a:schemeClr val="accent3"/>
+          </a:fillRef>
+          <a:effectRef idx="3">
+            <a:schemeClr val="accent3"/>
+          </a:effectRef>
+          <a:fontRef idx="minor">
+            <a:schemeClr val="lt1"/>
+          </a:fontRef>
+        </p:style>
+        <p:txBody>
+          <a:bodyPr rtlCol="0" anchor="ctr"/>
+          <a:lstStyle/>
+          <a:p>
+            <a:pPr algn="ctr"/>
+            <a:endParaRPr lang="en-US">
+              <a:solidFill>
+                <a:schemeClr val="tx1"/>
+              </a:solidFill>
+            </a:endParaRPr>
+          </a:p>
+        </p:txBody>
+      </p:sp>
+      <p:sp>
+        <p:nvSpPr>
+          <p:cNvPr id="23" name="Chevron 22"/>
+          <p:cNvSpPr/>
+          <p:nvPr/>
+        </p:nvSpPr>
+        <p:spPr>
+          <a:xfrm>
+            <a:off x="6103006" y="5298846"/>
+            <a:ext cx="1144943" cy="962081"/>
+          </a:xfrm>
+          <a:prstGeom prst="chevron">
+            <a:avLst/>
+          </a:prstGeom>
+        </p:spPr>
+        <p:style>
+          <a:lnRef idx="0">
+            <a:schemeClr val="accent3"/>
+          </a:lnRef>
+          <a:fillRef idx="3">
+            <a:schemeClr val="accent3"/>
+          </a:fillRef>
+          <a:effectRef idx="3">
+            <a:schemeClr val="accent3"/>
+          </a:effectRef>
+          <a:fontRef idx="minor">
+            <a:schemeClr val="lt1"/>
+          </a:fontRef>
+        </p:style>
+        <p:txBody>
+          <a:bodyPr rtlCol="0" anchor="ctr"/>
+          <a:lstStyle/>
+          <a:p>
+            <a:pPr algn="ctr"/>
+            <a:endParaRPr lang="en-US">
+              <a:solidFill>
+                <a:schemeClr val="tx1"/>
+              </a:solidFill>
+            </a:endParaRPr>
+          </a:p>
+        </p:txBody>
+      </p:sp>
+      <p:sp>
+        <p:nvSpPr>
+          <p:cNvPr id="24" name="Chevron 23"/>
+          <p:cNvSpPr/>
+          <p:nvPr/>
+        </p:nvSpPr>
+        <p:spPr>
+          <a:xfrm>
+            <a:off x="6970213" y="5310331"/>
+            <a:ext cx="1144943" cy="962081"/>
+          </a:xfrm>
+          <a:prstGeom prst="chevron">
+            <a:avLst/>
+          </a:prstGeom>
+        </p:spPr>
+        <p:style>
+          <a:lnRef idx="0">
+            <a:schemeClr val="accent3"/>
+          </a:lnRef>
+          <a:fillRef idx="3">
+            <a:schemeClr val="accent3"/>
+          </a:fillRef>
+          <a:effectRef idx="3">
+            <a:schemeClr val="accent3"/>
+          </a:effectRef>
+          <a:fontRef idx="minor">
+            <a:schemeClr val="lt1"/>
+          </a:fontRef>
+        </p:style>
+        <p:txBody>
+          <a:bodyPr rtlCol="0" anchor="ctr"/>
+          <a:lstStyle/>
+          <a:p>
+            <a:pPr algn="ctr"/>
+            <a:endParaRPr lang="en-US">
+              <a:solidFill>
+                <a:schemeClr val="tx1"/>
+              </a:solidFill>
+            </a:endParaRPr>
+          </a:p>
+        </p:txBody>
+      </p:sp>
+      <p:sp>
+        <p:nvSpPr>
+          <p:cNvPr id="25" name="Chevron 24"/>
+          <p:cNvSpPr/>
+          <p:nvPr/>
+        </p:nvSpPr>
+        <p:spPr>
+          <a:xfrm>
+            <a:off x="7829419" y="5301564"/>
+            <a:ext cx="1144943" cy="962081"/>
+          </a:xfrm>
+          <a:prstGeom prst="chevron">
+            <a:avLst/>
+          </a:prstGeom>
+        </p:spPr>
+        <p:style>
+          <a:lnRef idx="0">
+            <a:schemeClr val="accent3"/>
+          </a:lnRef>
+          <a:fillRef idx="3">
+            <a:schemeClr val="accent3"/>
+          </a:fillRef>
+          <a:effectRef idx="3">
+            <a:schemeClr val="accent3"/>
+          </a:effectRef>
+          <a:fontRef idx="minor">
+            <a:schemeClr val="lt1"/>
+          </a:fontRef>
+        </p:style>
+        <p:txBody>
+          <a:bodyPr rtlCol="0" anchor="ctr"/>
+          <a:lstStyle/>
+          <a:p>
+            <a:pPr algn="ctr"/>
+            <a:endParaRPr lang="en-US">
+              <a:solidFill>
+                <a:schemeClr val="tx1"/>
+              </a:solidFill>
+            </a:endParaRPr>
+          </a:p>
+        </p:txBody>
+      </p:sp>
+      <p:sp>
+        <p:nvSpPr>
+          <p:cNvPr id="26" name="Chevron 25"/>
+          <p:cNvSpPr/>
+          <p:nvPr/>
+        </p:nvSpPr>
+        <p:spPr>
+          <a:xfrm>
+            <a:off x="8696626" y="5290080"/>
+            <a:ext cx="1144943" cy="962081"/>
+          </a:xfrm>
+          <a:prstGeom prst="chevron">
+            <a:avLst/>
+          </a:prstGeom>
+        </p:spPr>
+        <p:style>
+          <a:lnRef idx="0">
+            <a:schemeClr val="accent3"/>
+          </a:lnRef>
+          <a:fillRef idx="3">
+            <a:schemeClr val="accent3"/>
+          </a:fillRef>
+          <a:effectRef idx="3">
+            <a:schemeClr val="accent3"/>
+          </a:effectRef>
+          <a:fontRef idx="minor">
+            <a:schemeClr val="lt1"/>
+          </a:fontRef>
+        </p:style>
+        <p:txBody>
+          <a:bodyPr rtlCol="0" anchor="ctr"/>
+          <a:lstStyle/>
+          <a:p>
+            <a:pPr algn="ctr"/>
+            <a:endParaRPr lang="en-US">
+              <a:solidFill>
+                <a:schemeClr val="tx1"/>
+              </a:solidFill>
+            </a:endParaRPr>
+          </a:p>
+        </p:txBody>
+      </p:sp>
+      <p:sp>
+        <p:nvSpPr>
+          <p:cNvPr id="27" name="Chevron 26"/>
+          <p:cNvSpPr/>
+          <p:nvPr/>
+        </p:nvSpPr>
+        <p:spPr>
+          <a:xfrm>
+            <a:off x="9555832" y="5290079"/>
+            <a:ext cx="1144943" cy="962081"/>
+          </a:xfrm>
+          <a:prstGeom prst="chevron">
+            <a:avLst/>
+          </a:prstGeom>
+        </p:spPr>
+        <p:style>
+          <a:lnRef idx="0">
+            <a:schemeClr val="accent3"/>
+          </a:lnRef>
+          <a:fillRef idx="3">
+            <a:schemeClr val="accent3"/>
+          </a:fillRef>
+          <a:effectRef idx="3">
+            <a:schemeClr val="accent3"/>
+          </a:effectRef>
+          <a:fontRef idx="minor">
+            <a:schemeClr val="lt1"/>
+          </a:fontRef>
+        </p:style>
+        <p:txBody>
+          <a:bodyPr rtlCol="0" anchor="ctr"/>
+          <a:lstStyle/>
+          <a:p>
+            <a:pPr algn="ctr"/>
+            <a:endParaRPr lang="en-US">
+              <a:solidFill>
+                <a:schemeClr val="tx1"/>
+              </a:solidFill>
+            </a:endParaRPr>
+          </a:p>
+        </p:txBody>
+      </p:sp>
+      <p:sp>
+        <p:nvSpPr>
+          <p:cNvPr id="28" name="Chevron 27"/>
+          <p:cNvSpPr/>
+          <p:nvPr/>
+        </p:nvSpPr>
+        <p:spPr>
+          <a:xfrm>
+            <a:off x="10423039" y="5301564"/>
+            <a:ext cx="1144943" cy="962081"/>
+          </a:xfrm>
+          <a:prstGeom prst="chevron">
+            <a:avLst/>
+          </a:prstGeom>
+        </p:spPr>
+        <p:style>
+          <a:lnRef idx="0">
+            <a:schemeClr val="accent3"/>
+          </a:lnRef>
+          <a:fillRef idx="3">
+            <a:schemeClr val="accent3"/>
+          </a:fillRef>
+          <a:effectRef idx="3">
+            <a:schemeClr val="accent3"/>
+          </a:effectRef>
+          <a:fontRef idx="minor">
+            <a:schemeClr val="lt1"/>
+          </a:fontRef>
+        </p:style>
+        <p:txBody>
+          <a:bodyPr rtlCol="0" anchor="ctr"/>
+          <a:lstStyle/>
+          <a:p>
+            <a:pPr algn="ctr"/>
+            <a:endParaRPr lang="en-US">
+              <a:solidFill>
+                <a:schemeClr val="tx1"/>
+              </a:solidFill>
+            </a:endParaRPr>
+          </a:p>
+        </p:txBody>
+      </p:sp>
+      <p:sp>
+        <p:nvSpPr>
+          <p:cNvPr id="30" name="Hexagon 29"/>
+          <p:cNvSpPr/>
+          <p:nvPr/>
+        </p:nvSpPr>
+        <p:spPr>
+          <a:xfrm rot="5400000">
+            <a:off x="8284531" y="1863977"/>
+            <a:ext cx="1669689" cy="1444386"/>
+          </a:xfrm>
+          <a:prstGeom prst="hexagon">
+            <a:avLst/>
+          </a:prstGeom>
+          <a:solidFill>
+            <a:schemeClr val="accent3">
+              <a:lumMod val="40000"/>
+              <a:lumOff val="60000"/>
+            </a:schemeClr>
+          </a:solidFill>
+          <a:ln w="38100">
+            <a:solidFill>
+              <a:schemeClr val="accent3">
+                <a:lumMod val="75000"/>
+              </a:schemeClr>
+            </a:solidFill>
+          </a:ln>
+          <a:effectLst>
+            <a:outerShdw blurRad="50800" dist="38100" dir="5400000" algn="t" rotWithShape="0">
+              <a:prstClr val="black">
+                <a:alpha val="40000"/>
+              </a:prstClr>
+            </a:outerShdw>
+          </a:effectLst>
+        </p:spPr>
+        <p:style>
+          <a:lnRef idx="1">
+            <a:schemeClr val="accent3"/>
+          </a:lnRef>
+          <a:fillRef idx="2">
+            <a:schemeClr val="accent3"/>
+          </a:fillRef>
+          <a:effectRef idx="1">
+            <a:schemeClr val="accent3"/>
+          </a:effectRef>
+          <a:fontRef idx="minor">
+            <a:schemeClr val="dk1"/>
+          </a:fontRef>
+        </p:style>
+        <p:txBody>
+          <a:bodyPr rtlCol="0" anchor="ctr"/>
+          <a:lstStyle/>
+          <a:p>
+            <a:pPr algn="ctr"/>
+            <a:endParaRPr lang="en-US" dirty="0"/>
+          </a:p>
+        </p:txBody>
+      </p:sp>
+      <p:sp>
+        <p:nvSpPr>
+          <p:cNvPr id="31" name="Diamond 30"/>
+          <p:cNvSpPr/>
+          <p:nvPr/>
+        </p:nvSpPr>
+        <p:spPr>
+          <a:xfrm>
+            <a:off x="8397183" y="1739851"/>
+            <a:ext cx="1444386" cy="735454"/>
+          </a:xfrm>
+          <a:prstGeom prst="diamond">
+            <a:avLst/>
+          </a:prstGeom>
+          <a:solidFill>
+            <a:schemeClr val="accent3">
+              <a:lumMod val="75000"/>
+            </a:schemeClr>
+          </a:solidFill>
+          <a:ln w="38100">
+            <a:solidFill>
+              <a:schemeClr val="accent3">
+                <a:lumMod val="75000"/>
+              </a:schemeClr>
+            </a:solidFill>
+          </a:ln>
+        </p:spPr>
+        <p:style>
+          <a:lnRef idx="1">
+            <a:schemeClr val="accent3"/>
+          </a:lnRef>
+          <a:fillRef idx="2">
+            <a:schemeClr val="accent3"/>
+          </a:fillRef>
+          <a:effectRef idx="1">
+            <a:schemeClr val="accent3"/>
+          </a:effectRef>
+          <a:fontRef idx="minor">
+            <a:schemeClr val="dk1"/>
+          </a:fontRef>
+        </p:style>
+        <p:txBody>
+          <a:bodyPr rtlCol="0" anchor="ctr"/>
+          <a:lstStyle/>
+          <a:p>
+            <a:pPr algn="ctr"/>
+            <a:endParaRPr lang="en-US"/>
+          </a:p>
+        </p:txBody>
+      </p:sp>
+      <p:sp>
+        <p:nvSpPr>
+          <p:cNvPr id="32" name="TextBox 31"/>
+          <p:cNvSpPr txBox="1"/>
+          <p:nvPr/>
+        </p:nvSpPr>
+        <p:spPr>
+          <a:xfrm>
+            <a:off x="8605196" y="2586170"/>
+            <a:ext cx="1028358" cy="369332"/>
+          </a:xfrm>
+          <a:prstGeom prst="rect">
+            <a:avLst/>
+          </a:prstGeom>
+          <a:noFill/>
+        </p:spPr>
+        <p:txBody>
+          <a:bodyPr wrap="none" rtlCol="0">
+            <a:spAutoFit/>
+          </a:bodyPr>
+          <a:lstStyle/>
+          <a:p>
+            <a:r>
+              <a:rPr lang="en-US" dirty="0" smtClean="0">
+                <a:solidFill>
+                  <a:schemeClr val="accent3">
+                    <a:lumMod val="50000"/>
+                  </a:schemeClr>
+                </a:solidFill>
+              </a:rPr>
+              <a:t>Service </a:t>
+            </a:r>
+            <a:r>
+              <a:rPr lang="en-US" dirty="0" smtClean="0">
+                <a:solidFill>
+                  <a:schemeClr val="accent3">
+                    <a:lumMod val="50000"/>
+                  </a:schemeClr>
+                </a:solidFill>
+              </a:rPr>
+              <a:t>2</a:t>
+            </a:r>
+            <a:endParaRPr lang="en-US" dirty="0">
+              <a:solidFill>
+                <a:schemeClr val="accent3">
+                  <a:lumMod val="50000"/>
+                </a:schemeClr>
+              </a:solidFill>
+            </a:endParaRPr>
+          </a:p>
+        </p:txBody>
+      </p:sp>
+      <p:cxnSp>
+        <p:nvCxnSpPr>
+          <p:cNvPr id="33" name="Straight Arrow Connector 32"/>
+          <p:cNvCxnSpPr>
+            <a:endCxn id="30" idx="0"/>
+          </p:cNvCxnSpPr>
+          <p:nvPr/>
+        </p:nvCxnSpPr>
+        <p:spPr>
+          <a:xfrm flipV="1">
+            <a:off x="9114688" y="3421015"/>
+            <a:ext cx="4688" cy="1858396"/>
+          </a:xfrm>
+          <a:prstGeom prst="straightConnector1">
+            <a:avLst/>
+          </a:prstGeom>
+          <a:ln w="38100">
+            <a:solidFill>
+              <a:schemeClr val="accent3">
+                <a:lumMod val="75000"/>
+              </a:schemeClr>
+            </a:solidFill>
+            <a:tailEnd type="triangle"/>
+          </a:ln>
+        </p:spPr>
+        <p:style>
+          <a:lnRef idx="1">
+            <a:schemeClr val="accent1"/>
+          </a:lnRef>
+          <a:fillRef idx="0">
+            <a:schemeClr val="accent1"/>
+          </a:fillRef>
+          <a:effectRef idx="0">
+            <a:schemeClr val="accent1"/>
+          </a:effectRef>
+          <a:fontRef idx="minor">
+            <a:schemeClr val="tx1"/>
+          </a:fontRef>
+        </p:style>
+      </p:cxnSp>
+      <p:sp>
+        <p:nvSpPr>
+          <p:cNvPr id="41" name="Flowchart: Document 40"/>
+          <p:cNvSpPr/>
+          <p:nvPr/>
+        </p:nvSpPr>
+        <p:spPr>
+          <a:xfrm>
+            <a:off x="6928696" y="3673797"/>
+            <a:ext cx="1119192" cy="623294"/>
+          </a:xfrm>
+          <a:prstGeom prst="flowChartDocument">
+            <a:avLst/>
+          </a:prstGeom>
+        </p:spPr>
+        <p:style>
+          <a:lnRef idx="1">
+            <a:schemeClr val="accent6"/>
+          </a:lnRef>
+          <a:fillRef idx="3">
+            <a:schemeClr val="accent6"/>
+          </a:fillRef>
+          <a:effectRef idx="2">
+            <a:schemeClr val="accent6"/>
+          </a:effectRef>
+          <a:fontRef idx="minor">
+            <a:schemeClr val="lt1"/>
+          </a:fontRef>
+        </p:style>
+        <p:txBody>
+          <a:bodyPr rtlCol="0" anchor="ctr"/>
+          <a:lstStyle/>
+          <a:p>
+            <a:pPr algn="ctr"/>
+            <a:r>
+              <a:rPr lang="en-US" dirty="0" smtClean="0"/>
+              <a:t>Event 1</a:t>
+            </a:r>
+          </a:p>
+        </p:txBody>
+      </p:sp>
+      <p:sp>
+        <p:nvSpPr>
+          <p:cNvPr id="42" name="Flowchart: Document 41"/>
+          <p:cNvSpPr/>
+          <p:nvPr/>
+        </p:nvSpPr>
+        <p:spPr>
+          <a:xfrm>
+            <a:off x="7081096" y="3826197"/>
+            <a:ext cx="1119192" cy="623294"/>
+          </a:xfrm>
+          <a:prstGeom prst="flowChartDocument">
+            <a:avLst/>
+          </a:prstGeom>
+        </p:spPr>
+        <p:style>
+          <a:lnRef idx="1">
+            <a:schemeClr val="accent6"/>
+          </a:lnRef>
+          <a:fillRef idx="3">
+            <a:schemeClr val="accent6"/>
+          </a:fillRef>
+          <a:effectRef idx="2">
+            <a:schemeClr val="accent6"/>
+          </a:effectRef>
+          <a:fontRef idx="minor">
+            <a:schemeClr val="lt1"/>
+          </a:fontRef>
+        </p:style>
+        <p:txBody>
+          <a:bodyPr rtlCol="0" anchor="ctr"/>
+          <a:lstStyle/>
+          <a:p>
+            <a:pPr algn="ctr"/>
+            <a:r>
+              <a:rPr lang="en-US" dirty="0" smtClean="0"/>
+              <a:t>Event 1</a:t>
+            </a:r>
+          </a:p>
+        </p:txBody>
+      </p:sp>
+      <p:sp>
+        <p:nvSpPr>
+          <p:cNvPr id="43" name="Flowchart: Document 42"/>
+          <p:cNvSpPr/>
+          <p:nvPr/>
+        </p:nvSpPr>
+        <p:spPr>
+          <a:xfrm>
+            <a:off x="7233496" y="3978597"/>
+            <a:ext cx="1119192" cy="623294"/>
+          </a:xfrm>
+          <a:prstGeom prst="flowChartDocument">
+            <a:avLst/>
+          </a:prstGeom>
+        </p:spPr>
+        <p:style>
+          <a:lnRef idx="1">
+            <a:schemeClr val="accent6"/>
+          </a:lnRef>
+          <a:fillRef idx="3">
+            <a:schemeClr val="accent6"/>
+          </a:fillRef>
+          <a:effectRef idx="2">
+            <a:schemeClr val="accent6"/>
+          </a:effectRef>
+          <a:fontRef idx="minor">
+            <a:schemeClr val="lt1"/>
+          </a:fontRef>
+        </p:style>
+        <p:txBody>
+          <a:bodyPr rtlCol="0" anchor="ctr"/>
+          <a:lstStyle/>
+          <a:p>
+            <a:pPr algn="ctr"/>
+            <a:r>
+              <a:rPr lang="en-US" dirty="0" smtClean="0"/>
+              <a:t>Event 1</a:t>
+            </a:r>
+          </a:p>
+        </p:txBody>
+      </p:sp>
+      <p:sp>
+        <p:nvSpPr>
+          <p:cNvPr id="44" name="Flowchart: Document 43"/>
+          <p:cNvSpPr/>
+          <p:nvPr/>
+        </p:nvSpPr>
+        <p:spPr>
+          <a:xfrm>
+            <a:off x="7385896" y="4130997"/>
+            <a:ext cx="1119192" cy="623294"/>
+          </a:xfrm>
+          <a:prstGeom prst="flowChartDocument">
+            <a:avLst/>
+          </a:prstGeom>
+        </p:spPr>
+        <p:style>
+          <a:lnRef idx="1">
+            <a:schemeClr val="accent6"/>
+          </a:lnRef>
+          <a:fillRef idx="3">
+            <a:schemeClr val="accent6"/>
+          </a:fillRef>
+          <a:effectRef idx="2">
+            <a:schemeClr val="accent6"/>
+          </a:effectRef>
+          <a:fontRef idx="minor">
+            <a:schemeClr val="lt1"/>
+          </a:fontRef>
+        </p:style>
+        <p:txBody>
+          <a:bodyPr rtlCol="0" anchor="ctr"/>
+          <a:lstStyle/>
+          <a:p>
+            <a:pPr algn="ctr"/>
+            <a:r>
+              <a:rPr lang="en-US" dirty="0" smtClean="0"/>
+              <a:t>Event 1</a:t>
+            </a:r>
+          </a:p>
+        </p:txBody>
+      </p:sp>
+      <p:sp>
+        <p:nvSpPr>
+          <p:cNvPr id="45" name="Flowchart: Document 44"/>
+          <p:cNvSpPr/>
+          <p:nvPr/>
+        </p:nvSpPr>
+        <p:spPr>
+          <a:xfrm>
+            <a:off x="7538296" y="4283397"/>
+            <a:ext cx="1119192" cy="623294"/>
+          </a:xfrm>
+          <a:prstGeom prst="flowChartDocument">
+            <a:avLst/>
+          </a:prstGeom>
+        </p:spPr>
+        <p:style>
+          <a:lnRef idx="1">
+            <a:schemeClr val="accent6"/>
+          </a:lnRef>
+          <a:fillRef idx="3">
+            <a:schemeClr val="accent6"/>
+          </a:fillRef>
+          <a:effectRef idx="2">
+            <a:schemeClr val="accent6"/>
+          </a:effectRef>
+          <a:fontRef idx="minor">
+            <a:schemeClr val="lt1"/>
+          </a:fontRef>
+        </p:style>
+        <p:txBody>
+          <a:bodyPr rtlCol="0" anchor="ctr"/>
+          <a:lstStyle/>
+          <a:p>
+            <a:pPr algn="ctr"/>
+            <a:r>
+              <a:rPr lang="en-US" dirty="0" smtClean="0"/>
+              <a:t>Event</a:t>
+            </a:r>
+          </a:p>
+        </p:txBody>
+      </p:sp>
+    </p:spTree>
+    <p:extLst>
+      <p:ext uri="{BB962C8B-B14F-4D97-AF65-F5344CB8AC3E}">
+        <p14:creationId xmlns:p14="http://schemas.microsoft.com/office/powerpoint/2010/main" val="324414144"/>
+      </p:ext>
+    </p:extLst>
+  </p:cSld>
+  <p:clrMapOvr>
+    <a:masterClrMapping/>
+  </p:clrMapOvr>
+  <p:timing>
+    <p:tnLst>
+      <p:par>
+        <p:cTn id="1" dur="indefinite" restart="never" nodeType="tmRoot"/>
+      </p:par>
+    </p:tnLst>
+  </p:timing>
+</p:sld>
+</file>
+
+<file path=ppt/slides/slide8.xml><?xml version="1.0" encoding="utf-8"?>
+<p:sld xmlns:a="http://schemas.openxmlformats.org/drawingml/2006/main" xmlns:r="http://schemas.openxmlformats.org/officeDocument/2006/relationships" xmlns:p="http://schemas.openxmlformats.org/presentationml/2006/main">
+  <p:cSld>
+    <p:spTree>
+      <p:nvGrpSpPr>
+        <p:cNvPr id="1" name=""/>
+        <p:cNvGrpSpPr/>
+        <p:nvPr/>
+      </p:nvGrpSpPr>
+      <p:grpSpPr>
+        <a:xfrm>
+          <a:off x="0" y="0"/>
+          <a:ext cx="0" cy="0"/>
+          <a:chOff x="0" y="0"/>
+          <a:chExt cx="0" cy="0"/>
+        </a:xfrm>
+      </p:grpSpPr>
+      <p:sp>
+        <p:nvSpPr>
+          <p:cNvPr id="2" name="Title 1"/>
+          <p:cNvSpPr>
+            <a:spLocks noGrp="1"/>
+          </p:cNvSpPr>
+          <p:nvPr>
+            <p:ph type="ctrTitle"/>
+          </p:nvPr>
+        </p:nvSpPr>
+        <p:spPr>
+          <a:xfrm>
+            <a:off x="1261872" y="383065"/>
+            <a:ext cx="9418320" cy="1062681"/>
+          </a:xfrm>
+        </p:spPr>
+        <p:txBody>
+          <a:bodyPr>
+            <a:normAutofit fontScale="90000"/>
+          </a:bodyPr>
+          <a:lstStyle/>
+          <a:p>
+            <a:r>
+              <a:rPr lang="en-US" dirty="0" smtClean="0"/>
+              <a:t>Application events (Outbox)</a:t>
+            </a:r>
+            <a:endParaRPr lang="en-US" dirty="0"/>
+          </a:p>
+        </p:txBody>
+      </p:sp>
+      <p:sp>
+        <p:nvSpPr>
+          <p:cNvPr id="4" name="Hexagon 3"/>
+          <p:cNvSpPr/>
+          <p:nvPr/>
+        </p:nvSpPr>
+        <p:spPr>
+          <a:xfrm rot="5400000">
+            <a:off x="3247572" y="1569872"/>
+            <a:ext cx="1669689" cy="1444386"/>
+          </a:xfrm>
+          <a:prstGeom prst="hexagon">
+            <a:avLst/>
+          </a:prstGeom>
+          <a:solidFill>
+            <a:schemeClr val="accent3">
+              <a:lumMod val="40000"/>
+              <a:lumOff val="60000"/>
+            </a:schemeClr>
+          </a:solidFill>
+          <a:ln w="38100">
+            <a:solidFill>
+              <a:schemeClr val="accent3">
+                <a:lumMod val="75000"/>
+              </a:schemeClr>
+            </a:solidFill>
+          </a:ln>
+          <a:effectLst>
+            <a:outerShdw blurRad="50800" dist="38100" dir="5400000" algn="t" rotWithShape="0">
+              <a:prstClr val="black">
+                <a:alpha val="40000"/>
+              </a:prstClr>
+            </a:outerShdw>
+          </a:effectLst>
+        </p:spPr>
+        <p:style>
+          <a:lnRef idx="1">
+            <a:schemeClr val="accent3"/>
+          </a:lnRef>
+          <a:fillRef idx="2">
+            <a:schemeClr val="accent3"/>
+          </a:fillRef>
+          <a:effectRef idx="1">
+            <a:schemeClr val="accent3"/>
+          </a:effectRef>
+          <a:fontRef idx="minor">
+            <a:schemeClr val="dk1"/>
+          </a:fontRef>
+        </p:style>
+        <p:txBody>
+          <a:bodyPr rtlCol="0" anchor="ctr"/>
+          <a:lstStyle/>
+          <a:p>
+            <a:pPr algn="ctr"/>
+            <a:endParaRPr lang="en-US" dirty="0"/>
+          </a:p>
+        </p:txBody>
+      </p:sp>
+      <p:sp>
+        <p:nvSpPr>
+          <p:cNvPr id="5" name="Diamond 4"/>
+          <p:cNvSpPr/>
+          <p:nvPr/>
+        </p:nvSpPr>
+        <p:spPr>
+          <a:xfrm>
+            <a:off x="3360224" y="1445746"/>
+            <a:ext cx="1444386" cy="735454"/>
+          </a:xfrm>
+          <a:prstGeom prst="diamond">
+            <a:avLst/>
+          </a:prstGeom>
+          <a:solidFill>
+            <a:schemeClr val="accent3">
+              <a:lumMod val="75000"/>
+            </a:schemeClr>
+          </a:solidFill>
+          <a:ln w="38100">
+            <a:solidFill>
+              <a:schemeClr val="accent3">
+                <a:lumMod val="75000"/>
+              </a:schemeClr>
+            </a:solidFill>
+          </a:ln>
+        </p:spPr>
+        <p:style>
+          <a:lnRef idx="1">
+            <a:schemeClr val="accent3"/>
+          </a:lnRef>
+          <a:fillRef idx="2">
+            <a:schemeClr val="accent3"/>
+          </a:fillRef>
+          <a:effectRef idx="1">
+            <a:schemeClr val="accent3"/>
+          </a:effectRef>
+          <a:fontRef idx="minor">
+            <a:schemeClr val="dk1"/>
+          </a:fontRef>
+        </p:style>
+        <p:txBody>
+          <a:bodyPr rtlCol="0" anchor="ctr"/>
+          <a:lstStyle/>
+          <a:p>
+            <a:pPr algn="ctr"/>
+            <a:endParaRPr lang="en-US"/>
+          </a:p>
+        </p:txBody>
+      </p:sp>
+      <p:sp>
+        <p:nvSpPr>
+          <p:cNvPr id="6" name="TextBox 5"/>
+          <p:cNvSpPr txBox="1"/>
+          <p:nvPr/>
+        </p:nvSpPr>
+        <p:spPr>
+          <a:xfrm>
+            <a:off x="3568237" y="2292065"/>
+            <a:ext cx="1028358" cy="369332"/>
+          </a:xfrm>
+          <a:prstGeom prst="rect">
+            <a:avLst/>
+          </a:prstGeom>
+          <a:noFill/>
+        </p:spPr>
+        <p:txBody>
+          <a:bodyPr wrap="none" rtlCol="0">
+            <a:spAutoFit/>
+          </a:bodyPr>
+          <a:lstStyle/>
+          <a:p>
+            <a:r>
+              <a:rPr lang="en-US" dirty="0" smtClean="0">
+                <a:solidFill>
+                  <a:schemeClr val="accent3">
+                    <a:lumMod val="50000"/>
+                  </a:schemeClr>
+                </a:solidFill>
+              </a:rPr>
+              <a:t>Service 1</a:t>
+            </a:r>
+            <a:endParaRPr lang="en-US" dirty="0">
+              <a:solidFill>
+                <a:schemeClr val="accent3">
+                  <a:lumMod val="50000"/>
+                </a:schemeClr>
+              </a:solidFill>
+            </a:endParaRPr>
+          </a:p>
+        </p:txBody>
+      </p:sp>
+      <p:cxnSp>
+        <p:nvCxnSpPr>
+          <p:cNvPr id="8" name="Straight Arrow Connector 7"/>
+          <p:cNvCxnSpPr>
+            <a:endCxn id="7" idx="0"/>
+          </p:cNvCxnSpPr>
+          <p:nvPr/>
+        </p:nvCxnSpPr>
+        <p:spPr>
+          <a:xfrm flipH="1">
+            <a:off x="2342919" y="2928551"/>
+            <a:ext cx="1327038" cy="1717692"/>
+          </a:xfrm>
+          <a:prstGeom prst="straightConnector1">
+            <a:avLst/>
+          </a:prstGeom>
+          <a:ln w="38100">
+            <a:solidFill>
+              <a:schemeClr val="accent3">
+                <a:lumMod val="75000"/>
+              </a:schemeClr>
+            </a:solidFill>
+            <a:tailEnd type="triangle"/>
+          </a:ln>
+        </p:spPr>
+        <p:style>
+          <a:lnRef idx="1">
+            <a:schemeClr val="accent1"/>
+          </a:lnRef>
+          <a:fillRef idx="0">
+            <a:schemeClr val="accent1"/>
+          </a:fillRef>
+          <a:effectRef idx="0">
+            <a:schemeClr val="accent1"/>
+          </a:effectRef>
+          <a:fontRef idx="minor">
+            <a:schemeClr val="tx1"/>
+          </a:fontRef>
+        </p:style>
+      </p:cxnSp>
+      <p:sp>
+        <p:nvSpPr>
+          <p:cNvPr id="34" name="Rectangle 33"/>
+          <p:cNvSpPr/>
+          <p:nvPr/>
+        </p:nvSpPr>
+        <p:spPr>
+          <a:xfrm>
+            <a:off x="9570919" y="1717590"/>
+            <a:ext cx="1371600" cy="3950370"/>
+          </a:xfrm>
+          <a:prstGeom prst="rect">
+            <a:avLst/>
+          </a:prstGeom>
+          <a:ln w="57150">
+            <a:prstDash val="sysDot"/>
+          </a:ln>
+        </p:spPr>
+        <p:style>
+          <a:lnRef idx="1">
+            <a:schemeClr val="accent3"/>
+          </a:lnRef>
+          <a:fillRef idx="2">
+            <a:schemeClr val="accent3"/>
+          </a:fillRef>
+          <a:effectRef idx="1">
+            <a:schemeClr val="accent3"/>
+          </a:effectRef>
+          <a:fontRef idx="minor">
+            <a:schemeClr val="dk1"/>
+          </a:fontRef>
+        </p:style>
+        <p:txBody>
+          <a:bodyPr vert="wordArtVert" rtlCol="0" anchor="ctr"/>
+          <a:lstStyle/>
+          <a:p>
+            <a:pPr algn="ctr"/>
+            <a:r>
+              <a:rPr lang="en-US" dirty="0" smtClean="0">
+                <a:solidFill>
+                  <a:schemeClr val="accent3">
+                    <a:lumMod val="50000"/>
+                  </a:schemeClr>
+                </a:solidFill>
+              </a:rPr>
+              <a:t>Message broker</a:t>
+            </a:r>
+          </a:p>
+        </p:txBody>
+      </p:sp>
+      <p:graphicFrame>
+        <p:nvGraphicFramePr>
+          <p:cNvPr id="7" name="Table 6"/>
+          <p:cNvGraphicFramePr>
+            <a:graphicFrameLocks noGrp="1"/>
+          </p:cNvGraphicFramePr>
+          <p:nvPr>
+            <p:extLst>
+              <p:ext uri="{D42A27DB-BD31-4B8C-83A1-F6EECF244321}">
+                <p14:modId xmlns:p14="http://schemas.microsoft.com/office/powerpoint/2010/main" val="2955558562"/>
+              </p:ext>
+            </p:extLst>
+          </p:nvPr>
+        </p:nvGraphicFramePr>
+        <p:xfrm>
+          <a:off x="1117602" y="4646243"/>
+          <a:ext cx="2450635" cy="1130493"/>
+        </p:xfrm>
+        <a:graphic>
+          <a:graphicData uri="http://schemas.openxmlformats.org/drawingml/2006/table">
+            <a:tbl>
+              <a:tblPr firstRow="1" bandRow="1">
+                <a:tableStyleId>{5C22544A-7EE6-4342-B048-85BDC9FD1C3A}</a:tableStyleId>
+              </a:tblPr>
+              <a:tblGrid>
+                <a:gridCol w="490127"/>
+                <a:gridCol w="490127"/>
+                <a:gridCol w="490127"/>
+                <a:gridCol w="490127"/>
+                <a:gridCol w="490127"/>
+              </a:tblGrid>
+              <a:tr h="376831">
+                <a:tc>
+                  <a:txBody>
+                    <a:bodyPr/>
+                    <a:lstStyle/>
+                    <a:p>
+                      <a:endParaRPr lang="en-US" dirty="0"/>
+                    </a:p>
+                  </a:txBody>
+                  <a:tcPr/>
+                </a:tc>
+                <a:tc>
+                  <a:txBody>
+                    <a:bodyPr/>
+                    <a:lstStyle/>
+                    <a:p>
+                      <a:endParaRPr lang="en-US"/>
+                    </a:p>
+                  </a:txBody>
+                  <a:tcPr/>
+                </a:tc>
+                <a:tc>
+                  <a:txBody>
+                    <a:bodyPr/>
+                    <a:lstStyle/>
+                    <a:p>
+                      <a:endParaRPr lang="en-US"/>
+                    </a:p>
+                  </a:txBody>
+                  <a:tcPr/>
+                </a:tc>
+                <a:tc>
+                  <a:txBody>
+                    <a:bodyPr/>
+                    <a:lstStyle/>
+                    <a:p>
+                      <a:endParaRPr lang="en-US" dirty="0"/>
+                    </a:p>
+                  </a:txBody>
+                  <a:tcPr/>
+                </a:tc>
+                <a:tc>
+                  <a:txBody>
+                    <a:bodyPr/>
+                    <a:lstStyle/>
+                    <a:p>
+                      <a:endParaRPr lang="en-US"/>
+                    </a:p>
+                  </a:txBody>
+                  <a:tcPr/>
+                </a:tc>
+              </a:tr>
+              <a:tr h="376831">
+                <a:tc>
+                  <a:txBody>
+                    <a:bodyPr/>
+                    <a:lstStyle/>
+                    <a:p>
+                      <a:endParaRPr lang="en-US"/>
+                    </a:p>
+                  </a:txBody>
+                  <a:tcPr/>
+                </a:tc>
+                <a:tc>
+                  <a:txBody>
+                    <a:bodyPr/>
+                    <a:lstStyle/>
+                    <a:p>
+                      <a:endParaRPr lang="en-US" dirty="0"/>
+                    </a:p>
+                  </a:txBody>
+                  <a:tcPr/>
+                </a:tc>
+                <a:tc>
+                  <a:txBody>
+                    <a:bodyPr/>
+                    <a:lstStyle/>
+                    <a:p>
+                      <a:endParaRPr lang="en-US"/>
+                    </a:p>
+                  </a:txBody>
+                  <a:tcPr/>
+                </a:tc>
+                <a:tc>
+                  <a:txBody>
+                    <a:bodyPr/>
+                    <a:lstStyle/>
+                    <a:p>
+                      <a:endParaRPr lang="en-US" dirty="0"/>
+                    </a:p>
+                  </a:txBody>
+                  <a:tcPr/>
+                </a:tc>
+                <a:tc>
+                  <a:txBody>
+                    <a:bodyPr/>
+                    <a:lstStyle/>
+                    <a:p>
+                      <a:endParaRPr lang="en-US" dirty="0"/>
+                    </a:p>
+                  </a:txBody>
+                  <a:tcPr/>
+                </a:tc>
+              </a:tr>
+              <a:tr h="376831">
+                <a:tc>
+                  <a:txBody>
+                    <a:bodyPr/>
+                    <a:lstStyle/>
+                    <a:p>
+                      <a:endParaRPr lang="en-US"/>
+                    </a:p>
+                  </a:txBody>
+                  <a:tcPr/>
+                </a:tc>
+                <a:tc>
+                  <a:txBody>
+                    <a:bodyPr/>
+                    <a:lstStyle/>
+                    <a:p>
+                      <a:endParaRPr lang="en-US" dirty="0"/>
+                    </a:p>
+                  </a:txBody>
+                  <a:tcPr/>
+                </a:tc>
+                <a:tc>
+                  <a:txBody>
+                    <a:bodyPr/>
+                    <a:lstStyle/>
+                    <a:p>
+                      <a:endParaRPr lang="en-US"/>
+                    </a:p>
+                  </a:txBody>
+                  <a:tcPr/>
+                </a:tc>
+                <a:tc>
+                  <a:txBody>
+                    <a:bodyPr/>
+                    <a:lstStyle/>
+                    <a:p>
+                      <a:endParaRPr lang="en-US" dirty="0"/>
+                    </a:p>
+                  </a:txBody>
+                  <a:tcPr/>
+                </a:tc>
+                <a:tc>
+                  <a:txBody>
+                    <a:bodyPr/>
+                    <a:lstStyle/>
+                    <a:p>
+                      <a:endParaRPr lang="en-US" dirty="0"/>
+                    </a:p>
+                  </a:txBody>
+                  <a:tcPr/>
+                </a:tc>
+              </a:tr>
+            </a:tbl>
+          </a:graphicData>
+        </a:graphic>
+      </p:graphicFrame>
+      <p:graphicFrame>
+        <p:nvGraphicFramePr>
+          <p:cNvPr id="36" name="Table 35"/>
+          <p:cNvGraphicFramePr>
+            <a:graphicFrameLocks noGrp="1"/>
+          </p:cNvGraphicFramePr>
+          <p:nvPr>
+            <p:extLst>
+              <p:ext uri="{D42A27DB-BD31-4B8C-83A1-F6EECF244321}">
+                <p14:modId xmlns:p14="http://schemas.microsoft.com/office/powerpoint/2010/main" val="626315843"/>
+              </p:ext>
+            </p:extLst>
+          </p:nvPr>
+        </p:nvGraphicFramePr>
+        <p:xfrm>
+          <a:off x="4596595" y="4646243"/>
+          <a:ext cx="2450635" cy="1130493"/>
+        </p:xfrm>
+        <a:graphic>
+          <a:graphicData uri="http://schemas.openxmlformats.org/drawingml/2006/table">
+            <a:tbl>
+              <a:tblPr firstRow="1" bandRow="1">
+                <a:tableStyleId>{5C22544A-7EE6-4342-B048-85BDC9FD1C3A}</a:tableStyleId>
+              </a:tblPr>
+              <a:tblGrid>
+                <a:gridCol w="490127"/>
+                <a:gridCol w="490127"/>
+                <a:gridCol w="490127"/>
+                <a:gridCol w="490127"/>
+                <a:gridCol w="490127"/>
+              </a:tblGrid>
+              <a:tr h="376831">
+                <a:tc>
+                  <a:txBody>
+                    <a:bodyPr/>
+                    <a:lstStyle/>
+                    <a:p>
+                      <a:endParaRPr lang="en-US" dirty="0"/>
+                    </a:p>
+                  </a:txBody>
+                  <a:tcPr/>
+                </a:tc>
+                <a:tc>
+                  <a:txBody>
+                    <a:bodyPr/>
+                    <a:lstStyle/>
+                    <a:p>
+                      <a:endParaRPr lang="en-US"/>
+                    </a:p>
+                  </a:txBody>
+                  <a:tcPr/>
+                </a:tc>
+                <a:tc>
+                  <a:txBody>
+                    <a:bodyPr/>
+                    <a:lstStyle/>
+                    <a:p>
+                      <a:endParaRPr lang="en-US"/>
+                    </a:p>
+                  </a:txBody>
+                  <a:tcPr/>
+                </a:tc>
+                <a:tc>
+                  <a:txBody>
+                    <a:bodyPr/>
+                    <a:lstStyle/>
+                    <a:p>
+                      <a:endParaRPr lang="en-US" dirty="0"/>
+                    </a:p>
+                  </a:txBody>
+                  <a:tcPr/>
+                </a:tc>
+                <a:tc>
+                  <a:txBody>
+                    <a:bodyPr/>
+                    <a:lstStyle/>
+                    <a:p>
+                      <a:endParaRPr lang="en-US"/>
+                    </a:p>
+                  </a:txBody>
+                  <a:tcPr/>
+                </a:tc>
+              </a:tr>
+              <a:tr h="376831">
+                <a:tc>
+                  <a:txBody>
+                    <a:bodyPr/>
+                    <a:lstStyle/>
+                    <a:p>
+                      <a:endParaRPr lang="en-US"/>
+                    </a:p>
+                  </a:txBody>
+                  <a:tcPr/>
+                </a:tc>
+                <a:tc>
+                  <a:txBody>
+                    <a:bodyPr/>
+                    <a:lstStyle/>
+                    <a:p>
+                      <a:endParaRPr lang="en-US" dirty="0"/>
+                    </a:p>
+                  </a:txBody>
+                  <a:tcPr/>
+                </a:tc>
+                <a:tc>
+                  <a:txBody>
+                    <a:bodyPr/>
+                    <a:lstStyle/>
+                    <a:p>
+                      <a:endParaRPr lang="en-US"/>
+                    </a:p>
+                  </a:txBody>
+                  <a:tcPr/>
+                </a:tc>
+                <a:tc>
+                  <a:txBody>
+                    <a:bodyPr/>
+                    <a:lstStyle/>
+                    <a:p>
+                      <a:endParaRPr lang="en-US" dirty="0"/>
+                    </a:p>
+                  </a:txBody>
+                  <a:tcPr/>
+                </a:tc>
+                <a:tc>
+                  <a:txBody>
+                    <a:bodyPr/>
+                    <a:lstStyle/>
+                    <a:p>
+                      <a:endParaRPr lang="en-US" dirty="0"/>
+                    </a:p>
+                  </a:txBody>
+                  <a:tcPr/>
+                </a:tc>
+              </a:tr>
+              <a:tr h="376831">
+                <a:tc>
+                  <a:txBody>
+                    <a:bodyPr/>
+                    <a:lstStyle/>
+                    <a:p>
+                      <a:endParaRPr lang="en-US"/>
+                    </a:p>
+                  </a:txBody>
+                  <a:tcPr/>
+                </a:tc>
+                <a:tc>
+                  <a:txBody>
+                    <a:bodyPr/>
+                    <a:lstStyle/>
+                    <a:p>
+                      <a:endParaRPr lang="en-US" dirty="0"/>
+                    </a:p>
+                  </a:txBody>
+                  <a:tcPr/>
+                </a:tc>
+                <a:tc>
+                  <a:txBody>
+                    <a:bodyPr/>
+                    <a:lstStyle/>
+                    <a:p>
+                      <a:endParaRPr lang="en-US"/>
+                    </a:p>
+                  </a:txBody>
+                  <a:tcPr/>
+                </a:tc>
+                <a:tc>
+                  <a:txBody>
+                    <a:bodyPr/>
+                    <a:lstStyle/>
+                    <a:p>
+                      <a:endParaRPr lang="en-US" dirty="0"/>
+                    </a:p>
+                  </a:txBody>
+                  <a:tcPr/>
+                </a:tc>
+                <a:tc>
+                  <a:txBody>
+                    <a:bodyPr/>
+                    <a:lstStyle/>
+                    <a:p>
+                      <a:endParaRPr lang="en-US" dirty="0"/>
+                    </a:p>
+                  </a:txBody>
+                  <a:tcPr/>
+                </a:tc>
+              </a:tr>
+            </a:tbl>
+          </a:graphicData>
+        </a:graphic>
+      </p:graphicFrame>
+      <p:cxnSp>
+        <p:nvCxnSpPr>
+          <p:cNvPr id="39" name="Straight Arrow Connector 38"/>
+          <p:cNvCxnSpPr>
+            <a:endCxn id="36" idx="0"/>
+          </p:cNvCxnSpPr>
+          <p:nvPr/>
+        </p:nvCxnSpPr>
+        <p:spPr>
+          <a:xfrm>
+            <a:off x="4494875" y="2928551"/>
+            <a:ext cx="1327037" cy="1717692"/>
+          </a:xfrm>
+          <a:prstGeom prst="straightConnector1">
+            <a:avLst/>
+          </a:prstGeom>
+          <a:ln w="38100">
+            <a:solidFill>
+              <a:schemeClr val="accent3">
+                <a:lumMod val="75000"/>
+              </a:schemeClr>
+            </a:solidFill>
+            <a:tailEnd type="triangle"/>
+          </a:ln>
+        </p:spPr>
+        <p:style>
+          <a:lnRef idx="1">
+            <a:schemeClr val="accent1"/>
+          </a:lnRef>
+          <a:fillRef idx="0">
+            <a:schemeClr val="accent1"/>
+          </a:fillRef>
+          <a:effectRef idx="0">
+            <a:schemeClr val="accent1"/>
+          </a:effectRef>
+          <a:fontRef idx="minor">
+            <a:schemeClr val="tx1"/>
+          </a:fontRef>
+        </p:style>
+      </p:cxnSp>
+      <p:sp>
+        <p:nvSpPr>
+          <p:cNvPr id="46" name="Flowchart: Document 45"/>
+          <p:cNvSpPr/>
+          <p:nvPr/>
+        </p:nvSpPr>
+        <p:spPr>
+          <a:xfrm>
+            <a:off x="1481326" y="3780649"/>
+            <a:ext cx="964736" cy="574752"/>
+          </a:xfrm>
+          <a:prstGeom prst="flowChartDocument">
+            <a:avLst/>
+          </a:prstGeom>
+        </p:spPr>
+        <p:style>
+          <a:lnRef idx="1">
+            <a:schemeClr val="accent4"/>
+          </a:lnRef>
+          <a:fillRef idx="3">
+            <a:schemeClr val="accent4"/>
+          </a:fillRef>
+          <a:effectRef idx="2">
+            <a:schemeClr val="accent4"/>
+          </a:effectRef>
+          <a:fontRef idx="minor">
+            <a:schemeClr val="lt1"/>
+          </a:fontRef>
+        </p:style>
+        <p:txBody>
+          <a:bodyPr rtlCol="0" anchor="ctr"/>
+          <a:lstStyle/>
+          <a:p>
+            <a:pPr algn="ctr"/>
+            <a:r>
+              <a:rPr lang="en-US" dirty="0" smtClean="0"/>
+              <a:t>Entity</a:t>
+            </a:r>
+            <a:endParaRPr lang="en-US" dirty="0" smtClean="0"/>
+          </a:p>
+        </p:txBody>
+      </p:sp>
+      <p:sp>
+        <p:nvSpPr>
+          <p:cNvPr id="47" name="Flowchart: Document 46"/>
+          <p:cNvSpPr/>
+          <p:nvPr/>
+        </p:nvSpPr>
+        <p:spPr>
+          <a:xfrm>
+            <a:off x="5800993" y="3768703"/>
+            <a:ext cx="964736" cy="574752"/>
+          </a:xfrm>
+          <a:prstGeom prst="flowChartDocument">
+            <a:avLst/>
+          </a:prstGeom>
+        </p:spPr>
+        <p:style>
+          <a:lnRef idx="1">
+            <a:schemeClr val="accent6"/>
+          </a:lnRef>
+          <a:fillRef idx="3">
+            <a:schemeClr val="accent6"/>
+          </a:fillRef>
+          <a:effectRef idx="2">
+            <a:schemeClr val="accent6"/>
+          </a:effectRef>
+          <a:fontRef idx="minor">
+            <a:schemeClr val="lt1"/>
+          </a:fontRef>
+        </p:style>
+        <p:txBody>
+          <a:bodyPr rtlCol="0" anchor="ctr"/>
+          <a:lstStyle/>
+          <a:p>
+            <a:pPr algn="ctr"/>
+            <a:r>
+              <a:rPr lang="en-US" dirty="0" smtClean="0"/>
+              <a:t>Event</a:t>
+            </a:r>
+          </a:p>
+        </p:txBody>
+      </p:sp>
+      <p:sp>
+        <p:nvSpPr>
+          <p:cNvPr id="37" name="Rectangle 36"/>
+          <p:cNvSpPr/>
+          <p:nvPr/>
+        </p:nvSpPr>
+        <p:spPr>
+          <a:xfrm>
+            <a:off x="815546" y="3237470"/>
+            <a:ext cx="6932140" cy="2842054"/>
+          </a:xfrm>
+          <a:prstGeom prst="rect">
+            <a:avLst/>
+          </a:prstGeom>
+          <a:noFill/>
+          <a:ln w="38100">
+            <a:solidFill>
+              <a:schemeClr val="accent3"/>
+            </a:solidFill>
+            <a:prstDash val="sysDot"/>
+          </a:ln>
+        </p:spPr>
+        <p:style>
+          <a:lnRef idx="2">
+            <a:schemeClr val="accent1">
+              <a:shade val="50000"/>
+            </a:schemeClr>
+          </a:lnRef>
+          <a:fillRef idx="1">
+            <a:schemeClr val="accent1"/>
+          </a:fillRef>
+          <a:effectRef idx="0">
+            <a:schemeClr val="accent1"/>
+          </a:effectRef>
+          <a:fontRef idx="minor">
+            <a:schemeClr val="lt1"/>
+          </a:fontRef>
+        </p:style>
+        <p:txBody>
+          <a:bodyPr rtlCol="0" anchor="ctr"/>
+          <a:lstStyle/>
+          <a:p>
+            <a:pPr algn="ctr"/>
+            <a:endParaRPr lang="en-US"/>
+          </a:p>
+        </p:txBody>
+      </p:sp>
+      <p:sp>
+        <p:nvSpPr>
+          <p:cNvPr id="38" name="TextBox 37"/>
+          <p:cNvSpPr txBox="1"/>
+          <p:nvPr/>
+        </p:nvSpPr>
+        <p:spPr>
+          <a:xfrm>
+            <a:off x="3269557" y="3757191"/>
+            <a:ext cx="1772986" cy="369332"/>
+          </a:xfrm>
+          <a:prstGeom prst="rect">
+            <a:avLst/>
+          </a:prstGeom>
+          <a:noFill/>
+        </p:spPr>
+        <p:txBody>
+          <a:bodyPr wrap="none" rtlCol="0">
+            <a:spAutoFit/>
+          </a:bodyPr>
+          <a:lstStyle/>
+          <a:p>
+            <a:r>
+              <a:rPr lang="en-US" dirty="0" smtClean="0"/>
+              <a:t>Local transaction</a:t>
+            </a:r>
+            <a:endParaRPr lang="en-US" dirty="0"/>
+          </a:p>
+        </p:txBody>
+      </p:sp>
+      <p:cxnSp>
+        <p:nvCxnSpPr>
+          <p:cNvPr id="48" name="Straight Arrow Connector 47"/>
+          <p:cNvCxnSpPr>
+            <a:stCxn id="36" idx="3"/>
+          </p:cNvCxnSpPr>
+          <p:nvPr/>
+        </p:nvCxnSpPr>
+        <p:spPr>
+          <a:xfrm>
+            <a:off x="7047230" y="5211489"/>
+            <a:ext cx="2523689" cy="0"/>
+          </a:xfrm>
+          <a:prstGeom prst="straightConnector1">
+            <a:avLst/>
+          </a:prstGeom>
+          <a:ln w="38100">
+            <a:solidFill>
+              <a:schemeClr val="accent3">
+                <a:lumMod val="75000"/>
+              </a:schemeClr>
+            </a:solidFill>
+            <a:tailEnd type="triangle"/>
+          </a:ln>
+        </p:spPr>
+        <p:style>
+          <a:lnRef idx="1">
+            <a:schemeClr val="accent1"/>
+          </a:lnRef>
+          <a:fillRef idx="0">
+            <a:schemeClr val="accent1"/>
+          </a:fillRef>
+          <a:effectRef idx="0">
+            <a:schemeClr val="accent1"/>
+          </a:effectRef>
+          <a:fontRef idx="minor">
+            <a:schemeClr val="tx1"/>
+          </a:fontRef>
+        </p:style>
+      </p:cxnSp>
+      <p:sp>
+        <p:nvSpPr>
+          <p:cNvPr id="52" name="Flowchart: Document 51"/>
+          <p:cNvSpPr/>
+          <p:nvPr/>
+        </p:nvSpPr>
+        <p:spPr>
+          <a:xfrm>
+            <a:off x="8090236" y="4467643"/>
+            <a:ext cx="964736" cy="574752"/>
+          </a:xfrm>
+          <a:prstGeom prst="flowChartDocument">
+            <a:avLst/>
+          </a:prstGeom>
+        </p:spPr>
+        <p:style>
+          <a:lnRef idx="1">
+            <a:schemeClr val="accent6"/>
+          </a:lnRef>
+          <a:fillRef idx="3">
+            <a:schemeClr val="accent6"/>
+          </a:fillRef>
+          <a:effectRef idx="2">
+            <a:schemeClr val="accent6"/>
+          </a:effectRef>
+          <a:fontRef idx="minor">
+            <a:schemeClr val="lt1"/>
+          </a:fontRef>
+        </p:style>
+        <p:txBody>
+          <a:bodyPr rtlCol="0" anchor="ctr"/>
+          <a:lstStyle/>
+          <a:p>
+            <a:pPr algn="ctr"/>
+            <a:r>
+              <a:rPr lang="en-US" dirty="0" smtClean="0"/>
+              <a:t>Event</a:t>
+            </a:r>
+          </a:p>
+        </p:txBody>
+      </p:sp>
+    </p:spTree>
+    <p:extLst>
+      <p:ext uri="{BB962C8B-B14F-4D97-AF65-F5344CB8AC3E}">
+        <p14:creationId xmlns:p14="http://schemas.microsoft.com/office/powerpoint/2010/main" val="3541929606"/>
+      </p:ext>
+    </p:extLst>
+  </p:cSld>
+  <p:clrMapOvr>
+    <a:masterClrMapping/>
+  </p:clrMapOvr>
+  <p:timing>
+    <p:tnLst>
+      <p:par>
+        <p:cTn id="1" dur="indefinite" restart="never" nodeType="tmRoot"/>
+      </p:par>
+    </p:tnLst>
   </p:timing>
 </p:sld>
 </file>

</xml_diff>

<commit_message>
Update notes and slides
</commit_message>
<xml_diff>
--- a/t18-event-mongodb.pptx
+++ b/t18-event-mongodb.pptx
@@ -517,8 +517,8 @@
           <a:lstStyle/>
           <a:p>
             <a:r>
-              <a:rPr lang="en-US" sz="1200" dirty="0" err="1" smtClean="0"/>
-              <a:t>Greatings</a:t>
+              <a:rPr lang="en-US" sz="1200" dirty="0" smtClean="0"/>
+              <a:t>Greetings</a:t>
             </a:r>
             <a:endParaRPr lang="en-US" sz="1200" dirty="0" smtClean="0"/>
           </a:p>
@@ -681,50 +681,7 @@
             </a:r>
           </a:p>
           <a:p>
-            <a:r>
-              <a:rPr lang="en-US" dirty="0" smtClean="0"/>
-              <a:t>    -&gt; many</a:t>
-            </a:r>
-            <a:r>
-              <a:rPr lang="en-US" baseline="0" dirty="0" smtClean="0"/>
-              <a:t> components</a:t>
-            </a:r>
-          </a:p>
-          <a:p>
-            <a:r>
-              <a:rPr lang="en-US" baseline="0" dirty="0" smtClean="0"/>
-              <a:t>        -&gt; client apps</a:t>
-            </a:r>
-          </a:p>
-          <a:p>
-            <a:endParaRPr lang="en-US" baseline="0" dirty="0" smtClean="0"/>
-          </a:p>
-          <a:p>
-            <a:r>
-              <a:rPr lang="en-US" baseline="0" dirty="0" smtClean="0"/>
-              <a:t>Multiple verticals</a:t>
-            </a:r>
-          </a:p>
-          <a:p>
-            <a:endParaRPr lang="en-US" baseline="0" dirty="0" smtClean="0"/>
-          </a:p>
-          <a:p>
-            <a:r>
-              <a:rPr lang="en-US" baseline="0" dirty="0" smtClean="0"/>
-              <a:t>Operations tools</a:t>
-            </a:r>
-          </a:p>
-          <a:p>
-            <a:endParaRPr lang="en-US" baseline="0" dirty="0" smtClean="0"/>
-          </a:p>
-          <a:p>
-            <a:r>
-              <a:rPr lang="en-US" baseline="0" dirty="0" smtClean="0"/>
-              <a:t>Reporting</a:t>
-            </a:r>
-          </a:p>
-          <a:p>
-            <a:endParaRPr lang="en-US" baseline="0" dirty="0" smtClean="0"/>
+            <a:endParaRPr lang="en-US" dirty="0" smtClean="0"/>
           </a:p>
           <a:p>
             <a:pPr marL="0" marR="0" lvl="0" indent="0" algn="l" defTabSz="914400" rtl="0" eaLnBrk="1" fontAlgn="auto" latinLnBrk="0" hangingPunct="1">
@@ -746,8 +703,11 @@
             </a:pPr>
             <a:r>
               <a:rPr lang="en-US" baseline="0" dirty="0" smtClean="0"/>
-              <a:t>Complex domain rules</a:t>
-            </a:r>
+              <a:t>Video, Reporting, Operations, Client apps</a:t>
+            </a:r>
+          </a:p>
+          <a:p>
+            <a:endParaRPr lang="en-US" baseline="0" dirty="0" smtClean="0"/>
           </a:p>
           <a:p>
             <a:pPr marL="0" marR="0" lvl="0" indent="0" algn="l" defTabSz="914400" rtl="0" eaLnBrk="1" fontAlgn="auto" latinLnBrk="0" hangingPunct="1">
@@ -769,7 +729,11 @@
             </a:pPr>
             <a:r>
               <a:rPr lang="en-US" baseline="0" dirty="0" smtClean="0"/>
-              <a:t>    -&gt; </a:t>
+              <a:t>Complex domain </a:t>
+            </a:r>
+            <a:r>
+              <a:rPr lang="en-US" baseline="0" dirty="0" smtClean="0"/>
+              <a:t>rules -&gt; </a:t>
             </a:r>
             <a:r>
               <a:rPr lang="en-US" baseline="0" dirty="0" err="1" smtClean="0"/>
@@ -863,12 +827,12 @@
           <a:lstStyle/>
           <a:p>
             <a:r>
-              <a:rPr lang="en-US" smtClean="0"/>
+              <a:rPr lang="en-US" dirty="0" smtClean="0"/>
               <a:t>Multiple</a:t>
             </a:r>
             <a:r>
-              <a:rPr lang="en-US" baseline="0" smtClean="0"/>
-              <a:t> components, same goal</a:t>
+              <a:rPr lang="en-US" baseline="0" dirty="0" smtClean="0"/>
+              <a:t> components to accomplish business task</a:t>
             </a:r>
             <a:endParaRPr lang="en-US" dirty="0"/>
           </a:p>
@@ -1415,11 +1379,7 @@
           <a:p>
             <a:r>
               <a:rPr lang="en-US" baseline="0" dirty="0" smtClean="0"/>
-              <a:t>Only supported </a:t>
-            </a:r>
-            <a:r>
-              <a:rPr lang="en-US" baseline="0" smtClean="0"/>
-              <a:t>in MongoDB 4.0+</a:t>
+              <a:t>Only supported by MongoDB 4.0+</a:t>
             </a:r>
             <a:endParaRPr lang="en-US" dirty="0"/>
           </a:p>
@@ -8645,7 +8605,7 @@
         </p:nvSpPr>
         <p:spPr>
           <a:xfrm rot="5400000">
-            <a:off x="3247572" y="1569872"/>
+            <a:off x="3247572" y="1903509"/>
             <a:ext cx="1669689" cy="1444386"/>
           </a:xfrm>
           <a:prstGeom prst="hexagon">
@@ -8703,7 +8663,7 @@
         </p:nvSpPr>
         <p:spPr>
           <a:xfrm>
-            <a:off x="3360224" y="1445746"/>
+            <a:off x="3360224" y="1779383"/>
             <a:ext cx="1444386" cy="735454"/>
           </a:xfrm>
           <a:prstGeom prst="diamond">
@@ -8753,8 +8713,8 @@
         </p:nvSpPr>
         <p:spPr>
           <a:xfrm>
-            <a:off x="3568237" y="2292065"/>
-            <a:ext cx="1028358" cy="369332"/>
+            <a:off x="3654736" y="2625702"/>
+            <a:ext cx="858440" cy="369332"/>
           </a:xfrm>
           <a:prstGeom prst="rect">
             <a:avLst/>
@@ -8775,7 +8735,7 @@
                   </a:schemeClr>
                 </a:solidFill>
               </a:rPr>
-              <a:t>Service 1</a:t>
+              <a:t>Service</a:t>
             </a:r>
             <a:endParaRPr lang="en-US" dirty="0">
               <a:solidFill>
@@ -8797,7 +8757,7 @@
         </p:nvCxnSpPr>
         <p:spPr>
           <a:xfrm flipH="1">
-            <a:off x="2342919" y="2928551"/>
+            <a:off x="2342919" y="3262188"/>
             <a:ext cx="1327038" cy="1717692"/>
           </a:xfrm>
           <a:prstGeom prst="straightConnector1">
@@ -8835,7 +8795,7 @@
         </p:nvSpPr>
         <p:spPr>
           <a:xfrm>
-            <a:off x="9570919" y="1717590"/>
+            <a:off x="9570919" y="2051227"/>
             <a:ext cx="1371600" cy="3950370"/>
           </a:xfrm>
           <a:prstGeom prst="rect">
@@ -8886,13 +8846,13 @@
           <p:nvPr>
             <p:extLst>
               <p:ext uri="{D42A27DB-BD31-4B8C-83A1-F6EECF244321}">
-                <p14:modId xmlns:p14="http://schemas.microsoft.com/office/powerpoint/2010/main" val="2955558562"/>
+                <p14:modId xmlns:p14="http://schemas.microsoft.com/office/powerpoint/2010/main" val="2454511132"/>
               </p:ext>
             </p:extLst>
           </p:nvPr>
         </p:nvGraphicFramePr>
         <p:xfrm>
-          <a:off x="1117602" y="4646243"/>
+          <a:off x="1117602" y="4979880"/>
           <a:ext cx="2450635" cy="1130493"/>
         </p:xfrm>
         <a:graphic>
@@ -9077,13 +9037,13 @@
           <p:nvPr>
             <p:extLst>
               <p:ext uri="{D42A27DB-BD31-4B8C-83A1-F6EECF244321}">
-                <p14:modId xmlns:p14="http://schemas.microsoft.com/office/powerpoint/2010/main" val="626315843"/>
+                <p14:modId xmlns:p14="http://schemas.microsoft.com/office/powerpoint/2010/main" val="4275125521"/>
               </p:ext>
             </p:extLst>
           </p:nvPr>
         </p:nvGraphicFramePr>
         <p:xfrm>
-          <a:off x="4596595" y="4646243"/>
+          <a:off x="4596595" y="4979880"/>
           <a:ext cx="2450635" cy="1130493"/>
         </p:xfrm>
         <a:graphic>
@@ -9269,7 +9229,7 @@
         </p:nvCxnSpPr>
         <p:spPr>
           <a:xfrm>
-            <a:off x="4494875" y="2928551"/>
+            <a:off x="4494875" y="3262188"/>
             <a:ext cx="1327037" cy="1717692"/>
           </a:xfrm>
           <a:prstGeom prst="straightConnector1">
@@ -9307,7 +9267,7 @@
         </p:nvSpPr>
         <p:spPr>
           <a:xfrm>
-            <a:off x="1481326" y="3780649"/>
+            <a:off x="1481326" y="4114286"/>
             <a:ext cx="964736" cy="574752"/>
           </a:xfrm>
           <a:prstGeom prst="flowChartDocument">
@@ -9349,7 +9309,7 @@
         </p:nvSpPr>
         <p:spPr>
           <a:xfrm>
-            <a:off x="5800993" y="3768703"/>
+            <a:off x="5800993" y="4102340"/>
             <a:ext cx="964736" cy="574752"/>
           </a:xfrm>
           <a:prstGeom prst="flowChartDocument">
@@ -9390,7 +9350,7 @@
         </p:nvSpPr>
         <p:spPr>
           <a:xfrm>
-            <a:off x="815546" y="3237470"/>
+            <a:off x="815546" y="3571107"/>
             <a:ext cx="6932140" cy="2842054"/>
           </a:xfrm>
           <a:prstGeom prst="rect">
@@ -9437,8 +9397,8 @@
         </p:nvSpPr>
         <p:spPr>
           <a:xfrm>
-            <a:off x="3269557" y="3757191"/>
-            <a:ext cx="1772986" cy="369332"/>
+            <a:off x="2960636" y="4313253"/>
+            <a:ext cx="2281074" cy="369332"/>
           </a:xfrm>
           <a:prstGeom prst="rect">
             <a:avLst/>
@@ -9453,7 +9413,7 @@
           <a:p>
             <a:r>
               <a:rPr lang="en-US" dirty="0" smtClean="0"/>
-              <a:t>Local transaction</a:t>
+              <a:t>Local ACID transaction</a:t>
             </a:r>
             <a:endParaRPr lang="en-US" dirty="0"/>
           </a:p>
@@ -9469,7 +9429,7 @@
         </p:nvCxnSpPr>
         <p:spPr>
           <a:xfrm>
-            <a:off x="7047230" y="5211489"/>
+            <a:off x="7047230" y="5545126"/>
             <a:ext cx="2523689" cy="0"/>
           </a:xfrm>
           <a:prstGeom prst="straightConnector1">
@@ -9507,7 +9467,7 @@
         </p:nvSpPr>
         <p:spPr>
           <a:xfrm>
-            <a:off x="8090236" y="4467643"/>
+            <a:off x="8090236" y="4801280"/>
             <a:ext cx="964736" cy="574752"/>
           </a:xfrm>
           <a:prstGeom prst="flowChartDocument">

</xml_diff>

<commit_message>
Update x and ?
</commit_message>
<xml_diff>
--- a/t18-event-mongodb.pptx
+++ b/t18-event-mongodb.pptx
@@ -6798,14 +6798,14 @@
       </p:sp>
       <p:sp>
         <p:nvSpPr>
-          <p:cNvPr id="31" name="TextBox 30"/>
+          <p:cNvPr id="32" name="TextBox 31"/>
           <p:cNvSpPr txBox="1"/>
           <p:nvPr/>
         </p:nvSpPr>
         <p:spPr>
           <a:xfrm>
-            <a:off x="8769627" y="-529429"/>
-            <a:ext cx="2026517" cy="6001643"/>
+            <a:off x="3980742" y="670708"/>
+            <a:ext cx="1209091" cy="2185214"/>
           </a:xfrm>
           <a:prstGeom prst="rect">
             <a:avLst/>
@@ -6813,65 +6813,29 @@
           <a:noFill/>
         </p:spPr>
         <p:txBody>
-          <a:bodyPr wrap="none" rtlCol="0">
+          <a:bodyPr wrap="square" rtlCol="0">
             <a:spAutoFit/>
           </a:bodyPr>
           <a:lstStyle/>
           <a:p>
             <a:r>
-              <a:rPr lang="en-US" sz="38400" dirty="0" smtClean="0">
+              <a:rPr lang="en-US" sz="13600" dirty="0">
                 <a:solidFill>
                   <a:srgbClr val="FF0000"/>
                 </a:solidFill>
-                <a:latin typeface="Bradley Hand ITC" panose="03070402050302030203" pitchFamily="66" charset="0"/>
+                <a:latin typeface="Arial Unicode MS" panose="020B0604020202020204" pitchFamily="34" charset="-128"/>
+                <a:ea typeface="Arial Unicode MS" panose="020B0604020202020204" pitchFamily="34" charset="-128"/>
+                <a:cs typeface="Arial Unicode MS" panose="020B0604020202020204" pitchFamily="34" charset="-128"/>
               </a:rPr>
-              <a:t>?</a:t>
-            </a:r>
-            <a:endParaRPr lang="en-US" sz="38400" dirty="0">
+              <a:t>✕</a:t>
+            </a:r>
+            <a:endParaRPr lang="en-US" sz="13600" dirty="0">
               <a:solidFill>
                 <a:srgbClr val="FF0000"/>
               </a:solidFill>
-              <a:latin typeface="Bradley Hand ITC" panose="03070402050302030203" pitchFamily="66" charset="0"/>
-            </a:endParaRPr>
-          </a:p>
-        </p:txBody>
-      </p:sp>
-      <p:sp>
-        <p:nvSpPr>
-          <p:cNvPr id="32" name="TextBox 31"/>
-          <p:cNvSpPr txBox="1"/>
-          <p:nvPr/>
-        </p:nvSpPr>
-        <p:spPr>
-          <a:xfrm>
-            <a:off x="4195704" y="267106"/>
-            <a:ext cx="1720332" cy="3063515"/>
-          </a:xfrm>
-          <a:prstGeom prst="rect">
-            <a:avLst/>
-          </a:prstGeom>
-          <a:noFill/>
-        </p:spPr>
-        <p:txBody>
-          <a:bodyPr wrap="square" rtlCol="0">
-            <a:spAutoFit/>
-          </a:bodyPr>
-          <a:lstStyle/>
-          <a:p>
-            <a:r>
-              <a:rPr lang="en-US" sz="19200" dirty="0" smtClean="0">
-                <a:solidFill>
-                  <a:srgbClr val="FF0000"/>
-                </a:solidFill>
-                <a:latin typeface="Bradley Hand ITC" panose="03070402050302030203" pitchFamily="66" charset="0"/>
-              </a:rPr>
-              <a:t>X</a:t>
-            </a:r>
-            <a:endParaRPr lang="en-US" sz="19200" dirty="0">
-              <a:solidFill>
-                <a:srgbClr val="FF0000"/>
-              </a:solidFill>
-              <a:latin typeface="Bradley Hand ITC" panose="03070402050302030203" pitchFamily="66" charset="0"/>
+              <a:latin typeface="Arial Unicode MS" panose="020B0604020202020204" pitchFamily="34" charset="-128"/>
+              <a:ea typeface="Arial Unicode MS" panose="020B0604020202020204" pitchFamily="34" charset="-128"/>
+              <a:cs typeface="Arial Unicode MS" panose="020B0604020202020204" pitchFamily="34" charset="-128"/>
             </a:endParaRPr>
           </a:p>
         </p:txBody>
@@ -6998,6 +6962,50 @@
               <a:rPr lang="en-US" dirty="0" smtClean="0"/>
               <a:t>Event</a:t>
             </a:r>
+          </a:p>
+        </p:txBody>
+      </p:sp>
+      <p:sp>
+        <p:nvSpPr>
+          <p:cNvPr id="31" name="TextBox 30"/>
+          <p:cNvSpPr txBox="1"/>
+          <p:nvPr/>
+        </p:nvSpPr>
+        <p:spPr>
+          <a:xfrm>
+            <a:off x="9115619" y="508540"/>
+            <a:ext cx="1553630" cy="3046988"/>
+          </a:xfrm>
+          <a:prstGeom prst="rect">
+            <a:avLst/>
+          </a:prstGeom>
+          <a:noFill/>
+        </p:spPr>
+        <p:txBody>
+          <a:bodyPr wrap="none" rtlCol="0">
+            <a:spAutoFit/>
+          </a:bodyPr>
+          <a:lstStyle/>
+          <a:p>
+            <a:r>
+              <a:rPr lang="en-US" sz="19200" dirty="0" smtClean="0">
+                <a:solidFill>
+                  <a:srgbClr val="FF0000"/>
+                </a:solidFill>
+                <a:latin typeface="Arial Unicode MS" panose="020B0604020202020204" pitchFamily="34" charset="-128"/>
+                <a:ea typeface="Arial Unicode MS" panose="020B0604020202020204" pitchFamily="34" charset="-128"/>
+                <a:cs typeface="Arial Unicode MS" panose="020B0604020202020204" pitchFamily="34" charset="-128"/>
+              </a:rPr>
+              <a:t>?</a:t>
+            </a:r>
+            <a:endParaRPr lang="en-US" sz="19200" dirty="0">
+              <a:solidFill>
+                <a:srgbClr val="FF0000"/>
+              </a:solidFill>
+              <a:latin typeface="Arial Unicode MS" panose="020B0604020202020204" pitchFamily="34" charset="-128"/>
+              <a:ea typeface="Arial Unicode MS" panose="020B0604020202020204" pitchFamily="34" charset="-128"/>
+              <a:cs typeface="Arial Unicode MS" panose="020B0604020202020204" pitchFamily="34" charset="-128"/>
+            </a:endParaRPr>
           </a:p>
         </p:txBody>
       </p:sp>
@@ -7222,9 +7230,9 @@
     </p:tnLst>
     <p:bldLst>
       <p:bldP spid="17" grpId="0" animBg="1"/>
-      <p:bldP spid="31" grpId="0"/>
       <p:bldP spid="32" grpId="0"/>
       <p:bldP spid="34" grpId="0"/>
+      <p:bldP spid="31" grpId="0"/>
     </p:bldLst>
   </p:timing>
 </p:sld>

</xml_diff>

<commit_message>
Add animation to system slide
</commit_message>
<xml_diff>
--- a/t18-event-mongodb.pptx
+++ b/t18-event-mongodb.pptx
@@ -7541,9 +7541,545 @@
   <p:timing>
     <p:tnLst>
       <p:par>
-        <p:cTn id="1" dur="indefinite" restart="never" nodeType="tmRoot"/>
+        <p:cTn id="1" dur="indefinite" restart="never" nodeType="tmRoot">
+          <p:childTnLst>
+            <p:seq concurrent="1" nextAc="seek">
+              <p:cTn id="2" dur="indefinite" nodeType="mainSeq">
+                <p:childTnLst>
+                  <p:par>
+                    <p:cTn id="3" fill="hold">
+                      <p:stCondLst>
+                        <p:cond delay="indefinite"/>
+                      </p:stCondLst>
+                      <p:childTnLst>
+                        <p:par>
+                          <p:cTn id="4" fill="hold">
+                            <p:stCondLst>
+                              <p:cond delay="0"/>
+                            </p:stCondLst>
+                            <p:childTnLst>
+                              <p:par>
+                                <p:cTn id="5" presetID="1" presetClass="entr" presetSubtype="0" fill="hold" grpId="0" nodeType="clickEffect">
+                                  <p:stCondLst>
+                                    <p:cond delay="0"/>
+                                  </p:stCondLst>
+                                  <p:childTnLst>
+                                    <p:set>
+                                      <p:cBhvr>
+                                        <p:cTn id="6" dur="1" fill="hold">
+                                          <p:stCondLst>
+                                            <p:cond delay="0"/>
+                                          </p:stCondLst>
+                                        </p:cTn>
+                                        <p:tgtEl>
+                                          <p:spTgt spid="24"/>
+                                        </p:tgtEl>
+                                        <p:attrNameLst>
+                                          <p:attrName>style.visibility</p:attrName>
+                                        </p:attrNameLst>
+                                      </p:cBhvr>
+                                      <p:to>
+                                        <p:strVal val="visible"/>
+                                      </p:to>
+                                    </p:set>
+                                  </p:childTnLst>
+                                </p:cTn>
+                              </p:par>
+                              <p:par>
+                                <p:cTn id="7" presetID="1" presetClass="entr" presetSubtype="0" fill="hold" nodeType="withEffect">
+                                  <p:stCondLst>
+                                    <p:cond delay="0"/>
+                                  </p:stCondLst>
+                                  <p:childTnLst>
+                                    <p:set>
+                                      <p:cBhvr>
+                                        <p:cTn id="8" dur="1" fill="hold">
+                                          <p:stCondLst>
+                                            <p:cond delay="0"/>
+                                          </p:stCondLst>
+                                        </p:cTn>
+                                        <p:tgtEl>
+                                          <p:spTgt spid="21"/>
+                                        </p:tgtEl>
+                                        <p:attrNameLst>
+                                          <p:attrName>style.visibility</p:attrName>
+                                        </p:attrNameLst>
+                                      </p:cBhvr>
+                                      <p:to>
+                                        <p:strVal val="visible"/>
+                                      </p:to>
+                                    </p:set>
+                                  </p:childTnLst>
+                                </p:cTn>
+                              </p:par>
+                            </p:childTnLst>
+                          </p:cTn>
+                        </p:par>
+                      </p:childTnLst>
+                    </p:cTn>
+                  </p:par>
+                  <p:par>
+                    <p:cTn id="9" fill="hold">
+                      <p:stCondLst>
+                        <p:cond delay="indefinite"/>
+                      </p:stCondLst>
+                      <p:childTnLst>
+                        <p:par>
+                          <p:cTn id="10" fill="hold">
+                            <p:stCondLst>
+                              <p:cond delay="0"/>
+                            </p:stCondLst>
+                            <p:childTnLst>
+                              <p:par>
+                                <p:cTn id="11" presetID="1" presetClass="entr" presetSubtype="0" fill="hold" grpId="0" nodeType="clickEffect">
+                                  <p:stCondLst>
+                                    <p:cond delay="0"/>
+                                  </p:stCondLst>
+                                  <p:childTnLst>
+                                    <p:set>
+                                      <p:cBhvr>
+                                        <p:cTn id="12" dur="1" fill="hold">
+                                          <p:stCondLst>
+                                            <p:cond delay="0"/>
+                                          </p:stCondLst>
+                                        </p:cTn>
+                                        <p:tgtEl>
+                                          <p:spTgt spid="25"/>
+                                        </p:tgtEl>
+                                        <p:attrNameLst>
+                                          <p:attrName>style.visibility</p:attrName>
+                                        </p:attrNameLst>
+                                      </p:cBhvr>
+                                      <p:to>
+                                        <p:strVal val="visible"/>
+                                      </p:to>
+                                    </p:set>
+                                  </p:childTnLst>
+                                </p:cTn>
+                              </p:par>
+                              <p:par>
+                                <p:cTn id="13" presetID="1" presetClass="entr" presetSubtype="0" fill="hold" nodeType="withEffect">
+                                  <p:stCondLst>
+                                    <p:cond delay="0"/>
+                                  </p:stCondLst>
+                                  <p:childTnLst>
+                                    <p:set>
+                                      <p:cBhvr>
+                                        <p:cTn id="14" dur="1" fill="hold">
+                                          <p:stCondLst>
+                                            <p:cond delay="0"/>
+                                          </p:stCondLst>
+                                        </p:cTn>
+                                        <p:tgtEl>
+                                          <p:spTgt spid="10"/>
+                                        </p:tgtEl>
+                                        <p:attrNameLst>
+                                          <p:attrName>style.visibility</p:attrName>
+                                        </p:attrNameLst>
+                                      </p:cBhvr>
+                                      <p:to>
+                                        <p:strVal val="visible"/>
+                                      </p:to>
+                                    </p:set>
+                                  </p:childTnLst>
+                                </p:cTn>
+                              </p:par>
+                            </p:childTnLst>
+                          </p:cTn>
+                        </p:par>
+                      </p:childTnLst>
+                    </p:cTn>
+                  </p:par>
+                  <p:par>
+                    <p:cTn id="15" fill="hold">
+                      <p:stCondLst>
+                        <p:cond delay="indefinite"/>
+                      </p:stCondLst>
+                      <p:childTnLst>
+                        <p:par>
+                          <p:cTn id="16" fill="hold">
+                            <p:stCondLst>
+                              <p:cond delay="0"/>
+                            </p:stCondLst>
+                            <p:childTnLst>
+                              <p:par>
+                                <p:cTn id="17" presetID="1" presetClass="entr" presetSubtype="0" fill="hold" grpId="0" nodeType="clickEffect">
+                                  <p:stCondLst>
+                                    <p:cond delay="0"/>
+                                  </p:stCondLst>
+                                  <p:childTnLst>
+                                    <p:set>
+                                      <p:cBhvr>
+                                        <p:cTn id="18" dur="1" fill="hold">
+                                          <p:stCondLst>
+                                            <p:cond delay="0"/>
+                                          </p:stCondLst>
+                                        </p:cTn>
+                                        <p:tgtEl>
+                                          <p:spTgt spid="26"/>
+                                        </p:tgtEl>
+                                        <p:attrNameLst>
+                                          <p:attrName>style.visibility</p:attrName>
+                                        </p:attrNameLst>
+                                      </p:cBhvr>
+                                      <p:to>
+                                        <p:strVal val="visible"/>
+                                      </p:to>
+                                    </p:set>
+                                  </p:childTnLst>
+                                </p:cTn>
+                              </p:par>
+                              <p:par>
+                                <p:cTn id="19" presetID="1" presetClass="entr" presetSubtype="0" fill="hold" nodeType="withEffect">
+                                  <p:stCondLst>
+                                    <p:cond delay="0"/>
+                                  </p:stCondLst>
+                                  <p:childTnLst>
+                                    <p:set>
+                                      <p:cBhvr>
+                                        <p:cTn id="20" dur="1" fill="hold">
+                                          <p:stCondLst>
+                                            <p:cond delay="0"/>
+                                          </p:stCondLst>
+                                        </p:cTn>
+                                        <p:tgtEl>
+                                          <p:spTgt spid="11"/>
+                                        </p:tgtEl>
+                                        <p:attrNameLst>
+                                          <p:attrName>style.visibility</p:attrName>
+                                        </p:attrNameLst>
+                                      </p:cBhvr>
+                                      <p:to>
+                                        <p:strVal val="visible"/>
+                                      </p:to>
+                                    </p:set>
+                                  </p:childTnLst>
+                                </p:cTn>
+                              </p:par>
+                            </p:childTnLst>
+                          </p:cTn>
+                        </p:par>
+                      </p:childTnLst>
+                    </p:cTn>
+                  </p:par>
+                  <p:par>
+                    <p:cTn id="21" fill="hold">
+                      <p:stCondLst>
+                        <p:cond delay="indefinite"/>
+                      </p:stCondLst>
+                      <p:childTnLst>
+                        <p:par>
+                          <p:cTn id="22" fill="hold">
+                            <p:stCondLst>
+                              <p:cond delay="0"/>
+                            </p:stCondLst>
+                            <p:childTnLst>
+                              <p:par>
+                                <p:cTn id="23" presetID="1" presetClass="entr" presetSubtype="0" fill="hold" grpId="0" nodeType="clickEffect">
+                                  <p:stCondLst>
+                                    <p:cond delay="0"/>
+                                  </p:stCondLst>
+                                  <p:childTnLst>
+                                    <p:set>
+                                      <p:cBhvr>
+                                        <p:cTn id="24" dur="1" fill="hold">
+                                          <p:stCondLst>
+                                            <p:cond delay="0"/>
+                                          </p:stCondLst>
+                                        </p:cTn>
+                                        <p:tgtEl>
+                                          <p:spTgt spid="27"/>
+                                        </p:tgtEl>
+                                        <p:attrNameLst>
+                                          <p:attrName>style.visibility</p:attrName>
+                                        </p:attrNameLst>
+                                      </p:cBhvr>
+                                      <p:to>
+                                        <p:strVal val="visible"/>
+                                      </p:to>
+                                    </p:set>
+                                  </p:childTnLst>
+                                </p:cTn>
+                              </p:par>
+                              <p:par>
+                                <p:cTn id="25" presetID="1" presetClass="entr" presetSubtype="0" fill="hold" nodeType="withEffect">
+                                  <p:stCondLst>
+                                    <p:cond delay="0"/>
+                                  </p:stCondLst>
+                                  <p:childTnLst>
+                                    <p:set>
+                                      <p:cBhvr>
+                                        <p:cTn id="26" dur="1" fill="hold">
+                                          <p:stCondLst>
+                                            <p:cond delay="0"/>
+                                          </p:stCondLst>
+                                        </p:cTn>
+                                        <p:tgtEl>
+                                          <p:spTgt spid="37"/>
+                                        </p:tgtEl>
+                                        <p:attrNameLst>
+                                          <p:attrName>style.visibility</p:attrName>
+                                        </p:attrNameLst>
+                                      </p:cBhvr>
+                                      <p:to>
+                                        <p:strVal val="visible"/>
+                                      </p:to>
+                                    </p:set>
+                                  </p:childTnLst>
+                                </p:cTn>
+                              </p:par>
+                            </p:childTnLst>
+                          </p:cTn>
+                        </p:par>
+                      </p:childTnLst>
+                    </p:cTn>
+                  </p:par>
+                  <p:par>
+                    <p:cTn id="27" fill="hold">
+                      <p:stCondLst>
+                        <p:cond delay="indefinite"/>
+                      </p:stCondLst>
+                      <p:childTnLst>
+                        <p:par>
+                          <p:cTn id="28" fill="hold">
+                            <p:stCondLst>
+                              <p:cond delay="0"/>
+                            </p:stCondLst>
+                            <p:childTnLst>
+                              <p:par>
+                                <p:cTn id="29" presetID="1" presetClass="entr" presetSubtype="0" fill="hold" grpId="0" nodeType="clickEffect">
+                                  <p:stCondLst>
+                                    <p:cond delay="0"/>
+                                  </p:stCondLst>
+                                  <p:childTnLst>
+                                    <p:set>
+                                      <p:cBhvr>
+                                        <p:cTn id="30" dur="1" fill="hold">
+                                          <p:stCondLst>
+                                            <p:cond delay="0"/>
+                                          </p:stCondLst>
+                                        </p:cTn>
+                                        <p:tgtEl>
+                                          <p:spTgt spid="36"/>
+                                        </p:tgtEl>
+                                        <p:attrNameLst>
+                                          <p:attrName>style.visibility</p:attrName>
+                                        </p:attrNameLst>
+                                      </p:cBhvr>
+                                      <p:to>
+                                        <p:strVal val="visible"/>
+                                      </p:to>
+                                    </p:set>
+                                  </p:childTnLst>
+                                </p:cTn>
+                              </p:par>
+                              <p:par>
+                                <p:cTn id="31" presetID="1" presetClass="entr" presetSubtype="0" fill="hold" nodeType="withEffect">
+                                  <p:stCondLst>
+                                    <p:cond delay="0"/>
+                                  </p:stCondLst>
+                                  <p:childTnLst>
+                                    <p:set>
+                                      <p:cBhvr>
+                                        <p:cTn id="32" dur="1" fill="hold">
+                                          <p:stCondLst>
+                                            <p:cond delay="0"/>
+                                          </p:stCondLst>
+                                        </p:cTn>
+                                        <p:tgtEl>
+                                          <p:spTgt spid="33"/>
+                                        </p:tgtEl>
+                                        <p:attrNameLst>
+                                          <p:attrName>style.visibility</p:attrName>
+                                        </p:attrNameLst>
+                                      </p:cBhvr>
+                                      <p:to>
+                                        <p:strVal val="visible"/>
+                                      </p:to>
+                                    </p:set>
+                                  </p:childTnLst>
+                                </p:cTn>
+                              </p:par>
+                            </p:childTnLst>
+                          </p:cTn>
+                        </p:par>
+                      </p:childTnLst>
+                    </p:cTn>
+                  </p:par>
+                  <p:par>
+                    <p:cTn id="33" fill="hold">
+                      <p:stCondLst>
+                        <p:cond delay="indefinite"/>
+                      </p:stCondLst>
+                      <p:childTnLst>
+                        <p:par>
+                          <p:cTn id="34" fill="hold">
+                            <p:stCondLst>
+                              <p:cond delay="0"/>
+                            </p:stCondLst>
+                            <p:childTnLst>
+                              <p:par>
+                                <p:cTn id="35" presetID="1" presetClass="entr" presetSubtype="0" fill="hold" grpId="0" nodeType="clickEffect">
+                                  <p:stCondLst>
+                                    <p:cond delay="0"/>
+                                  </p:stCondLst>
+                                  <p:childTnLst>
+                                    <p:set>
+                                      <p:cBhvr>
+                                        <p:cTn id="36" dur="1" fill="hold">
+                                          <p:stCondLst>
+                                            <p:cond delay="0"/>
+                                          </p:stCondLst>
+                                        </p:cTn>
+                                        <p:tgtEl>
+                                          <p:spTgt spid="29"/>
+                                        </p:tgtEl>
+                                        <p:attrNameLst>
+                                          <p:attrName>style.visibility</p:attrName>
+                                        </p:attrNameLst>
+                                      </p:cBhvr>
+                                      <p:to>
+                                        <p:strVal val="visible"/>
+                                      </p:to>
+                                    </p:set>
+                                  </p:childTnLst>
+                                </p:cTn>
+                              </p:par>
+                              <p:par>
+                                <p:cTn id="37" presetID="1" presetClass="entr" presetSubtype="0" fill="hold" nodeType="withEffect">
+                                  <p:stCondLst>
+                                    <p:cond delay="0"/>
+                                  </p:stCondLst>
+                                  <p:childTnLst>
+                                    <p:set>
+                                      <p:cBhvr>
+                                        <p:cTn id="38" dur="1" fill="hold">
+                                          <p:stCondLst>
+                                            <p:cond delay="0"/>
+                                          </p:stCondLst>
+                                        </p:cTn>
+                                        <p:tgtEl>
+                                          <p:spTgt spid="28"/>
+                                        </p:tgtEl>
+                                        <p:attrNameLst>
+                                          <p:attrName>style.visibility</p:attrName>
+                                        </p:attrNameLst>
+                                      </p:cBhvr>
+                                      <p:to>
+                                        <p:strVal val="visible"/>
+                                      </p:to>
+                                    </p:set>
+                                  </p:childTnLst>
+                                </p:cTn>
+                              </p:par>
+                            </p:childTnLst>
+                          </p:cTn>
+                        </p:par>
+                      </p:childTnLst>
+                    </p:cTn>
+                  </p:par>
+                  <p:par>
+                    <p:cTn id="39" fill="hold">
+                      <p:stCondLst>
+                        <p:cond delay="indefinite"/>
+                      </p:stCondLst>
+                      <p:childTnLst>
+                        <p:par>
+                          <p:cTn id="40" fill="hold">
+                            <p:stCondLst>
+                              <p:cond delay="0"/>
+                            </p:stCondLst>
+                            <p:childTnLst>
+                              <p:par>
+                                <p:cTn id="41" presetID="1" presetClass="entr" presetSubtype="0" fill="hold" nodeType="clickEffect">
+                                  <p:stCondLst>
+                                    <p:cond delay="0"/>
+                                  </p:stCondLst>
+                                  <p:childTnLst>
+                                    <p:set>
+                                      <p:cBhvr>
+                                        <p:cTn id="42" dur="1" fill="hold">
+                                          <p:stCondLst>
+                                            <p:cond delay="0"/>
+                                          </p:stCondLst>
+                                        </p:cTn>
+                                        <p:tgtEl>
+                                          <p:spTgt spid="38"/>
+                                        </p:tgtEl>
+                                        <p:attrNameLst>
+                                          <p:attrName>style.visibility</p:attrName>
+                                        </p:attrNameLst>
+                                      </p:cBhvr>
+                                      <p:to>
+                                        <p:strVal val="visible"/>
+                                      </p:to>
+                                    </p:set>
+                                  </p:childTnLst>
+                                </p:cTn>
+                              </p:par>
+                              <p:par>
+                                <p:cTn id="43" presetID="1" presetClass="entr" presetSubtype="0" fill="hold" grpId="0" nodeType="withEffect">
+                                  <p:stCondLst>
+                                    <p:cond delay="0"/>
+                                  </p:stCondLst>
+                                  <p:childTnLst>
+                                    <p:set>
+                                      <p:cBhvr>
+                                        <p:cTn id="44" dur="1" fill="hold">
+                                          <p:stCondLst>
+                                            <p:cond delay="0"/>
+                                          </p:stCondLst>
+                                        </p:cTn>
+                                        <p:tgtEl>
+                                          <p:spTgt spid="40"/>
+                                        </p:tgtEl>
+                                        <p:attrNameLst>
+                                          <p:attrName>style.visibility</p:attrName>
+                                        </p:attrNameLst>
+                                      </p:cBhvr>
+                                      <p:to>
+                                        <p:strVal val="visible"/>
+                                      </p:to>
+                                    </p:set>
+                                  </p:childTnLst>
+                                </p:cTn>
+                              </p:par>
+                            </p:childTnLst>
+                          </p:cTn>
+                        </p:par>
+                      </p:childTnLst>
+                    </p:cTn>
+                  </p:par>
+                </p:childTnLst>
+              </p:cTn>
+              <p:prevCondLst>
+                <p:cond evt="onPrev" delay="0">
+                  <p:tgtEl>
+                    <p:sldTgt/>
+                  </p:tgtEl>
+                </p:cond>
+              </p:prevCondLst>
+              <p:nextCondLst>
+                <p:cond evt="onNext" delay="0">
+                  <p:tgtEl>
+                    <p:sldTgt/>
+                  </p:tgtEl>
+                </p:cond>
+              </p:nextCondLst>
+            </p:seq>
+          </p:childTnLst>
+        </p:cTn>
       </p:par>
     </p:tnLst>
+    <p:bldLst>
+      <p:bldP spid="24" grpId="0" animBg="1"/>
+      <p:bldP spid="25" grpId="0" animBg="1"/>
+      <p:bldP spid="26" grpId="0" animBg="1"/>
+      <p:bldP spid="27" grpId="0" animBg="1"/>
+      <p:bldP spid="29" grpId="0" animBg="1"/>
+      <p:bldP spid="36" grpId="0" animBg="1"/>
+      <p:bldP spid="40" grpId="0" animBg="1"/>
+    </p:bldLst>
   </p:timing>
 </p:sld>
 </file>

</xml_diff>

<commit_message>
Update notes and add QR-code
</commit_message>
<xml_diff>
--- a/t18-event-mongodb.pptx
+++ b/t18-event-mongodb.pptx
@@ -1477,7 +1477,6 @@
               <a:rPr lang="en-US" dirty="0" smtClean="0"/>
               <a:t>Kafka?</a:t>
             </a:r>
-            <a:endParaRPr lang="en-US" dirty="0" smtClean="0"/>
           </a:p>
         </p:txBody>
       </p:sp>
@@ -5186,7 +5185,7 @@
             </a:r>
             <a:r>
               <a:rPr lang="en-US" dirty="0" smtClean="0"/>
-              <a:t>considerations:</a:t>
+              <a:t>considerations</a:t>
             </a:r>
             <a:endParaRPr lang="en-US" dirty="0"/>
           </a:p>
@@ -5854,7 +5853,7 @@
         <p:spPr>
           <a:xfrm>
             <a:off x="1261872" y="1836955"/>
-            <a:ext cx="819327" cy="461665"/>
+            <a:ext cx="737574" cy="461665"/>
           </a:xfrm>
           <a:prstGeom prst="rect">
             <a:avLst/>
@@ -5868,8 +5867,8 @@
           <a:lstStyle/>
           <a:p>
             <a:r>
-              <a:rPr lang="en-US" sz="2400" dirty="0" smtClean="0"/>
-              <a:t>Proc:</a:t>
+              <a:rPr lang="en-US" sz="2400" smtClean="0"/>
+              <a:t>Proc</a:t>
             </a:r>
             <a:endParaRPr lang="en-US" sz="2400" dirty="0"/>
           </a:p>
@@ -5884,7 +5883,7 @@
         <p:spPr>
           <a:xfrm>
             <a:off x="1261872" y="3357094"/>
-            <a:ext cx="873957" cy="461665"/>
+            <a:ext cx="792205" cy="461665"/>
           </a:xfrm>
           <a:prstGeom prst="rect">
             <a:avLst/>
@@ -5898,8 +5897,8 @@
           <a:lstStyle/>
           <a:p>
             <a:r>
-              <a:rPr lang="en-US" sz="2400" dirty="0" smtClean="0"/>
-              <a:t>Cons:</a:t>
+              <a:rPr lang="en-US" sz="2400" smtClean="0"/>
+              <a:t>Cons</a:t>
             </a:r>
             <a:endParaRPr lang="en-US" sz="2400" dirty="0"/>
           </a:p>
@@ -7495,7 +7494,7 @@
         </p:nvSpPr>
         <p:spPr>
           <a:xfrm>
-            <a:off x="4170838" y="2581614"/>
+            <a:off x="4165124" y="2510646"/>
             <a:ext cx="1251115" cy="785740"/>
           </a:xfrm>
           <a:prstGeom prst="flowChartDocument">

</xml_diff>

<commit_message>
Refine and add oplog internals slide
</commit_message>
<xml_diff>
--- a/t18-event-mongodb.pptx
+++ b/t18-event-mongodb.pptx
@@ -5,7 +5,7 @@
     <p:sldMasterId id="2147483756" r:id="rId1"/>
   </p:sldMasterIdLst>
   <p:notesMasterIdLst>
-    <p:notesMasterId r:id="rId16"/>
+    <p:notesMasterId r:id="rId19"/>
   </p:notesMasterIdLst>
   <p:sldIdLst>
     <p:sldId id="258" r:id="rId2"/>
@@ -22,6 +22,9 @@
     <p:sldId id="269" r:id="rId13"/>
     <p:sldId id="270" r:id="rId14"/>
     <p:sldId id="271" r:id="rId15"/>
+    <p:sldId id="272" r:id="rId16"/>
+    <p:sldId id="274" r:id="rId17"/>
+    <p:sldId id="273" r:id="rId18"/>
   </p:sldIdLst>
   <p:sldSz cx="12192000" cy="6858000"/>
   <p:notesSz cx="6858000" cy="9144000"/>
@@ -848,6 +851,37 @@
           <a:bodyPr/>
           <a:lstStyle/>
           <a:p>
+            <a:r>
+              <a:rPr lang="en-US" dirty="0" smtClean="0"/>
+              <a:t>Went with Change Streams for </a:t>
+            </a:r>
+            <a:r>
+              <a:rPr lang="en-US" dirty="0" err="1" smtClean="0"/>
+              <a:t>PoC</a:t>
+            </a:r>
+            <a:endParaRPr lang="en-US" dirty="0" smtClean="0"/>
+          </a:p>
+          <a:p>
+            <a:endParaRPr lang="en-US" dirty="0" smtClean="0"/>
+          </a:p>
+          <a:p>
+            <a:r>
+              <a:rPr lang="en-US" dirty="0" smtClean="0"/>
+              <a:t>Stale</a:t>
+            </a:r>
+            <a:r>
+              <a:rPr lang="en-US" baseline="0" dirty="0" smtClean="0"/>
+              <a:t> collection r</a:t>
+            </a:r>
+            <a:r>
+              <a:rPr lang="en-US" dirty="0" smtClean="0"/>
+              <a:t>esume issue</a:t>
+            </a:r>
+          </a:p>
+          <a:p>
+            <a:endParaRPr lang="en-US" dirty="0" smtClean="0"/>
+          </a:p>
+          <a:p>
             <a:endParaRPr lang="en-US" dirty="0"/>
           </a:p>
         </p:txBody>
@@ -932,7 +966,32 @@
           <a:bodyPr/>
           <a:lstStyle/>
           <a:p>
-            <a:endParaRPr lang="en-US" dirty="0"/>
+            <a:pPr marL="0" marR="0" lvl="0" indent="0" algn="l" defTabSz="914400" rtl="0" eaLnBrk="1" fontAlgn="auto" latinLnBrk="0" hangingPunct="1">
+              <a:lnSpc>
+                <a:spcPct val="100000"/>
+              </a:lnSpc>
+              <a:spcBef>
+                <a:spcPts val="0"/>
+              </a:spcBef>
+              <a:spcAft>
+                <a:spcPts val="0"/>
+              </a:spcAft>
+              <a:buClrTx/>
+              <a:buSzTx/>
+              <a:buFontTx/>
+              <a:buNone/>
+              <a:tabLst/>
+              <a:defRPr/>
+            </a:pPr>
+            <a:r>
+              <a:rPr lang="en-US" dirty="0" smtClean="0"/>
+              <a:t>3.4</a:t>
+            </a:r>
+            <a:r>
+              <a:rPr lang="en-US" baseline="0" dirty="0" smtClean="0"/>
+              <a:t> to 3.6 upgrade issue</a:t>
+            </a:r>
+            <a:endParaRPr lang="en-US" dirty="0" smtClean="0"/>
           </a:p>
         </p:txBody>
       </p:sp>
@@ -1047,6 +1106,276 @@
     <p:extLst>
       <p:ext uri="{BB962C8B-B14F-4D97-AF65-F5344CB8AC3E}">
         <p14:creationId xmlns:p14="http://schemas.microsoft.com/office/powerpoint/2010/main" val="2789047906"/>
+      </p:ext>
+    </p:extLst>
+  </p:cSld>
+  <p:clrMapOvr>
+    <a:masterClrMapping/>
+  </p:clrMapOvr>
+</p:notes>
+</file>
+
+<file path=ppt/notesSlides/notesSlide15.xml><?xml version="1.0" encoding="utf-8"?>
+<p:notes xmlns:a="http://schemas.openxmlformats.org/drawingml/2006/main" xmlns:r="http://schemas.openxmlformats.org/officeDocument/2006/relationships" xmlns:p="http://schemas.openxmlformats.org/presentationml/2006/main">
+  <p:cSld>
+    <p:spTree>
+      <p:nvGrpSpPr>
+        <p:cNvPr id="1" name=""/>
+        <p:cNvGrpSpPr/>
+        <p:nvPr/>
+      </p:nvGrpSpPr>
+      <p:grpSpPr>
+        <a:xfrm>
+          <a:off x="0" y="0"/>
+          <a:ext cx="0" cy="0"/>
+          <a:chOff x="0" y="0"/>
+          <a:chExt cx="0" cy="0"/>
+        </a:xfrm>
+      </p:grpSpPr>
+      <p:sp>
+        <p:nvSpPr>
+          <p:cNvPr id="2" name="Slide Image Placeholder 1"/>
+          <p:cNvSpPr>
+            <a:spLocks noGrp="1" noRot="1" noChangeAspect="1"/>
+          </p:cNvSpPr>
+          <p:nvPr>
+            <p:ph type="sldImg"/>
+          </p:nvPr>
+        </p:nvSpPr>
+        <p:spPr/>
+      </p:sp>
+      <p:sp>
+        <p:nvSpPr>
+          <p:cNvPr id="3" name="Notes Placeholder 2"/>
+          <p:cNvSpPr>
+            <a:spLocks noGrp="1"/>
+          </p:cNvSpPr>
+          <p:nvPr>
+            <p:ph type="body" idx="1"/>
+          </p:nvPr>
+        </p:nvSpPr>
+        <p:spPr/>
+        <p:txBody>
+          <a:bodyPr/>
+          <a:lstStyle/>
+          <a:p>
+            <a:endParaRPr lang="en-US" dirty="0"/>
+          </a:p>
+        </p:txBody>
+      </p:sp>
+      <p:sp>
+        <p:nvSpPr>
+          <p:cNvPr id="4" name="Slide Number Placeholder 3"/>
+          <p:cNvSpPr>
+            <a:spLocks noGrp="1"/>
+          </p:cNvSpPr>
+          <p:nvPr>
+            <p:ph type="sldNum" sz="quarter" idx="10"/>
+          </p:nvPr>
+        </p:nvSpPr>
+        <p:spPr/>
+        <p:txBody>
+          <a:bodyPr/>
+          <a:lstStyle/>
+          <a:p>
+            <a:fld id="{40EA4F9F-6CEF-4B9D-BEB3-40FCF0DF71AE}" type="slidenum">
+              <a:rPr lang="en-US" smtClean="0"/>
+              <a:t>15</a:t>
+            </a:fld>
+            <a:endParaRPr lang="en-US"/>
+          </a:p>
+        </p:txBody>
+      </p:sp>
+    </p:spTree>
+    <p:extLst>
+      <p:ext uri="{BB962C8B-B14F-4D97-AF65-F5344CB8AC3E}">
+        <p14:creationId xmlns:p14="http://schemas.microsoft.com/office/powerpoint/2010/main" val="2848189909"/>
+      </p:ext>
+    </p:extLst>
+  </p:cSld>
+  <p:clrMapOvr>
+    <a:masterClrMapping/>
+  </p:clrMapOvr>
+</p:notes>
+</file>
+
+<file path=ppt/notesSlides/notesSlide16.xml><?xml version="1.0" encoding="utf-8"?>
+<p:notes xmlns:a="http://schemas.openxmlformats.org/drawingml/2006/main" xmlns:r="http://schemas.openxmlformats.org/officeDocument/2006/relationships" xmlns:p="http://schemas.openxmlformats.org/presentationml/2006/main">
+  <p:cSld>
+    <p:spTree>
+      <p:nvGrpSpPr>
+        <p:cNvPr id="1" name=""/>
+        <p:cNvGrpSpPr/>
+        <p:nvPr/>
+      </p:nvGrpSpPr>
+      <p:grpSpPr>
+        <a:xfrm>
+          <a:off x="0" y="0"/>
+          <a:ext cx="0" cy="0"/>
+          <a:chOff x="0" y="0"/>
+          <a:chExt cx="0" cy="0"/>
+        </a:xfrm>
+      </p:grpSpPr>
+      <p:sp>
+        <p:nvSpPr>
+          <p:cNvPr id="2" name="Slide Image Placeholder 1"/>
+          <p:cNvSpPr>
+            <a:spLocks noGrp="1" noRot="1" noChangeAspect="1"/>
+          </p:cNvSpPr>
+          <p:nvPr>
+            <p:ph type="sldImg"/>
+          </p:nvPr>
+        </p:nvSpPr>
+        <p:spPr/>
+      </p:sp>
+      <p:sp>
+        <p:nvSpPr>
+          <p:cNvPr id="3" name="Notes Placeholder 2"/>
+          <p:cNvSpPr>
+            <a:spLocks noGrp="1"/>
+          </p:cNvSpPr>
+          <p:nvPr>
+            <p:ph type="body" idx="1"/>
+          </p:nvPr>
+        </p:nvSpPr>
+        <p:spPr/>
+        <p:txBody>
+          <a:bodyPr/>
+          <a:lstStyle/>
+          <a:p>
+            <a:endParaRPr lang="en-US" dirty="0"/>
+          </a:p>
+        </p:txBody>
+      </p:sp>
+      <p:sp>
+        <p:nvSpPr>
+          <p:cNvPr id="4" name="Slide Number Placeholder 3"/>
+          <p:cNvSpPr>
+            <a:spLocks noGrp="1"/>
+          </p:cNvSpPr>
+          <p:nvPr>
+            <p:ph type="sldNum" sz="quarter" idx="10"/>
+          </p:nvPr>
+        </p:nvSpPr>
+        <p:spPr/>
+        <p:txBody>
+          <a:bodyPr/>
+          <a:lstStyle/>
+          <a:p>
+            <a:fld id="{40EA4F9F-6CEF-4B9D-BEB3-40FCF0DF71AE}" type="slidenum">
+              <a:rPr lang="en-US" smtClean="0"/>
+              <a:t>16</a:t>
+            </a:fld>
+            <a:endParaRPr lang="en-US"/>
+          </a:p>
+        </p:txBody>
+      </p:sp>
+    </p:spTree>
+    <p:extLst>
+      <p:ext uri="{BB962C8B-B14F-4D97-AF65-F5344CB8AC3E}">
+        <p14:creationId xmlns:p14="http://schemas.microsoft.com/office/powerpoint/2010/main" val="4020643647"/>
+      </p:ext>
+    </p:extLst>
+  </p:cSld>
+  <p:clrMapOvr>
+    <a:masterClrMapping/>
+  </p:clrMapOvr>
+</p:notes>
+</file>
+
+<file path=ppt/notesSlides/notesSlide17.xml><?xml version="1.0" encoding="utf-8"?>
+<p:notes xmlns:a="http://schemas.openxmlformats.org/drawingml/2006/main" xmlns:r="http://schemas.openxmlformats.org/officeDocument/2006/relationships" xmlns:p="http://schemas.openxmlformats.org/presentationml/2006/main">
+  <p:cSld>
+    <p:spTree>
+      <p:nvGrpSpPr>
+        <p:cNvPr id="1" name=""/>
+        <p:cNvGrpSpPr/>
+        <p:nvPr/>
+      </p:nvGrpSpPr>
+      <p:grpSpPr>
+        <a:xfrm>
+          <a:off x="0" y="0"/>
+          <a:ext cx="0" cy="0"/>
+          <a:chOff x="0" y="0"/>
+          <a:chExt cx="0" cy="0"/>
+        </a:xfrm>
+      </p:grpSpPr>
+      <p:sp>
+        <p:nvSpPr>
+          <p:cNvPr id="2" name="Slide Image Placeholder 1"/>
+          <p:cNvSpPr>
+            <a:spLocks noGrp="1" noRot="1" noChangeAspect="1"/>
+          </p:cNvSpPr>
+          <p:nvPr>
+            <p:ph type="sldImg"/>
+          </p:nvPr>
+        </p:nvSpPr>
+        <p:spPr/>
+      </p:sp>
+      <p:sp>
+        <p:nvSpPr>
+          <p:cNvPr id="3" name="Notes Placeholder 2"/>
+          <p:cNvSpPr>
+            <a:spLocks noGrp="1"/>
+          </p:cNvSpPr>
+          <p:nvPr>
+            <p:ph type="body" idx="1"/>
+          </p:nvPr>
+        </p:nvSpPr>
+        <p:spPr/>
+        <p:txBody>
+          <a:bodyPr/>
+          <a:lstStyle/>
+          <a:p>
+            <a:r>
+              <a:rPr lang="en-US" dirty="0" smtClean="0"/>
+              <a:t>Capped collection</a:t>
+            </a:r>
+          </a:p>
+          <a:p>
+            <a:r>
+              <a:rPr lang="ru-RU" dirty="0" smtClean="0"/>
+              <a:t>50</a:t>
+            </a:r>
+            <a:r>
+              <a:rPr lang="ru-RU" baseline="0" dirty="0" smtClean="0"/>
+              <a:t> </a:t>
+            </a:r>
+            <a:r>
+              <a:rPr lang="en-US" baseline="0" dirty="0" smtClean="0"/>
+              <a:t>GB size limit</a:t>
+            </a:r>
+            <a:endParaRPr lang="en-US" dirty="0"/>
+          </a:p>
+        </p:txBody>
+      </p:sp>
+      <p:sp>
+        <p:nvSpPr>
+          <p:cNvPr id="4" name="Slide Number Placeholder 3"/>
+          <p:cNvSpPr>
+            <a:spLocks noGrp="1"/>
+          </p:cNvSpPr>
+          <p:nvPr>
+            <p:ph type="sldNum" sz="quarter" idx="10"/>
+          </p:nvPr>
+        </p:nvSpPr>
+        <p:spPr/>
+        <p:txBody>
+          <a:bodyPr/>
+          <a:lstStyle/>
+          <a:p>
+            <a:fld id="{40EA4F9F-6CEF-4B9D-BEB3-40FCF0DF71AE}" type="slidenum">
+              <a:rPr lang="en-US" smtClean="0"/>
+              <a:t>17</a:t>
+            </a:fld>
+            <a:endParaRPr lang="en-US"/>
+          </a:p>
+        </p:txBody>
+      </p:sp>
+    </p:spTree>
+    <p:extLst>
+      <p:ext uri="{BB962C8B-B14F-4D97-AF65-F5344CB8AC3E}">
+        <p14:creationId xmlns:p14="http://schemas.microsoft.com/office/powerpoint/2010/main" val="1263657375"/>
       </p:ext>
     </p:extLst>
   </p:cSld>
@@ -7774,6 +8103,817 @@
     <p:extLst>
       <p:ext uri="{BB962C8B-B14F-4D97-AF65-F5344CB8AC3E}">
         <p14:creationId xmlns:p14="http://schemas.microsoft.com/office/powerpoint/2010/main" val="4217504484"/>
+      </p:ext>
+    </p:extLst>
+  </p:cSld>
+  <p:clrMapOvr>
+    <a:masterClrMapping/>
+  </p:clrMapOvr>
+  <p:timing>
+    <p:tnLst>
+      <p:par>
+        <p:cTn id="1" dur="indefinite" restart="never" nodeType="tmRoot"/>
+      </p:par>
+    </p:tnLst>
+  </p:timing>
+</p:sld>
+</file>
+
+<file path=ppt/slides/slide15.xml><?xml version="1.0" encoding="utf-8"?>
+<p:sld xmlns:a="http://schemas.openxmlformats.org/drawingml/2006/main" xmlns:r="http://schemas.openxmlformats.org/officeDocument/2006/relationships" xmlns:p="http://schemas.openxmlformats.org/presentationml/2006/main">
+  <p:cSld>
+    <p:spTree>
+      <p:nvGrpSpPr>
+        <p:cNvPr id="1" name=""/>
+        <p:cNvGrpSpPr/>
+        <p:nvPr/>
+      </p:nvGrpSpPr>
+      <p:grpSpPr>
+        <a:xfrm>
+          <a:off x="0" y="0"/>
+          <a:ext cx="0" cy="0"/>
+          <a:chOff x="0" y="0"/>
+          <a:chExt cx="0" cy="0"/>
+        </a:xfrm>
+      </p:grpSpPr>
+      <p:sp>
+        <p:nvSpPr>
+          <p:cNvPr id="2" name="Title 1"/>
+          <p:cNvSpPr>
+            <a:spLocks noGrp="1"/>
+          </p:cNvSpPr>
+          <p:nvPr>
+            <p:ph type="ctrTitle"/>
+          </p:nvPr>
+        </p:nvSpPr>
+        <p:spPr>
+          <a:xfrm>
+            <a:off x="1261872" y="383065"/>
+            <a:ext cx="9418320" cy="1062681"/>
+          </a:xfrm>
+        </p:spPr>
+        <p:txBody>
+          <a:bodyPr>
+            <a:normAutofit/>
+          </a:bodyPr>
+          <a:lstStyle/>
+          <a:p>
+            <a:r>
+              <a:rPr lang="en-US" dirty="0"/>
+              <a:t>Change </a:t>
+            </a:r>
+            <a:r>
+              <a:rPr lang="en-US" dirty="0" smtClean="0"/>
+              <a:t>Streams 4.0</a:t>
+            </a:r>
+            <a:endParaRPr lang="en-US" dirty="0"/>
+          </a:p>
+        </p:txBody>
+      </p:sp>
+      <p:sp>
+        <p:nvSpPr>
+          <p:cNvPr id="5" name="TextBox 4"/>
+          <p:cNvSpPr txBox="1"/>
+          <p:nvPr/>
+        </p:nvSpPr>
+        <p:spPr>
+          <a:xfrm>
+            <a:off x="1999446" y="3221950"/>
+            <a:ext cx="4231030" cy="461665"/>
+          </a:xfrm>
+          <a:prstGeom prst="rect">
+            <a:avLst/>
+          </a:prstGeom>
+          <a:noFill/>
+        </p:spPr>
+        <p:txBody>
+          <a:bodyPr wrap="none" rtlCol="0">
+            <a:spAutoFit/>
+          </a:bodyPr>
+          <a:lstStyle/>
+          <a:p>
+            <a:r>
+              <a:rPr lang="en-US" sz="2400" dirty="0" smtClean="0"/>
+              <a:t>• </a:t>
+            </a:r>
+            <a:r>
+              <a:rPr lang="en-US" sz="2400" dirty="0">
+                <a:solidFill>
+                  <a:srgbClr val="FFFF00"/>
+                </a:solidFill>
+              </a:rPr>
+              <a:t>{ w: "majority" }</a:t>
+            </a:r>
+            <a:r>
+              <a:rPr lang="en-US" sz="2400" dirty="0"/>
+              <a:t> </a:t>
+            </a:r>
+            <a:r>
+              <a:rPr lang="en-US" sz="2400" dirty="0" smtClean="0"/>
+              <a:t>out of the box</a:t>
+            </a:r>
+            <a:endParaRPr lang="en-US" sz="2400" dirty="0"/>
+          </a:p>
+        </p:txBody>
+      </p:sp>
+      <p:sp>
+        <p:nvSpPr>
+          <p:cNvPr id="6" name="TextBox 5"/>
+          <p:cNvSpPr txBox="1"/>
+          <p:nvPr/>
+        </p:nvSpPr>
+        <p:spPr>
+          <a:xfrm>
+            <a:off x="1999446" y="2298620"/>
+            <a:ext cx="6534954" cy="461665"/>
+          </a:xfrm>
+          <a:prstGeom prst="rect">
+            <a:avLst/>
+          </a:prstGeom>
+          <a:noFill/>
+        </p:spPr>
+        <p:txBody>
+          <a:bodyPr wrap="square" rtlCol="0">
+            <a:spAutoFit/>
+          </a:bodyPr>
+          <a:lstStyle/>
+          <a:p>
+            <a:r>
+              <a:rPr lang="en-US" sz="2400" dirty="0"/>
+              <a:t>• Option to resume from a given Timestamp</a:t>
+            </a:r>
+            <a:endParaRPr lang="en-US" sz="2400" dirty="0"/>
+          </a:p>
+        </p:txBody>
+      </p:sp>
+      <p:sp>
+        <p:nvSpPr>
+          <p:cNvPr id="7" name="TextBox 6"/>
+          <p:cNvSpPr txBox="1"/>
+          <p:nvPr/>
+        </p:nvSpPr>
+        <p:spPr>
+          <a:xfrm>
+            <a:off x="1999446" y="2760285"/>
+            <a:ext cx="7637347" cy="461665"/>
+          </a:xfrm>
+          <a:prstGeom prst="rect">
+            <a:avLst/>
+          </a:prstGeom>
+          <a:noFill/>
+        </p:spPr>
+        <p:txBody>
+          <a:bodyPr wrap="none" rtlCol="0">
+            <a:spAutoFit/>
+          </a:bodyPr>
+          <a:lstStyle/>
+          <a:p>
+            <a:r>
+              <a:rPr lang="en-US" sz="2400" dirty="0" smtClean="0"/>
+              <a:t>• </a:t>
+            </a:r>
+            <a:r>
+              <a:rPr lang="en-US" sz="2400" dirty="0"/>
+              <a:t>Subscribe to changes from </a:t>
+            </a:r>
+            <a:r>
+              <a:rPr lang="en-US" sz="2400" dirty="0" smtClean="0"/>
+              <a:t>database </a:t>
+            </a:r>
+            <a:r>
+              <a:rPr lang="en-US" sz="2400" dirty="0"/>
+              <a:t>or entire </a:t>
+            </a:r>
+            <a:r>
+              <a:rPr lang="en-US" sz="2400" dirty="0" smtClean="0"/>
+              <a:t>deployment</a:t>
+            </a:r>
+            <a:endParaRPr lang="en-US" sz="2400" dirty="0"/>
+          </a:p>
+        </p:txBody>
+      </p:sp>
+      <p:sp>
+        <p:nvSpPr>
+          <p:cNvPr id="8" name="TextBox 7"/>
+          <p:cNvSpPr txBox="1"/>
+          <p:nvPr/>
+        </p:nvSpPr>
+        <p:spPr>
+          <a:xfrm>
+            <a:off x="1261872" y="1836955"/>
+            <a:ext cx="737574" cy="461665"/>
+          </a:xfrm>
+          <a:prstGeom prst="rect">
+            <a:avLst/>
+          </a:prstGeom>
+          <a:noFill/>
+        </p:spPr>
+        <p:txBody>
+          <a:bodyPr wrap="none" rtlCol="0">
+            <a:spAutoFit/>
+          </a:bodyPr>
+          <a:lstStyle/>
+          <a:p>
+            <a:r>
+              <a:rPr lang="en-US" sz="2400" dirty="0" smtClean="0"/>
+              <a:t>Proc</a:t>
+            </a:r>
+            <a:endParaRPr lang="en-US" sz="2400" dirty="0"/>
+          </a:p>
+        </p:txBody>
+      </p:sp>
+      <p:sp>
+        <p:nvSpPr>
+          <p:cNvPr id="9" name="TextBox 8"/>
+          <p:cNvSpPr txBox="1"/>
+          <p:nvPr/>
+        </p:nvSpPr>
+        <p:spPr>
+          <a:xfrm>
+            <a:off x="1261872" y="3683615"/>
+            <a:ext cx="630301" cy="461665"/>
+          </a:xfrm>
+          <a:prstGeom prst="rect">
+            <a:avLst/>
+          </a:prstGeom>
+          <a:noFill/>
+        </p:spPr>
+        <p:txBody>
+          <a:bodyPr wrap="none" rtlCol="0">
+            <a:spAutoFit/>
+          </a:bodyPr>
+          <a:lstStyle/>
+          <a:p>
+            <a:r>
+              <a:rPr lang="en-US" sz="2400" dirty="0" smtClean="0"/>
+              <a:t>Cos</a:t>
+            </a:r>
+            <a:endParaRPr lang="en-US" sz="2400" dirty="0"/>
+          </a:p>
+        </p:txBody>
+      </p:sp>
+      <p:sp>
+        <p:nvSpPr>
+          <p:cNvPr id="10" name="TextBox 9"/>
+          <p:cNvSpPr txBox="1"/>
+          <p:nvPr/>
+        </p:nvSpPr>
+        <p:spPr>
+          <a:xfrm>
+            <a:off x="1999446" y="4145280"/>
+            <a:ext cx="8516154" cy="461665"/>
+          </a:xfrm>
+          <a:prstGeom prst="rect">
+            <a:avLst/>
+          </a:prstGeom>
+          <a:noFill/>
+        </p:spPr>
+        <p:txBody>
+          <a:bodyPr wrap="square" rtlCol="0">
+            <a:spAutoFit/>
+          </a:bodyPr>
+          <a:lstStyle/>
+          <a:p>
+            <a:r>
+              <a:rPr lang="en-US" sz="2400" dirty="0" smtClean="0"/>
+              <a:t>• </a:t>
+            </a:r>
+            <a:r>
+              <a:rPr lang="en-US" sz="2400" dirty="0" smtClean="0"/>
+              <a:t>Only supports </a:t>
+            </a:r>
+            <a:r>
+              <a:rPr lang="en-US" sz="2400" dirty="0" smtClean="0">
+                <a:solidFill>
+                  <a:srgbClr val="FFFF00"/>
+                </a:solidFill>
+              </a:rPr>
+              <a:t>{ w: "majority" }</a:t>
+            </a:r>
+            <a:r>
+              <a:rPr lang="en-US" sz="2400" dirty="0" smtClean="0"/>
+              <a:t>, no way to achieve </a:t>
+            </a:r>
+            <a:r>
+              <a:rPr lang="en-US" sz="2400" dirty="0">
+                <a:solidFill>
+                  <a:srgbClr val="FFFF00"/>
+                </a:solidFill>
+              </a:rPr>
+              <a:t>{ w: </a:t>
+            </a:r>
+            <a:r>
+              <a:rPr lang="en-US" sz="2400" dirty="0" smtClean="0">
+                <a:solidFill>
+                  <a:srgbClr val="FFFF00"/>
+                </a:solidFill>
+              </a:rPr>
+              <a:t>1}</a:t>
+            </a:r>
+            <a:endParaRPr lang="en-US" sz="2400" dirty="0">
+              <a:solidFill>
+                <a:srgbClr val="FFFF00"/>
+              </a:solidFill>
+            </a:endParaRPr>
+          </a:p>
+        </p:txBody>
+      </p:sp>
+    </p:spTree>
+    <p:extLst>
+      <p:ext uri="{BB962C8B-B14F-4D97-AF65-F5344CB8AC3E}">
+        <p14:creationId xmlns:p14="http://schemas.microsoft.com/office/powerpoint/2010/main" val="1902679719"/>
+      </p:ext>
+    </p:extLst>
+  </p:cSld>
+  <p:clrMapOvr>
+    <a:masterClrMapping/>
+  </p:clrMapOvr>
+  <p:timing>
+    <p:tnLst>
+      <p:par>
+        <p:cTn id="1" dur="indefinite" restart="never" nodeType="tmRoot">
+          <p:childTnLst>
+            <p:seq concurrent="1" nextAc="seek">
+              <p:cTn id="2" dur="indefinite" nodeType="mainSeq">
+                <p:childTnLst>
+                  <p:par>
+                    <p:cTn id="3" fill="hold">
+                      <p:stCondLst>
+                        <p:cond delay="indefinite"/>
+                      </p:stCondLst>
+                      <p:childTnLst>
+                        <p:par>
+                          <p:cTn id="4" fill="hold">
+                            <p:stCondLst>
+                              <p:cond delay="0"/>
+                            </p:stCondLst>
+                            <p:childTnLst>
+                              <p:par>
+                                <p:cTn id="5" presetID="1" presetClass="entr" presetSubtype="0" fill="hold" grpId="0" nodeType="clickEffect">
+                                  <p:stCondLst>
+                                    <p:cond delay="0"/>
+                                  </p:stCondLst>
+                                  <p:childTnLst>
+                                    <p:set>
+                                      <p:cBhvr>
+                                        <p:cTn id="6" dur="1" fill="hold">
+                                          <p:stCondLst>
+                                            <p:cond delay="0"/>
+                                          </p:stCondLst>
+                                        </p:cTn>
+                                        <p:tgtEl>
+                                          <p:spTgt spid="8"/>
+                                        </p:tgtEl>
+                                        <p:attrNameLst>
+                                          <p:attrName>style.visibility</p:attrName>
+                                        </p:attrNameLst>
+                                      </p:cBhvr>
+                                      <p:to>
+                                        <p:strVal val="visible"/>
+                                      </p:to>
+                                    </p:set>
+                                  </p:childTnLst>
+                                </p:cTn>
+                              </p:par>
+                            </p:childTnLst>
+                          </p:cTn>
+                        </p:par>
+                      </p:childTnLst>
+                    </p:cTn>
+                  </p:par>
+                  <p:par>
+                    <p:cTn id="7" fill="hold">
+                      <p:stCondLst>
+                        <p:cond delay="indefinite"/>
+                      </p:stCondLst>
+                      <p:childTnLst>
+                        <p:par>
+                          <p:cTn id="8" fill="hold">
+                            <p:stCondLst>
+                              <p:cond delay="0"/>
+                            </p:stCondLst>
+                            <p:childTnLst>
+                              <p:par>
+                                <p:cTn id="9" presetID="1" presetClass="entr" presetSubtype="0" fill="hold" grpId="0" nodeType="clickEffect">
+                                  <p:stCondLst>
+                                    <p:cond delay="0"/>
+                                  </p:stCondLst>
+                                  <p:childTnLst>
+                                    <p:set>
+                                      <p:cBhvr>
+                                        <p:cTn id="10" dur="1" fill="hold">
+                                          <p:stCondLst>
+                                            <p:cond delay="0"/>
+                                          </p:stCondLst>
+                                        </p:cTn>
+                                        <p:tgtEl>
+                                          <p:spTgt spid="6"/>
+                                        </p:tgtEl>
+                                        <p:attrNameLst>
+                                          <p:attrName>style.visibility</p:attrName>
+                                        </p:attrNameLst>
+                                      </p:cBhvr>
+                                      <p:to>
+                                        <p:strVal val="visible"/>
+                                      </p:to>
+                                    </p:set>
+                                  </p:childTnLst>
+                                </p:cTn>
+                              </p:par>
+                            </p:childTnLst>
+                          </p:cTn>
+                        </p:par>
+                      </p:childTnLst>
+                    </p:cTn>
+                  </p:par>
+                  <p:par>
+                    <p:cTn id="11" fill="hold">
+                      <p:stCondLst>
+                        <p:cond delay="indefinite"/>
+                      </p:stCondLst>
+                      <p:childTnLst>
+                        <p:par>
+                          <p:cTn id="12" fill="hold">
+                            <p:stCondLst>
+                              <p:cond delay="0"/>
+                            </p:stCondLst>
+                            <p:childTnLst>
+                              <p:par>
+                                <p:cTn id="13" presetID="1" presetClass="entr" presetSubtype="0" fill="hold" grpId="0" nodeType="clickEffect">
+                                  <p:stCondLst>
+                                    <p:cond delay="0"/>
+                                  </p:stCondLst>
+                                  <p:childTnLst>
+                                    <p:set>
+                                      <p:cBhvr>
+                                        <p:cTn id="14" dur="1" fill="hold">
+                                          <p:stCondLst>
+                                            <p:cond delay="0"/>
+                                          </p:stCondLst>
+                                        </p:cTn>
+                                        <p:tgtEl>
+                                          <p:spTgt spid="7"/>
+                                        </p:tgtEl>
+                                        <p:attrNameLst>
+                                          <p:attrName>style.visibility</p:attrName>
+                                        </p:attrNameLst>
+                                      </p:cBhvr>
+                                      <p:to>
+                                        <p:strVal val="visible"/>
+                                      </p:to>
+                                    </p:set>
+                                  </p:childTnLst>
+                                </p:cTn>
+                              </p:par>
+                            </p:childTnLst>
+                          </p:cTn>
+                        </p:par>
+                      </p:childTnLst>
+                    </p:cTn>
+                  </p:par>
+                  <p:par>
+                    <p:cTn id="15" fill="hold">
+                      <p:stCondLst>
+                        <p:cond delay="indefinite"/>
+                      </p:stCondLst>
+                      <p:childTnLst>
+                        <p:par>
+                          <p:cTn id="16" fill="hold">
+                            <p:stCondLst>
+                              <p:cond delay="0"/>
+                            </p:stCondLst>
+                            <p:childTnLst>
+                              <p:par>
+                                <p:cTn id="17" presetID="1" presetClass="entr" presetSubtype="0" fill="hold" grpId="0" nodeType="clickEffect">
+                                  <p:stCondLst>
+                                    <p:cond delay="0"/>
+                                  </p:stCondLst>
+                                  <p:childTnLst>
+                                    <p:set>
+                                      <p:cBhvr>
+                                        <p:cTn id="18" dur="1" fill="hold">
+                                          <p:stCondLst>
+                                            <p:cond delay="0"/>
+                                          </p:stCondLst>
+                                        </p:cTn>
+                                        <p:tgtEl>
+                                          <p:spTgt spid="5"/>
+                                        </p:tgtEl>
+                                        <p:attrNameLst>
+                                          <p:attrName>style.visibility</p:attrName>
+                                        </p:attrNameLst>
+                                      </p:cBhvr>
+                                      <p:to>
+                                        <p:strVal val="visible"/>
+                                      </p:to>
+                                    </p:set>
+                                  </p:childTnLst>
+                                </p:cTn>
+                              </p:par>
+                            </p:childTnLst>
+                          </p:cTn>
+                        </p:par>
+                      </p:childTnLst>
+                    </p:cTn>
+                  </p:par>
+                  <p:par>
+                    <p:cTn id="19" fill="hold">
+                      <p:stCondLst>
+                        <p:cond delay="indefinite"/>
+                      </p:stCondLst>
+                      <p:childTnLst>
+                        <p:par>
+                          <p:cTn id="20" fill="hold">
+                            <p:stCondLst>
+                              <p:cond delay="0"/>
+                            </p:stCondLst>
+                            <p:childTnLst>
+                              <p:par>
+                                <p:cTn id="21" presetID="1" presetClass="entr" presetSubtype="0" fill="hold" grpId="0" nodeType="clickEffect">
+                                  <p:stCondLst>
+                                    <p:cond delay="0"/>
+                                  </p:stCondLst>
+                                  <p:childTnLst>
+                                    <p:set>
+                                      <p:cBhvr>
+                                        <p:cTn id="22" dur="1" fill="hold">
+                                          <p:stCondLst>
+                                            <p:cond delay="0"/>
+                                          </p:stCondLst>
+                                        </p:cTn>
+                                        <p:tgtEl>
+                                          <p:spTgt spid="9"/>
+                                        </p:tgtEl>
+                                        <p:attrNameLst>
+                                          <p:attrName>style.visibility</p:attrName>
+                                        </p:attrNameLst>
+                                      </p:cBhvr>
+                                      <p:to>
+                                        <p:strVal val="visible"/>
+                                      </p:to>
+                                    </p:set>
+                                  </p:childTnLst>
+                                </p:cTn>
+                              </p:par>
+                            </p:childTnLst>
+                          </p:cTn>
+                        </p:par>
+                      </p:childTnLst>
+                    </p:cTn>
+                  </p:par>
+                  <p:par>
+                    <p:cTn id="23" fill="hold">
+                      <p:stCondLst>
+                        <p:cond delay="indefinite"/>
+                      </p:stCondLst>
+                      <p:childTnLst>
+                        <p:par>
+                          <p:cTn id="24" fill="hold">
+                            <p:stCondLst>
+                              <p:cond delay="0"/>
+                            </p:stCondLst>
+                            <p:childTnLst>
+                              <p:par>
+                                <p:cTn id="25" presetID="1" presetClass="entr" presetSubtype="0" fill="hold" grpId="0" nodeType="clickEffect">
+                                  <p:stCondLst>
+                                    <p:cond delay="0"/>
+                                  </p:stCondLst>
+                                  <p:childTnLst>
+                                    <p:set>
+                                      <p:cBhvr>
+                                        <p:cTn id="26" dur="1" fill="hold">
+                                          <p:stCondLst>
+                                            <p:cond delay="0"/>
+                                          </p:stCondLst>
+                                        </p:cTn>
+                                        <p:tgtEl>
+                                          <p:spTgt spid="10"/>
+                                        </p:tgtEl>
+                                        <p:attrNameLst>
+                                          <p:attrName>style.visibility</p:attrName>
+                                        </p:attrNameLst>
+                                      </p:cBhvr>
+                                      <p:to>
+                                        <p:strVal val="visible"/>
+                                      </p:to>
+                                    </p:set>
+                                  </p:childTnLst>
+                                </p:cTn>
+                              </p:par>
+                            </p:childTnLst>
+                          </p:cTn>
+                        </p:par>
+                      </p:childTnLst>
+                    </p:cTn>
+                  </p:par>
+                </p:childTnLst>
+              </p:cTn>
+              <p:prevCondLst>
+                <p:cond evt="onPrev" delay="0">
+                  <p:tgtEl>
+                    <p:sldTgt/>
+                  </p:tgtEl>
+                </p:cond>
+              </p:prevCondLst>
+              <p:nextCondLst>
+                <p:cond evt="onNext" delay="0">
+                  <p:tgtEl>
+                    <p:sldTgt/>
+                  </p:tgtEl>
+                </p:cond>
+              </p:nextCondLst>
+            </p:seq>
+          </p:childTnLst>
+        </p:cTn>
+      </p:par>
+    </p:tnLst>
+    <p:bldLst>
+      <p:bldP spid="5" grpId="0"/>
+      <p:bldP spid="6" grpId="0"/>
+      <p:bldP spid="7" grpId="0"/>
+      <p:bldP spid="8" grpId="0"/>
+      <p:bldP spid="9" grpId="0"/>
+      <p:bldP spid="10" grpId="0"/>
+    </p:bldLst>
+  </p:timing>
+</p:sld>
+</file>
+
+<file path=ppt/slides/slide16.xml><?xml version="1.0" encoding="utf-8"?>
+<p:sld xmlns:a="http://schemas.openxmlformats.org/drawingml/2006/main" xmlns:r="http://schemas.openxmlformats.org/officeDocument/2006/relationships" xmlns:p="http://schemas.openxmlformats.org/presentationml/2006/main">
+  <p:cSld>
+    <p:spTree>
+      <p:nvGrpSpPr>
+        <p:cNvPr id="1" name=""/>
+        <p:cNvGrpSpPr/>
+        <p:nvPr/>
+      </p:nvGrpSpPr>
+      <p:grpSpPr>
+        <a:xfrm>
+          <a:off x="0" y="0"/>
+          <a:ext cx="0" cy="0"/>
+          <a:chOff x="0" y="0"/>
+          <a:chExt cx="0" cy="0"/>
+        </a:xfrm>
+      </p:grpSpPr>
+      <p:sp>
+        <p:nvSpPr>
+          <p:cNvPr id="2" name="Title 1"/>
+          <p:cNvSpPr>
+            <a:spLocks noGrp="1"/>
+          </p:cNvSpPr>
+          <p:nvPr>
+            <p:ph type="ctrTitle"/>
+          </p:nvPr>
+        </p:nvSpPr>
+        <p:spPr/>
+        <p:txBody>
+          <a:bodyPr>
+            <a:normAutofit fontScale="90000"/>
+          </a:bodyPr>
+          <a:lstStyle/>
+          <a:p>
+            <a:r>
+              <a:rPr lang="en-US" dirty="0" smtClean="0">
+                <a:solidFill>
+                  <a:srgbClr val="FFFF00"/>
+                </a:solidFill>
+              </a:rPr>
+              <a:t>Takeaway:</a:t>
+            </a:r>
+            <a:br>
+              <a:rPr lang="en-US" dirty="0" smtClean="0">
+                <a:solidFill>
+                  <a:srgbClr val="FFFF00"/>
+                </a:solidFill>
+              </a:rPr>
+            </a:br>
+            <a:r>
+              <a:rPr lang="en-US" dirty="0" smtClean="0"/>
+              <a:t>for MongoDB 4.0 replica set with 3+ data-bearing nodes use </a:t>
+            </a:r>
+            <a:r>
+              <a:rPr lang="en-US" dirty="0" smtClean="0">
+                <a:solidFill>
+                  <a:srgbClr val="92D050"/>
+                </a:solidFill>
+              </a:rPr>
+              <a:t>Change Streams</a:t>
+            </a:r>
+            <a:endParaRPr lang="en-US" dirty="0">
+              <a:solidFill>
+                <a:srgbClr val="92D050"/>
+              </a:solidFill>
+            </a:endParaRPr>
+          </a:p>
+        </p:txBody>
+      </p:sp>
+      <p:sp>
+        <p:nvSpPr>
+          <p:cNvPr id="3" name="Subtitle 2"/>
+          <p:cNvSpPr>
+            <a:spLocks noGrp="1"/>
+          </p:cNvSpPr>
+          <p:nvPr>
+            <p:ph type="subTitle" idx="1"/>
+          </p:nvPr>
+        </p:nvSpPr>
+        <p:spPr/>
+        <p:txBody>
+          <a:bodyPr/>
+          <a:lstStyle/>
+          <a:p>
+            <a:endParaRPr lang="en-US" dirty="0"/>
+          </a:p>
+        </p:txBody>
+      </p:sp>
+    </p:spTree>
+    <p:extLst>
+      <p:ext uri="{BB962C8B-B14F-4D97-AF65-F5344CB8AC3E}">
+        <p14:creationId xmlns:p14="http://schemas.microsoft.com/office/powerpoint/2010/main" val="345151891"/>
+      </p:ext>
+    </p:extLst>
+  </p:cSld>
+  <p:clrMapOvr>
+    <a:masterClrMapping/>
+  </p:clrMapOvr>
+  <p:timing>
+    <p:tnLst>
+      <p:par>
+        <p:cTn id="1" dur="indefinite" restart="never" nodeType="tmRoot"/>
+      </p:par>
+    </p:tnLst>
+  </p:timing>
+</p:sld>
+</file>
+
+<file path=ppt/slides/slide17.xml><?xml version="1.0" encoding="utf-8"?>
+<p:sld xmlns:a="http://schemas.openxmlformats.org/drawingml/2006/main" xmlns:r="http://schemas.openxmlformats.org/officeDocument/2006/relationships" xmlns:p="http://schemas.openxmlformats.org/presentationml/2006/main">
+  <p:cSld>
+    <p:spTree>
+      <p:nvGrpSpPr>
+        <p:cNvPr id="1" name=""/>
+        <p:cNvGrpSpPr/>
+        <p:nvPr/>
+      </p:nvGrpSpPr>
+      <p:grpSpPr>
+        <a:xfrm>
+          <a:off x="0" y="0"/>
+          <a:ext cx="0" cy="0"/>
+          <a:chOff x="0" y="0"/>
+          <a:chExt cx="0" cy="0"/>
+        </a:xfrm>
+      </p:grpSpPr>
+      <p:sp>
+        <p:nvSpPr>
+          <p:cNvPr id="2" name="Title 1"/>
+          <p:cNvSpPr>
+            <a:spLocks noGrp="1"/>
+          </p:cNvSpPr>
+          <p:nvPr>
+            <p:ph type="ctrTitle"/>
+          </p:nvPr>
+        </p:nvSpPr>
+        <p:spPr/>
+        <p:txBody>
+          <a:bodyPr/>
+          <a:lstStyle/>
+          <a:p>
+            <a:r>
+              <a:rPr lang="en-US" dirty="0" err="1" smtClean="0"/>
+              <a:t>Oplog</a:t>
+            </a:r>
+            <a:r>
+              <a:rPr lang="en-US" dirty="0" smtClean="0"/>
+              <a:t> internals</a:t>
+            </a:r>
+            <a:endParaRPr lang="en-US" dirty="0"/>
+          </a:p>
+        </p:txBody>
+      </p:sp>
+      <p:sp>
+        <p:nvSpPr>
+          <p:cNvPr id="3" name="Subtitle 2"/>
+          <p:cNvSpPr>
+            <a:spLocks noGrp="1"/>
+          </p:cNvSpPr>
+          <p:nvPr>
+            <p:ph type="subTitle" idx="1"/>
+          </p:nvPr>
+        </p:nvSpPr>
+        <p:spPr/>
+        <p:txBody>
+          <a:bodyPr/>
+          <a:lstStyle/>
+          <a:p>
+            <a:endParaRPr lang="en-US"/>
+          </a:p>
+        </p:txBody>
+      </p:sp>
+    </p:spTree>
+    <p:extLst>
+      <p:ext uri="{BB962C8B-B14F-4D97-AF65-F5344CB8AC3E}">
+        <p14:creationId xmlns:p14="http://schemas.microsoft.com/office/powerpoint/2010/main" val="3053173680"/>
       </p:ext>
     </p:extLst>
   </p:cSld>

</xml_diff>

<commit_message>
Added some TODOs to slides
</commit_message>
<xml_diff>
--- a/t18-event-mongodb.pptx
+++ b/t18-event-mongodb.pptx
@@ -5,27 +5,28 @@
     <p:sldMasterId id="2147483756" r:id="rId1"/>
   </p:sldMasterIdLst>
   <p:notesMasterIdLst>
-    <p:notesMasterId r:id="rId20"/>
+    <p:notesMasterId r:id="rId21"/>
   </p:notesMasterIdLst>
   <p:sldIdLst>
     <p:sldId id="258" r:id="rId2"/>
-    <p:sldId id="260" r:id="rId3"/>
-    <p:sldId id="259" r:id="rId4"/>
-    <p:sldId id="261" r:id="rId5"/>
-    <p:sldId id="262" r:id="rId6"/>
-    <p:sldId id="264" r:id="rId7"/>
-    <p:sldId id="263" r:id="rId8"/>
-    <p:sldId id="265" r:id="rId9"/>
-    <p:sldId id="266" r:id="rId10"/>
-    <p:sldId id="275" r:id="rId11"/>
-    <p:sldId id="267" r:id="rId12"/>
-    <p:sldId id="273" r:id="rId13"/>
+    <p:sldId id="276" r:id="rId3"/>
+    <p:sldId id="260" r:id="rId4"/>
+    <p:sldId id="259" r:id="rId5"/>
+    <p:sldId id="261" r:id="rId6"/>
+    <p:sldId id="262" r:id="rId7"/>
+    <p:sldId id="264" r:id="rId8"/>
+    <p:sldId id="263" r:id="rId9"/>
+    <p:sldId id="265" r:id="rId10"/>
+    <p:sldId id="266" r:id="rId11"/>
+    <p:sldId id="275" r:id="rId12"/>
+    <p:sldId id="267" r:id="rId13"/>
     <p:sldId id="268" r:id="rId14"/>
     <p:sldId id="269" r:id="rId15"/>
     <p:sldId id="270" r:id="rId16"/>
     <p:sldId id="271" r:id="rId17"/>
     <p:sldId id="272" r:id="rId18"/>
     <p:sldId id="274" r:id="rId19"/>
+    <p:sldId id="273" r:id="rId20"/>
   </p:sldIdLst>
   <p:sldSz cx="12192000" cy="6858000"/>
   <p:notesSz cx="6858000" cy="9144000"/>
@@ -214,7 +215,7 @@
           <a:p>
             <a:fld id="{DBCC800D-31EB-4931-99D3-EDB5CCBB0CE8}" type="datetimeFigureOut">
               <a:rPr lang="en-US" smtClean="0"/>
-              <a:t>11/26/2018</a:t>
+              <a:t>11/29/2018</a:t>
             </a:fld>
             <a:endParaRPr lang="en-US"/>
           </a:p>
@@ -690,6 +691,36 @@
           <a:bodyPr/>
           <a:lstStyle/>
           <a:p>
+            <a:r>
+              <a:rPr lang="en-US" dirty="0" smtClean="0"/>
+              <a:t>Work with most No-SQL</a:t>
+            </a:r>
+          </a:p>
+          <a:p>
+            <a:endParaRPr lang="en-US" dirty="0" smtClean="0"/>
+          </a:p>
+          <a:p>
+            <a:r>
+              <a:rPr lang="en-US" dirty="0" smtClean="0"/>
+              <a:t>No explicit event publishing</a:t>
+            </a:r>
+            <a:r>
+              <a:rPr lang="en-US" baseline="0" dirty="0" smtClean="0"/>
+              <a:t> in the app code</a:t>
+            </a:r>
+          </a:p>
+          <a:p>
+            <a:endParaRPr lang="en-US" baseline="0" dirty="0" smtClean="0"/>
+          </a:p>
+          <a:p>
+            <a:r>
+              <a:rPr lang="en-US" dirty="0" smtClean="0"/>
+              <a:t>Can</a:t>
+            </a:r>
+            <a:r>
+              <a:rPr lang="en-US" baseline="0" dirty="0" smtClean="0"/>
+              <a:t> be hard to revers-engineer the event</a:t>
+            </a:r>
             <a:endParaRPr lang="en-US" dirty="0"/>
           </a:p>
         </p:txBody>
@@ -720,7 +751,7 @@
     </p:spTree>
     <p:extLst>
       <p:ext uri="{BB962C8B-B14F-4D97-AF65-F5344CB8AC3E}">
-        <p14:creationId xmlns:p14="http://schemas.microsoft.com/office/powerpoint/2010/main" val="67010511"/>
+        <p14:creationId xmlns:p14="http://schemas.microsoft.com/office/powerpoint/2010/main" val="1763315828"/>
       </p:ext>
     </p:extLst>
   </p:cSld>
@@ -804,7 +835,7 @@
     </p:spTree>
     <p:extLst>
       <p:ext uri="{BB962C8B-B14F-4D97-AF65-F5344CB8AC3E}">
-        <p14:creationId xmlns:p14="http://schemas.microsoft.com/office/powerpoint/2010/main" val="1127299053"/>
+        <p14:creationId xmlns:p14="http://schemas.microsoft.com/office/powerpoint/2010/main" val="67010511"/>
       </p:ext>
     </p:extLst>
   </p:cSld>
@@ -858,24 +889,6 @@
           <a:bodyPr/>
           <a:lstStyle/>
           <a:p>
-            <a:r>
-              <a:rPr lang="en-US" dirty="0" smtClean="0"/>
-              <a:t>Capped collection</a:t>
-            </a:r>
-          </a:p>
-          <a:p>
-            <a:r>
-              <a:rPr lang="ru-RU" dirty="0" smtClean="0"/>
-              <a:t>50</a:t>
-            </a:r>
-            <a:r>
-              <a:rPr lang="ru-RU" baseline="0" dirty="0" smtClean="0"/>
-              <a:t> </a:t>
-            </a:r>
-            <a:r>
-              <a:rPr lang="en-US" baseline="0" dirty="0" smtClean="0"/>
-              <a:t>GB size limit</a:t>
-            </a:r>
             <a:endParaRPr lang="en-US" dirty="0"/>
           </a:p>
         </p:txBody>
@@ -906,7 +919,7 @@
     </p:spTree>
     <p:extLst>
       <p:ext uri="{BB962C8B-B14F-4D97-AF65-F5344CB8AC3E}">
-        <p14:creationId xmlns:p14="http://schemas.microsoft.com/office/powerpoint/2010/main" val="1263657375"/>
+        <p14:creationId xmlns:p14="http://schemas.microsoft.com/office/powerpoint/2010/main" val="1127299053"/>
       </p:ext>
     </p:extLst>
   </p:cSld>
@@ -1476,6 +1489,108 @@
 </p:notes>
 </file>
 
+<file path=ppt/notesSlides/notesSlide19.xml><?xml version="1.0" encoding="utf-8"?>
+<p:notes xmlns:a="http://schemas.openxmlformats.org/drawingml/2006/main" xmlns:r="http://schemas.openxmlformats.org/officeDocument/2006/relationships" xmlns:p="http://schemas.openxmlformats.org/presentationml/2006/main">
+  <p:cSld>
+    <p:spTree>
+      <p:nvGrpSpPr>
+        <p:cNvPr id="1" name=""/>
+        <p:cNvGrpSpPr/>
+        <p:nvPr/>
+      </p:nvGrpSpPr>
+      <p:grpSpPr>
+        <a:xfrm>
+          <a:off x="0" y="0"/>
+          <a:ext cx="0" cy="0"/>
+          <a:chOff x="0" y="0"/>
+          <a:chExt cx="0" cy="0"/>
+        </a:xfrm>
+      </p:grpSpPr>
+      <p:sp>
+        <p:nvSpPr>
+          <p:cNvPr id="2" name="Slide Image Placeholder 1"/>
+          <p:cNvSpPr>
+            <a:spLocks noGrp="1" noRot="1" noChangeAspect="1"/>
+          </p:cNvSpPr>
+          <p:nvPr>
+            <p:ph type="sldImg"/>
+          </p:nvPr>
+        </p:nvSpPr>
+        <p:spPr/>
+      </p:sp>
+      <p:sp>
+        <p:nvSpPr>
+          <p:cNvPr id="3" name="Notes Placeholder 2"/>
+          <p:cNvSpPr>
+            <a:spLocks noGrp="1"/>
+          </p:cNvSpPr>
+          <p:nvPr>
+            <p:ph type="body" idx="1"/>
+          </p:nvPr>
+        </p:nvSpPr>
+        <p:spPr/>
+        <p:txBody>
+          <a:bodyPr/>
+          <a:lstStyle/>
+          <a:p>
+            <a:r>
+              <a:rPr lang="en-US" dirty="0" smtClean="0"/>
+              <a:t>Capped collection</a:t>
+            </a:r>
+          </a:p>
+          <a:p>
+            <a:r>
+              <a:rPr lang="ru-RU" dirty="0" smtClean="0"/>
+              <a:t>50</a:t>
+            </a:r>
+            <a:r>
+              <a:rPr lang="ru-RU" baseline="0" dirty="0" smtClean="0"/>
+              <a:t> </a:t>
+            </a:r>
+            <a:r>
+              <a:rPr lang="en-US" baseline="0" dirty="0" smtClean="0"/>
+              <a:t>GB size limit</a:t>
+            </a:r>
+            <a:endParaRPr lang="en-US" dirty="0"/>
+          </a:p>
+        </p:txBody>
+      </p:sp>
+      <p:sp>
+        <p:nvSpPr>
+          <p:cNvPr id="4" name="Slide Number Placeholder 3"/>
+          <p:cNvSpPr>
+            <a:spLocks noGrp="1"/>
+          </p:cNvSpPr>
+          <p:nvPr>
+            <p:ph type="sldNum" sz="quarter" idx="10"/>
+          </p:nvPr>
+        </p:nvSpPr>
+        <p:spPr/>
+        <p:txBody>
+          <a:bodyPr/>
+          <a:lstStyle/>
+          <a:p>
+            <a:fld id="{40EA4F9F-6CEF-4B9D-BEB3-40FCF0DF71AE}" type="slidenum">
+              <a:rPr lang="en-US" smtClean="0"/>
+              <a:t>19</a:t>
+            </a:fld>
+            <a:endParaRPr lang="en-US"/>
+          </a:p>
+        </p:txBody>
+      </p:sp>
+    </p:spTree>
+    <p:extLst>
+      <p:ext uri="{BB962C8B-B14F-4D97-AF65-F5344CB8AC3E}">
+        <p14:creationId xmlns:p14="http://schemas.microsoft.com/office/powerpoint/2010/main" val="1263657375"/>
+      </p:ext>
+    </p:extLst>
+  </p:cSld>
+  <p:clrMapOvr>
+    <a:masterClrMapping/>
+  </p:clrMapOvr>
+</p:notes>
+</file>
+
 <file path=ppt/notesSlides/notesSlide2.xml><?xml version="1.0" encoding="utf-8"?>
 <p:notes xmlns:a="http://schemas.openxmlformats.org/drawingml/2006/main" xmlns:r="http://schemas.openxmlformats.org/officeDocument/2006/relationships" xmlns:p="http://schemas.openxmlformats.org/presentationml/2006/main">
   <p:cSld>
@@ -1520,6 +1635,42 @@
           <a:bodyPr/>
           <a:lstStyle/>
           <a:p>
+            <a:r>
+              <a:rPr lang="en-US" sz="1200" dirty="0" smtClean="0"/>
+              <a:t>Greetings</a:t>
+            </a:r>
+          </a:p>
+          <a:p>
+            <a:endParaRPr lang="en-US" dirty="0" smtClean="0"/>
+          </a:p>
+          <a:p>
+            <a:r>
+              <a:rPr lang="en-US" baseline="0" dirty="0" smtClean="0"/>
+              <a:t>Talk intro:</a:t>
+            </a:r>
+          </a:p>
+          <a:p>
+            <a:r>
+              <a:rPr lang="en-US" baseline="0" dirty="0" smtClean="0"/>
+              <a:t>    - Event-Driven systems and challenges</a:t>
+            </a:r>
+          </a:p>
+          <a:p>
+            <a:r>
+              <a:rPr lang="en-US" baseline="0" dirty="0" smtClean="0"/>
+              <a:t>    - MongoDB replication internals</a:t>
+            </a:r>
+          </a:p>
+          <a:p>
+            <a:r>
+              <a:rPr lang="en-US" baseline="0" dirty="0" smtClean="0"/>
+              <a:t>    - Reference implementation with MongoDB and C#</a:t>
+            </a:r>
+          </a:p>
+          <a:p>
+            <a:endParaRPr lang="en-US" baseline="0" dirty="0" smtClean="0"/>
+          </a:p>
+          <a:p>
             <a:pPr marL="0" marR="0" lvl="0" indent="0" algn="l" defTabSz="914400" rtl="0" eaLnBrk="1" fontAlgn="auto" latinLnBrk="0" hangingPunct="1">
               <a:lnSpc>
                 <a:spcPct val="100000"/>
@@ -1538,98 +1689,32 @@
               <a:defRPr/>
             </a:pPr>
             <a:r>
+              <a:rPr lang="en-US" dirty="0" smtClean="0"/>
+              <a:t>Andrii Litvinov</a:t>
+            </a:r>
+            <a:r>
               <a:rPr lang="en-US" baseline="0" dirty="0" smtClean="0"/>
-              <a:t>Large codebase</a:t>
-            </a:r>
-          </a:p>
-          <a:p>
-            <a:pPr marL="0" marR="0" lvl="0" indent="0" algn="l" defTabSz="914400" rtl="0" eaLnBrk="1" fontAlgn="auto" latinLnBrk="0" hangingPunct="1">
-              <a:lnSpc>
-                <a:spcPct val="100000"/>
-              </a:lnSpc>
-              <a:spcBef>
-                <a:spcPts val="0"/>
-              </a:spcBef>
-              <a:spcAft>
-                <a:spcPts val="0"/>
-              </a:spcAft>
-              <a:buClrTx/>
-              <a:buSzTx/>
-              <a:buFontTx/>
-              <a:buNone/>
-              <a:tabLst/>
-              <a:defRPr/>
-            </a:pPr>
-            <a:endParaRPr lang="en-US" baseline="0" dirty="0" smtClean="0"/>
-          </a:p>
-          <a:p>
-            <a:pPr marL="0" marR="0" lvl="0" indent="0" algn="l" defTabSz="914400" rtl="0" eaLnBrk="1" fontAlgn="auto" latinLnBrk="0" hangingPunct="1">
-              <a:lnSpc>
-                <a:spcPct val="100000"/>
-              </a:lnSpc>
-              <a:spcBef>
-                <a:spcPts val="0"/>
-              </a:spcBef>
-              <a:spcAft>
-                <a:spcPts val="0"/>
-              </a:spcAft>
-              <a:buClrTx/>
-              <a:buSzTx/>
-              <a:buFontTx/>
-              <a:buNone/>
-              <a:tabLst/>
-              <a:defRPr/>
-            </a:pPr>
-            <a:r>
-              <a:rPr lang="en-US" baseline="0" dirty="0" err="1" smtClean="0"/>
-              <a:t>Async</a:t>
+              <a:t>, p</a:t>
+            </a:r>
+            <a:r>
+              <a:rPr lang="en-US" dirty="0" smtClean="0"/>
+              <a:t>latform engineer</a:t>
             </a:r>
             <a:r>
               <a:rPr lang="en-US" baseline="0" dirty="0" smtClean="0"/>
-              <a:t> request processing</a:t>
-            </a:r>
-          </a:p>
-          <a:p>
-            <a:pPr marL="0" marR="0" lvl="0" indent="0" algn="l" defTabSz="914400" rtl="0" eaLnBrk="1" fontAlgn="auto" latinLnBrk="0" hangingPunct="1">
-              <a:lnSpc>
-                <a:spcPct val="100000"/>
-              </a:lnSpc>
-              <a:spcBef>
-                <a:spcPts val="0"/>
-              </a:spcBef>
-              <a:spcAft>
-                <a:spcPts val="0"/>
-              </a:spcAft>
-              <a:buClrTx/>
-              <a:buSzTx/>
-              <a:buFontTx/>
-              <a:buNone/>
-              <a:tabLst/>
-              <a:defRPr/>
-            </a:pPr>
-            <a:endParaRPr lang="en-US" baseline="0" dirty="0" smtClean="0"/>
-          </a:p>
-          <a:p>
-            <a:pPr marL="0" marR="0" lvl="0" indent="0" algn="l" defTabSz="914400" rtl="0" eaLnBrk="1" fontAlgn="auto" latinLnBrk="0" hangingPunct="1">
-              <a:lnSpc>
-                <a:spcPct val="100000"/>
-              </a:lnSpc>
-              <a:spcBef>
-                <a:spcPts val="0"/>
-              </a:spcBef>
-              <a:spcAft>
-                <a:spcPts val="0"/>
-              </a:spcAft>
-              <a:buClrTx/>
-              <a:buSzTx/>
-              <a:buFontTx/>
-              <a:buNone/>
-              <a:tabLst/>
-              <a:defRPr/>
-            </a:pPr>
+              <a:t> in company </a:t>
+            </a:r>
+            <a:r>
+              <a:rPr lang="en-US" baseline="0" smtClean="0"/>
+              <a:t>that creates </a:t>
+            </a:r>
+            <a:r>
+              <a:rPr lang="en-US" dirty="0" smtClean="0"/>
+              <a:t>analytics of sport events based</a:t>
+            </a:r>
             <a:r>
               <a:rPr lang="en-US" baseline="0" dirty="0" smtClean="0"/>
-              <a:t>Keep data in-sync between systems</a:t>
+              <a:t> on videos.</a:t>
             </a:r>
           </a:p>
         </p:txBody>
@@ -1660,7 +1745,7 @@
     </p:spTree>
     <p:extLst>
       <p:ext uri="{BB962C8B-B14F-4D97-AF65-F5344CB8AC3E}">
-        <p14:creationId xmlns:p14="http://schemas.microsoft.com/office/powerpoint/2010/main" val="1766753281"/>
+        <p14:creationId xmlns:p14="http://schemas.microsoft.com/office/powerpoint/2010/main" val="4248885569"/>
       </p:ext>
     </p:extLst>
   </p:cSld>
@@ -1714,15 +1799,117 @@
           <a:bodyPr/>
           <a:lstStyle/>
           <a:p>
-            <a:r>
-              <a:rPr lang="en-US" dirty="0" smtClean="0"/>
-              <a:t>Multiple</a:t>
-            </a:r>
+            <a:pPr marL="0" marR="0" lvl="0" indent="0" algn="l" defTabSz="914400" rtl="0" eaLnBrk="1" fontAlgn="auto" latinLnBrk="0" hangingPunct="1">
+              <a:lnSpc>
+                <a:spcPct val="100000"/>
+              </a:lnSpc>
+              <a:spcBef>
+                <a:spcPts val="0"/>
+              </a:spcBef>
+              <a:spcAft>
+                <a:spcPts val="0"/>
+              </a:spcAft>
+              <a:buClrTx/>
+              <a:buSzTx/>
+              <a:buFontTx/>
+              <a:buNone/>
+              <a:tabLst/>
+              <a:defRPr/>
+            </a:pPr>
             <a:r>
               <a:rPr lang="en-US" baseline="0" dirty="0" smtClean="0"/>
-              <a:t> components involved in business transaction</a:t>
-            </a:r>
-            <a:endParaRPr lang="en-US" dirty="0"/>
+              <a:t>Large codebase</a:t>
+            </a:r>
+          </a:p>
+          <a:p>
+            <a:pPr marL="0" marR="0" lvl="0" indent="0" algn="l" defTabSz="914400" rtl="0" eaLnBrk="1" fontAlgn="auto" latinLnBrk="0" hangingPunct="1">
+              <a:lnSpc>
+                <a:spcPct val="100000"/>
+              </a:lnSpc>
+              <a:spcBef>
+                <a:spcPts val="0"/>
+              </a:spcBef>
+              <a:spcAft>
+                <a:spcPts val="0"/>
+              </a:spcAft>
+              <a:buClrTx/>
+              <a:buSzTx/>
+              <a:buFontTx/>
+              <a:buNone/>
+              <a:tabLst/>
+              <a:defRPr/>
+            </a:pPr>
+            <a:endParaRPr lang="en-US" baseline="0" dirty="0" smtClean="0"/>
+          </a:p>
+          <a:p>
+            <a:pPr marL="0" marR="0" lvl="0" indent="0" algn="l" defTabSz="914400" rtl="0" eaLnBrk="1" fontAlgn="auto" latinLnBrk="0" hangingPunct="1">
+              <a:lnSpc>
+                <a:spcPct val="100000"/>
+              </a:lnSpc>
+              <a:spcBef>
+                <a:spcPts val="0"/>
+              </a:spcBef>
+              <a:spcAft>
+                <a:spcPts val="0"/>
+              </a:spcAft>
+              <a:buClrTx/>
+              <a:buSzTx/>
+              <a:buFontTx/>
+              <a:buNone/>
+              <a:tabLst/>
+              <a:defRPr/>
+            </a:pPr>
+            <a:r>
+              <a:rPr lang="en-US" baseline="0" dirty="0" err="1" smtClean="0"/>
+              <a:t>Async</a:t>
+            </a:r>
+            <a:r>
+              <a:rPr lang="en-US" baseline="0" dirty="0" smtClean="0"/>
+              <a:t> request processing</a:t>
+            </a:r>
+          </a:p>
+          <a:p>
+            <a:pPr marL="0" marR="0" lvl="0" indent="0" algn="l" defTabSz="914400" rtl="0" eaLnBrk="1" fontAlgn="auto" latinLnBrk="0" hangingPunct="1">
+              <a:lnSpc>
+                <a:spcPct val="100000"/>
+              </a:lnSpc>
+              <a:spcBef>
+                <a:spcPts val="0"/>
+              </a:spcBef>
+              <a:spcAft>
+                <a:spcPts val="0"/>
+              </a:spcAft>
+              <a:buClrTx/>
+              <a:buSzTx/>
+              <a:buFontTx/>
+              <a:buNone/>
+              <a:tabLst/>
+              <a:defRPr/>
+            </a:pPr>
+            <a:endParaRPr lang="en-US" baseline="0" dirty="0" smtClean="0"/>
+          </a:p>
+          <a:p>
+            <a:pPr marL="0" marR="0" lvl="0" indent="0" algn="l" defTabSz="914400" rtl="0" eaLnBrk="1" fontAlgn="auto" latinLnBrk="0" hangingPunct="1">
+              <a:lnSpc>
+                <a:spcPct val="100000"/>
+              </a:lnSpc>
+              <a:spcBef>
+                <a:spcPts val="0"/>
+              </a:spcBef>
+              <a:spcAft>
+                <a:spcPts val="0"/>
+              </a:spcAft>
+              <a:buClrTx/>
+              <a:buSzTx/>
+              <a:buFontTx/>
+              <a:buNone/>
+              <a:tabLst/>
+              <a:defRPr/>
+            </a:pPr>
+            <a:r>
+              <a:rPr lang="en-US" baseline="0" dirty="0" smtClean="0"/>
+              <a:t>Keep data in-sync between systems</a:t>
+            </a:r>
           </a:p>
         </p:txBody>
       </p:sp>
@@ -1752,7 +1939,7 @@
     </p:spTree>
     <p:extLst>
       <p:ext uri="{BB962C8B-B14F-4D97-AF65-F5344CB8AC3E}">
-        <p14:creationId xmlns:p14="http://schemas.microsoft.com/office/powerpoint/2010/main" val="1285228012"/>
+        <p14:creationId xmlns:p14="http://schemas.microsoft.com/office/powerpoint/2010/main" val="1766753281"/>
       </p:ext>
     </p:extLst>
   </p:cSld>
@@ -1808,25 +1995,11 @@
           <a:p>
             <a:r>
               <a:rPr lang="en-US" dirty="0" smtClean="0"/>
-              <a:t>State change notifications</a:t>
-            </a:r>
-          </a:p>
-          <a:p>
-            <a:endParaRPr lang="en-US" dirty="0" smtClean="0"/>
-          </a:p>
-          <a:p>
-            <a:r>
-              <a:rPr lang="en-US" dirty="0" smtClean="0"/>
-              <a:t>Reactive</a:t>
-            </a:r>
-          </a:p>
-          <a:p>
-            <a:endParaRPr lang="en-US" dirty="0" smtClean="0"/>
-          </a:p>
-          <a:p>
-            <a:r>
-              <a:rPr lang="en-US" dirty="0" smtClean="0"/>
-              <a:t>Can make decisions independently (in isolation)</a:t>
+              <a:t>Multiple</a:t>
+            </a:r>
+            <a:r>
+              <a:rPr lang="en-US" baseline="0" dirty="0" smtClean="0"/>
+              <a:t> components involved in business transaction</a:t>
             </a:r>
             <a:endParaRPr lang="en-US" dirty="0"/>
           </a:p>
@@ -1858,7 +2031,7 @@
     </p:spTree>
     <p:extLst>
       <p:ext uri="{BB962C8B-B14F-4D97-AF65-F5344CB8AC3E}">
-        <p14:creationId xmlns:p14="http://schemas.microsoft.com/office/powerpoint/2010/main" val="552390821"/>
+        <p14:creationId xmlns:p14="http://schemas.microsoft.com/office/powerpoint/2010/main" val="1285228012"/>
       </p:ext>
     </p:extLst>
   </p:cSld>
@@ -1914,7 +2087,25 @@
           <a:p>
             <a:r>
               <a:rPr lang="en-US" dirty="0" smtClean="0"/>
-              <a:t>Failure scenario</a:t>
+              <a:t>State change notifications</a:t>
+            </a:r>
+          </a:p>
+          <a:p>
+            <a:endParaRPr lang="en-US" dirty="0" smtClean="0"/>
+          </a:p>
+          <a:p>
+            <a:r>
+              <a:rPr lang="en-US" dirty="0" smtClean="0"/>
+              <a:t>Reactive</a:t>
+            </a:r>
+          </a:p>
+          <a:p>
+            <a:endParaRPr lang="en-US" dirty="0" smtClean="0"/>
+          </a:p>
+          <a:p>
+            <a:r>
+              <a:rPr lang="en-US" dirty="0" smtClean="0"/>
+              <a:t>Can make decisions independently (in isolation)</a:t>
             </a:r>
             <a:endParaRPr lang="en-US" dirty="0"/>
           </a:p>
@@ -1946,7 +2137,7 @@
     </p:spTree>
     <p:extLst>
       <p:ext uri="{BB962C8B-B14F-4D97-AF65-F5344CB8AC3E}">
-        <p14:creationId xmlns:p14="http://schemas.microsoft.com/office/powerpoint/2010/main" val="3384025134"/>
+        <p14:creationId xmlns:p14="http://schemas.microsoft.com/office/powerpoint/2010/main" val="552390821"/>
       </p:ext>
     </p:extLst>
   </p:cSld>
@@ -2002,53 +2193,7 @@
           <a:p>
             <a:r>
               <a:rPr lang="en-US" dirty="0" smtClean="0"/>
-              <a:t>TPC</a:t>
-            </a:r>
-          </a:p>
-          <a:p>
-            <a:r>
-              <a:rPr lang="en-US" dirty="0" smtClean="0"/>
-              <a:t>    Degraded</a:t>
-            </a:r>
-            <a:r>
-              <a:rPr lang="en-US" baseline="0" dirty="0" smtClean="0"/>
-              <a:t> performance</a:t>
-            </a:r>
-          </a:p>
-          <a:p>
-            <a:r>
-              <a:rPr lang="en-US" baseline="0" dirty="0" smtClean="0"/>
-              <a:t>    No support by message brokers</a:t>
-            </a:r>
-            <a:endParaRPr lang="en-US" dirty="0" smtClean="0"/>
-          </a:p>
-          <a:p>
-            <a:endParaRPr lang="en-US" dirty="0" smtClean="0"/>
-          </a:p>
-          <a:p>
-            <a:r>
-              <a:rPr lang="en-US" dirty="0" smtClean="0"/>
-              <a:t>Write</a:t>
-            </a:r>
-            <a:r>
-              <a:rPr lang="en-US" baseline="0" dirty="0" smtClean="0"/>
-              <a:t> ahead logging</a:t>
-            </a:r>
-          </a:p>
-          <a:p>
-            <a:r>
-              <a:rPr lang="en-US" baseline="0" dirty="0" smtClean="0"/>
-              <a:t>    To complex for simple cases</a:t>
-            </a:r>
-            <a:endParaRPr lang="en-US" dirty="0" smtClean="0"/>
-          </a:p>
-          <a:p>
-            <a:endParaRPr lang="en-US" dirty="0" smtClean="0"/>
-          </a:p>
-          <a:p>
-            <a:r>
-              <a:rPr lang="en-US" dirty="0" smtClean="0"/>
-              <a:t>Options?</a:t>
+              <a:t>Failure scenario</a:t>
             </a:r>
             <a:endParaRPr lang="en-US" dirty="0"/>
           </a:p>
@@ -2080,7 +2225,7 @@
     </p:spTree>
     <p:extLst>
       <p:ext uri="{BB962C8B-B14F-4D97-AF65-F5344CB8AC3E}">
-        <p14:creationId xmlns:p14="http://schemas.microsoft.com/office/powerpoint/2010/main" val="3983230249"/>
+        <p14:creationId xmlns:p14="http://schemas.microsoft.com/office/powerpoint/2010/main" val="3384025134"/>
       </p:ext>
     </p:extLst>
   </p:cSld>
@@ -2136,17 +2281,55 @@
           <a:p>
             <a:r>
               <a:rPr lang="en-US" dirty="0" smtClean="0"/>
-              <a:t>Best option where applicable</a:t>
-            </a:r>
-          </a:p>
-          <a:p>
+              <a:t>TPC</a:t>
+            </a:r>
+          </a:p>
+          <a:p>
+            <a:r>
+              <a:rPr lang="en-US" dirty="0" smtClean="0"/>
+              <a:t>    Degraded</a:t>
+            </a:r>
+            <a:r>
+              <a:rPr lang="en-US" baseline="0" dirty="0" smtClean="0"/>
+              <a:t> performance</a:t>
+            </a:r>
+          </a:p>
+          <a:p>
+            <a:r>
+              <a:rPr lang="en-US" baseline="0" dirty="0" smtClean="0"/>
+              <a:t>    No support by message brokers</a:t>
+            </a:r>
             <a:endParaRPr lang="en-US" dirty="0" smtClean="0"/>
           </a:p>
           <a:p>
+            <a:endParaRPr lang="en-US" dirty="0" smtClean="0"/>
+          </a:p>
+          <a:p>
             <a:r>
               <a:rPr lang="en-US" dirty="0" smtClean="0"/>
-              <a:t>Kafka?</a:t>
-            </a:r>
+              <a:t>Write</a:t>
+            </a:r>
+            <a:r>
+              <a:rPr lang="en-US" baseline="0" dirty="0" smtClean="0"/>
+              <a:t> ahead logging</a:t>
+            </a:r>
+          </a:p>
+          <a:p>
+            <a:r>
+              <a:rPr lang="en-US" baseline="0" dirty="0" smtClean="0"/>
+              <a:t>    To complex for simple cases</a:t>
+            </a:r>
+            <a:endParaRPr lang="en-US" dirty="0" smtClean="0"/>
+          </a:p>
+          <a:p>
+            <a:endParaRPr lang="en-US" dirty="0" smtClean="0"/>
+          </a:p>
+          <a:p>
+            <a:r>
+              <a:rPr lang="en-US" dirty="0" smtClean="0"/>
+              <a:t>Options?</a:t>
+            </a:r>
+            <a:endParaRPr lang="en-US" dirty="0"/>
           </a:p>
         </p:txBody>
       </p:sp>
@@ -2176,7 +2359,7 @@
     </p:spTree>
     <p:extLst>
       <p:ext uri="{BB962C8B-B14F-4D97-AF65-F5344CB8AC3E}">
-        <p14:creationId xmlns:p14="http://schemas.microsoft.com/office/powerpoint/2010/main" val="2514363315"/>
+        <p14:creationId xmlns:p14="http://schemas.microsoft.com/office/powerpoint/2010/main" val="3983230249"/>
       </p:ext>
     </p:extLst>
   </p:cSld>
@@ -2232,20 +2415,16 @@
           <a:p>
             <a:r>
               <a:rPr lang="en-US" dirty="0" smtClean="0"/>
-              <a:t>A</a:t>
-            </a:r>
-            <a:r>
-              <a:rPr lang="en-US" baseline="0" dirty="0" smtClean="0"/>
-              <a:t>ll ACID SQL DB engines</a:t>
-            </a:r>
-          </a:p>
-          <a:p>
-            <a:endParaRPr lang="en-US" baseline="0" dirty="0" smtClean="0"/>
-          </a:p>
-          <a:p>
-            <a:r>
-              <a:rPr lang="en-US" baseline="0" dirty="0" smtClean="0"/>
-              <a:t>Some No-SQL DB engines</a:t>
+              <a:t>Best option where applicable</a:t>
+            </a:r>
+          </a:p>
+          <a:p>
+            <a:endParaRPr lang="en-US" dirty="0" smtClean="0"/>
+          </a:p>
+          <a:p>
+            <a:r>
+              <a:rPr lang="en-US" dirty="0" smtClean="0"/>
+              <a:t>Kafka?</a:t>
             </a:r>
           </a:p>
         </p:txBody>
@@ -2276,7 +2455,7 @@
     </p:spTree>
     <p:extLst>
       <p:ext uri="{BB962C8B-B14F-4D97-AF65-F5344CB8AC3E}">
-        <p14:creationId xmlns:p14="http://schemas.microsoft.com/office/powerpoint/2010/main" val="169814653"/>
+        <p14:creationId xmlns:p14="http://schemas.microsoft.com/office/powerpoint/2010/main" val="2514363315"/>
       </p:ext>
     </p:extLst>
   </p:cSld>
@@ -2332,20 +2511,11 @@
           <a:p>
             <a:r>
               <a:rPr lang="en-US" dirty="0" smtClean="0"/>
-              <a:t>Work with most No-SQL</a:t>
-            </a:r>
-          </a:p>
-          <a:p>
-            <a:endParaRPr lang="en-US" dirty="0" smtClean="0"/>
-          </a:p>
-          <a:p>
-            <a:r>
-              <a:rPr lang="en-US" dirty="0" smtClean="0"/>
-              <a:t>No explicit event publishing</a:t>
+              <a:t>A</a:t>
             </a:r>
             <a:r>
               <a:rPr lang="en-US" baseline="0" dirty="0" smtClean="0"/>
-              <a:t> in the app code</a:t>
+              <a:t>ll ACID SQL DB engines</a:t>
             </a:r>
           </a:p>
           <a:p>
@@ -2353,14 +2523,9 @@
           </a:p>
           <a:p>
             <a:r>
-              <a:rPr lang="en-US" dirty="0" smtClean="0"/>
-              <a:t>Can</a:t>
-            </a:r>
-            <a:r>
               <a:rPr lang="en-US" baseline="0" dirty="0" smtClean="0"/>
-              <a:t> be hard to revers-engineer the event</a:t>
-            </a:r>
-            <a:endParaRPr lang="en-US" dirty="0"/>
+              <a:t>Some No-SQL DB engines</a:t>
+            </a:r>
           </a:p>
         </p:txBody>
       </p:sp>
@@ -2390,7 +2555,7 @@
     </p:spTree>
     <p:extLst>
       <p:ext uri="{BB962C8B-B14F-4D97-AF65-F5344CB8AC3E}">
-        <p14:creationId xmlns:p14="http://schemas.microsoft.com/office/powerpoint/2010/main" val="1763315828"/>
+        <p14:creationId xmlns:p14="http://schemas.microsoft.com/office/powerpoint/2010/main" val="169814653"/>
       </p:ext>
     </p:extLst>
   </p:cSld>
@@ -2568,7 +2733,7 @@
           <a:p>
             <a:fld id="{5EE630CB-3638-41B1-AFF1-A77D5CAA11B6}" type="datetimeFigureOut">
               <a:rPr lang="en-US" smtClean="0"/>
-              <a:t>11/26/2018</a:t>
+              <a:t>11/29/2018</a:t>
             </a:fld>
             <a:endParaRPr lang="en-US"/>
           </a:p>
@@ -2796,7 +2961,7 @@
           <a:p>
             <a:fld id="{5EE630CB-3638-41B1-AFF1-A77D5CAA11B6}" type="datetimeFigureOut">
               <a:rPr lang="en-US" smtClean="0"/>
-              <a:t>11/26/2018</a:t>
+              <a:t>11/29/2018</a:t>
             </a:fld>
             <a:endParaRPr lang="en-US"/>
           </a:p>
@@ -2976,7 +3141,7 @@
           <a:p>
             <a:fld id="{5EE630CB-3638-41B1-AFF1-A77D5CAA11B6}" type="datetimeFigureOut">
               <a:rPr lang="en-US" smtClean="0"/>
-              <a:t>11/26/2018</a:t>
+              <a:t>11/29/2018</a:t>
             </a:fld>
             <a:endParaRPr lang="en-US"/>
           </a:p>
@@ -3146,7 +3311,7 @@
           <a:p>
             <a:fld id="{5EE630CB-3638-41B1-AFF1-A77D5CAA11B6}" type="datetimeFigureOut">
               <a:rPr lang="en-US" smtClean="0"/>
-              <a:t>11/26/2018</a:t>
+              <a:t>11/29/2018</a:t>
             </a:fld>
             <a:endParaRPr lang="en-US"/>
           </a:p>
@@ -3400,7 +3565,7 @@
           <a:p>
             <a:fld id="{5EE630CB-3638-41B1-AFF1-A77D5CAA11B6}" type="datetimeFigureOut">
               <a:rPr lang="en-US" smtClean="0"/>
-              <a:t>11/26/2018</a:t>
+              <a:t>11/29/2018</a:t>
             </a:fld>
             <a:endParaRPr lang="en-US"/>
           </a:p>
@@ -3726,7 +3891,7 @@
           <a:p>
             <a:fld id="{5EE630CB-3638-41B1-AFF1-A77D5CAA11B6}" type="datetimeFigureOut">
               <a:rPr lang="en-US" smtClean="0"/>
-              <a:t>11/26/2018</a:t>
+              <a:t>11/29/2018</a:t>
             </a:fld>
             <a:endParaRPr lang="en-US"/>
           </a:p>
@@ -4177,7 +4342,7 @@
           <a:p>
             <a:fld id="{5EE630CB-3638-41B1-AFF1-A77D5CAA11B6}" type="datetimeFigureOut">
               <a:rPr lang="en-US" smtClean="0"/>
-              <a:t>11/26/2018</a:t>
+              <a:t>11/29/2018</a:t>
             </a:fld>
             <a:endParaRPr lang="en-US"/>
           </a:p>
@@ -4295,7 +4460,7 @@
           <a:p>
             <a:fld id="{5EE630CB-3638-41B1-AFF1-A77D5CAA11B6}" type="datetimeFigureOut">
               <a:rPr lang="en-US" smtClean="0"/>
-              <a:t>11/26/2018</a:t>
+              <a:t>11/29/2018</a:t>
             </a:fld>
             <a:endParaRPr lang="en-US"/>
           </a:p>
@@ -4390,7 +4555,7 @@
           <a:p>
             <a:fld id="{5EE630CB-3638-41B1-AFF1-A77D5CAA11B6}" type="datetimeFigureOut">
               <a:rPr lang="en-US" smtClean="0"/>
-              <a:t>11/26/2018</a:t>
+              <a:t>11/29/2018</a:t>
             </a:fld>
             <a:endParaRPr lang="en-US"/>
           </a:p>
@@ -4677,7 +4842,7 @@
           <a:p>
             <a:fld id="{5EE630CB-3638-41B1-AFF1-A77D5CAA11B6}" type="datetimeFigureOut">
               <a:rPr lang="en-US" smtClean="0"/>
-              <a:t>11/26/2018</a:t>
+              <a:t>11/29/2018</a:t>
             </a:fld>
             <a:endParaRPr lang="en-US"/>
           </a:p>
@@ -4999,7 +5164,7 @@
           <a:p>
             <a:fld id="{5EE630CB-3638-41B1-AFF1-A77D5CAA11B6}" type="datetimeFigureOut">
               <a:rPr lang="en-US" smtClean="0"/>
-              <a:t>11/26/2018</a:t>
+              <a:t>11/29/2018</a:t>
             </a:fld>
             <a:endParaRPr lang="en-US"/>
           </a:p>
@@ -5253,7 +5418,7 @@
           <a:p>
             <a:fld id="{5EE630CB-3638-41B1-AFF1-A77D5CAA11B6}" type="datetimeFigureOut">
               <a:rPr lang="en-US" smtClean="0"/>
-              <a:t>11/26/2018</a:t>
+              <a:t>11/29/2018</a:t>
             </a:fld>
             <a:endParaRPr lang="en-US"/>
           </a:p>
@@ -5914,6 +6079,833 @@
           <a:p>
             <a:r>
               <a:rPr lang="en-US" dirty="0" smtClean="0"/>
+              <a:t>Transaction log tailing</a:t>
+            </a:r>
+            <a:endParaRPr lang="en-US" dirty="0"/>
+          </a:p>
+        </p:txBody>
+      </p:sp>
+      <p:sp>
+        <p:nvSpPr>
+          <p:cNvPr id="4" name="Hexagon 3"/>
+          <p:cNvSpPr/>
+          <p:nvPr/>
+        </p:nvSpPr>
+        <p:spPr>
+          <a:xfrm rot="5400000">
+            <a:off x="2305427" y="1791970"/>
+            <a:ext cx="1669689" cy="1444386"/>
+          </a:xfrm>
+          <a:prstGeom prst="hexagon">
+            <a:avLst/>
+          </a:prstGeom>
+          <a:solidFill>
+            <a:schemeClr val="accent3">
+              <a:lumMod val="40000"/>
+              <a:lumOff val="60000"/>
+            </a:schemeClr>
+          </a:solidFill>
+          <a:ln w="38100">
+            <a:solidFill>
+              <a:schemeClr val="accent3">
+                <a:lumMod val="75000"/>
+              </a:schemeClr>
+            </a:solidFill>
+          </a:ln>
+          <a:effectLst>
+            <a:outerShdw blurRad="50800" dist="38100" dir="5400000" algn="t" rotWithShape="0">
+              <a:prstClr val="black">
+                <a:alpha val="40000"/>
+              </a:prstClr>
+            </a:outerShdw>
+          </a:effectLst>
+        </p:spPr>
+        <p:style>
+          <a:lnRef idx="1">
+            <a:schemeClr val="accent3"/>
+          </a:lnRef>
+          <a:fillRef idx="2">
+            <a:schemeClr val="accent3"/>
+          </a:fillRef>
+          <a:effectRef idx="1">
+            <a:schemeClr val="accent3"/>
+          </a:effectRef>
+          <a:fontRef idx="minor">
+            <a:schemeClr val="dk1"/>
+          </a:fontRef>
+        </p:style>
+        <p:txBody>
+          <a:bodyPr rtlCol="0" anchor="ctr"/>
+          <a:lstStyle/>
+          <a:p>
+            <a:pPr algn="ctr"/>
+            <a:endParaRPr lang="en-US" dirty="0"/>
+          </a:p>
+        </p:txBody>
+      </p:sp>
+      <p:sp>
+        <p:nvSpPr>
+          <p:cNvPr id="5" name="Diamond 4"/>
+          <p:cNvSpPr/>
+          <p:nvPr/>
+        </p:nvSpPr>
+        <p:spPr>
+          <a:xfrm>
+            <a:off x="2418079" y="1667844"/>
+            <a:ext cx="1444386" cy="735454"/>
+          </a:xfrm>
+          <a:prstGeom prst="diamond">
+            <a:avLst/>
+          </a:prstGeom>
+          <a:solidFill>
+            <a:schemeClr val="accent3">
+              <a:lumMod val="75000"/>
+            </a:schemeClr>
+          </a:solidFill>
+          <a:ln w="38100">
+            <a:solidFill>
+              <a:schemeClr val="accent3">
+                <a:lumMod val="75000"/>
+              </a:schemeClr>
+            </a:solidFill>
+          </a:ln>
+        </p:spPr>
+        <p:style>
+          <a:lnRef idx="1">
+            <a:schemeClr val="accent3"/>
+          </a:lnRef>
+          <a:fillRef idx="2">
+            <a:schemeClr val="accent3"/>
+          </a:fillRef>
+          <a:effectRef idx="1">
+            <a:schemeClr val="accent3"/>
+          </a:effectRef>
+          <a:fontRef idx="minor">
+            <a:schemeClr val="dk1"/>
+          </a:fontRef>
+        </p:style>
+        <p:txBody>
+          <a:bodyPr rtlCol="0" anchor="ctr"/>
+          <a:lstStyle/>
+          <a:p>
+            <a:pPr algn="ctr"/>
+            <a:endParaRPr lang="en-US"/>
+          </a:p>
+        </p:txBody>
+      </p:sp>
+      <p:sp>
+        <p:nvSpPr>
+          <p:cNvPr id="6" name="TextBox 5"/>
+          <p:cNvSpPr txBox="1"/>
+          <p:nvPr/>
+        </p:nvSpPr>
+        <p:spPr>
+          <a:xfrm>
+            <a:off x="2712591" y="2514163"/>
+            <a:ext cx="858440" cy="369332"/>
+          </a:xfrm>
+          <a:prstGeom prst="rect">
+            <a:avLst/>
+          </a:prstGeom>
+          <a:noFill/>
+        </p:spPr>
+        <p:txBody>
+          <a:bodyPr wrap="none" rtlCol="0">
+            <a:spAutoFit/>
+          </a:bodyPr>
+          <a:lstStyle/>
+          <a:p>
+            <a:r>
+              <a:rPr lang="en-US" dirty="0" smtClean="0">
+                <a:solidFill>
+                  <a:schemeClr val="accent3">
+                    <a:lumMod val="50000"/>
+                  </a:schemeClr>
+                </a:solidFill>
+              </a:rPr>
+              <a:t>Service</a:t>
+            </a:r>
+            <a:endParaRPr lang="en-US" dirty="0">
+              <a:solidFill>
+                <a:schemeClr val="accent3">
+                  <a:lumMod val="50000"/>
+                </a:schemeClr>
+              </a:solidFill>
+            </a:endParaRPr>
+          </a:p>
+        </p:txBody>
+      </p:sp>
+      <p:cxnSp>
+        <p:nvCxnSpPr>
+          <p:cNvPr id="8" name="Straight Arrow Connector 7"/>
+          <p:cNvCxnSpPr>
+            <a:stCxn id="4" idx="0"/>
+            <a:endCxn id="7" idx="0"/>
+          </p:cNvCxnSpPr>
+          <p:nvPr/>
+        </p:nvCxnSpPr>
+        <p:spPr>
+          <a:xfrm flipH="1">
+            <a:off x="3137391" y="3349008"/>
+            <a:ext cx="2881" cy="1346562"/>
+          </a:xfrm>
+          <a:prstGeom prst="straightConnector1">
+            <a:avLst/>
+          </a:prstGeom>
+          <a:ln w="57150">
+            <a:solidFill>
+              <a:schemeClr val="accent3">
+                <a:lumMod val="75000"/>
+              </a:schemeClr>
+            </a:solidFill>
+            <a:tailEnd type="triangle"/>
+          </a:ln>
+        </p:spPr>
+        <p:style>
+          <a:lnRef idx="1">
+            <a:schemeClr val="accent1"/>
+          </a:lnRef>
+          <a:fillRef idx="0">
+            <a:schemeClr val="accent1"/>
+          </a:fillRef>
+          <a:effectRef idx="0">
+            <a:schemeClr val="accent1"/>
+          </a:effectRef>
+          <a:fontRef idx="minor">
+            <a:schemeClr val="tx1"/>
+          </a:fontRef>
+        </p:style>
+      </p:cxnSp>
+      <p:sp>
+        <p:nvSpPr>
+          <p:cNvPr id="34" name="Rectangle 33"/>
+          <p:cNvSpPr/>
+          <p:nvPr/>
+        </p:nvSpPr>
+        <p:spPr>
+          <a:xfrm>
+            <a:off x="9308592" y="2035571"/>
+            <a:ext cx="1371600" cy="3950370"/>
+          </a:xfrm>
+          <a:prstGeom prst="rect">
+            <a:avLst/>
+          </a:prstGeom>
+          <a:ln w="57150">
+            <a:prstDash val="sysDot"/>
+          </a:ln>
+        </p:spPr>
+        <p:style>
+          <a:lnRef idx="1">
+            <a:schemeClr val="accent3"/>
+          </a:lnRef>
+          <a:fillRef idx="2">
+            <a:schemeClr val="accent3"/>
+          </a:fillRef>
+          <a:effectRef idx="1">
+            <a:schemeClr val="accent3"/>
+          </a:effectRef>
+          <a:fontRef idx="minor">
+            <a:schemeClr val="dk1"/>
+          </a:fontRef>
+        </p:style>
+        <p:txBody>
+          <a:bodyPr vert="wordArtVert" rtlCol="0" anchor="ctr"/>
+          <a:lstStyle/>
+          <a:p>
+            <a:pPr algn="ctr"/>
+            <a:r>
+              <a:rPr lang="en-US" dirty="0" smtClean="0">
+                <a:solidFill>
+                  <a:schemeClr val="accent3">
+                    <a:lumMod val="50000"/>
+                  </a:schemeClr>
+                </a:solidFill>
+              </a:rPr>
+              <a:t>Message broker</a:t>
+            </a:r>
+          </a:p>
+        </p:txBody>
+      </p:sp>
+      <p:graphicFrame>
+        <p:nvGraphicFramePr>
+          <p:cNvPr id="7" name="Table 6"/>
+          <p:cNvGraphicFramePr>
+            <a:graphicFrameLocks noGrp="1"/>
+          </p:cNvGraphicFramePr>
+          <p:nvPr>
+            <p:extLst>
+              <p:ext uri="{D42A27DB-BD31-4B8C-83A1-F6EECF244321}">
+                <p14:modId xmlns:p14="http://schemas.microsoft.com/office/powerpoint/2010/main" val="939476646"/>
+              </p:ext>
+            </p:extLst>
+          </p:nvPr>
+        </p:nvGraphicFramePr>
+        <p:xfrm>
+          <a:off x="1912074" y="4695570"/>
+          <a:ext cx="2450635" cy="742591"/>
+        </p:xfrm>
+        <a:graphic>
+          <a:graphicData uri="http://schemas.openxmlformats.org/drawingml/2006/table">
+            <a:tbl>
+              <a:tblPr firstRow="1" bandRow="1">
+                <a:tableStyleId>{5C22544A-7EE6-4342-B048-85BDC9FD1C3A}</a:tableStyleId>
+              </a:tblPr>
+              <a:tblGrid>
+                <a:gridCol w="490127"/>
+                <a:gridCol w="490127"/>
+                <a:gridCol w="490127"/>
+                <a:gridCol w="490127"/>
+                <a:gridCol w="490127"/>
+              </a:tblGrid>
+              <a:tr h="264476">
+                <a:tc>
+                  <a:txBody>
+                    <a:bodyPr/>
+                    <a:lstStyle/>
+                    <a:p>
+                      <a:endParaRPr lang="en-US" dirty="0"/>
+                    </a:p>
+                  </a:txBody>
+                  <a:tcPr/>
+                </a:tc>
+                <a:tc>
+                  <a:txBody>
+                    <a:bodyPr/>
+                    <a:lstStyle/>
+                    <a:p>
+                      <a:endParaRPr lang="en-US"/>
+                    </a:p>
+                  </a:txBody>
+                  <a:tcPr/>
+                </a:tc>
+                <a:tc>
+                  <a:txBody>
+                    <a:bodyPr/>
+                    <a:lstStyle/>
+                    <a:p>
+                      <a:endParaRPr lang="en-US" dirty="0"/>
+                    </a:p>
+                  </a:txBody>
+                  <a:tcPr/>
+                </a:tc>
+                <a:tc>
+                  <a:txBody>
+                    <a:bodyPr/>
+                    <a:lstStyle/>
+                    <a:p>
+                      <a:endParaRPr lang="en-US" dirty="0"/>
+                    </a:p>
+                  </a:txBody>
+                  <a:tcPr/>
+                </a:tc>
+                <a:tc>
+                  <a:txBody>
+                    <a:bodyPr/>
+                    <a:lstStyle/>
+                    <a:p>
+                      <a:endParaRPr lang="en-US"/>
+                    </a:p>
+                  </a:txBody>
+                  <a:tcPr/>
+                </a:tc>
+              </a:tr>
+              <a:tr h="376831">
+                <a:tc>
+                  <a:txBody>
+                    <a:bodyPr/>
+                    <a:lstStyle/>
+                    <a:p>
+                      <a:endParaRPr lang="en-US"/>
+                    </a:p>
+                  </a:txBody>
+                  <a:tcPr/>
+                </a:tc>
+                <a:tc>
+                  <a:txBody>
+                    <a:bodyPr/>
+                    <a:lstStyle/>
+                    <a:p>
+                      <a:endParaRPr lang="en-US" dirty="0"/>
+                    </a:p>
+                  </a:txBody>
+                  <a:tcPr/>
+                </a:tc>
+                <a:tc>
+                  <a:txBody>
+                    <a:bodyPr/>
+                    <a:lstStyle/>
+                    <a:p>
+                      <a:endParaRPr lang="en-US"/>
+                    </a:p>
+                  </a:txBody>
+                  <a:tcPr/>
+                </a:tc>
+                <a:tc>
+                  <a:txBody>
+                    <a:bodyPr/>
+                    <a:lstStyle/>
+                    <a:p>
+                      <a:endParaRPr lang="en-US" dirty="0"/>
+                    </a:p>
+                  </a:txBody>
+                  <a:tcPr/>
+                </a:tc>
+                <a:tc>
+                  <a:txBody>
+                    <a:bodyPr/>
+                    <a:lstStyle/>
+                    <a:p>
+                      <a:endParaRPr lang="en-US" dirty="0"/>
+                    </a:p>
+                  </a:txBody>
+                  <a:tcPr/>
+                </a:tc>
+              </a:tr>
+            </a:tbl>
+          </a:graphicData>
+        </a:graphic>
+      </p:graphicFrame>
+      <p:sp>
+        <p:nvSpPr>
+          <p:cNvPr id="46" name="Flowchart: Document 45"/>
+          <p:cNvSpPr/>
+          <p:nvPr/>
+        </p:nvSpPr>
+        <p:spPr>
+          <a:xfrm>
+            <a:off x="1932830" y="3551998"/>
+            <a:ext cx="964736" cy="574752"/>
+          </a:xfrm>
+          <a:prstGeom prst="flowChartDocument">
+            <a:avLst/>
+          </a:prstGeom>
+        </p:spPr>
+        <p:style>
+          <a:lnRef idx="1">
+            <a:schemeClr val="accent4"/>
+          </a:lnRef>
+          <a:fillRef idx="3">
+            <a:schemeClr val="accent4"/>
+          </a:fillRef>
+          <a:effectRef idx="2">
+            <a:schemeClr val="accent4"/>
+          </a:effectRef>
+          <a:fontRef idx="minor">
+            <a:schemeClr val="lt1"/>
+          </a:fontRef>
+        </p:style>
+        <p:txBody>
+          <a:bodyPr rtlCol="0" anchor="ctr"/>
+          <a:lstStyle/>
+          <a:p>
+            <a:pPr algn="ctr"/>
+            <a:r>
+              <a:rPr lang="en-US" dirty="0" smtClean="0"/>
+              <a:t>Entity</a:t>
+            </a:r>
+          </a:p>
+        </p:txBody>
+      </p:sp>
+      <p:cxnSp>
+        <p:nvCxnSpPr>
+          <p:cNvPr id="48" name="Straight Arrow Connector 47"/>
+          <p:cNvCxnSpPr/>
+          <p:nvPr/>
+        </p:nvCxnSpPr>
+        <p:spPr>
+          <a:xfrm>
+            <a:off x="7330560" y="3729814"/>
+            <a:ext cx="1965121" cy="0"/>
+          </a:xfrm>
+          <a:prstGeom prst="straightConnector1">
+            <a:avLst/>
+          </a:prstGeom>
+          <a:ln w="57150">
+            <a:solidFill>
+              <a:schemeClr val="accent3">
+                <a:lumMod val="75000"/>
+              </a:schemeClr>
+            </a:solidFill>
+            <a:tailEnd type="triangle"/>
+          </a:ln>
+        </p:spPr>
+        <p:style>
+          <a:lnRef idx="1">
+            <a:schemeClr val="accent1"/>
+          </a:lnRef>
+          <a:fillRef idx="0">
+            <a:schemeClr val="accent1"/>
+          </a:fillRef>
+          <a:effectRef idx="0">
+            <a:schemeClr val="accent1"/>
+          </a:effectRef>
+          <a:fontRef idx="minor">
+            <a:schemeClr val="tx1"/>
+          </a:fontRef>
+        </p:style>
+      </p:cxnSp>
+      <p:sp>
+        <p:nvSpPr>
+          <p:cNvPr id="54" name="Hexagon 53"/>
+          <p:cNvSpPr/>
+          <p:nvPr/>
+        </p:nvSpPr>
+        <p:spPr>
+          <a:xfrm rot="5400000">
+            <a:off x="5773522" y="3007621"/>
+            <a:ext cx="1669689" cy="1444386"/>
+          </a:xfrm>
+          <a:prstGeom prst="hexagon">
+            <a:avLst/>
+          </a:prstGeom>
+          <a:solidFill>
+            <a:schemeClr val="accent3">
+              <a:lumMod val="40000"/>
+              <a:lumOff val="60000"/>
+            </a:schemeClr>
+          </a:solidFill>
+          <a:ln w="38100">
+            <a:solidFill>
+              <a:schemeClr val="accent3">
+                <a:lumMod val="75000"/>
+              </a:schemeClr>
+            </a:solidFill>
+          </a:ln>
+          <a:effectLst>
+            <a:outerShdw blurRad="50800" dist="38100" dir="5400000" algn="t" rotWithShape="0">
+              <a:prstClr val="black">
+                <a:alpha val="40000"/>
+              </a:prstClr>
+            </a:outerShdw>
+          </a:effectLst>
+        </p:spPr>
+        <p:style>
+          <a:lnRef idx="1">
+            <a:schemeClr val="accent3"/>
+          </a:lnRef>
+          <a:fillRef idx="2">
+            <a:schemeClr val="accent3"/>
+          </a:fillRef>
+          <a:effectRef idx="1">
+            <a:schemeClr val="accent3"/>
+          </a:effectRef>
+          <a:fontRef idx="minor">
+            <a:schemeClr val="dk1"/>
+          </a:fontRef>
+        </p:style>
+        <p:txBody>
+          <a:bodyPr rtlCol="0" anchor="ctr"/>
+          <a:lstStyle/>
+          <a:p>
+            <a:pPr algn="ctr"/>
+            <a:endParaRPr lang="en-US" dirty="0"/>
+          </a:p>
+        </p:txBody>
+      </p:sp>
+      <p:sp>
+        <p:nvSpPr>
+          <p:cNvPr id="55" name="Diamond 54"/>
+          <p:cNvSpPr/>
+          <p:nvPr/>
+        </p:nvSpPr>
+        <p:spPr>
+          <a:xfrm>
+            <a:off x="5886174" y="2883495"/>
+            <a:ext cx="1444386" cy="735454"/>
+          </a:xfrm>
+          <a:prstGeom prst="diamond">
+            <a:avLst/>
+          </a:prstGeom>
+          <a:solidFill>
+            <a:schemeClr val="accent3">
+              <a:lumMod val="75000"/>
+            </a:schemeClr>
+          </a:solidFill>
+          <a:ln w="38100">
+            <a:solidFill>
+              <a:schemeClr val="accent3">
+                <a:lumMod val="75000"/>
+              </a:schemeClr>
+            </a:solidFill>
+          </a:ln>
+        </p:spPr>
+        <p:style>
+          <a:lnRef idx="1">
+            <a:schemeClr val="accent3"/>
+          </a:lnRef>
+          <a:fillRef idx="2">
+            <a:schemeClr val="accent3"/>
+          </a:fillRef>
+          <a:effectRef idx="1">
+            <a:schemeClr val="accent3"/>
+          </a:effectRef>
+          <a:fontRef idx="minor">
+            <a:schemeClr val="dk1"/>
+          </a:fontRef>
+        </p:style>
+        <p:txBody>
+          <a:bodyPr rtlCol="0" anchor="ctr"/>
+          <a:lstStyle/>
+          <a:p>
+            <a:pPr algn="ctr"/>
+            <a:endParaRPr lang="en-US"/>
+          </a:p>
+        </p:txBody>
+      </p:sp>
+      <p:sp>
+        <p:nvSpPr>
+          <p:cNvPr id="56" name="TextBox 55"/>
+          <p:cNvSpPr txBox="1"/>
+          <p:nvPr/>
+        </p:nvSpPr>
+        <p:spPr>
+          <a:xfrm>
+            <a:off x="6066386" y="3615514"/>
+            <a:ext cx="1059906" cy="646331"/>
+          </a:xfrm>
+          <a:prstGeom prst="rect">
+            <a:avLst/>
+          </a:prstGeom>
+          <a:noFill/>
+        </p:spPr>
+        <p:txBody>
+          <a:bodyPr wrap="square" rtlCol="0">
+            <a:spAutoFit/>
+          </a:bodyPr>
+          <a:lstStyle/>
+          <a:p>
+            <a:pPr algn="ctr"/>
+            <a:r>
+              <a:rPr lang="en-US" dirty="0" smtClean="0">
+                <a:solidFill>
+                  <a:schemeClr val="accent3">
+                    <a:lumMod val="50000"/>
+                  </a:schemeClr>
+                </a:solidFill>
+              </a:rPr>
+              <a:t>Event</a:t>
+            </a:r>
+          </a:p>
+          <a:p>
+            <a:pPr algn="ctr"/>
+            <a:r>
+              <a:rPr lang="en-US" dirty="0" smtClean="0">
+                <a:solidFill>
+                  <a:schemeClr val="accent3">
+                    <a:lumMod val="50000"/>
+                  </a:schemeClr>
+                </a:solidFill>
+              </a:rPr>
+              <a:t>Publisher</a:t>
+            </a:r>
+            <a:endParaRPr lang="en-US" dirty="0">
+              <a:solidFill>
+                <a:schemeClr val="accent3">
+                  <a:lumMod val="50000"/>
+                </a:schemeClr>
+              </a:solidFill>
+            </a:endParaRPr>
+          </a:p>
+        </p:txBody>
+      </p:sp>
+      <p:cxnSp>
+        <p:nvCxnSpPr>
+          <p:cNvPr id="65" name="Straight Arrow Connector 64"/>
+          <p:cNvCxnSpPr/>
+          <p:nvPr/>
+        </p:nvCxnSpPr>
+        <p:spPr>
+          <a:xfrm flipV="1">
+            <a:off x="4870956" y="4339494"/>
+            <a:ext cx="1195430" cy="1241329"/>
+          </a:xfrm>
+          <a:prstGeom prst="straightConnector1">
+            <a:avLst/>
+          </a:prstGeom>
+          <a:ln w="57150">
+            <a:solidFill>
+              <a:schemeClr val="accent3">
+                <a:lumMod val="75000"/>
+              </a:schemeClr>
+            </a:solidFill>
+            <a:tailEnd type="triangle"/>
+          </a:ln>
+        </p:spPr>
+        <p:style>
+          <a:lnRef idx="1">
+            <a:schemeClr val="accent1"/>
+          </a:lnRef>
+          <a:fillRef idx="0">
+            <a:schemeClr val="accent1"/>
+          </a:fillRef>
+          <a:effectRef idx="0">
+            <a:schemeClr val="accent1"/>
+          </a:effectRef>
+          <a:fontRef idx="minor">
+            <a:schemeClr val="tx1"/>
+          </a:fontRef>
+        </p:style>
+      </p:cxnSp>
+      <p:sp>
+        <p:nvSpPr>
+          <p:cNvPr id="24" name="Rectangle 23"/>
+          <p:cNvSpPr/>
+          <p:nvPr/>
+        </p:nvSpPr>
+        <p:spPr>
+          <a:xfrm>
+            <a:off x="1383878" y="5580823"/>
+            <a:ext cx="3501271" cy="478591"/>
+          </a:xfrm>
+          <a:prstGeom prst="rect">
+            <a:avLst/>
+          </a:prstGeom>
+          <a:ln w="57150">
+            <a:prstDash val="sysDot"/>
+          </a:ln>
+        </p:spPr>
+        <p:style>
+          <a:lnRef idx="1">
+            <a:schemeClr val="accent3"/>
+          </a:lnRef>
+          <a:fillRef idx="2">
+            <a:schemeClr val="accent3"/>
+          </a:fillRef>
+          <a:effectRef idx="1">
+            <a:schemeClr val="accent3"/>
+          </a:effectRef>
+          <a:fontRef idx="minor">
+            <a:schemeClr val="dk1"/>
+          </a:fontRef>
+        </p:style>
+        <p:txBody>
+          <a:bodyPr vert="horz" rtlCol="0" anchor="ctr"/>
+          <a:lstStyle/>
+          <a:p>
+            <a:pPr algn="ctr"/>
+            <a:r>
+              <a:rPr lang="en-US" dirty="0" smtClean="0">
+                <a:solidFill>
+                  <a:schemeClr val="accent3">
+                    <a:lumMod val="50000"/>
+                  </a:schemeClr>
+                </a:solidFill>
+              </a:rPr>
+              <a:t>Transaction Log</a:t>
+            </a:r>
+          </a:p>
+        </p:txBody>
+      </p:sp>
+      <p:sp>
+        <p:nvSpPr>
+          <p:cNvPr id="40" name="Flowchart: Magnetic Disk 39"/>
+          <p:cNvSpPr/>
+          <p:nvPr/>
+        </p:nvSpPr>
+        <p:spPr>
+          <a:xfrm>
+            <a:off x="988550" y="4488758"/>
+            <a:ext cx="4522606" cy="1834872"/>
+          </a:xfrm>
+          <a:prstGeom prst="flowChartMagneticDisk">
+            <a:avLst/>
+          </a:prstGeom>
+          <a:noFill/>
+          <a:ln w="38100">
+            <a:prstDash val="sysDot"/>
+          </a:ln>
+          <a:effectLst>
+            <a:outerShdw blurRad="50800" dist="38100" dir="5400000" algn="t" rotWithShape="0">
+              <a:prstClr val="black">
+                <a:alpha val="40000"/>
+              </a:prstClr>
+            </a:outerShdw>
+          </a:effectLst>
+        </p:spPr>
+        <p:style>
+          <a:lnRef idx="3">
+            <a:schemeClr val="lt1"/>
+          </a:lnRef>
+          <a:fillRef idx="1">
+            <a:schemeClr val="accent1"/>
+          </a:fillRef>
+          <a:effectRef idx="1">
+            <a:schemeClr val="accent1"/>
+          </a:effectRef>
+          <a:fontRef idx="minor">
+            <a:schemeClr val="lt1"/>
+          </a:fontRef>
+        </p:style>
+        <p:txBody>
+          <a:bodyPr rtlCol="0" anchor="ctr"/>
+          <a:lstStyle/>
+          <a:p>
+            <a:pPr algn="ctr"/>
+            <a:endParaRPr lang="en-US"/>
+          </a:p>
+        </p:txBody>
+      </p:sp>
+    </p:spTree>
+    <p:extLst>
+      <p:ext uri="{BB962C8B-B14F-4D97-AF65-F5344CB8AC3E}">
+        <p14:creationId xmlns:p14="http://schemas.microsoft.com/office/powerpoint/2010/main" val="1677658167"/>
+      </p:ext>
+    </p:extLst>
+  </p:cSld>
+  <p:clrMapOvr>
+    <a:masterClrMapping/>
+  </p:clrMapOvr>
+  <p:timing>
+    <p:tnLst>
+      <p:par>
+        <p:cTn id="1" dur="indefinite" restart="never" nodeType="tmRoot"/>
+      </p:par>
+    </p:tnLst>
+  </p:timing>
+</p:sld>
+</file>
+
+<file path=ppt/slides/slide11.xml><?xml version="1.0" encoding="utf-8"?>
+<p:sld xmlns:a="http://schemas.openxmlformats.org/drawingml/2006/main" xmlns:r="http://schemas.openxmlformats.org/officeDocument/2006/relationships" xmlns:p="http://schemas.openxmlformats.org/presentationml/2006/main">
+  <p:cSld>
+    <p:spTree>
+      <p:nvGrpSpPr>
+        <p:cNvPr id="1" name=""/>
+        <p:cNvGrpSpPr/>
+        <p:nvPr/>
+      </p:nvGrpSpPr>
+      <p:grpSpPr>
+        <a:xfrm>
+          <a:off x="0" y="0"/>
+          <a:ext cx="0" cy="0"/>
+          <a:chOff x="0" y="0"/>
+          <a:chExt cx="0" cy="0"/>
+        </a:xfrm>
+      </p:grpSpPr>
+      <p:sp>
+        <p:nvSpPr>
+          <p:cNvPr id="2" name="Title 1"/>
+          <p:cNvSpPr>
+            <a:spLocks noGrp="1"/>
+          </p:cNvSpPr>
+          <p:nvPr>
+            <p:ph type="ctrTitle"/>
+          </p:nvPr>
+        </p:nvSpPr>
+        <p:spPr>
+          <a:xfrm>
+            <a:off x="1261872" y="383065"/>
+            <a:ext cx="9418320" cy="1062681"/>
+          </a:xfrm>
+        </p:spPr>
+        <p:txBody>
+          <a:bodyPr>
+            <a:normAutofit/>
+          </a:bodyPr>
+          <a:lstStyle/>
+          <a:p>
+            <a:r>
+              <a:rPr lang="en-US" dirty="0" smtClean="0"/>
               <a:t>Write concern</a:t>
             </a:r>
             <a:endParaRPr lang="en-US" dirty="0"/>
@@ -5970,7 +6962,7 @@
 </p:sld>
 </file>
 
-<file path=ppt/slides/slide11.xml><?xml version="1.0" encoding="utf-8"?>
+<file path=ppt/slides/slide12.xml><?xml version="1.0" encoding="utf-8"?>
 <p:sld xmlns:a="http://schemas.openxmlformats.org/drawingml/2006/main" xmlns:r="http://schemas.openxmlformats.org/officeDocument/2006/relationships" xmlns:p="http://schemas.openxmlformats.org/presentationml/2006/main">
   <p:cSld>
     <p:spTree>
@@ -6462,89 +7454,6 @@
       <p:bldP spid="6" grpId="0"/>
       <p:bldP spid="7" grpId="0"/>
     </p:bldLst>
-  </p:timing>
-</p:sld>
-</file>
-
-<file path=ppt/slides/slide12.xml><?xml version="1.0" encoding="utf-8"?>
-<p:sld xmlns:a="http://schemas.openxmlformats.org/drawingml/2006/main" xmlns:r="http://schemas.openxmlformats.org/officeDocument/2006/relationships" xmlns:p="http://schemas.openxmlformats.org/presentationml/2006/main">
-  <p:cSld>
-    <p:spTree>
-      <p:nvGrpSpPr>
-        <p:cNvPr id="1" name=""/>
-        <p:cNvGrpSpPr/>
-        <p:nvPr/>
-      </p:nvGrpSpPr>
-      <p:grpSpPr>
-        <a:xfrm>
-          <a:off x="0" y="0"/>
-          <a:ext cx="0" cy="0"/>
-          <a:chOff x="0" y="0"/>
-          <a:chExt cx="0" cy="0"/>
-        </a:xfrm>
-      </p:grpSpPr>
-      <p:sp>
-        <p:nvSpPr>
-          <p:cNvPr id="2" name="Title 1"/>
-          <p:cNvSpPr>
-            <a:spLocks noGrp="1"/>
-          </p:cNvSpPr>
-          <p:nvPr>
-            <p:ph type="ctrTitle"/>
-          </p:nvPr>
-        </p:nvSpPr>
-        <p:spPr/>
-        <p:txBody>
-          <a:bodyPr/>
-          <a:lstStyle/>
-          <a:p>
-            <a:r>
-              <a:rPr lang="en-US" dirty="0" err="1" smtClean="0"/>
-              <a:t>Oplog</a:t>
-            </a:r>
-            <a:r>
-              <a:rPr lang="en-US" dirty="0" smtClean="0"/>
-              <a:t> internals</a:t>
-            </a:r>
-            <a:endParaRPr lang="en-US" dirty="0"/>
-          </a:p>
-        </p:txBody>
-      </p:sp>
-      <p:sp>
-        <p:nvSpPr>
-          <p:cNvPr id="3" name="Subtitle 2"/>
-          <p:cNvSpPr>
-            <a:spLocks noGrp="1"/>
-          </p:cNvSpPr>
-          <p:nvPr>
-            <p:ph type="subTitle" idx="1"/>
-          </p:nvPr>
-        </p:nvSpPr>
-        <p:spPr/>
-        <p:txBody>
-          <a:bodyPr/>
-          <a:lstStyle/>
-          <a:p>
-            <a:endParaRPr lang="en-US"/>
-          </a:p>
-        </p:txBody>
-      </p:sp>
-    </p:spTree>
-    <p:extLst>
-      <p:ext uri="{BB962C8B-B14F-4D97-AF65-F5344CB8AC3E}">
-        <p14:creationId xmlns:p14="http://schemas.microsoft.com/office/powerpoint/2010/main" val="3053173680"/>
-      </p:ext>
-    </p:extLst>
-  </p:cSld>
-  <p:clrMapOvr>
-    <a:masterClrMapping/>
-  </p:clrMapOvr>
-  <p:timing>
-    <p:tnLst>
-      <p:par>
-        <p:cTn id="1" dur="indefinite" restart="never" nodeType="tmRoot"/>
-      </p:par>
-    </p:tnLst>
   </p:timing>
 </p:sld>
 </file>
@@ -9359,6 +10268,85 @@
 </p:sld>
 </file>
 
+<file path=ppt/slides/slide19.xml><?xml version="1.0" encoding="utf-8"?>
+<p:sld xmlns:a="http://schemas.openxmlformats.org/drawingml/2006/main" xmlns:r="http://schemas.openxmlformats.org/officeDocument/2006/relationships" xmlns:p="http://schemas.openxmlformats.org/presentationml/2006/main">
+  <p:cSld>
+    <p:spTree>
+      <p:nvGrpSpPr>
+        <p:cNvPr id="1" name=""/>
+        <p:cNvGrpSpPr/>
+        <p:nvPr/>
+      </p:nvGrpSpPr>
+      <p:grpSpPr>
+        <a:xfrm>
+          <a:off x="0" y="0"/>
+          <a:ext cx="0" cy="0"/>
+          <a:chOff x="0" y="0"/>
+          <a:chExt cx="0" cy="0"/>
+        </a:xfrm>
+      </p:grpSpPr>
+      <p:sp>
+        <p:nvSpPr>
+          <p:cNvPr id="2" name="Title 1"/>
+          <p:cNvSpPr>
+            <a:spLocks noGrp="1"/>
+          </p:cNvSpPr>
+          <p:nvPr>
+            <p:ph type="ctrTitle"/>
+          </p:nvPr>
+        </p:nvSpPr>
+        <p:spPr/>
+        <p:txBody>
+          <a:bodyPr/>
+          <a:lstStyle/>
+          <a:p>
+            <a:r>
+              <a:rPr lang="en-US" dirty="0" smtClean="0"/>
+              <a:t>Demo</a:t>
+            </a:r>
+            <a:endParaRPr lang="en-US" dirty="0"/>
+          </a:p>
+        </p:txBody>
+      </p:sp>
+      <p:sp>
+        <p:nvSpPr>
+          <p:cNvPr id="3" name="Subtitle 2"/>
+          <p:cNvSpPr>
+            <a:spLocks noGrp="1"/>
+          </p:cNvSpPr>
+          <p:nvPr>
+            <p:ph type="subTitle" idx="1"/>
+          </p:nvPr>
+        </p:nvSpPr>
+        <p:spPr/>
+        <p:txBody>
+          <a:bodyPr/>
+          <a:lstStyle/>
+          <a:p>
+            <a:endParaRPr lang="en-US"/>
+          </a:p>
+        </p:txBody>
+      </p:sp>
+    </p:spTree>
+    <p:extLst>
+      <p:ext uri="{BB962C8B-B14F-4D97-AF65-F5344CB8AC3E}">
+        <p14:creationId xmlns:p14="http://schemas.microsoft.com/office/powerpoint/2010/main" val="3053173680"/>
+      </p:ext>
+    </p:extLst>
+  </p:cSld>
+  <p:clrMapOvr>
+    <a:masterClrMapping/>
+  </p:clrMapOvr>
+  <p:timing>
+    <p:tnLst>
+      <p:par>
+        <p:cTn id="1" dur="indefinite" restart="never" nodeType="tmRoot"/>
+      </p:par>
+    </p:tnLst>
+  </p:timing>
+</p:sld>
+</file>
+
 <file path=ppt/slides/slide2.xml><?xml version="1.0" encoding="utf-8"?>
 <p:sld xmlns:a="http://schemas.openxmlformats.org/drawingml/2006/main" xmlns:r="http://schemas.openxmlformats.org/officeDocument/2006/relationships" xmlns:p="http://schemas.openxmlformats.org/presentationml/2006/main">
   <p:cSld>
@@ -9386,34 +10374,22 @@
             <p:ph type="ctrTitle"/>
           </p:nvPr>
         </p:nvSpPr>
-        <p:spPr/>
-        <p:txBody>
-          <a:bodyPr/>
+        <p:spPr>
+          <a:xfrm>
+            <a:off x="1261872" y="363531"/>
+            <a:ext cx="9418320" cy="1041936"/>
+          </a:xfrm>
+        </p:spPr>
+        <p:txBody>
+          <a:bodyPr>
+            <a:normAutofit/>
+          </a:bodyPr>
           <a:lstStyle/>
           <a:p>
             <a:r>
               <a:rPr lang="en-US" dirty="0" smtClean="0"/>
-              <a:t>Challenges we face</a:t>
-            </a:r>
-            <a:endParaRPr lang="en-US" dirty="0"/>
-          </a:p>
-        </p:txBody>
-      </p:sp>
-      <p:sp>
-        <p:nvSpPr>
-          <p:cNvPr id="3" name="Subtitle 2"/>
-          <p:cNvSpPr>
-            <a:spLocks noGrp="1"/>
-          </p:cNvSpPr>
-          <p:nvPr>
-            <p:ph type="subTitle" idx="1"/>
-          </p:nvPr>
-        </p:nvSpPr>
-        <p:spPr/>
-        <p:txBody>
-          <a:bodyPr/>
-          <a:lstStyle/>
-          <a:p>
+              <a:t>About me</a:t>
+            </a:r>
             <a:endParaRPr lang="en-US" dirty="0"/>
           </a:p>
         </p:txBody>
@@ -9421,7 +10397,7 @@
     </p:spTree>
     <p:extLst>
       <p:ext uri="{BB962C8B-B14F-4D97-AF65-F5344CB8AC3E}">
-        <p14:creationId xmlns:p14="http://schemas.microsoft.com/office/powerpoint/2010/main" val="4029788524"/>
+        <p14:creationId xmlns:p14="http://schemas.microsoft.com/office/powerpoint/2010/main" val="1953207086"/>
       </p:ext>
     </p:extLst>
   </p:cSld>
@@ -9467,6 +10443,89 @@
         </p:nvSpPr>
         <p:spPr/>
         <p:txBody>
+          <a:bodyPr/>
+          <a:lstStyle/>
+          <a:p>
+            <a:r>
+              <a:rPr lang="en-US" dirty="0" smtClean="0"/>
+              <a:t>Challenges we face</a:t>
+            </a:r>
+            <a:endParaRPr lang="en-US" dirty="0"/>
+          </a:p>
+        </p:txBody>
+      </p:sp>
+      <p:sp>
+        <p:nvSpPr>
+          <p:cNvPr id="3" name="Subtitle 2"/>
+          <p:cNvSpPr>
+            <a:spLocks noGrp="1"/>
+          </p:cNvSpPr>
+          <p:nvPr>
+            <p:ph type="subTitle" idx="1"/>
+          </p:nvPr>
+        </p:nvSpPr>
+        <p:spPr/>
+        <p:txBody>
+          <a:bodyPr/>
+          <a:lstStyle/>
+          <a:p>
+            <a:r>
+              <a:rPr lang="en-US" dirty="0" smtClean="0"/>
+              <a:t>TODO: Add bullets</a:t>
+            </a:r>
+            <a:endParaRPr lang="en-US" dirty="0"/>
+          </a:p>
+        </p:txBody>
+      </p:sp>
+    </p:spTree>
+    <p:extLst>
+      <p:ext uri="{BB962C8B-B14F-4D97-AF65-F5344CB8AC3E}">
+        <p14:creationId xmlns:p14="http://schemas.microsoft.com/office/powerpoint/2010/main" val="4029788524"/>
+      </p:ext>
+    </p:extLst>
+  </p:cSld>
+  <p:clrMapOvr>
+    <a:masterClrMapping/>
+  </p:clrMapOvr>
+  <p:timing>
+    <p:tnLst>
+      <p:par>
+        <p:cTn id="1" dur="indefinite" restart="never" nodeType="tmRoot"/>
+      </p:par>
+    </p:tnLst>
+  </p:timing>
+</p:sld>
+</file>
+
+<file path=ppt/slides/slide4.xml><?xml version="1.0" encoding="utf-8"?>
+<p:sld xmlns:a="http://schemas.openxmlformats.org/drawingml/2006/main" xmlns:r="http://schemas.openxmlformats.org/officeDocument/2006/relationships" xmlns:p="http://schemas.openxmlformats.org/presentationml/2006/main">
+  <p:cSld>
+    <p:spTree>
+      <p:nvGrpSpPr>
+        <p:cNvPr id="1" name=""/>
+        <p:cNvGrpSpPr/>
+        <p:nvPr/>
+      </p:nvGrpSpPr>
+      <p:grpSpPr>
+        <a:xfrm>
+          <a:off x="0" y="0"/>
+          <a:ext cx="0" cy="0"/>
+          <a:chOff x="0" y="0"/>
+          <a:chExt cx="0" cy="0"/>
+        </a:xfrm>
+      </p:grpSpPr>
+      <p:sp>
+        <p:nvSpPr>
+          <p:cNvPr id="2" name="Title 1"/>
+          <p:cNvSpPr>
+            <a:spLocks noGrp="1"/>
+          </p:cNvSpPr>
+          <p:nvPr>
+            <p:ph type="ctrTitle"/>
+          </p:nvPr>
+        </p:nvSpPr>
+        <p:spPr/>
+        <p:txBody>
           <a:bodyPr>
             <a:normAutofit/>
           </a:bodyPr>
@@ -9526,7 +10585,7 @@
 </p:sld>
 </file>
 
-<file path=ppt/slides/slide4.xml><?xml version="1.0" encoding="utf-8"?>
+<file path=ppt/slides/slide5.xml><?xml version="1.0" encoding="utf-8"?>
 <p:sld xmlns:a="http://schemas.openxmlformats.org/drawingml/2006/main" xmlns:r="http://schemas.openxmlformats.org/officeDocument/2006/relationships" xmlns:p="http://schemas.openxmlformats.org/presentationml/2006/main">
   <p:cSld>
     <p:spTree>
@@ -11095,7 +12154,7 @@
 </p:sld>
 </file>
 
-<file path=ppt/slides/slide5.xml><?xml version="1.0" encoding="utf-8"?>
+<file path=ppt/slides/slide6.xml><?xml version="1.0" encoding="utf-8"?>
 <p:sld xmlns:a="http://schemas.openxmlformats.org/drawingml/2006/main" xmlns:r="http://schemas.openxmlformats.org/officeDocument/2006/relationships" xmlns:p="http://schemas.openxmlformats.org/presentationml/2006/main">
   <p:cSld>
     <p:spTree>
@@ -12125,7 +13184,7 @@
 </p:sld>
 </file>
 
-<file path=ppt/slides/slide6.xml><?xml version="1.0" encoding="utf-8"?>
+<file path=ppt/slides/slide7.xml><?xml version="1.0" encoding="utf-8"?>
 <p:sld xmlns:a="http://schemas.openxmlformats.org/drawingml/2006/main" xmlns:r="http://schemas.openxmlformats.org/officeDocument/2006/relationships" xmlns:p="http://schemas.openxmlformats.org/presentationml/2006/main">
   <p:cSld>
     <p:spTree>
@@ -12231,7 +13290,7 @@
 </p:sld>
 </file>
 
-<file path=ppt/slides/slide7.xml><?xml version="1.0" encoding="utf-8"?>
+<file path=ppt/slides/slide8.xml><?xml version="1.0" encoding="utf-8"?>
 <p:sld xmlns:a="http://schemas.openxmlformats.org/drawingml/2006/main" xmlns:r="http://schemas.openxmlformats.org/officeDocument/2006/relationships" xmlns:p="http://schemas.openxmlformats.org/presentationml/2006/main">
   <p:cSld>
     <p:spTree>
@@ -13592,7 +14651,7 @@
 </p:sld>
 </file>
 
-<file path=ppt/slides/slide8.xml><?xml version="1.0" encoding="utf-8"?>
+<file path=ppt/slides/slide9.xml><?xml version="1.0" encoding="utf-8"?>
 <p:sld xmlns:a="http://schemas.openxmlformats.org/drawingml/2006/main" xmlns:r="http://schemas.openxmlformats.org/officeDocument/2006/relationships" xmlns:p="http://schemas.openxmlformats.org/presentationml/2006/main">
   <p:cSld>
     <p:spTree>
@@ -14712,833 +15771,6 @@
     <p:extLst>
       <p:ext uri="{BB962C8B-B14F-4D97-AF65-F5344CB8AC3E}">
         <p14:creationId xmlns:p14="http://schemas.microsoft.com/office/powerpoint/2010/main" val="3541929606"/>
-      </p:ext>
-    </p:extLst>
-  </p:cSld>
-  <p:clrMapOvr>
-    <a:masterClrMapping/>
-  </p:clrMapOvr>
-  <p:timing>
-    <p:tnLst>
-      <p:par>
-        <p:cTn id="1" dur="indefinite" restart="never" nodeType="tmRoot"/>
-      </p:par>
-    </p:tnLst>
-  </p:timing>
-</p:sld>
-</file>
-
-<file path=ppt/slides/slide9.xml><?xml version="1.0" encoding="utf-8"?>
-<p:sld xmlns:a="http://schemas.openxmlformats.org/drawingml/2006/main" xmlns:r="http://schemas.openxmlformats.org/officeDocument/2006/relationships" xmlns:p="http://schemas.openxmlformats.org/presentationml/2006/main">
-  <p:cSld>
-    <p:spTree>
-      <p:nvGrpSpPr>
-        <p:cNvPr id="1" name=""/>
-        <p:cNvGrpSpPr/>
-        <p:nvPr/>
-      </p:nvGrpSpPr>
-      <p:grpSpPr>
-        <a:xfrm>
-          <a:off x="0" y="0"/>
-          <a:ext cx="0" cy="0"/>
-          <a:chOff x="0" y="0"/>
-          <a:chExt cx="0" cy="0"/>
-        </a:xfrm>
-      </p:grpSpPr>
-      <p:sp>
-        <p:nvSpPr>
-          <p:cNvPr id="2" name="Title 1"/>
-          <p:cNvSpPr>
-            <a:spLocks noGrp="1"/>
-          </p:cNvSpPr>
-          <p:nvPr>
-            <p:ph type="ctrTitle"/>
-          </p:nvPr>
-        </p:nvSpPr>
-        <p:spPr>
-          <a:xfrm>
-            <a:off x="1261872" y="383065"/>
-            <a:ext cx="9418320" cy="1062681"/>
-          </a:xfrm>
-        </p:spPr>
-        <p:txBody>
-          <a:bodyPr>
-            <a:normAutofit/>
-          </a:bodyPr>
-          <a:lstStyle/>
-          <a:p>
-            <a:r>
-              <a:rPr lang="en-US" dirty="0" smtClean="0"/>
-              <a:t>Transaction log tailing</a:t>
-            </a:r>
-            <a:endParaRPr lang="en-US" dirty="0"/>
-          </a:p>
-        </p:txBody>
-      </p:sp>
-      <p:sp>
-        <p:nvSpPr>
-          <p:cNvPr id="4" name="Hexagon 3"/>
-          <p:cNvSpPr/>
-          <p:nvPr/>
-        </p:nvSpPr>
-        <p:spPr>
-          <a:xfrm rot="5400000">
-            <a:off x="2305427" y="1791970"/>
-            <a:ext cx="1669689" cy="1444386"/>
-          </a:xfrm>
-          <a:prstGeom prst="hexagon">
-            <a:avLst/>
-          </a:prstGeom>
-          <a:solidFill>
-            <a:schemeClr val="accent3">
-              <a:lumMod val="40000"/>
-              <a:lumOff val="60000"/>
-            </a:schemeClr>
-          </a:solidFill>
-          <a:ln w="38100">
-            <a:solidFill>
-              <a:schemeClr val="accent3">
-                <a:lumMod val="75000"/>
-              </a:schemeClr>
-            </a:solidFill>
-          </a:ln>
-          <a:effectLst>
-            <a:outerShdw blurRad="50800" dist="38100" dir="5400000" algn="t" rotWithShape="0">
-              <a:prstClr val="black">
-                <a:alpha val="40000"/>
-              </a:prstClr>
-            </a:outerShdw>
-          </a:effectLst>
-        </p:spPr>
-        <p:style>
-          <a:lnRef idx="1">
-            <a:schemeClr val="accent3"/>
-          </a:lnRef>
-          <a:fillRef idx="2">
-            <a:schemeClr val="accent3"/>
-          </a:fillRef>
-          <a:effectRef idx="1">
-            <a:schemeClr val="accent3"/>
-          </a:effectRef>
-          <a:fontRef idx="minor">
-            <a:schemeClr val="dk1"/>
-          </a:fontRef>
-        </p:style>
-        <p:txBody>
-          <a:bodyPr rtlCol="0" anchor="ctr"/>
-          <a:lstStyle/>
-          <a:p>
-            <a:pPr algn="ctr"/>
-            <a:endParaRPr lang="en-US" dirty="0"/>
-          </a:p>
-        </p:txBody>
-      </p:sp>
-      <p:sp>
-        <p:nvSpPr>
-          <p:cNvPr id="5" name="Diamond 4"/>
-          <p:cNvSpPr/>
-          <p:nvPr/>
-        </p:nvSpPr>
-        <p:spPr>
-          <a:xfrm>
-            <a:off x="2418079" y="1667844"/>
-            <a:ext cx="1444386" cy="735454"/>
-          </a:xfrm>
-          <a:prstGeom prst="diamond">
-            <a:avLst/>
-          </a:prstGeom>
-          <a:solidFill>
-            <a:schemeClr val="accent3">
-              <a:lumMod val="75000"/>
-            </a:schemeClr>
-          </a:solidFill>
-          <a:ln w="38100">
-            <a:solidFill>
-              <a:schemeClr val="accent3">
-                <a:lumMod val="75000"/>
-              </a:schemeClr>
-            </a:solidFill>
-          </a:ln>
-        </p:spPr>
-        <p:style>
-          <a:lnRef idx="1">
-            <a:schemeClr val="accent3"/>
-          </a:lnRef>
-          <a:fillRef idx="2">
-            <a:schemeClr val="accent3"/>
-          </a:fillRef>
-          <a:effectRef idx="1">
-            <a:schemeClr val="accent3"/>
-          </a:effectRef>
-          <a:fontRef idx="minor">
-            <a:schemeClr val="dk1"/>
-          </a:fontRef>
-        </p:style>
-        <p:txBody>
-          <a:bodyPr rtlCol="0" anchor="ctr"/>
-          <a:lstStyle/>
-          <a:p>
-            <a:pPr algn="ctr"/>
-            <a:endParaRPr lang="en-US"/>
-          </a:p>
-        </p:txBody>
-      </p:sp>
-      <p:sp>
-        <p:nvSpPr>
-          <p:cNvPr id="6" name="TextBox 5"/>
-          <p:cNvSpPr txBox="1"/>
-          <p:nvPr/>
-        </p:nvSpPr>
-        <p:spPr>
-          <a:xfrm>
-            <a:off x="2712591" y="2514163"/>
-            <a:ext cx="858440" cy="369332"/>
-          </a:xfrm>
-          <a:prstGeom prst="rect">
-            <a:avLst/>
-          </a:prstGeom>
-          <a:noFill/>
-        </p:spPr>
-        <p:txBody>
-          <a:bodyPr wrap="none" rtlCol="0">
-            <a:spAutoFit/>
-          </a:bodyPr>
-          <a:lstStyle/>
-          <a:p>
-            <a:r>
-              <a:rPr lang="en-US" dirty="0" smtClean="0">
-                <a:solidFill>
-                  <a:schemeClr val="accent3">
-                    <a:lumMod val="50000"/>
-                  </a:schemeClr>
-                </a:solidFill>
-              </a:rPr>
-              <a:t>Service</a:t>
-            </a:r>
-            <a:endParaRPr lang="en-US" dirty="0">
-              <a:solidFill>
-                <a:schemeClr val="accent3">
-                  <a:lumMod val="50000"/>
-                </a:schemeClr>
-              </a:solidFill>
-            </a:endParaRPr>
-          </a:p>
-        </p:txBody>
-      </p:sp>
-      <p:cxnSp>
-        <p:nvCxnSpPr>
-          <p:cNvPr id="8" name="Straight Arrow Connector 7"/>
-          <p:cNvCxnSpPr>
-            <a:stCxn id="4" idx="0"/>
-            <a:endCxn id="7" idx="0"/>
-          </p:cNvCxnSpPr>
-          <p:nvPr/>
-        </p:nvCxnSpPr>
-        <p:spPr>
-          <a:xfrm flipH="1">
-            <a:off x="3137391" y="3349008"/>
-            <a:ext cx="2881" cy="1346562"/>
-          </a:xfrm>
-          <a:prstGeom prst="straightConnector1">
-            <a:avLst/>
-          </a:prstGeom>
-          <a:ln w="57150">
-            <a:solidFill>
-              <a:schemeClr val="accent3">
-                <a:lumMod val="75000"/>
-              </a:schemeClr>
-            </a:solidFill>
-            <a:tailEnd type="triangle"/>
-          </a:ln>
-        </p:spPr>
-        <p:style>
-          <a:lnRef idx="1">
-            <a:schemeClr val="accent1"/>
-          </a:lnRef>
-          <a:fillRef idx="0">
-            <a:schemeClr val="accent1"/>
-          </a:fillRef>
-          <a:effectRef idx="0">
-            <a:schemeClr val="accent1"/>
-          </a:effectRef>
-          <a:fontRef idx="minor">
-            <a:schemeClr val="tx1"/>
-          </a:fontRef>
-        </p:style>
-      </p:cxnSp>
-      <p:sp>
-        <p:nvSpPr>
-          <p:cNvPr id="34" name="Rectangle 33"/>
-          <p:cNvSpPr/>
-          <p:nvPr/>
-        </p:nvSpPr>
-        <p:spPr>
-          <a:xfrm>
-            <a:off x="9308592" y="2035571"/>
-            <a:ext cx="1371600" cy="3950370"/>
-          </a:xfrm>
-          <a:prstGeom prst="rect">
-            <a:avLst/>
-          </a:prstGeom>
-          <a:ln w="57150">
-            <a:prstDash val="sysDot"/>
-          </a:ln>
-        </p:spPr>
-        <p:style>
-          <a:lnRef idx="1">
-            <a:schemeClr val="accent3"/>
-          </a:lnRef>
-          <a:fillRef idx="2">
-            <a:schemeClr val="accent3"/>
-          </a:fillRef>
-          <a:effectRef idx="1">
-            <a:schemeClr val="accent3"/>
-          </a:effectRef>
-          <a:fontRef idx="minor">
-            <a:schemeClr val="dk1"/>
-          </a:fontRef>
-        </p:style>
-        <p:txBody>
-          <a:bodyPr vert="wordArtVert" rtlCol="0" anchor="ctr"/>
-          <a:lstStyle/>
-          <a:p>
-            <a:pPr algn="ctr"/>
-            <a:r>
-              <a:rPr lang="en-US" dirty="0" smtClean="0">
-                <a:solidFill>
-                  <a:schemeClr val="accent3">
-                    <a:lumMod val="50000"/>
-                  </a:schemeClr>
-                </a:solidFill>
-              </a:rPr>
-              <a:t>Message broker</a:t>
-            </a:r>
-          </a:p>
-        </p:txBody>
-      </p:sp>
-      <p:graphicFrame>
-        <p:nvGraphicFramePr>
-          <p:cNvPr id="7" name="Table 6"/>
-          <p:cNvGraphicFramePr>
-            <a:graphicFrameLocks noGrp="1"/>
-          </p:cNvGraphicFramePr>
-          <p:nvPr>
-            <p:extLst>
-              <p:ext uri="{D42A27DB-BD31-4B8C-83A1-F6EECF244321}">
-                <p14:modId xmlns:p14="http://schemas.microsoft.com/office/powerpoint/2010/main" val="939476646"/>
-              </p:ext>
-            </p:extLst>
-          </p:nvPr>
-        </p:nvGraphicFramePr>
-        <p:xfrm>
-          <a:off x="1912074" y="4695570"/>
-          <a:ext cx="2450635" cy="742591"/>
-        </p:xfrm>
-        <a:graphic>
-          <a:graphicData uri="http://schemas.openxmlformats.org/drawingml/2006/table">
-            <a:tbl>
-              <a:tblPr firstRow="1" bandRow="1">
-                <a:tableStyleId>{5C22544A-7EE6-4342-B048-85BDC9FD1C3A}</a:tableStyleId>
-              </a:tblPr>
-              <a:tblGrid>
-                <a:gridCol w="490127"/>
-                <a:gridCol w="490127"/>
-                <a:gridCol w="490127"/>
-                <a:gridCol w="490127"/>
-                <a:gridCol w="490127"/>
-              </a:tblGrid>
-              <a:tr h="264476">
-                <a:tc>
-                  <a:txBody>
-                    <a:bodyPr/>
-                    <a:lstStyle/>
-                    <a:p>
-                      <a:endParaRPr lang="en-US" dirty="0"/>
-                    </a:p>
-                  </a:txBody>
-                  <a:tcPr/>
-                </a:tc>
-                <a:tc>
-                  <a:txBody>
-                    <a:bodyPr/>
-                    <a:lstStyle/>
-                    <a:p>
-                      <a:endParaRPr lang="en-US"/>
-                    </a:p>
-                  </a:txBody>
-                  <a:tcPr/>
-                </a:tc>
-                <a:tc>
-                  <a:txBody>
-                    <a:bodyPr/>
-                    <a:lstStyle/>
-                    <a:p>
-                      <a:endParaRPr lang="en-US" dirty="0"/>
-                    </a:p>
-                  </a:txBody>
-                  <a:tcPr/>
-                </a:tc>
-                <a:tc>
-                  <a:txBody>
-                    <a:bodyPr/>
-                    <a:lstStyle/>
-                    <a:p>
-                      <a:endParaRPr lang="en-US" dirty="0"/>
-                    </a:p>
-                  </a:txBody>
-                  <a:tcPr/>
-                </a:tc>
-                <a:tc>
-                  <a:txBody>
-                    <a:bodyPr/>
-                    <a:lstStyle/>
-                    <a:p>
-                      <a:endParaRPr lang="en-US"/>
-                    </a:p>
-                  </a:txBody>
-                  <a:tcPr/>
-                </a:tc>
-              </a:tr>
-              <a:tr h="376831">
-                <a:tc>
-                  <a:txBody>
-                    <a:bodyPr/>
-                    <a:lstStyle/>
-                    <a:p>
-                      <a:endParaRPr lang="en-US"/>
-                    </a:p>
-                  </a:txBody>
-                  <a:tcPr/>
-                </a:tc>
-                <a:tc>
-                  <a:txBody>
-                    <a:bodyPr/>
-                    <a:lstStyle/>
-                    <a:p>
-                      <a:endParaRPr lang="en-US" dirty="0"/>
-                    </a:p>
-                  </a:txBody>
-                  <a:tcPr/>
-                </a:tc>
-                <a:tc>
-                  <a:txBody>
-                    <a:bodyPr/>
-                    <a:lstStyle/>
-                    <a:p>
-                      <a:endParaRPr lang="en-US"/>
-                    </a:p>
-                  </a:txBody>
-                  <a:tcPr/>
-                </a:tc>
-                <a:tc>
-                  <a:txBody>
-                    <a:bodyPr/>
-                    <a:lstStyle/>
-                    <a:p>
-                      <a:endParaRPr lang="en-US" dirty="0"/>
-                    </a:p>
-                  </a:txBody>
-                  <a:tcPr/>
-                </a:tc>
-                <a:tc>
-                  <a:txBody>
-                    <a:bodyPr/>
-                    <a:lstStyle/>
-                    <a:p>
-                      <a:endParaRPr lang="en-US" dirty="0"/>
-                    </a:p>
-                  </a:txBody>
-                  <a:tcPr/>
-                </a:tc>
-              </a:tr>
-            </a:tbl>
-          </a:graphicData>
-        </a:graphic>
-      </p:graphicFrame>
-      <p:sp>
-        <p:nvSpPr>
-          <p:cNvPr id="46" name="Flowchart: Document 45"/>
-          <p:cNvSpPr/>
-          <p:nvPr/>
-        </p:nvSpPr>
-        <p:spPr>
-          <a:xfrm>
-            <a:off x="1932830" y="3551998"/>
-            <a:ext cx="964736" cy="574752"/>
-          </a:xfrm>
-          <a:prstGeom prst="flowChartDocument">
-            <a:avLst/>
-          </a:prstGeom>
-        </p:spPr>
-        <p:style>
-          <a:lnRef idx="1">
-            <a:schemeClr val="accent4"/>
-          </a:lnRef>
-          <a:fillRef idx="3">
-            <a:schemeClr val="accent4"/>
-          </a:fillRef>
-          <a:effectRef idx="2">
-            <a:schemeClr val="accent4"/>
-          </a:effectRef>
-          <a:fontRef idx="minor">
-            <a:schemeClr val="lt1"/>
-          </a:fontRef>
-        </p:style>
-        <p:txBody>
-          <a:bodyPr rtlCol="0" anchor="ctr"/>
-          <a:lstStyle/>
-          <a:p>
-            <a:pPr algn="ctr"/>
-            <a:r>
-              <a:rPr lang="en-US" dirty="0" smtClean="0"/>
-              <a:t>Entity</a:t>
-            </a:r>
-          </a:p>
-        </p:txBody>
-      </p:sp>
-      <p:cxnSp>
-        <p:nvCxnSpPr>
-          <p:cNvPr id="48" name="Straight Arrow Connector 47"/>
-          <p:cNvCxnSpPr/>
-          <p:nvPr/>
-        </p:nvCxnSpPr>
-        <p:spPr>
-          <a:xfrm>
-            <a:off x="7330560" y="3729814"/>
-            <a:ext cx="1965121" cy="0"/>
-          </a:xfrm>
-          <a:prstGeom prst="straightConnector1">
-            <a:avLst/>
-          </a:prstGeom>
-          <a:ln w="57150">
-            <a:solidFill>
-              <a:schemeClr val="accent3">
-                <a:lumMod val="75000"/>
-              </a:schemeClr>
-            </a:solidFill>
-            <a:tailEnd type="triangle"/>
-          </a:ln>
-        </p:spPr>
-        <p:style>
-          <a:lnRef idx="1">
-            <a:schemeClr val="accent1"/>
-          </a:lnRef>
-          <a:fillRef idx="0">
-            <a:schemeClr val="accent1"/>
-          </a:fillRef>
-          <a:effectRef idx="0">
-            <a:schemeClr val="accent1"/>
-          </a:effectRef>
-          <a:fontRef idx="minor">
-            <a:schemeClr val="tx1"/>
-          </a:fontRef>
-        </p:style>
-      </p:cxnSp>
-      <p:sp>
-        <p:nvSpPr>
-          <p:cNvPr id="54" name="Hexagon 53"/>
-          <p:cNvSpPr/>
-          <p:nvPr/>
-        </p:nvSpPr>
-        <p:spPr>
-          <a:xfrm rot="5400000">
-            <a:off x="5773522" y="3007621"/>
-            <a:ext cx="1669689" cy="1444386"/>
-          </a:xfrm>
-          <a:prstGeom prst="hexagon">
-            <a:avLst/>
-          </a:prstGeom>
-          <a:solidFill>
-            <a:schemeClr val="accent3">
-              <a:lumMod val="40000"/>
-              <a:lumOff val="60000"/>
-            </a:schemeClr>
-          </a:solidFill>
-          <a:ln w="38100">
-            <a:solidFill>
-              <a:schemeClr val="accent3">
-                <a:lumMod val="75000"/>
-              </a:schemeClr>
-            </a:solidFill>
-          </a:ln>
-          <a:effectLst>
-            <a:outerShdw blurRad="50800" dist="38100" dir="5400000" algn="t" rotWithShape="0">
-              <a:prstClr val="black">
-                <a:alpha val="40000"/>
-              </a:prstClr>
-            </a:outerShdw>
-          </a:effectLst>
-        </p:spPr>
-        <p:style>
-          <a:lnRef idx="1">
-            <a:schemeClr val="accent3"/>
-          </a:lnRef>
-          <a:fillRef idx="2">
-            <a:schemeClr val="accent3"/>
-          </a:fillRef>
-          <a:effectRef idx="1">
-            <a:schemeClr val="accent3"/>
-          </a:effectRef>
-          <a:fontRef idx="minor">
-            <a:schemeClr val="dk1"/>
-          </a:fontRef>
-        </p:style>
-        <p:txBody>
-          <a:bodyPr rtlCol="0" anchor="ctr"/>
-          <a:lstStyle/>
-          <a:p>
-            <a:pPr algn="ctr"/>
-            <a:endParaRPr lang="en-US" dirty="0"/>
-          </a:p>
-        </p:txBody>
-      </p:sp>
-      <p:sp>
-        <p:nvSpPr>
-          <p:cNvPr id="55" name="Diamond 54"/>
-          <p:cNvSpPr/>
-          <p:nvPr/>
-        </p:nvSpPr>
-        <p:spPr>
-          <a:xfrm>
-            <a:off x="5886174" y="2883495"/>
-            <a:ext cx="1444386" cy="735454"/>
-          </a:xfrm>
-          <a:prstGeom prst="diamond">
-            <a:avLst/>
-          </a:prstGeom>
-          <a:solidFill>
-            <a:schemeClr val="accent3">
-              <a:lumMod val="75000"/>
-            </a:schemeClr>
-          </a:solidFill>
-          <a:ln w="38100">
-            <a:solidFill>
-              <a:schemeClr val="accent3">
-                <a:lumMod val="75000"/>
-              </a:schemeClr>
-            </a:solidFill>
-          </a:ln>
-        </p:spPr>
-        <p:style>
-          <a:lnRef idx="1">
-            <a:schemeClr val="accent3"/>
-          </a:lnRef>
-          <a:fillRef idx="2">
-            <a:schemeClr val="accent3"/>
-          </a:fillRef>
-          <a:effectRef idx="1">
-            <a:schemeClr val="accent3"/>
-          </a:effectRef>
-          <a:fontRef idx="minor">
-            <a:schemeClr val="dk1"/>
-          </a:fontRef>
-        </p:style>
-        <p:txBody>
-          <a:bodyPr rtlCol="0" anchor="ctr"/>
-          <a:lstStyle/>
-          <a:p>
-            <a:pPr algn="ctr"/>
-            <a:endParaRPr lang="en-US"/>
-          </a:p>
-        </p:txBody>
-      </p:sp>
-      <p:sp>
-        <p:nvSpPr>
-          <p:cNvPr id="56" name="TextBox 55"/>
-          <p:cNvSpPr txBox="1"/>
-          <p:nvPr/>
-        </p:nvSpPr>
-        <p:spPr>
-          <a:xfrm>
-            <a:off x="6066386" y="3615514"/>
-            <a:ext cx="1059906" cy="646331"/>
-          </a:xfrm>
-          <a:prstGeom prst="rect">
-            <a:avLst/>
-          </a:prstGeom>
-          <a:noFill/>
-        </p:spPr>
-        <p:txBody>
-          <a:bodyPr wrap="square" rtlCol="0">
-            <a:spAutoFit/>
-          </a:bodyPr>
-          <a:lstStyle/>
-          <a:p>
-            <a:pPr algn="ctr"/>
-            <a:r>
-              <a:rPr lang="en-US" dirty="0" smtClean="0">
-                <a:solidFill>
-                  <a:schemeClr val="accent3">
-                    <a:lumMod val="50000"/>
-                  </a:schemeClr>
-                </a:solidFill>
-              </a:rPr>
-              <a:t>Event</a:t>
-            </a:r>
-          </a:p>
-          <a:p>
-            <a:pPr algn="ctr"/>
-            <a:r>
-              <a:rPr lang="en-US" dirty="0" smtClean="0">
-                <a:solidFill>
-                  <a:schemeClr val="accent3">
-                    <a:lumMod val="50000"/>
-                  </a:schemeClr>
-                </a:solidFill>
-              </a:rPr>
-              <a:t>Publisher</a:t>
-            </a:r>
-            <a:endParaRPr lang="en-US" dirty="0">
-              <a:solidFill>
-                <a:schemeClr val="accent3">
-                  <a:lumMod val="50000"/>
-                </a:schemeClr>
-              </a:solidFill>
-            </a:endParaRPr>
-          </a:p>
-        </p:txBody>
-      </p:sp>
-      <p:cxnSp>
-        <p:nvCxnSpPr>
-          <p:cNvPr id="65" name="Straight Arrow Connector 64"/>
-          <p:cNvCxnSpPr/>
-          <p:nvPr/>
-        </p:nvCxnSpPr>
-        <p:spPr>
-          <a:xfrm flipV="1">
-            <a:off x="4870956" y="4339494"/>
-            <a:ext cx="1195430" cy="1241329"/>
-          </a:xfrm>
-          <a:prstGeom prst="straightConnector1">
-            <a:avLst/>
-          </a:prstGeom>
-          <a:ln w="57150">
-            <a:solidFill>
-              <a:schemeClr val="accent3">
-                <a:lumMod val="75000"/>
-              </a:schemeClr>
-            </a:solidFill>
-            <a:tailEnd type="triangle"/>
-          </a:ln>
-        </p:spPr>
-        <p:style>
-          <a:lnRef idx="1">
-            <a:schemeClr val="accent1"/>
-          </a:lnRef>
-          <a:fillRef idx="0">
-            <a:schemeClr val="accent1"/>
-          </a:fillRef>
-          <a:effectRef idx="0">
-            <a:schemeClr val="accent1"/>
-          </a:effectRef>
-          <a:fontRef idx="minor">
-            <a:schemeClr val="tx1"/>
-          </a:fontRef>
-        </p:style>
-      </p:cxnSp>
-      <p:sp>
-        <p:nvSpPr>
-          <p:cNvPr id="24" name="Rectangle 23"/>
-          <p:cNvSpPr/>
-          <p:nvPr/>
-        </p:nvSpPr>
-        <p:spPr>
-          <a:xfrm>
-            <a:off x="1383878" y="5580823"/>
-            <a:ext cx="3501271" cy="478591"/>
-          </a:xfrm>
-          <a:prstGeom prst="rect">
-            <a:avLst/>
-          </a:prstGeom>
-          <a:ln w="57150">
-            <a:prstDash val="sysDot"/>
-          </a:ln>
-        </p:spPr>
-        <p:style>
-          <a:lnRef idx="1">
-            <a:schemeClr val="accent3"/>
-          </a:lnRef>
-          <a:fillRef idx="2">
-            <a:schemeClr val="accent3"/>
-          </a:fillRef>
-          <a:effectRef idx="1">
-            <a:schemeClr val="accent3"/>
-          </a:effectRef>
-          <a:fontRef idx="minor">
-            <a:schemeClr val="dk1"/>
-          </a:fontRef>
-        </p:style>
-        <p:txBody>
-          <a:bodyPr vert="horz" rtlCol="0" anchor="ctr"/>
-          <a:lstStyle/>
-          <a:p>
-            <a:pPr algn="ctr"/>
-            <a:r>
-              <a:rPr lang="en-US" dirty="0" smtClean="0">
-                <a:solidFill>
-                  <a:schemeClr val="accent3">
-                    <a:lumMod val="50000"/>
-                  </a:schemeClr>
-                </a:solidFill>
-              </a:rPr>
-              <a:t>Transaction Log</a:t>
-            </a:r>
-          </a:p>
-        </p:txBody>
-      </p:sp>
-      <p:sp>
-        <p:nvSpPr>
-          <p:cNvPr id="40" name="Flowchart: Magnetic Disk 39"/>
-          <p:cNvSpPr/>
-          <p:nvPr/>
-        </p:nvSpPr>
-        <p:spPr>
-          <a:xfrm>
-            <a:off x="988550" y="4488758"/>
-            <a:ext cx="4522606" cy="1834872"/>
-          </a:xfrm>
-          <a:prstGeom prst="flowChartMagneticDisk">
-            <a:avLst/>
-          </a:prstGeom>
-          <a:noFill/>
-          <a:ln w="38100">
-            <a:prstDash val="sysDot"/>
-          </a:ln>
-          <a:effectLst>
-            <a:outerShdw blurRad="50800" dist="38100" dir="5400000" algn="t" rotWithShape="0">
-              <a:prstClr val="black">
-                <a:alpha val="40000"/>
-              </a:prstClr>
-            </a:outerShdw>
-          </a:effectLst>
-        </p:spPr>
-        <p:style>
-          <a:lnRef idx="3">
-            <a:schemeClr val="lt1"/>
-          </a:lnRef>
-          <a:fillRef idx="1">
-            <a:schemeClr val="accent1"/>
-          </a:fillRef>
-          <a:effectRef idx="1">
-            <a:schemeClr val="accent1"/>
-          </a:effectRef>
-          <a:fontRef idx="minor">
-            <a:schemeClr val="lt1"/>
-          </a:fontRef>
-        </p:style>
-        <p:txBody>
-          <a:bodyPr rtlCol="0" anchor="ctr"/>
-          <a:lstStyle/>
-          <a:p>
-            <a:pPr algn="ctr"/>
-            <a:endParaRPr lang="en-US"/>
-          </a:p>
-        </p:txBody>
-      </p:sp>
-    </p:spTree>
-    <p:extLst>
-      <p:ext uri="{BB962C8B-B14F-4D97-AF65-F5344CB8AC3E}">
-        <p14:creationId xmlns:p14="http://schemas.microsoft.com/office/powerpoint/2010/main" val="1677658167"/>
       </p:ext>
     </p:extLst>
   </p:cSld>

</xml_diff>

<commit_message>
Set line-width to 120
</commit_message>
<xml_diff>
--- a/t18-event-mongodb.pptx
+++ b/t18-event-mongodb.pptx
@@ -5,7 +5,7 @@
     <p:sldMasterId id="2147483756" r:id="rId1"/>
   </p:sldMasterIdLst>
   <p:notesMasterIdLst>
-    <p:notesMasterId r:id="rId22"/>
+    <p:notesMasterId r:id="rId23"/>
   </p:notesMasterIdLst>
   <p:sldIdLst>
     <p:sldId id="258" r:id="rId2"/>
@@ -28,6 +28,7 @@
     <p:sldId id="272" r:id="rId19"/>
     <p:sldId id="274" r:id="rId20"/>
     <p:sldId id="273" r:id="rId21"/>
+    <p:sldId id="278" r:id="rId22"/>
   </p:sldIdLst>
   <p:sldSz cx="12192000" cy="6858000"/>
   <p:notesSz cx="6858000" cy="9144000"/>
@@ -530,11 +531,7 @@
           <a:p>
             <a:r>
               <a:rPr lang="en-US" baseline="0" dirty="0" smtClean="0"/>
-              <a:t>Talk </a:t>
-            </a:r>
-            <a:r>
-              <a:rPr lang="en-US" baseline="0" dirty="0" smtClean="0"/>
-              <a:t>intro:</a:t>
+              <a:t>Talk intro:</a:t>
             </a:r>
           </a:p>
           <a:p>
@@ -552,13 +549,8 @@
           <a:p>
             <a:r>
               <a:rPr lang="en-US" baseline="0" dirty="0" smtClean="0"/>
-              <a:t>    - Reference implementation with MongoDB and C</a:t>
-            </a:r>
-            <a:r>
-              <a:rPr lang="en-US" baseline="0" dirty="0" smtClean="0"/>
-              <a:t>#</a:t>
-            </a:r>
-            <a:endParaRPr lang="en-US" baseline="0" dirty="0" smtClean="0"/>
+              <a:t>    - Reference implementation with MongoDB and C#</a:t>
+            </a:r>
           </a:p>
         </p:txBody>
       </p:sp>
@@ -1024,18 +1016,12 @@
           <a:p>
             <a:r>
               <a:rPr lang="en-US" dirty="0" smtClean="0"/>
-              <a:t>Stale</a:t>
+              <a:t>Quickly implemented</a:t>
             </a:r>
             <a:r>
               <a:rPr lang="en-US" baseline="0" dirty="0" smtClean="0"/>
-              <a:t> collection r</a:t>
-            </a:r>
-            <a:r>
-              <a:rPr lang="en-US" dirty="0" smtClean="0"/>
-              <a:t>esume issue</a:t>
-            </a:r>
-          </a:p>
-          <a:p>
+              <a:t> it</a:t>
+            </a:r>
             <a:endParaRPr lang="en-US" dirty="0" smtClean="0"/>
           </a:p>
           <a:p>
@@ -1123,7 +1109,41 @@
           <a:bodyPr/>
           <a:lstStyle/>
           <a:p>
-            <a:endParaRPr lang="en-US" dirty="0"/>
+            <a:r>
+              <a:rPr lang="en-US" dirty="0" smtClean="0"/>
+              <a:t>Deployed to staging</a:t>
+            </a:r>
+          </a:p>
+          <a:p>
+            <a:endParaRPr lang="en-US" dirty="0" smtClean="0"/>
+          </a:p>
+          <a:p>
+            <a:r>
+              <a:rPr lang="en-US" dirty="0" smtClean="0"/>
+              <a:t>Stale</a:t>
+            </a:r>
+            <a:r>
+              <a:rPr lang="en-US" baseline="0" dirty="0" smtClean="0"/>
+              <a:t> r</a:t>
+            </a:r>
+            <a:r>
+              <a:rPr lang="en-US" dirty="0" smtClean="0"/>
+              <a:t>esume token issue</a:t>
+            </a:r>
+          </a:p>
+          <a:p>
+            <a:endParaRPr lang="en-US" dirty="0" smtClean="0"/>
+          </a:p>
+          <a:p>
+            <a:r>
+              <a:rPr lang="en-US" dirty="0" smtClean="0"/>
+              <a:t>Failed to upgrade to MongoDB</a:t>
+            </a:r>
+            <a:r>
+              <a:rPr lang="en-US" baseline="0" dirty="0" smtClean="0"/>
+              <a:t> 3.6 on prod</a:t>
+            </a:r>
+            <a:endParaRPr lang="en-US" dirty="0" smtClean="0"/>
           </a:p>
         </p:txBody>
       </p:sp>
@@ -1226,13 +1246,16 @@
             </a:pPr>
             <a:r>
               <a:rPr lang="en-US" dirty="0" smtClean="0"/>
-              <a:t>3.4</a:t>
+              <a:t>Stale</a:t>
             </a:r>
             <a:r>
               <a:rPr lang="en-US" baseline="0" dirty="0" smtClean="0"/>
-              <a:t> to 3.6 upgrade issue</a:t>
-            </a:r>
-            <a:endParaRPr lang="en-US" dirty="0" smtClean="0"/>
+              <a:t> r</a:t>
+            </a:r>
+            <a:r>
+              <a:rPr lang="en-US" dirty="0" smtClean="0"/>
+              <a:t>esume token issue</a:t>
+            </a:r>
           </a:p>
         </p:txBody>
       </p:sp>
@@ -1316,6 +1339,31 @@
           <a:bodyPr/>
           <a:lstStyle/>
           <a:p>
+            <a:pPr marL="0" marR="0" lvl="0" indent="0" algn="l" defTabSz="914400" rtl="0" eaLnBrk="1" fontAlgn="auto" latinLnBrk="0" hangingPunct="1">
+              <a:lnSpc>
+                <a:spcPct val="100000"/>
+              </a:lnSpc>
+              <a:spcBef>
+                <a:spcPts val="0"/>
+              </a:spcBef>
+              <a:spcAft>
+                <a:spcPts val="0"/>
+              </a:spcAft>
+              <a:buClrTx/>
+              <a:buSzTx/>
+              <a:buFontTx/>
+              <a:buNone/>
+              <a:tabLst/>
+              <a:defRPr/>
+            </a:pPr>
+            <a:r>
+              <a:rPr lang="en-US" dirty="0" smtClean="0"/>
+              <a:t>3.4</a:t>
+            </a:r>
+            <a:r>
+              <a:rPr lang="en-US" baseline="0" dirty="0" smtClean="0"/>
+              <a:t> to 3.6 upgrade issue</a:t>
+            </a:r>
             <a:endParaRPr lang="en-US" dirty="0"/>
           </a:p>
         </p:txBody>
@@ -1597,7 +1645,6 @@
               <a:rPr lang="en-US" baseline="0" dirty="0" smtClean="0"/>
               <a:t> on videos.</a:t>
             </a:r>
-            <a:endParaRPr lang="en-US" baseline="0" dirty="0" smtClean="0"/>
           </a:p>
         </p:txBody>
       </p:sp>
@@ -1730,6 +1777,112 @@
     <p:extLst>
       <p:ext uri="{BB962C8B-B14F-4D97-AF65-F5344CB8AC3E}">
         <p14:creationId xmlns:p14="http://schemas.microsoft.com/office/powerpoint/2010/main" val="1263657375"/>
+      </p:ext>
+    </p:extLst>
+  </p:cSld>
+  <p:clrMapOvr>
+    <a:masterClrMapping/>
+  </p:clrMapOvr>
+</p:notes>
+</file>
+
+<file path=ppt/notesSlides/notesSlide21.xml><?xml version="1.0" encoding="utf-8"?>
+<p:notes xmlns:a="http://schemas.openxmlformats.org/drawingml/2006/main" xmlns:r="http://schemas.openxmlformats.org/officeDocument/2006/relationships" xmlns:p="http://schemas.openxmlformats.org/presentationml/2006/main">
+  <p:cSld>
+    <p:spTree>
+      <p:nvGrpSpPr>
+        <p:cNvPr id="1" name=""/>
+        <p:cNvGrpSpPr/>
+        <p:nvPr/>
+      </p:nvGrpSpPr>
+      <p:grpSpPr>
+        <a:xfrm>
+          <a:off x="0" y="0"/>
+          <a:ext cx="0" cy="0"/>
+          <a:chOff x="0" y="0"/>
+          <a:chExt cx="0" cy="0"/>
+        </a:xfrm>
+      </p:grpSpPr>
+      <p:sp>
+        <p:nvSpPr>
+          <p:cNvPr id="2" name="Slide Image Placeholder 1"/>
+          <p:cNvSpPr>
+            <a:spLocks noGrp="1" noRot="1" noChangeAspect="1"/>
+          </p:cNvSpPr>
+          <p:nvPr>
+            <p:ph type="sldImg"/>
+          </p:nvPr>
+        </p:nvSpPr>
+        <p:spPr/>
+      </p:sp>
+      <p:sp>
+        <p:nvSpPr>
+          <p:cNvPr id="3" name="Notes Placeholder 2"/>
+          <p:cNvSpPr>
+            <a:spLocks noGrp="1"/>
+          </p:cNvSpPr>
+          <p:nvPr>
+            <p:ph type="body" idx="1"/>
+          </p:nvPr>
+        </p:nvSpPr>
+        <p:spPr/>
+        <p:txBody>
+          <a:bodyPr/>
+          <a:lstStyle/>
+          <a:p>
+            <a:r>
+              <a:rPr lang="en-US" dirty="0" smtClean="0"/>
+              <a:t>State change notifications</a:t>
+            </a:r>
+          </a:p>
+          <a:p>
+            <a:endParaRPr lang="en-US" dirty="0" smtClean="0"/>
+          </a:p>
+          <a:p>
+            <a:r>
+              <a:rPr lang="en-US" dirty="0" smtClean="0"/>
+              <a:t>Reactive</a:t>
+            </a:r>
+          </a:p>
+          <a:p>
+            <a:endParaRPr lang="en-US" dirty="0" smtClean="0"/>
+          </a:p>
+          <a:p>
+            <a:r>
+              <a:rPr lang="en-US" dirty="0" smtClean="0"/>
+              <a:t>Can make decisions independently (in isolation)</a:t>
+            </a:r>
+            <a:endParaRPr lang="en-US" dirty="0"/>
+          </a:p>
+        </p:txBody>
+      </p:sp>
+      <p:sp>
+        <p:nvSpPr>
+          <p:cNvPr id="4" name="Slide Number Placeholder 3"/>
+          <p:cNvSpPr>
+            <a:spLocks noGrp="1"/>
+          </p:cNvSpPr>
+          <p:nvPr>
+            <p:ph type="sldNum" sz="quarter" idx="10"/>
+          </p:nvPr>
+        </p:nvSpPr>
+        <p:spPr/>
+        <p:txBody>
+          <a:bodyPr/>
+          <a:lstStyle/>
+          <a:p>
+            <a:fld id="{40EA4F9F-6CEF-4B9D-BEB3-40FCF0DF71AE}" type="slidenum">
+              <a:rPr lang="en-US" smtClean="0"/>
+              <a:t>21</a:t>
+            </a:fld>
+            <a:endParaRPr lang="en-US"/>
+          </a:p>
+        </p:txBody>
+      </p:sp>
+    </p:spTree>
+    <p:extLst>
+      <p:ext uri="{BB962C8B-B14F-4D97-AF65-F5344CB8AC3E}">
+        <p14:creationId xmlns:p14="http://schemas.microsoft.com/office/powerpoint/2010/main" val="3052783767"/>
       </p:ext>
     </p:extLst>
   </p:cSld>
@@ -10286,11 +10439,7 @@
           <a:p>
             <a:r>
               <a:rPr lang="en-US" dirty="0" smtClean="0"/>
-              <a:t>About </a:t>
-            </a:r>
-            <a:r>
-              <a:rPr lang="en-US" dirty="0" smtClean="0"/>
-              <a:t>me</a:t>
+              <a:t>About me</a:t>
             </a:r>
             <a:endParaRPr lang="en-US" dirty="0"/>
           </a:p>
@@ -10502,6 +10651,1045 @@
 </p:sld>
 </file>
 
+<file path=ppt/slides/slide21.xml><?xml version="1.0" encoding="utf-8"?>
+<p:sld xmlns:a="http://schemas.openxmlformats.org/drawingml/2006/main" xmlns:r="http://schemas.openxmlformats.org/officeDocument/2006/relationships" xmlns:p="http://schemas.openxmlformats.org/presentationml/2006/main">
+  <p:cSld>
+    <p:spTree>
+      <p:nvGrpSpPr>
+        <p:cNvPr id="1" name=""/>
+        <p:cNvGrpSpPr/>
+        <p:nvPr/>
+      </p:nvGrpSpPr>
+      <p:grpSpPr>
+        <a:xfrm>
+          <a:off x="0" y="0"/>
+          <a:ext cx="0" cy="0"/>
+          <a:chOff x="0" y="0"/>
+          <a:chExt cx="0" cy="0"/>
+        </a:xfrm>
+      </p:grpSpPr>
+      <p:cxnSp>
+        <p:nvCxnSpPr>
+          <p:cNvPr id="37" name="Straight Arrow Connector 36"/>
+          <p:cNvCxnSpPr/>
+          <p:nvPr/>
+        </p:nvCxnSpPr>
+        <p:spPr>
+          <a:xfrm>
+            <a:off x="7952185" y="1854227"/>
+            <a:ext cx="1961878" cy="6501"/>
+          </a:xfrm>
+          <a:prstGeom prst="straightConnector1">
+            <a:avLst/>
+          </a:prstGeom>
+          <a:ln w="57150">
+            <a:solidFill>
+              <a:schemeClr val="accent3">
+                <a:lumMod val="75000"/>
+              </a:schemeClr>
+            </a:solidFill>
+            <a:tailEnd type="triangle"/>
+          </a:ln>
+        </p:spPr>
+        <p:style>
+          <a:lnRef idx="1">
+            <a:schemeClr val="accent1"/>
+          </a:lnRef>
+          <a:fillRef idx="0">
+            <a:schemeClr val="accent1"/>
+          </a:fillRef>
+          <a:effectRef idx="0">
+            <a:schemeClr val="accent1"/>
+          </a:effectRef>
+          <a:fontRef idx="minor">
+            <a:schemeClr val="tx1"/>
+          </a:fontRef>
+        </p:style>
+      </p:cxnSp>
+      <p:sp>
+        <p:nvSpPr>
+          <p:cNvPr id="4" name="Hexagon 3"/>
+          <p:cNvSpPr/>
+          <p:nvPr/>
+        </p:nvSpPr>
+        <p:spPr>
+          <a:xfrm rot="5400000">
+            <a:off x="1431130" y="1417446"/>
+            <a:ext cx="1669689" cy="1444386"/>
+          </a:xfrm>
+          <a:prstGeom prst="hexagon">
+            <a:avLst/>
+          </a:prstGeom>
+          <a:solidFill>
+            <a:schemeClr val="accent3">
+              <a:lumMod val="40000"/>
+              <a:lumOff val="60000"/>
+            </a:schemeClr>
+          </a:solidFill>
+          <a:ln w="38100">
+            <a:solidFill>
+              <a:schemeClr val="accent3">
+                <a:lumMod val="75000"/>
+              </a:schemeClr>
+            </a:solidFill>
+          </a:ln>
+          <a:effectLst>
+            <a:outerShdw blurRad="50800" dist="38100" dir="5400000" algn="t" rotWithShape="0">
+              <a:prstClr val="black">
+                <a:alpha val="40000"/>
+              </a:prstClr>
+            </a:outerShdw>
+          </a:effectLst>
+        </p:spPr>
+        <p:style>
+          <a:lnRef idx="1">
+            <a:schemeClr val="accent3"/>
+          </a:lnRef>
+          <a:fillRef idx="2">
+            <a:schemeClr val="accent3"/>
+          </a:fillRef>
+          <a:effectRef idx="1">
+            <a:schemeClr val="accent3"/>
+          </a:effectRef>
+          <a:fontRef idx="minor">
+            <a:schemeClr val="dk1"/>
+          </a:fontRef>
+        </p:style>
+        <p:txBody>
+          <a:bodyPr rtlCol="0" anchor="ctr"/>
+          <a:lstStyle/>
+          <a:p>
+            <a:pPr algn="ctr"/>
+            <a:endParaRPr lang="en-US" dirty="0"/>
+          </a:p>
+        </p:txBody>
+      </p:sp>
+      <p:sp>
+        <p:nvSpPr>
+          <p:cNvPr id="5" name="Diamond 4"/>
+          <p:cNvSpPr/>
+          <p:nvPr/>
+        </p:nvSpPr>
+        <p:spPr>
+          <a:xfrm>
+            <a:off x="1543782" y="1293320"/>
+            <a:ext cx="1444386" cy="735454"/>
+          </a:xfrm>
+          <a:prstGeom prst="diamond">
+            <a:avLst/>
+          </a:prstGeom>
+          <a:solidFill>
+            <a:schemeClr val="accent3">
+              <a:lumMod val="75000"/>
+            </a:schemeClr>
+          </a:solidFill>
+          <a:ln w="38100">
+            <a:solidFill>
+              <a:schemeClr val="accent3">
+                <a:lumMod val="75000"/>
+              </a:schemeClr>
+            </a:solidFill>
+          </a:ln>
+        </p:spPr>
+        <p:style>
+          <a:lnRef idx="1">
+            <a:schemeClr val="accent3"/>
+          </a:lnRef>
+          <a:fillRef idx="2">
+            <a:schemeClr val="accent3"/>
+          </a:fillRef>
+          <a:effectRef idx="1">
+            <a:schemeClr val="accent3"/>
+          </a:effectRef>
+          <a:fontRef idx="minor">
+            <a:schemeClr val="dk1"/>
+          </a:fontRef>
+        </p:style>
+        <p:txBody>
+          <a:bodyPr rtlCol="0" anchor="ctr"/>
+          <a:lstStyle/>
+          <a:p>
+            <a:pPr algn="ctr"/>
+            <a:endParaRPr lang="en-US"/>
+          </a:p>
+        </p:txBody>
+      </p:sp>
+      <p:sp>
+        <p:nvSpPr>
+          <p:cNvPr id="2" name="TextBox 1"/>
+          <p:cNvSpPr txBox="1"/>
+          <p:nvPr/>
+        </p:nvSpPr>
+        <p:spPr>
+          <a:xfrm>
+            <a:off x="1857302" y="2139639"/>
+            <a:ext cx="817147" cy="369332"/>
+          </a:xfrm>
+          <a:prstGeom prst="rect">
+            <a:avLst/>
+          </a:prstGeom>
+          <a:noFill/>
+        </p:spPr>
+        <p:txBody>
+          <a:bodyPr wrap="none" rtlCol="0">
+            <a:spAutoFit/>
+          </a:bodyPr>
+          <a:lstStyle/>
+          <a:p>
+            <a:r>
+              <a:rPr lang="en-US" dirty="0" smtClean="0">
+                <a:solidFill>
+                  <a:schemeClr val="accent3">
+                    <a:lumMod val="50000"/>
+                  </a:schemeClr>
+                </a:solidFill>
+              </a:rPr>
+              <a:t>Orders</a:t>
+            </a:r>
+            <a:endParaRPr lang="en-US" dirty="0">
+              <a:solidFill>
+                <a:schemeClr val="accent3">
+                  <a:lumMod val="50000"/>
+                </a:schemeClr>
+              </a:solidFill>
+            </a:endParaRPr>
+          </a:p>
+        </p:txBody>
+      </p:sp>
+      <p:sp>
+        <p:nvSpPr>
+          <p:cNvPr id="6" name="Hexagon 5"/>
+          <p:cNvSpPr/>
+          <p:nvPr/>
+        </p:nvSpPr>
+        <p:spPr>
+          <a:xfrm rot="5400000">
+            <a:off x="9801412" y="1397529"/>
+            <a:ext cx="1669689" cy="1444386"/>
+          </a:xfrm>
+          <a:prstGeom prst="hexagon">
+            <a:avLst/>
+          </a:prstGeom>
+          <a:solidFill>
+            <a:schemeClr val="accent3">
+              <a:lumMod val="40000"/>
+              <a:lumOff val="60000"/>
+            </a:schemeClr>
+          </a:solidFill>
+          <a:ln w="38100">
+            <a:solidFill>
+              <a:schemeClr val="accent3">
+                <a:lumMod val="75000"/>
+              </a:schemeClr>
+            </a:solidFill>
+          </a:ln>
+          <a:effectLst>
+            <a:outerShdw blurRad="50800" dist="38100" dir="5400000" algn="t" rotWithShape="0">
+              <a:prstClr val="black">
+                <a:alpha val="40000"/>
+              </a:prstClr>
+            </a:outerShdw>
+          </a:effectLst>
+        </p:spPr>
+        <p:style>
+          <a:lnRef idx="1">
+            <a:schemeClr val="accent3"/>
+          </a:lnRef>
+          <a:fillRef idx="2">
+            <a:schemeClr val="accent3"/>
+          </a:fillRef>
+          <a:effectRef idx="1">
+            <a:schemeClr val="accent3"/>
+          </a:effectRef>
+          <a:fontRef idx="minor">
+            <a:schemeClr val="dk1"/>
+          </a:fontRef>
+        </p:style>
+        <p:txBody>
+          <a:bodyPr rtlCol="0" anchor="ctr"/>
+          <a:lstStyle/>
+          <a:p>
+            <a:pPr algn="ctr"/>
+            <a:endParaRPr lang="en-US" dirty="0"/>
+          </a:p>
+        </p:txBody>
+      </p:sp>
+      <p:sp>
+        <p:nvSpPr>
+          <p:cNvPr id="7" name="Diamond 6"/>
+          <p:cNvSpPr/>
+          <p:nvPr/>
+        </p:nvSpPr>
+        <p:spPr>
+          <a:xfrm>
+            <a:off x="9914064" y="1273403"/>
+            <a:ext cx="1444386" cy="735454"/>
+          </a:xfrm>
+          <a:prstGeom prst="diamond">
+            <a:avLst/>
+          </a:prstGeom>
+          <a:solidFill>
+            <a:schemeClr val="accent3">
+              <a:lumMod val="75000"/>
+            </a:schemeClr>
+          </a:solidFill>
+          <a:ln w="38100">
+            <a:solidFill>
+              <a:schemeClr val="accent3">
+                <a:lumMod val="75000"/>
+              </a:schemeClr>
+            </a:solidFill>
+          </a:ln>
+        </p:spPr>
+        <p:style>
+          <a:lnRef idx="1">
+            <a:schemeClr val="accent3"/>
+          </a:lnRef>
+          <a:fillRef idx="2">
+            <a:schemeClr val="accent3"/>
+          </a:fillRef>
+          <a:effectRef idx="1">
+            <a:schemeClr val="accent3"/>
+          </a:effectRef>
+          <a:fontRef idx="minor">
+            <a:schemeClr val="dk1"/>
+          </a:fontRef>
+        </p:style>
+        <p:txBody>
+          <a:bodyPr rtlCol="0" anchor="ctr"/>
+          <a:lstStyle/>
+          <a:p>
+            <a:pPr algn="ctr"/>
+            <a:endParaRPr lang="en-US"/>
+          </a:p>
+        </p:txBody>
+      </p:sp>
+      <p:sp>
+        <p:nvSpPr>
+          <p:cNvPr id="8" name="TextBox 7"/>
+          <p:cNvSpPr txBox="1"/>
+          <p:nvPr/>
+        </p:nvSpPr>
+        <p:spPr>
+          <a:xfrm>
+            <a:off x="10086908" y="2119722"/>
+            <a:ext cx="1095043" cy="369332"/>
+          </a:xfrm>
+          <a:prstGeom prst="rect">
+            <a:avLst/>
+          </a:prstGeom>
+          <a:noFill/>
+        </p:spPr>
+        <p:txBody>
+          <a:bodyPr wrap="none" rtlCol="0">
+            <a:spAutoFit/>
+          </a:bodyPr>
+          <a:lstStyle/>
+          <a:p>
+            <a:r>
+              <a:rPr lang="en-US" dirty="0" smtClean="0">
+                <a:solidFill>
+                  <a:schemeClr val="accent3">
+                    <a:lumMod val="50000"/>
+                  </a:schemeClr>
+                </a:solidFill>
+              </a:rPr>
+              <a:t>Payments</a:t>
+            </a:r>
+          </a:p>
+        </p:txBody>
+      </p:sp>
+      <p:sp>
+        <p:nvSpPr>
+          <p:cNvPr id="3" name="Flowchart: Magnetic Disk 2"/>
+          <p:cNvSpPr/>
+          <p:nvPr/>
+        </p:nvSpPr>
+        <p:spPr>
+          <a:xfrm>
+            <a:off x="1543781" y="5146447"/>
+            <a:ext cx="1444387" cy="1324708"/>
+          </a:xfrm>
+          <a:prstGeom prst="flowChartMagneticDisk">
+            <a:avLst/>
+          </a:prstGeom>
+          <a:ln w="38100"/>
+          <a:effectLst>
+            <a:outerShdw blurRad="50800" dist="38100" dir="5400000" algn="t" rotWithShape="0">
+              <a:prstClr val="black">
+                <a:alpha val="40000"/>
+              </a:prstClr>
+            </a:outerShdw>
+          </a:effectLst>
+        </p:spPr>
+        <p:style>
+          <a:lnRef idx="3">
+            <a:schemeClr val="lt1"/>
+          </a:lnRef>
+          <a:fillRef idx="1">
+            <a:schemeClr val="accent1"/>
+          </a:fillRef>
+          <a:effectRef idx="1">
+            <a:schemeClr val="accent1"/>
+          </a:effectRef>
+          <a:fontRef idx="minor">
+            <a:schemeClr val="lt1"/>
+          </a:fontRef>
+        </p:style>
+        <p:txBody>
+          <a:bodyPr rtlCol="0" anchor="ctr"/>
+          <a:lstStyle/>
+          <a:p>
+            <a:pPr algn="ctr"/>
+            <a:endParaRPr lang="en-US"/>
+          </a:p>
+        </p:txBody>
+      </p:sp>
+      <p:cxnSp>
+        <p:nvCxnSpPr>
+          <p:cNvPr id="10" name="Straight Arrow Connector 9"/>
+          <p:cNvCxnSpPr>
+            <a:stCxn id="4" idx="0"/>
+            <a:endCxn id="3" idx="1"/>
+          </p:cNvCxnSpPr>
+          <p:nvPr/>
+        </p:nvCxnSpPr>
+        <p:spPr>
+          <a:xfrm>
+            <a:off x="2265975" y="2974484"/>
+            <a:ext cx="0" cy="2171963"/>
+          </a:xfrm>
+          <a:prstGeom prst="straightConnector1">
+            <a:avLst/>
+          </a:prstGeom>
+          <a:ln w="57150">
+            <a:solidFill>
+              <a:schemeClr val="accent3">
+                <a:lumMod val="75000"/>
+              </a:schemeClr>
+            </a:solidFill>
+            <a:tailEnd type="triangle"/>
+          </a:ln>
+        </p:spPr>
+        <p:style>
+          <a:lnRef idx="1">
+            <a:schemeClr val="accent1"/>
+          </a:lnRef>
+          <a:fillRef idx="0">
+            <a:schemeClr val="accent1"/>
+          </a:fillRef>
+          <a:effectRef idx="0">
+            <a:schemeClr val="accent1"/>
+          </a:effectRef>
+          <a:fontRef idx="minor">
+            <a:schemeClr val="tx1"/>
+          </a:fontRef>
+        </p:style>
+      </p:cxnSp>
+      <p:cxnSp>
+        <p:nvCxnSpPr>
+          <p:cNvPr id="11" name="Straight Arrow Connector 10"/>
+          <p:cNvCxnSpPr/>
+          <p:nvPr/>
+        </p:nvCxnSpPr>
+        <p:spPr>
+          <a:xfrm flipV="1">
+            <a:off x="2988167" y="1855777"/>
+            <a:ext cx="3592416" cy="11473"/>
+          </a:xfrm>
+          <a:prstGeom prst="straightConnector1">
+            <a:avLst/>
+          </a:prstGeom>
+          <a:ln w="57150">
+            <a:solidFill>
+              <a:schemeClr val="accent3">
+                <a:lumMod val="75000"/>
+              </a:schemeClr>
+            </a:solidFill>
+            <a:tailEnd type="triangle"/>
+          </a:ln>
+        </p:spPr>
+        <p:style>
+          <a:lnRef idx="1">
+            <a:schemeClr val="accent1"/>
+          </a:lnRef>
+          <a:fillRef idx="0">
+            <a:schemeClr val="accent1"/>
+          </a:fillRef>
+          <a:effectRef idx="0">
+            <a:schemeClr val="accent1"/>
+          </a:effectRef>
+          <a:fontRef idx="minor">
+            <a:schemeClr val="tx1"/>
+          </a:fontRef>
+        </p:style>
+      </p:cxnSp>
+      <p:sp>
+        <p:nvSpPr>
+          <p:cNvPr id="35" name="Rectangle 34"/>
+          <p:cNvSpPr/>
+          <p:nvPr/>
+        </p:nvSpPr>
+        <p:spPr>
+          <a:xfrm>
+            <a:off x="6580584" y="242393"/>
+            <a:ext cx="1371600" cy="6154615"/>
+          </a:xfrm>
+          <a:prstGeom prst="rect">
+            <a:avLst/>
+          </a:prstGeom>
+          <a:ln w="57150">
+            <a:prstDash val="sysDot"/>
+          </a:ln>
+        </p:spPr>
+        <p:style>
+          <a:lnRef idx="1">
+            <a:schemeClr val="accent3"/>
+          </a:lnRef>
+          <a:fillRef idx="2">
+            <a:schemeClr val="accent3"/>
+          </a:fillRef>
+          <a:effectRef idx="1">
+            <a:schemeClr val="accent3"/>
+          </a:effectRef>
+          <a:fontRef idx="minor">
+            <a:schemeClr val="dk1"/>
+          </a:fontRef>
+        </p:style>
+        <p:txBody>
+          <a:bodyPr vert="wordArtVert" rtlCol="0" anchor="ctr"/>
+          <a:lstStyle/>
+          <a:p>
+            <a:pPr algn="ctr"/>
+            <a:r>
+              <a:rPr lang="en-US" dirty="0" smtClean="0">
+                <a:solidFill>
+                  <a:schemeClr val="accent3">
+                    <a:lumMod val="50000"/>
+                  </a:schemeClr>
+                </a:solidFill>
+              </a:rPr>
+              <a:t>Message broker</a:t>
+            </a:r>
+          </a:p>
+        </p:txBody>
+      </p:sp>
+      <p:cxnSp>
+        <p:nvCxnSpPr>
+          <p:cNvPr id="21" name="Straight Arrow Connector 20"/>
+          <p:cNvCxnSpPr>
+            <a:endCxn id="4" idx="3"/>
+          </p:cNvCxnSpPr>
+          <p:nvPr/>
+        </p:nvCxnSpPr>
+        <p:spPr>
+          <a:xfrm>
+            <a:off x="2265973" y="342735"/>
+            <a:ext cx="2" cy="962060"/>
+          </a:xfrm>
+          <a:prstGeom prst="straightConnector1">
+            <a:avLst/>
+          </a:prstGeom>
+          <a:ln w="57150">
+            <a:solidFill>
+              <a:schemeClr val="accent3">
+                <a:lumMod val="75000"/>
+              </a:schemeClr>
+            </a:solidFill>
+            <a:tailEnd type="triangle"/>
+          </a:ln>
+        </p:spPr>
+        <p:style>
+          <a:lnRef idx="1">
+            <a:schemeClr val="accent1"/>
+          </a:lnRef>
+          <a:fillRef idx="0">
+            <a:schemeClr val="accent1"/>
+          </a:fillRef>
+          <a:effectRef idx="0">
+            <a:schemeClr val="accent1"/>
+          </a:effectRef>
+          <a:fontRef idx="minor">
+            <a:schemeClr val="tx1"/>
+          </a:fontRef>
+        </p:style>
+      </p:cxnSp>
+      <p:sp>
+        <p:nvSpPr>
+          <p:cNvPr id="24" name="Flowchart: Document 23"/>
+          <p:cNvSpPr/>
+          <p:nvPr/>
+        </p:nvSpPr>
+        <p:spPr>
+          <a:xfrm>
+            <a:off x="750399" y="430895"/>
+            <a:ext cx="1251115" cy="785740"/>
+          </a:xfrm>
+          <a:prstGeom prst="flowChartDocument">
+            <a:avLst/>
+          </a:prstGeom>
+        </p:spPr>
+        <p:style>
+          <a:lnRef idx="1">
+            <a:schemeClr val="accent2"/>
+          </a:lnRef>
+          <a:fillRef idx="3">
+            <a:schemeClr val="accent2"/>
+          </a:fillRef>
+          <a:effectRef idx="2">
+            <a:schemeClr val="accent2"/>
+          </a:effectRef>
+          <a:fontRef idx="minor">
+            <a:schemeClr val="lt1"/>
+          </a:fontRef>
+        </p:style>
+        <p:txBody>
+          <a:bodyPr rtlCol="0" anchor="ctr"/>
+          <a:lstStyle/>
+          <a:p>
+            <a:pPr algn="ctr"/>
+            <a:r>
+              <a:rPr lang="en-US" dirty="0" err="1" smtClean="0"/>
+              <a:t>PlaceOrder</a:t>
+            </a:r>
+            <a:endParaRPr lang="en-US" dirty="0" smtClean="0"/>
+          </a:p>
+        </p:txBody>
+      </p:sp>
+      <p:sp>
+        <p:nvSpPr>
+          <p:cNvPr id="25" name="Flowchart: Document 24"/>
+          <p:cNvSpPr/>
+          <p:nvPr/>
+        </p:nvSpPr>
+        <p:spPr>
+          <a:xfrm>
+            <a:off x="2559456" y="3900783"/>
+            <a:ext cx="1251115" cy="785740"/>
+          </a:xfrm>
+          <a:prstGeom prst="flowChartDocument">
+            <a:avLst/>
+          </a:prstGeom>
+        </p:spPr>
+        <p:style>
+          <a:lnRef idx="1">
+            <a:schemeClr val="accent4"/>
+          </a:lnRef>
+          <a:fillRef idx="3">
+            <a:schemeClr val="accent4"/>
+          </a:fillRef>
+          <a:effectRef idx="2">
+            <a:schemeClr val="accent4"/>
+          </a:effectRef>
+          <a:fontRef idx="minor">
+            <a:schemeClr val="lt1"/>
+          </a:fontRef>
+        </p:style>
+        <p:txBody>
+          <a:bodyPr rtlCol="0" anchor="ctr"/>
+          <a:lstStyle/>
+          <a:p>
+            <a:pPr algn="ctr"/>
+            <a:r>
+              <a:rPr lang="en-US" dirty="0" smtClean="0"/>
+              <a:t>Order</a:t>
+            </a:r>
+          </a:p>
+        </p:txBody>
+      </p:sp>
+      <p:sp>
+        <p:nvSpPr>
+          <p:cNvPr id="26" name="Flowchart: Document 25"/>
+          <p:cNvSpPr/>
+          <p:nvPr/>
+        </p:nvSpPr>
+        <p:spPr>
+          <a:xfrm>
+            <a:off x="4156024" y="846947"/>
+            <a:ext cx="1251115" cy="785740"/>
+          </a:xfrm>
+          <a:prstGeom prst="flowChartDocument">
+            <a:avLst/>
+          </a:prstGeom>
+        </p:spPr>
+        <p:style>
+          <a:lnRef idx="1">
+            <a:schemeClr val="accent6"/>
+          </a:lnRef>
+          <a:fillRef idx="3">
+            <a:schemeClr val="accent6"/>
+          </a:fillRef>
+          <a:effectRef idx="2">
+            <a:schemeClr val="accent6"/>
+          </a:effectRef>
+          <a:fontRef idx="minor">
+            <a:schemeClr val="lt1"/>
+          </a:fontRef>
+        </p:style>
+        <p:txBody>
+          <a:bodyPr rtlCol="0" anchor="ctr"/>
+          <a:lstStyle/>
+          <a:p>
+            <a:pPr algn="ctr"/>
+            <a:r>
+              <a:rPr lang="en-US" dirty="0" smtClean="0"/>
+              <a:t>Order Placed</a:t>
+            </a:r>
+          </a:p>
+        </p:txBody>
+      </p:sp>
+      <p:sp>
+        <p:nvSpPr>
+          <p:cNvPr id="27" name="Flowchart: Document 26"/>
+          <p:cNvSpPr/>
+          <p:nvPr/>
+        </p:nvSpPr>
+        <p:spPr>
+          <a:xfrm>
+            <a:off x="8307566" y="846947"/>
+            <a:ext cx="1251115" cy="785740"/>
+          </a:xfrm>
+          <a:prstGeom prst="flowChartDocument">
+            <a:avLst/>
+          </a:prstGeom>
+        </p:spPr>
+        <p:style>
+          <a:lnRef idx="1">
+            <a:schemeClr val="accent6"/>
+          </a:lnRef>
+          <a:fillRef idx="3">
+            <a:schemeClr val="accent6"/>
+          </a:fillRef>
+          <a:effectRef idx="2">
+            <a:schemeClr val="accent6"/>
+          </a:effectRef>
+          <a:fontRef idx="minor">
+            <a:schemeClr val="lt1"/>
+          </a:fontRef>
+        </p:style>
+        <p:txBody>
+          <a:bodyPr rtlCol="0" anchor="ctr"/>
+          <a:lstStyle/>
+          <a:p>
+            <a:pPr algn="ctr"/>
+            <a:r>
+              <a:rPr lang="en-US" dirty="0"/>
+              <a:t>Order Placed</a:t>
+            </a:r>
+          </a:p>
+        </p:txBody>
+      </p:sp>
+      <p:cxnSp>
+        <p:nvCxnSpPr>
+          <p:cNvPr id="28" name="Straight Arrow Connector 27"/>
+          <p:cNvCxnSpPr/>
+          <p:nvPr/>
+        </p:nvCxnSpPr>
+        <p:spPr>
+          <a:xfrm rot="10800000">
+            <a:off x="7952184" y="2180092"/>
+            <a:ext cx="1961878" cy="6501"/>
+          </a:xfrm>
+          <a:prstGeom prst="straightConnector1">
+            <a:avLst/>
+          </a:prstGeom>
+          <a:ln w="57150">
+            <a:solidFill>
+              <a:schemeClr val="accent3">
+                <a:lumMod val="75000"/>
+              </a:schemeClr>
+            </a:solidFill>
+            <a:tailEnd type="triangle"/>
+          </a:ln>
+        </p:spPr>
+        <p:style>
+          <a:lnRef idx="1">
+            <a:schemeClr val="accent1"/>
+          </a:lnRef>
+          <a:fillRef idx="0">
+            <a:schemeClr val="accent1"/>
+          </a:fillRef>
+          <a:effectRef idx="0">
+            <a:schemeClr val="accent1"/>
+          </a:effectRef>
+          <a:fontRef idx="minor">
+            <a:schemeClr val="tx1"/>
+          </a:fontRef>
+        </p:style>
+      </p:cxnSp>
+      <p:sp>
+        <p:nvSpPr>
+          <p:cNvPr id="29" name="Flowchart: Document 28"/>
+          <p:cNvSpPr/>
+          <p:nvPr/>
+        </p:nvSpPr>
+        <p:spPr>
+          <a:xfrm>
+            <a:off x="8307565" y="2505958"/>
+            <a:ext cx="1251115" cy="785740"/>
+          </a:xfrm>
+          <a:prstGeom prst="flowChartDocument">
+            <a:avLst/>
+          </a:prstGeom>
+        </p:spPr>
+        <p:style>
+          <a:lnRef idx="1">
+            <a:schemeClr val="accent6"/>
+          </a:lnRef>
+          <a:fillRef idx="3">
+            <a:schemeClr val="accent6"/>
+          </a:fillRef>
+          <a:effectRef idx="2">
+            <a:schemeClr val="accent6"/>
+          </a:effectRef>
+          <a:fontRef idx="minor">
+            <a:schemeClr val="lt1"/>
+          </a:fontRef>
+        </p:style>
+        <p:txBody>
+          <a:bodyPr rtlCol="0" anchor="ctr"/>
+          <a:lstStyle/>
+          <a:p>
+            <a:pPr algn="ctr"/>
+            <a:r>
+              <a:rPr lang="en-US" dirty="0" smtClean="0"/>
+              <a:t>Payment Accepted</a:t>
+            </a:r>
+          </a:p>
+        </p:txBody>
+      </p:sp>
+      <p:sp>
+        <p:nvSpPr>
+          <p:cNvPr id="30" name="Flowchart: Magnetic Disk 29"/>
+          <p:cNvSpPr/>
+          <p:nvPr/>
+        </p:nvSpPr>
+        <p:spPr>
+          <a:xfrm>
+            <a:off x="9914062" y="5072300"/>
+            <a:ext cx="1444387" cy="1324708"/>
+          </a:xfrm>
+          <a:prstGeom prst="flowChartMagneticDisk">
+            <a:avLst/>
+          </a:prstGeom>
+          <a:ln w="38100"/>
+          <a:effectLst>
+            <a:outerShdw blurRad="50800" dist="38100" dir="5400000" algn="t" rotWithShape="0">
+              <a:prstClr val="black">
+                <a:alpha val="40000"/>
+              </a:prstClr>
+            </a:outerShdw>
+          </a:effectLst>
+        </p:spPr>
+        <p:style>
+          <a:lnRef idx="3">
+            <a:schemeClr val="lt1"/>
+          </a:lnRef>
+          <a:fillRef idx="1">
+            <a:schemeClr val="accent1"/>
+          </a:fillRef>
+          <a:effectRef idx="1">
+            <a:schemeClr val="accent1"/>
+          </a:effectRef>
+          <a:fontRef idx="minor">
+            <a:schemeClr val="lt1"/>
+          </a:fontRef>
+        </p:style>
+        <p:txBody>
+          <a:bodyPr rtlCol="0" anchor="ctr"/>
+          <a:lstStyle/>
+          <a:p>
+            <a:pPr algn="ctr"/>
+            <a:endParaRPr lang="en-US"/>
+          </a:p>
+        </p:txBody>
+      </p:sp>
+      <p:cxnSp>
+        <p:nvCxnSpPr>
+          <p:cNvPr id="33" name="Straight Arrow Connector 32"/>
+          <p:cNvCxnSpPr>
+            <a:stCxn id="6" idx="0"/>
+            <a:endCxn id="30" idx="1"/>
+          </p:cNvCxnSpPr>
+          <p:nvPr/>
+        </p:nvCxnSpPr>
+        <p:spPr>
+          <a:xfrm flipH="1">
+            <a:off x="10636256" y="2954567"/>
+            <a:ext cx="1" cy="2117733"/>
+          </a:xfrm>
+          <a:prstGeom prst="straightConnector1">
+            <a:avLst/>
+          </a:prstGeom>
+          <a:ln w="57150">
+            <a:solidFill>
+              <a:schemeClr val="accent3">
+                <a:lumMod val="75000"/>
+              </a:schemeClr>
+            </a:solidFill>
+            <a:tailEnd type="triangle"/>
+          </a:ln>
+        </p:spPr>
+        <p:style>
+          <a:lnRef idx="1">
+            <a:schemeClr val="accent1"/>
+          </a:lnRef>
+          <a:fillRef idx="0">
+            <a:schemeClr val="accent1"/>
+          </a:fillRef>
+          <a:effectRef idx="0">
+            <a:schemeClr val="accent1"/>
+          </a:effectRef>
+          <a:fontRef idx="minor">
+            <a:schemeClr val="tx1"/>
+          </a:fontRef>
+        </p:style>
+      </p:cxnSp>
+      <p:sp>
+        <p:nvSpPr>
+          <p:cNvPr id="36" name="Flowchart: Document 35"/>
+          <p:cNvSpPr/>
+          <p:nvPr/>
+        </p:nvSpPr>
+        <p:spPr>
+          <a:xfrm>
+            <a:off x="9125629" y="3821047"/>
+            <a:ext cx="1251115" cy="785740"/>
+          </a:xfrm>
+          <a:prstGeom prst="flowChartDocument">
+            <a:avLst/>
+          </a:prstGeom>
+        </p:spPr>
+        <p:style>
+          <a:lnRef idx="1">
+            <a:schemeClr val="accent4"/>
+          </a:lnRef>
+          <a:fillRef idx="3">
+            <a:schemeClr val="accent4"/>
+          </a:fillRef>
+          <a:effectRef idx="2">
+            <a:schemeClr val="accent4"/>
+          </a:effectRef>
+          <a:fontRef idx="minor">
+            <a:schemeClr val="lt1"/>
+          </a:fontRef>
+        </p:style>
+        <p:txBody>
+          <a:bodyPr rtlCol="0" anchor="ctr"/>
+          <a:lstStyle/>
+          <a:p>
+            <a:pPr algn="ctr"/>
+            <a:r>
+              <a:rPr lang="en-US" dirty="0" smtClean="0"/>
+              <a:t>Payment</a:t>
+            </a:r>
+          </a:p>
+        </p:txBody>
+      </p:sp>
+      <p:cxnSp>
+        <p:nvCxnSpPr>
+          <p:cNvPr id="38" name="Straight Arrow Connector 37"/>
+          <p:cNvCxnSpPr/>
+          <p:nvPr/>
+        </p:nvCxnSpPr>
+        <p:spPr>
+          <a:xfrm flipH="1" flipV="1">
+            <a:off x="3012209" y="2180093"/>
+            <a:ext cx="3568374" cy="6501"/>
+          </a:xfrm>
+          <a:prstGeom prst="straightConnector1">
+            <a:avLst/>
+          </a:prstGeom>
+          <a:ln w="57150">
+            <a:solidFill>
+              <a:schemeClr val="accent3">
+                <a:lumMod val="75000"/>
+              </a:schemeClr>
+            </a:solidFill>
+            <a:tailEnd type="triangle"/>
+          </a:ln>
+        </p:spPr>
+        <p:style>
+          <a:lnRef idx="1">
+            <a:schemeClr val="accent1"/>
+          </a:lnRef>
+          <a:fillRef idx="0">
+            <a:schemeClr val="accent1"/>
+          </a:fillRef>
+          <a:effectRef idx="0">
+            <a:schemeClr val="accent1"/>
+          </a:effectRef>
+          <a:fontRef idx="minor">
+            <a:schemeClr val="tx1"/>
+          </a:fontRef>
+        </p:style>
+      </p:cxnSp>
+      <p:sp>
+        <p:nvSpPr>
+          <p:cNvPr id="40" name="Flowchart: Document 39"/>
+          <p:cNvSpPr/>
+          <p:nvPr/>
+        </p:nvSpPr>
+        <p:spPr>
+          <a:xfrm>
+            <a:off x="4165124" y="2510646"/>
+            <a:ext cx="1251115" cy="785740"/>
+          </a:xfrm>
+          <a:prstGeom prst="flowChartDocument">
+            <a:avLst/>
+          </a:prstGeom>
+        </p:spPr>
+        <p:style>
+          <a:lnRef idx="1">
+            <a:schemeClr val="accent6"/>
+          </a:lnRef>
+          <a:fillRef idx="3">
+            <a:schemeClr val="accent6"/>
+          </a:fillRef>
+          <a:effectRef idx="2">
+            <a:schemeClr val="accent6"/>
+          </a:effectRef>
+          <a:fontRef idx="minor">
+            <a:schemeClr val="lt1"/>
+          </a:fontRef>
+        </p:style>
+        <p:txBody>
+          <a:bodyPr rtlCol="0" anchor="ctr"/>
+          <a:lstStyle/>
+          <a:p>
+            <a:pPr algn="ctr"/>
+            <a:r>
+              <a:rPr lang="en-US" dirty="0"/>
+              <a:t>Payment </a:t>
+            </a:r>
+            <a:r>
+              <a:rPr lang="en-US" dirty="0" smtClean="0"/>
+              <a:t>Accepted</a:t>
+            </a:r>
+            <a:endParaRPr lang="en-US" dirty="0"/>
+          </a:p>
+        </p:txBody>
+      </p:sp>
+    </p:spTree>
+    <p:extLst>
+      <p:ext uri="{BB962C8B-B14F-4D97-AF65-F5344CB8AC3E}">
+        <p14:creationId xmlns:p14="http://schemas.microsoft.com/office/powerpoint/2010/main" val="2804598388"/>
+      </p:ext>
+    </p:extLst>
+  </p:cSld>
+  <p:clrMapOvr>
+    <a:masterClrMapping/>
+  </p:clrMapOvr>
+  <p:timing>
+    <p:tnLst>
+      <p:par>
+        <p:cTn id="1" dur="indefinite" restart="never" nodeType="tmRoot"/>
+      </p:par>
+    </p:tnLst>
+  </p:timing>
+</p:sld>
+</file>
+
 <file path=ppt/slides/slide3.xml><?xml version="1.0" encoding="utf-8"?>
 <p:sld xmlns:a="http://schemas.openxmlformats.org/drawingml/2006/main" xmlns:r="http://schemas.openxmlformats.org/officeDocument/2006/relationships" xmlns:p="http://schemas.openxmlformats.org/presentationml/2006/main">
   <p:cSld>
@@ -10575,15 +11763,7 @@
                   <a:schemeClr val="tx1"/>
                 </a:solidFill>
               </a:rPr>
-              <a:t>• Large c</a:t>
-            </a:r>
-            <a:r>
-              <a:rPr lang="en-US" sz="4000" dirty="0" smtClean="0">
-                <a:solidFill>
-                  <a:schemeClr val="tx1"/>
-                </a:solidFill>
-              </a:rPr>
-              <a:t>odebase </a:t>
+              <a:t>• Large codebase </a:t>
             </a:r>
           </a:p>
           <a:p>
@@ -10926,8 +12106,8 @@
         </p:nvSpPr>
         <p:spPr>
           <a:xfrm>
-            <a:off x="1751795" y="2139639"/>
-            <a:ext cx="1028358" cy="369332"/>
+            <a:off x="1857302" y="2139639"/>
+            <a:ext cx="817147" cy="369332"/>
           </a:xfrm>
           <a:prstGeom prst="rect">
             <a:avLst/>
@@ -10948,7 +12128,7 @@
                   </a:schemeClr>
                 </a:solidFill>
               </a:rPr>
-              <a:t>Service 1</a:t>
+              <a:t>Orders</a:t>
             </a:r>
             <a:endParaRPr lang="en-US" dirty="0">
               <a:solidFill>
@@ -11076,8 +12256,8 @@
         </p:nvSpPr>
         <p:spPr>
           <a:xfrm>
-            <a:off x="10122077" y="2119722"/>
-            <a:ext cx="1028358" cy="369332"/>
+            <a:off x="10086908" y="2119722"/>
+            <a:ext cx="1095043" cy="369332"/>
           </a:xfrm>
           <a:prstGeom prst="rect">
             <a:avLst/>
@@ -11098,7 +12278,7 @@
                   </a:schemeClr>
                 </a:solidFill>
               </a:rPr>
-              <a:t>Service 2</a:t>
+              <a:t>Payments</a:t>
             </a:r>
           </a:p>
         </p:txBody>
@@ -11353,9 +12533,10 @@
           <a:p>
             <a:pPr algn="ctr"/>
             <a:r>
-              <a:rPr lang="en-US" dirty="0" smtClean="0"/>
-              <a:t>Command</a:t>
-            </a:r>
+              <a:rPr lang="en-US" dirty="0" err="1" smtClean="0"/>
+              <a:t>PlaceOrder</a:t>
+            </a:r>
+            <a:endParaRPr lang="en-US" dirty="0" smtClean="0"/>
           </a:p>
         </p:txBody>
       </p:sp>
@@ -11395,7 +12576,7 @@
             <a:pPr algn="ctr"/>
             <a:r>
               <a:rPr lang="en-US" dirty="0" smtClean="0"/>
-              <a:t>Entity 1</a:t>
+              <a:t>Order</a:t>
             </a:r>
           </a:p>
         </p:txBody>
@@ -11436,7 +12617,7 @@
             <a:pPr algn="ctr"/>
             <a:r>
               <a:rPr lang="en-US" dirty="0" smtClean="0"/>
-              <a:t>Event 1</a:t>
+              <a:t>Order Placed</a:t>
             </a:r>
           </a:p>
         </p:txBody>
@@ -11476,8 +12657,8 @@
           <a:p>
             <a:pPr algn="ctr"/>
             <a:r>
-              <a:rPr lang="en-US" dirty="0" smtClean="0"/>
-              <a:t>Event 1</a:t>
+              <a:rPr lang="en-US" dirty="0"/>
+              <a:t>Order Placed</a:t>
             </a:r>
           </a:p>
         </p:txBody>
@@ -11556,7 +12737,7 @@
             <a:pPr algn="ctr"/>
             <a:r>
               <a:rPr lang="en-US" dirty="0" smtClean="0"/>
-              <a:t>Event 2</a:t>
+              <a:t>Payment Accepted</a:t>
             </a:r>
           </a:p>
         </p:txBody>
@@ -11684,7 +12865,7 @@
             <a:pPr algn="ctr"/>
             <a:r>
               <a:rPr lang="en-US" dirty="0" smtClean="0"/>
-              <a:t>Entity 2</a:t>
+              <a:t>Payment</a:t>
             </a:r>
           </a:p>
         </p:txBody>
@@ -11762,9 +12943,14 @@
           <a:p>
             <a:pPr algn="ctr"/>
             <a:r>
+              <a:rPr lang="en-US" dirty="0"/>
+              <a:t>Payment </a:t>
+            </a:r>
+            <a:r>
               <a:rPr lang="en-US" dirty="0" smtClean="0"/>
-              <a:t>Event 2</a:t>
-            </a:r>
+              <a:t>Accepted</a:t>
+            </a:r>
+            <a:endParaRPr lang="en-US" dirty="0"/>
           </a:p>
         </p:txBody>
       </p:sp>

</xml_diff>

<commit_message>
Updated oplog tailing slide
</commit_message>
<xml_diff>
--- a/t18-event-mongodb.pptx
+++ b/t18-event-mongodb.pptx
@@ -7916,7 +7916,9 @@
           </a:lstStyle>
           <a:p>
             <a:r>
-              <a:rPr lang="en-US" dirty="0" smtClean="0"/>
+              <a:rPr lang="en-US" dirty="0" smtClean="0">
+                <a:hlinkClick r:id="rId4"/>
+              </a:rPr>
               <a:t>bit.ly/2DUYXNF</a:t>
             </a:r>
             <a:endParaRPr lang="en-US" dirty="0"/>
@@ -17314,7 +17316,7 @@
       </p:sp>
       <p:sp>
         <p:nvSpPr>
-          <p:cNvPr id="34" name="Hexagon 33"/>
+          <p:cNvPr id="20" name="Hexagon 19"/>
           <p:cNvSpPr/>
           <p:nvPr/>
         </p:nvSpPr>
@@ -17370,7 +17372,7 @@
       </p:sp>
       <p:sp>
         <p:nvSpPr>
-          <p:cNvPr id="44" name="Diamond 43"/>
+          <p:cNvPr id="21" name="Diamond 20"/>
           <p:cNvSpPr/>
           <p:nvPr/>
         </p:nvSpPr>
@@ -17416,7 +17418,7 @@
       </p:sp>
       <p:sp>
         <p:nvSpPr>
-          <p:cNvPr id="45" name="TextBox 44"/>
+          <p:cNvPr id="22" name="TextBox 21"/>
           <p:cNvSpPr txBox="1"/>
           <p:nvPr/>
         </p:nvSpPr>
@@ -17458,16 +17460,17 @@
       </p:sp>
       <p:cxnSp>
         <p:nvCxnSpPr>
-          <p:cNvPr id="46" name="Straight Arrow Connector 45"/>
+          <p:cNvPr id="23" name="Straight Arrow Connector 22"/>
           <p:cNvCxnSpPr>
-            <a:endCxn id="48" idx="0"/>
+            <a:stCxn id="20" idx="0"/>
+            <a:endCxn id="25" idx="0"/>
           </p:cNvCxnSpPr>
           <p:nvPr/>
         </p:nvCxnSpPr>
         <p:spPr>
           <a:xfrm flipH="1">
-            <a:off x="2723919" y="3157538"/>
-            <a:ext cx="32700" cy="1822342"/>
+            <a:off x="3137391" y="3349008"/>
+            <a:ext cx="2881" cy="1346562"/>
           </a:xfrm>
           <a:prstGeom prst="straightConnector1">
             <a:avLst/>
@@ -17496,7 +17499,7 @@
       </p:cxnSp>
       <p:sp>
         <p:nvSpPr>
-          <p:cNvPr id="47" name="Rectangle 46"/>
+          <p:cNvPr id="24" name="Rectangle 23"/>
           <p:cNvSpPr/>
           <p:nvPr/>
         </p:nvSpPr>
@@ -17544,7 +17547,7 @@
               <a:rPr lang="en-US" dirty="0" smtClean="0">
                 <a:solidFill>
                   <a:schemeClr val="accent3">
-                    <a:lumMod val="75000"/>
+                    <a:lumMod val="50000"/>
                   </a:schemeClr>
                 </a:solidFill>
               </a:rPr>
@@ -17555,17 +17558,21 @@
       </p:sp>
       <p:graphicFrame>
         <p:nvGraphicFramePr>
-          <p:cNvPr id="48" name="Table 47"/>
+          <p:cNvPr id="25" name="Table 24"/>
           <p:cNvGraphicFramePr>
             <a:graphicFrameLocks noGrp="1"/>
           </p:cNvGraphicFramePr>
           <p:nvPr>
-            <p:extLst/>
+            <p:extLst>
+              <p:ext uri="{D42A27DB-BD31-4B8C-83A1-F6EECF244321}">
+                <p14:modId xmlns:p14="http://schemas.microsoft.com/office/powerpoint/2010/main" val="3054816568"/>
+              </p:ext>
+            </p:extLst>
           </p:nvPr>
         </p:nvGraphicFramePr>
         <p:xfrm>
-          <a:off x="1498602" y="4979880"/>
-          <a:ext cx="2450635" cy="1130493"/>
+          <a:off x="1912074" y="4695570"/>
+          <a:ext cx="2450635" cy="742591"/>
         </p:xfrm>
         <a:graphic>
           <a:graphicData uri="http://schemas.openxmlformats.org/drawingml/2006/table">
@@ -17580,7 +17587,7 @@
                 <a:gridCol w="490127"/>
                 <a:gridCol w="490127"/>
               </a:tblGrid>
-              <a:tr h="376831">
+              <a:tr h="264476">
                 <a:tc>
                   <a:txBody>
                     <a:bodyPr/>
@@ -17606,7 +17613,7 @@
                     <a:bodyPr/>
                     <a:lstStyle/>
                     <a:p>
-                      <a:endParaRPr lang="en-US"/>
+                      <a:endParaRPr lang="en-US" dirty="0"/>
                     </a:p>
                   </a:txBody>
                   <a:tcPr/>
@@ -17684,259 +17691,20 @@
                   <a:tcPr/>
                 </a:tc>
               </a:tr>
-              <a:tr h="376831">
-                <a:tc>
-                  <a:txBody>
-                    <a:bodyPr/>
-                    <a:lstStyle/>
-                    <a:p>
-                      <a:endParaRPr lang="en-US"/>
-                    </a:p>
-                  </a:txBody>
-                  <a:tcPr/>
-                </a:tc>
-                <a:tc>
-                  <a:txBody>
-                    <a:bodyPr/>
-                    <a:lstStyle/>
-                    <a:p>
-                      <a:endParaRPr lang="en-US" dirty="0"/>
-                    </a:p>
-                  </a:txBody>
-                  <a:tcPr/>
-                </a:tc>
-                <a:tc>
-                  <a:txBody>
-                    <a:bodyPr/>
-                    <a:lstStyle/>
-                    <a:p>
-                      <a:endParaRPr lang="en-US"/>
-                    </a:p>
-                  </a:txBody>
-                  <a:tcPr/>
-                </a:tc>
-                <a:tc>
-                  <a:txBody>
-                    <a:bodyPr/>
-                    <a:lstStyle/>
-                    <a:p>
-                      <a:endParaRPr lang="en-US" dirty="0"/>
-                    </a:p>
-                  </a:txBody>
-                  <a:tcPr/>
-                </a:tc>
-                <a:tc>
-                  <a:txBody>
-                    <a:bodyPr/>
-                    <a:lstStyle/>
-                    <a:p>
-                      <a:endParaRPr lang="en-US" dirty="0"/>
-                    </a:p>
-                  </a:txBody>
-                  <a:tcPr/>
-                </a:tc>
-              </a:tr>
-            </a:tbl>
-          </a:graphicData>
-        </a:graphic>
-      </p:graphicFrame>
-      <p:graphicFrame>
-        <p:nvGraphicFramePr>
-          <p:cNvPr id="49" name="Table 48"/>
-          <p:cNvGraphicFramePr>
-            <a:graphicFrameLocks noGrp="1"/>
-          </p:cNvGraphicFramePr>
-          <p:nvPr>
-            <p:extLst/>
-          </p:nvPr>
-        </p:nvGraphicFramePr>
-        <p:xfrm>
-          <a:off x="4977595" y="4979880"/>
-          <a:ext cx="2450635" cy="1130493"/>
-        </p:xfrm>
-        <a:graphic>
-          <a:graphicData uri="http://schemas.openxmlformats.org/drawingml/2006/table">
-            <a:tbl>
-              <a:tblPr firstRow="1" bandRow="1">
-                <a:tableStyleId>{5C22544A-7EE6-4342-B048-85BDC9FD1C3A}</a:tableStyleId>
-              </a:tblPr>
-              <a:tblGrid>
-                <a:gridCol w="490127"/>
-                <a:gridCol w="490127"/>
-                <a:gridCol w="490127"/>
-                <a:gridCol w="490127"/>
-                <a:gridCol w="490127"/>
-              </a:tblGrid>
-              <a:tr h="376831">
-                <a:tc>
-                  <a:txBody>
-                    <a:bodyPr/>
-                    <a:lstStyle/>
-                    <a:p>
-                      <a:endParaRPr lang="en-US" dirty="0"/>
-                    </a:p>
-                  </a:txBody>
-                  <a:tcPr/>
-                </a:tc>
-                <a:tc>
-                  <a:txBody>
-                    <a:bodyPr/>
-                    <a:lstStyle/>
-                    <a:p>
-                      <a:endParaRPr lang="en-US"/>
-                    </a:p>
-                  </a:txBody>
-                  <a:tcPr/>
-                </a:tc>
-                <a:tc>
-                  <a:txBody>
-                    <a:bodyPr/>
-                    <a:lstStyle/>
-                    <a:p>
-                      <a:endParaRPr lang="en-US"/>
-                    </a:p>
-                  </a:txBody>
-                  <a:tcPr/>
-                </a:tc>
-                <a:tc>
-                  <a:txBody>
-                    <a:bodyPr/>
-                    <a:lstStyle/>
-                    <a:p>
-                      <a:endParaRPr lang="en-US" dirty="0"/>
-                    </a:p>
-                  </a:txBody>
-                  <a:tcPr/>
-                </a:tc>
-                <a:tc>
-                  <a:txBody>
-                    <a:bodyPr/>
-                    <a:lstStyle/>
-                    <a:p>
-                      <a:endParaRPr lang="en-US"/>
-                    </a:p>
-                  </a:txBody>
-                  <a:tcPr/>
-                </a:tc>
-              </a:tr>
-              <a:tr h="376831">
-                <a:tc>
-                  <a:txBody>
-                    <a:bodyPr/>
-                    <a:lstStyle/>
-                    <a:p>
-                      <a:endParaRPr lang="en-US"/>
-                    </a:p>
-                  </a:txBody>
-                  <a:tcPr/>
-                </a:tc>
-                <a:tc>
-                  <a:txBody>
-                    <a:bodyPr/>
-                    <a:lstStyle/>
-                    <a:p>
-                      <a:endParaRPr lang="en-US" dirty="0"/>
-                    </a:p>
-                  </a:txBody>
-                  <a:tcPr/>
-                </a:tc>
-                <a:tc>
-                  <a:txBody>
-                    <a:bodyPr/>
-                    <a:lstStyle/>
-                    <a:p>
-                      <a:endParaRPr lang="en-US"/>
-                    </a:p>
-                  </a:txBody>
-                  <a:tcPr/>
-                </a:tc>
-                <a:tc>
-                  <a:txBody>
-                    <a:bodyPr/>
-                    <a:lstStyle/>
-                    <a:p>
-                      <a:endParaRPr lang="en-US" dirty="0"/>
-                    </a:p>
-                  </a:txBody>
-                  <a:tcPr/>
-                </a:tc>
-                <a:tc>
-                  <a:txBody>
-                    <a:bodyPr/>
-                    <a:lstStyle/>
-                    <a:p>
-                      <a:endParaRPr lang="en-US" dirty="0"/>
-                    </a:p>
-                  </a:txBody>
-                  <a:tcPr/>
-                </a:tc>
-              </a:tr>
-              <a:tr h="376831">
-                <a:tc>
-                  <a:txBody>
-                    <a:bodyPr/>
-                    <a:lstStyle/>
-                    <a:p>
-                      <a:endParaRPr lang="en-US"/>
-                    </a:p>
-                  </a:txBody>
-                  <a:tcPr/>
-                </a:tc>
-                <a:tc>
-                  <a:txBody>
-                    <a:bodyPr/>
-                    <a:lstStyle/>
-                    <a:p>
-                      <a:endParaRPr lang="en-US" dirty="0"/>
-                    </a:p>
-                  </a:txBody>
-                  <a:tcPr/>
-                </a:tc>
-                <a:tc>
-                  <a:txBody>
-                    <a:bodyPr/>
-                    <a:lstStyle/>
-                    <a:p>
-                      <a:endParaRPr lang="en-US"/>
-                    </a:p>
-                  </a:txBody>
-                  <a:tcPr/>
-                </a:tc>
-                <a:tc>
-                  <a:txBody>
-                    <a:bodyPr/>
-                    <a:lstStyle/>
-                    <a:p>
-                      <a:endParaRPr lang="en-US" dirty="0"/>
-                    </a:p>
-                  </a:txBody>
-                  <a:tcPr/>
-                </a:tc>
-                <a:tc>
-                  <a:txBody>
-                    <a:bodyPr/>
-                    <a:lstStyle/>
-                    <a:p>
-                      <a:endParaRPr lang="en-US" dirty="0"/>
-                    </a:p>
-                  </a:txBody>
-                  <a:tcPr/>
-                </a:tc>
-              </a:tr>
             </a:tbl>
           </a:graphicData>
         </a:graphic>
       </p:graphicFrame>
       <p:cxnSp>
         <p:nvCxnSpPr>
-          <p:cNvPr id="50" name="Straight Arrow Connector 49"/>
+          <p:cNvPr id="27" name="Straight Arrow Connector 26"/>
           <p:cNvCxnSpPr/>
           <p:nvPr/>
         </p:nvCxnSpPr>
         <p:spPr>
           <a:xfrm>
-            <a:off x="3457707" y="3175000"/>
-            <a:ext cx="1519888" cy="1804880"/>
+            <a:off x="7330560" y="3729814"/>
+            <a:ext cx="1965121" cy="0"/>
           </a:xfrm>
           <a:prstGeom prst="straightConnector1">
             <a:avLst/>
@@ -17965,235 +17733,13 @@
       </p:cxnSp>
       <p:sp>
         <p:nvSpPr>
-          <p:cNvPr id="51" name="Flowchart: Document 50"/>
+          <p:cNvPr id="28" name="Hexagon 27"/>
           <p:cNvSpPr/>
           <p:nvPr/>
         </p:nvSpPr>
         <p:spPr>
-          <a:xfrm>
-            <a:off x="1540463" y="3815849"/>
-            <a:ext cx="964736" cy="574752"/>
-          </a:xfrm>
-          <a:prstGeom prst="flowChartDocument">
-            <a:avLst/>
-          </a:prstGeom>
-          <a:solidFill>
-            <a:schemeClr val="accent4"/>
-          </a:solidFill>
-        </p:spPr>
-        <p:style>
-          <a:lnRef idx="1">
-            <a:schemeClr val="accent4"/>
-          </a:lnRef>
-          <a:fillRef idx="3">
-            <a:schemeClr val="accent4"/>
-          </a:fillRef>
-          <a:effectRef idx="2">
-            <a:schemeClr val="accent4"/>
-          </a:effectRef>
-          <a:fontRef idx="minor">
-            <a:schemeClr val="lt1"/>
-          </a:fontRef>
-        </p:style>
-        <p:txBody>
-          <a:bodyPr rtlCol="0" anchor="ctr"/>
-          <a:lstStyle/>
-          <a:p>
-            <a:pPr algn="ctr"/>
-            <a:r>
-              <a:rPr lang="en-US" dirty="0" smtClean="0">
-                <a:solidFill>
-                  <a:schemeClr val="accent4">
-                    <a:lumMod val="50000"/>
-                  </a:schemeClr>
-                </a:solidFill>
-              </a:rPr>
-              <a:t>Entity</a:t>
-            </a:r>
-          </a:p>
-        </p:txBody>
-      </p:sp>
-      <p:sp>
-        <p:nvSpPr>
-          <p:cNvPr id="52" name="Flowchart: Document 51"/>
-          <p:cNvSpPr/>
-          <p:nvPr/>
-        </p:nvSpPr>
-        <p:spPr>
-          <a:xfrm>
-            <a:off x="4536408" y="3815849"/>
-            <a:ext cx="964736" cy="574752"/>
-          </a:xfrm>
-          <a:prstGeom prst="flowChartDocument">
-            <a:avLst/>
-          </a:prstGeom>
-          <a:solidFill>
-            <a:schemeClr val="accent5"/>
-          </a:solidFill>
-          <a:ln>
-            <a:solidFill>
-              <a:schemeClr val="accent5"/>
-            </a:solidFill>
-          </a:ln>
-        </p:spPr>
-        <p:style>
-          <a:lnRef idx="1">
-            <a:schemeClr val="accent6"/>
-          </a:lnRef>
-          <a:fillRef idx="3">
-            <a:schemeClr val="accent6"/>
-          </a:fillRef>
-          <a:effectRef idx="2">
-            <a:schemeClr val="accent6"/>
-          </a:effectRef>
-          <a:fontRef idx="minor">
-            <a:schemeClr val="lt1"/>
-          </a:fontRef>
-        </p:style>
-        <p:txBody>
-          <a:bodyPr rtlCol="0" anchor="ctr"/>
-          <a:lstStyle/>
-          <a:p>
-            <a:pPr algn="ctr"/>
-            <a:r>
-              <a:rPr lang="en-US" dirty="0" smtClean="0"/>
-              <a:t>Event</a:t>
-            </a:r>
-          </a:p>
-        </p:txBody>
-      </p:sp>
-      <p:sp>
-        <p:nvSpPr>
-          <p:cNvPr id="53" name="Rectangle 52"/>
-          <p:cNvSpPr/>
-          <p:nvPr/>
-        </p:nvSpPr>
-        <p:spPr>
-          <a:xfrm>
-            <a:off x="1196546" y="3571108"/>
-            <a:ext cx="4426164" cy="1041642"/>
-          </a:xfrm>
-          <a:prstGeom prst="rect">
-            <a:avLst/>
-          </a:prstGeom>
-          <a:noFill/>
-          <a:ln w="38100">
-            <a:solidFill>
-              <a:schemeClr val="accent3"/>
-            </a:solidFill>
-            <a:prstDash val="sysDot"/>
-          </a:ln>
-        </p:spPr>
-        <p:style>
-          <a:lnRef idx="2">
-            <a:schemeClr val="accent1">
-              <a:shade val="50000"/>
-            </a:schemeClr>
-          </a:lnRef>
-          <a:fillRef idx="1">
-            <a:schemeClr val="accent1"/>
-          </a:fillRef>
-          <a:effectRef idx="0">
-            <a:schemeClr val="accent1"/>
-          </a:effectRef>
-          <a:fontRef idx="minor">
-            <a:schemeClr val="lt1"/>
-          </a:fontRef>
-        </p:style>
-        <p:txBody>
-          <a:bodyPr rtlCol="0" anchor="ctr"/>
-          <a:lstStyle/>
-          <a:p>
-            <a:pPr algn="ctr"/>
-            <a:endParaRPr lang="en-US"/>
-          </a:p>
-        </p:txBody>
-      </p:sp>
-      <p:sp>
-        <p:nvSpPr>
-          <p:cNvPr id="54" name="TextBox 53"/>
-          <p:cNvSpPr txBox="1"/>
-          <p:nvPr/>
-        </p:nvSpPr>
-        <p:spPr>
-          <a:xfrm>
-            <a:off x="2888467" y="3894071"/>
-            <a:ext cx="1241109" cy="646331"/>
-          </a:xfrm>
-          <a:prstGeom prst="rect">
-            <a:avLst/>
-          </a:prstGeom>
-          <a:noFill/>
-        </p:spPr>
-        <p:txBody>
-          <a:bodyPr wrap="none" rtlCol="0">
-            <a:spAutoFit/>
-          </a:bodyPr>
-          <a:lstStyle/>
-          <a:p>
-            <a:pPr algn="ctr"/>
-            <a:r>
-              <a:rPr lang="en-US" dirty="0" smtClean="0"/>
-              <a:t>Local</a:t>
-            </a:r>
-          </a:p>
-          <a:p>
-            <a:pPr algn="ctr"/>
-            <a:r>
-              <a:rPr lang="en-US" dirty="0" smtClean="0"/>
-              <a:t>transaction</a:t>
-            </a:r>
-            <a:endParaRPr lang="en-US" dirty="0"/>
-          </a:p>
-        </p:txBody>
-      </p:sp>
-      <p:cxnSp>
-        <p:nvCxnSpPr>
-          <p:cNvPr id="55" name="Straight Arrow Connector 54"/>
-          <p:cNvCxnSpPr/>
-          <p:nvPr/>
-        </p:nvCxnSpPr>
-        <p:spPr>
-          <a:xfrm>
-            <a:off x="7731036" y="2600984"/>
-            <a:ext cx="1577556" cy="0"/>
-          </a:xfrm>
-          <a:prstGeom prst="straightConnector1">
-            <a:avLst/>
-          </a:prstGeom>
-          <a:ln w="57150">
-            <a:solidFill>
-              <a:schemeClr val="accent3">
-                <a:lumMod val="75000"/>
-              </a:schemeClr>
-            </a:solidFill>
-            <a:tailEnd type="triangle"/>
-          </a:ln>
-        </p:spPr>
-        <p:style>
-          <a:lnRef idx="1">
-            <a:schemeClr val="accent1"/>
-          </a:lnRef>
-          <a:fillRef idx="0">
-            <a:schemeClr val="accent1"/>
-          </a:fillRef>
-          <a:effectRef idx="0">
-            <a:schemeClr val="accent1"/>
-          </a:effectRef>
-          <a:fontRef idx="minor">
-            <a:schemeClr val="tx1"/>
-          </a:fontRef>
-        </p:style>
-      </p:cxnSp>
-      <p:sp>
-        <p:nvSpPr>
-          <p:cNvPr id="56" name="Hexagon 55"/>
-          <p:cNvSpPr/>
-          <p:nvPr/>
-        </p:nvSpPr>
-        <p:spPr>
           <a:xfrm rot="5400000">
-            <a:off x="6173998" y="1878791"/>
+            <a:off x="5773522" y="3007621"/>
             <a:ext cx="1669689" cy="1444386"/>
           </a:xfrm>
           <a:prstGeom prst="hexagon">
@@ -18243,13 +17789,13 @@
       </p:sp>
       <p:sp>
         <p:nvSpPr>
-          <p:cNvPr id="57" name="Diamond 56"/>
+          <p:cNvPr id="29" name="Diamond 28"/>
           <p:cNvSpPr/>
           <p:nvPr/>
         </p:nvSpPr>
         <p:spPr>
           <a:xfrm>
-            <a:off x="6286650" y="1754665"/>
+            <a:off x="5886174" y="2883495"/>
             <a:ext cx="1444386" cy="735454"/>
           </a:xfrm>
           <a:prstGeom prst="diamond">
@@ -18289,14 +17835,14 @@
       </p:sp>
       <p:sp>
         <p:nvSpPr>
-          <p:cNvPr id="58" name="TextBox 57"/>
+          <p:cNvPr id="30" name="TextBox 29"/>
           <p:cNvSpPr txBox="1"/>
           <p:nvPr/>
         </p:nvSpPr>
         <p:spPr>
           <a:xfrm>
-            <a:off x="6415566" y="2486684"/>
-            <a:ext cx="1162499" cy="646331"/>
+            <a:off x="6066386" y="3615514"/>
+            <a:ext cx="1166752" cy="646331"/>
           </a:xfrm>
           <a:prstGeom prst="rect">
             <a:avLst/>
@@ -18304,7 +17850,7 @@
           <a:noFill/>
         </p:spPr>
         <p:txBody>
-          <a:bodyPr wrap="none" rtlCol="0">
+          <a:bodyPr wrap="square" rtlCol="0">
             <a:spAutoFit/>
           </a:bodyPr>
           <a:lstStyle/>
@@ -18345,16 +17891,14 @@
       </p:sp>
       <p:cxnSp>
         <p:nvCxnSpPr>
-          <p:cNvPr id="59" name="Straight Arrow Connector 58"/>
-          <p:cNvCxnSpPr>
-            <a:stCxn id="49" idx="0"/>
-          </p:cNvCxnSpPr>
+          <p:cNvPr id="31" name="Straight Arrow Connector 30"/>
+          <p:cNvCxnSpPr/>
           <p:nvPr/>
         </p:nvCxnSpPr>
         <p:spPr>
           <a:xfrm flipV="1">
-            <a:off x="6202912" y="3286125"/>
-            <a:ext cx="466969" cy="1693755"/>
+            <a:off x="4870956" y="4339494"/>
+            <a:ext cx="1195430" cy="1241329"/>
           </a:xfrm>
           <a:prstGeom prst="straightConnector1">
             <a:avLst/>
@@ -18381,6 +17925,164 @@
           </a:fontRef>
         </p:style>
       </p:cxnSp>
+      <p:sp>
+        <p:nvSpPr>
+          <p:cNvPr id="32" name="Rectangle 31"/>
+          <p:cNvSpPr/>
+          <p:nvPr/>
+        </p:nvSpPr>
+        <p:spPr>
+          <a:xfrm>
+            <a:off x="1383878" y="5580823"/>
+            <a:ext cx="3501271" cy="478591"/>
+          </a:xfrm>
+          <a:prstGeom prst="rect">
+            <a:avLst/>
+          </a:prstGeom>
+          <a:solidFill>
+            <a:schemeClr val="accent3">
+              <a:lumMod val="20000"/>
+              <a:lumOff val="80000"/>
+            </a:schemeClr>
+          </a:solidFill>
+          <a:ln w="57150">
+            <a:solidFill>
+              <a:schemeClr val="accent3"/>
+            </a:solidFill>
+            <a:prstDash val="sysDot"/>
+          </a:ln>
+        </p:spPr>
+        <p:style>
+          <a:lnRef idx="1">
+            <a:schemeClr val="accent3"/>
+          </a:lnRef>
+          <a:fillRef idx="2">
+            <a:schemeClr val="accent3"/>
+          </a:fillRef>
+          <a:effectRef idx="1">
+            <a:schemeClr val="accent3"/>
+          </a:effectRef>
+          <a:fontRef idx="minor">
+            <a:schemeClr val="dk1"/>
+          </a:fontRef>
+        </p:style>
+        <p:txBody>
+          <a:bodyPr vert="horz" rtlCol="0" anchor="ctr"/>
+          <a:lstStyle/>
+          <a:p>
+            <a:pPr algn="ctr"/>
+            <a:r>
+              <a:rPr lang="en-US" dirty="0" smtClean="0">
+                <a:solidFill>
+                  <a:schemeClr val="accent3">
+                    <a:lumMod val="75000"/>
+                  </a:schemeClr>
+                </a:solidFill>
+              </a:rPr>
+              <a:t>Transaction Log</a:t>
+            </a:r>
+          </a:p>
+        </p:txBody>
+      </p:sp>
+      <p:sp>
+        <p:nvSpPr>
+          <p:cNvPr id="33" name="Flowchart: Magnetic Disk 32"/>
+          <p:cNvSpPr/>
+          <p:nvPr/>
+        </p:nvSpPr>
+        <p:spPr>
+          <a:xfrm>
+            <a:off x="988550" y="4488758"/>
+            <a:ext cx="4522606" cy="1834872"/>
+          </a:xfrm>
+          <a:prstGeom prst="flowChartMagneticDisk">
+            <a:avLst/>
+          </a:prstGeom>
+          <a:noFill/>
+          <a:ln w="38100">
+            <a:prstDash val="sysDot"/>
+          </a:ln>
+          <a:effectLst>
+            <a:outerShdw blurRad="50800" dist="38100" dir="5400000" algn="t" rotWithShape="0">
+              <a:prstClr val="black">
+                <a:alpha val="40000"/>
+              </a:prstClr>
+            </a:outerShdw>
+          </a:effectLst>
+        </p:spPr>
+        <p:style>
+          <a:lnRef idx="3">
+            <a:schemeClr val="lt1"/>
+          </a:lnRef>
+          <a:fillRef idx="1">
+            <a:schemeClr val="accent1"/>
+          </a:fillRef>
+          <a:effectRef idx="1">
+            <a:schemeClr val="accent1"/>
+          </a:effectRef>
+          <a:fontRef idx="minor">
+            <a:schemeClr val="lt1"/>
+          </a:fontRef>
+        </p:style>
+        <p:txBody>
+          <a:bodyPr rtlCol="0" anchor="ctr"/>
+          <a:lstStyle/>
+          <a:p>
+            <a:pPr algn="ctr"/>
+            <a:endParaRPr lang="en-US"/>
+          </a:p>
+        </p:txBody>
+      </p:sp>
+      <p:sp>
+        <p:nvSpPr>
+          <p:cNvPr id="35" name="Flowchart: Document 34"/>
+          <p:cNvSpPr/>
+          <p:nvPr/>
+        </p:nvSpPr>
+        <p:spPr>
+          <a:xfrm>
+            <a:off x="1744192" y="3631507"/>
+            <a:ext cx="964736" cy="574752"/>
+          </a:xfrm>
+          <a:prstGeom prst="flowChartDocument">
+            <a:avLst/>
+          </a:prstGeom>
+          <a:solidFill>
+            <a:schemeClr val="accent4"/>
+          </a:solidFill>
+        </p:spPr>
+        <p:style>
+          <a:lnRef idx="1">
+            <a:schemeClr val="accent4"/>
+          </a:lnRef>
+          <a:fillRef idx="3">
+            <a:schemeClr val="accent4"/>
+          </a:fillRef>
+          <a:effectRef idx="2">
+            <a:schemeClr val="accent4"/>
+          </a:effectRef>
+          <a:fontRef idx="minor">
+            <a:schemeClr val="lt1"/>
+          </a:fontRef>
+        </p:style>
+        <p:txBody>
+          <a:bodyPr rtlCol="0" anchor="ctr"/>
+          <a:lstStyle/>
+          <a:p>
+            <a:pPr algn="ctr"/>
+            <a:r>
+              <a:rPr lang="en-US" dirty="0" smtClean="0">
+                <a:solidFill>
+                  <a:schemeClr val="accent4">
+                    <a:lumMod val="50000"/>
+                  </a:schemeClr>
+                </a:solidFill>
+              </a:rPr>
+              <a:t>Entity</a:t>
+            </a:r>
+          </a:p>
+        </p:txBody>
+      </p:sp>
     </p:spTree>
     <p:extLst>
       <p:ext uri="{BB962C8B-B14F-4D97-AF65-F5344CB8AC3E}">

</xml_diff>

<commit_message>
Fix oplog tailing slide
</commit_message>
<xml_diff>
--- a/t18-event-mongodb.pptx
+++ b/t18-event-mongodb.pptx
@@ -8683,22 +8683,27 @@
           <a:lstStyle/>
           <a:p>
             <a:r>
+              <a:rPr lang="en-US" sz="7200" dirty="0" err="1"/>
+              <a:t>Oplog</a:t>
+            </a:r>
+            <a:r>
               <a:rPr lang="en-US" sz="7200" dirty="0"/>
-              <a:t>Our considerations</a:t>
-            </a:r>
-          </a:p>
-        </p:txBody>
-      </p:sp>
-      <p:sp>
-        <p:nvSpPr>
-          <p:cNvPr id="3" name="TextBox 2"/>
+              <a:t> tailing</a:t>
+            </a:r>
+            <a:endParaRPr lang="en-US" sz="7200" dirty="0"/>
+          </a:p>
+        </p:txBody>
+      </p:sp>
+      <p:sp>
+        <p:nvSpPr>
+          <p:cNvPr id="8" name="TextBox 7"/>
           <p:cNvSpPr txBox="1"/>
           <p:nvPr/>
         </p:nvSpPr>
         <p:spPr>
           <a:xfrm>
-            <a:off x="589262" y="4296455"/>
-            <a:ext cx="4783682" cy="584775"/>
+            <a:off x="1999446" y="4440968"/>
+            <a:ext cx="6655989" cy="461665"/>
           </a:xfrm>
           <a:prstGeom prst="rect">
             <a:avLst/>
@@ -8712,31 +8717,39 @@
           <a:lstStyle/>
           <a:p>
             <a:r>
-              <a:rPr lang="en-US" sz="3200" dirty="0" smtClean="0"/>
-              <a:t>• Go with </a:t>
-            </a:r>
-            <a:r>
-              <a:rPr lang="en-US" sz="3200" dirty="0" err="1" smtClean="0"/>
-              <a:t>Oplog</a:t>
-            </a:r>
-            <a:r>
-              <a:rPr lang="en-US" sz="3200" dirty="0" smtClean="0"/>
-              <a:t> tailing</a:t>
-            </a:r>
-            <a:endParaRPr lang="en-US" sz="3200" dirty="0"/>
-          </a:p>
-        </p:txBody>
-      </p:sp>
-      <p:sp>
-        <p:nvSpPr>
-          <p:cNvPr id="4" name="TextBox 3"/>
+              <a:rPr lang="en-US" sz="2400" dirty="0" smtClean="0"/>
+              <a:t>• Move efforts to implement </a:t>
+            </a:r>
+            <a:r>
+              <a:rPr lang="en-US" sz="2400" dirty="0" smtClean="0">
+                <a:solidFill>
+                  <a:srgbClr val="FFFF00"/>
+                </a:solidFill>
+              </a:rPr>
+              <a:t>{ </a:t>
+            </a:r>
+            <a:r>
+              <a:rPr lang="en-US" sz="2400" dirty="0">
+                <a:solidFill>
+                  <a:srgbClr val="FFFF00"/>
+                </a:solidFill>
+              </a:rPr>
+              <a:t>w: "majority" }</a:t>
+            </a:r>
+            <a:endParaRPr lang="en-US" sz="2400" dirty="0"/>
+          </a:p>
+        </p:txBody>
+      </p:sp>
+      <p:sp>
+        <p:nvSpPr>
+          <p:cNvPr id="11" name="TextBox 10"/>
           <p:cNvSpPr txBox="1"/>
           <p:nvPr/>
         </p:nvSpPr>
         <p:spPr>
           <a:xfrm>
-            <a:off x="589262" y="3559391"/>
-            <a:ext cx="8174033" cy="584775"/>
+            <a:off x="1999446" y="2298620"/>
+            <a:ext cx="5897127" cy="461665"/>
           </a:xfrm>
           <a:prstGeom prst="rect">
             <a:avLst/>
@@ -8750,31 +8763,23 @@
           <a:lstStyle/>
           <a:p>
             <a:r>
-              <a:rPr lang="en-US" sz="3200" dirty="0" smtClean="0"/>
-              <a:t>• Event </a:t>
-            </a:r>
-            <a:r>
-              <a:rPr lang="en-US" sz="3200" dirty="0"/>
-              <a:t>sourcing requires major </a:t>
-            </a:r>
-            <a:r>
-              <a:rPr lang="en-US" sz="3200" dirty="0" smtClean="0"/>
-              <a:t>redesign</a:t>
-            </a:r>
-            <a:endParaRPr lang="en-US" sz="3200" dirty="0"/>
-          </a:p>
-        </p:txBody>
-      </p:sp>
-      <p:sp>
-        <p:nvSpPr>
-          <p:cNvPr id="5" name="TextBox 4"/>
+              <a:rPr lang="en-US" sz="2400" dirty="0" smtClean="0"/>
+              <a:t>• Proven, reliable, widely used in production</a:t>
+            </a:r>
+            <a:endParaRPr lang="en-US" sz="2400" dirty="0"/>
+          </a:p>
+        </p:txBody>
+      </p:sp>
+      <p:sp>
+        <p:nvSpPr>
+          <p:cNvPr id="12" name="TextBox 11"/>
           <p:cNvSpPr txBox="1"/>
           <p:nvPr/>
         </p:nvSpPr>
         <p:spPr>
           <a:xfrm>
-            <a:off x="582603" y="5033519"/>
-            <a:ext cx="10163360" cy="584775"/>
+            <a:off x="1999446" y="2760285"/>
+            <a:ext cx="3916521" cy="461665"/>
           </a:xfrm>
           <a:prstGeom prst="rect">
             <a:avLst/>
@@ -8788,69 +8793,46 @@
           <a:lstStyle/>
           <a:p>
             <a:r>
-              <a:rPr lang="en-US" sz="3200" dirty="0" smtClean="0"/>
-              <a:t>• MongoDB 3.6 with Change Streams just released</a:t>
-            </a:r>
-            <a:endParaRPr lang="en-US" sz="3200" dirty="0"/>
-          </a:p>
-        </p:txBody>
-      </p:sp>
-      <p:sp>
-        <p:nvSpPr>
-          <p:cNvPr id="6" name="TextBox 5"/>
-          <p:cNvSpPr txBox="1"/>
-          <p:nvPr/>
-        </p:nvSpPr>
-        <p:spPr>
-          <a:xfrm>
-            <a:off x="589262" y="2085263"/>
-            <a:ext cx="11327140" cy="584775"/>
-          </a:xfrm>
-          <a:prstGeom prst="rect">
-            <a:avLst/>
-          </a:prstGeom>
-          <a:noFill/>
-        </p:spPr>
-        <p:txBody>
-          <a:bodyPr wrap="none" rtlCol="0">
-            <a:spAutoFit/>
-          </a:bodyPr>
-          <a:lstStyle/>
-          <a:p>
-            <a:r>
-              <a:rPr lang="en-US" sz="3200" dirty="0" smtClean="0"/>
-              <a:t>• MongoDB 3.4, primary-secondary-arbiter (PSA), </a:t>
-            </a:r>
-            <a:r>
-              <a:rPr lang="en-US" sz="3200" dirty="0">
+              <a:rPr lang="en-US" sz="2400" dirty="0" smtClean="0"/>
+              <a:t>• Weak durability with </a:t>
+            </a:r>
+            <a:r>
+              <a:rPr lang="en-US" sz="2400" dirty="0">
                 <a:solidFill>
                   <a:srgbClr val="FFFF00"/>
                 </a:solidFill>
               </a:rPr>
-              <a:t>{ w: 1 </a:t>
-            </a:r>
-            <a:r>
-              <a:rPr lang="en-US" sz="3200" dirty="0" smtClean="0">
+              <a:t>{ w: </a:t>
+            </a:r>
+            <a:r>
+              <a:rPr lang="en-US" sz="2400" dirty="0" smtClean="0">
+                <a:solidFill>
+                  <a:srgbClr val="FFFF00"/>
+                </a:solidFill>
+              </a:rPr>
+              <a:t>1 </a:t>
+            </a:r>
+            <a:r>
+              <a:rPr lang="en-US" sz="2400" dirty="0">
                 <a:solidFill>
                   <a:srgbClr val="FFFF00"/>
                 </a:solidFill>
               </a:rPr>
               <a:t>}</a:t>
             </a:r>
-            <a:endParaRPr lang="en-US" sz="3200" dirty="0"/>
-          </a:p>
-        </p:txBody>
-      </p:sp>
-      <p:sp>
-        <p:nvSpPr>
-          <p:cNvPr id="7" name="TextBox 6"/>
+          </a:p>
+        </p:txBody>
+      </p:sp>
+      <p:sp>
+        <p:nvSpPr>
+          <p:cNvPr id="13" name="TextBox 12"/>
           <p:cNvSpPr txBox="1"/>
           <p:nvPr/>
         </p:nvSpPr>
         <p:spPr>
           <a:xfrm>
-            <a:off x="589262" y="2822327"/>
-            <a:ext cx="7584127" cy="584775"/>
+            <a:off x="1261872" y="1836955"/>
+            <a:ext cx="737574" cy="461665"/>
           </a:xfrm>
           <a:prstGeom prst="rect">
             <a:avLst/>
@@ -8864,18 +8846,124 @@
           <a:lstStyle/>
           <a:p>
             <a:r>
-              <a:rPr lang="en-US" sz="3200" dirty="0" smtClean="0"/>
+              <a:rPr lang="en-US" sz="2400" dirty="0" smtClean="0"/>
+              <a:t>Proc</a:t>
+            </a:r>
+            <a:endParaRPr lang="en-US" sz="2400" dirty="0"/>
+          </a:p>
+        </p:txBody>
+      </p:sp>
+      <p:sp>
+        <p:nvSpPr>
+          <p:cNvPr id="14" name="TextBox 13"/>
+          <p:cNvSpPr txBox="1"/>
+          <p:nvPr/>
+        </p:nvSpPr>
+        <p:spPr>
+          <a:xfrm>
+            <a:off x="1261872" y="3369794"/>
+            <a:ext cx="792205" cy="461665"/>
+          </a:xfrm>
+          <a:prstGeom prst="rect">
+            <a:avLst/>
+          </a:prstGeom>
+          <a:noFill/>
+        </p:spPr>
+        <p:txBody>
+          <a:bodyPr wrap="none" rtlCol="0">
+            <a:spAutoFit/>
+          </a:bodyPr>
+          <a:lstStyle/>
+          <a:p>
+            <a:r>
+              <a:rPr lang="en-US" sz="2400" dirty="0" smtClean="0"/>
+              <a:t>Cons</a:t>
+            </a:r>
+            <a:endParaRPr lang="en-US" sz="2400" dirty="0"/>
+          </a:p>
+        </p:txBody>
+      </p:sp>
+      <p:sp>
+        <p:nvSpPr>
+          <p:cNvPr id="15" name="TextBox 14"/>
+          <p:cNvSpPr txBox="1"/>
+          <p:nvPr/>
+        </p:nvSpPr>
+        <p:spPr>
+          <a:xfrm>
+            <a:off x="1999446" y="3979303"/>
+            <a:ext cx="4493538" cy="461665"/>
+          </a:xfrm>
+          <a:prstGeom prst="rect">
+            <a:avLst/>
+          </a:prstGeom>
+          <a:noFill/>
+        </p:spPr>
+        <p:txBody>
+          <a:bodyPr wrap="none" rtlCol="0">
+            <a:spAutoFit/>
+          </a:bodyPr>
+          <a:lstStyle/>
+          <a:p>
+            <a:r>
+              <a:rPr lang="en-US" sz="2400" dirty="0" smtClean="0"/>
               <a:t>• </a:t>
             </a:r>
             <a:r>
-              <a:rPr lang="en-US" sz="3200" dirty="0"/>
-              <a:t>No ACID transactions support so </a:t>
-            </a:r>
-            <a:r>
-              <a:rPr lang="en-US" sz="3200" dirty="0" smtClean="0"/>
-              <a:t>far</a:t>
-            </a:r>
-            <a:endParaRPr lang="en-US" sz="3200" dirty="0"/>
+              <a:rPr lang="en-US" sz="2400" dirty="0" smtClean="0"/>
+              <a:t>Private undocumented API</a:t>
+            </a:r>
+            <a:endParaRPr lang="en-US" sz="2400" dirty="0"/>
+          </a:p>
+        </p:txBody>
+      </p:sp>
+      <p:sp>
+        <p:nvSpPr>
+          <p:cNvPr id="16" name="TextBox 15"/>
+          <p:cNvSpPr txBox="1"/>
+          <p:nvPr/>
+        </p:nvSpPr>
+        <p:spPr>
+          <a:xfrm>
+            <a:off x="1999446" y="4944042"/>
+            <a:ext cx="4041556" cy="461665"/>
+          </a:xfrm>
+          <a:prstGeom prst="rect">
+            <a:avLst/>
+          </a:prstGeom>
+          <a:noFill/>
+        </p:spPr>
+        <p:txBody>
+          <a:bodyPr wrap="none" rtlCol="0">
+            <a:spAutoFit/>
+          </a:bodyPr>
+          <a:lstStyle/>
+          <a:p>
+            <a:r>
+              <a:rPr lang="en-US" sz="2400" dirty="0" smtClean="0"/>
+              <a:t>• </a:t>
+            </a:r>
+            <a:r>
+              <a:rPr lang="en-US" sz="2400" dirty="0" err="1" smtClean="0">
+                <a:solidFill>
+                  <a:srgbClr val="FFC000"/>
+                </a:solidFill>
+              </a:rPr>
+              <a:t>Adviced</a:t>
+            </a:r>
+            <a:r>
+              <a:rPr lang="en-US" sz="2400" dirty="0" smtClean="0">
+                <a:solidFill>
+                  <a:srgbClr val="FFC000"/>
+                </a:solidFill>
+              </a:rPr>
+              <a:t> against</a:t>
+            </a:r>
+            <a:r>
+              <a:rPr lang="en-US" sz="2400" dirty="0" smtClean="0"/>
+              <a:t> by MongoDB</a:t>
+            </a:r>
+            <a:endParaRPr lang="en-US" sz="2400" dirty="0"/>
           </a:p>
         </p:txBody>
       </p:sp>
@@ -8923,7 +9011,7 @@
                                           </p:stCondLst>
                                         </p:cTn>
                                         <p:tgtEl>
-                                          <p:spTgt spid="6"/>
+                                          <p:spTgt spid="13"/>
                                         </p:tgtEl>
                                         <p:attrNameLst>
                                           <p:attrName>style.visibility</p:attrName>
@@ -8968,7 +9056,7 @@
                                           </p:stCondLst>
                                         </p:cTn>
                                         <p:tgtEl>
-                                          <p:spTgt spid="7"/>
+                                          <p:spTgt spid="11"/>
                                         </p:tgtEl>
                                         <p:attrNameLst>
                                           <p:attrName>style.visibility</p:attrName>
@@ -9013,7 +9101,7 @@
                                           </p:stCondLst>
                                         </p:cTn>
                                         <p:tgtEl>
-                                          <p:spTgt spid="4"/>
+                                          <p:spTgt spid="12"/>
                                         </p:tgtEl>
                                         <p:attrNameLst>
                                           <p:attrName>style.visibility</p:attrName>
@@ -9058,7 +9146,7 @@
                                           </p:stCondLst>
                                         </p:cTn>
                                         <p:tgtEl>
-                                          <p:spTgt spid="3"/>
+                                          <p:spTgt spid="14"/>
                                         </p:tgtEl>
                                         <p:attrNameLst>
                                           <p:attrName>style.visibility</p:attrName>
@@ -9103,7 +9191,97 @@
                                           </p:stCondLst>
                                         </p:cTn>
                                         <p:tgtEl>
-                                          <p:spTgt spid="5"/>
+                                          <p:spTgt spid="15"/>
+                                        </p:tgtEl>
+                                        <p:attrNameLst>
+                                          <p:attrName>style.visibility</p:attrName>
+                                        </p:attrNameLst>
+                                      </p:cBhvr>
+                                      <p:to>
+                                        <p:strVal val="visible"/>
+                                      </p:to>
+                                    </p:set>
+                                  </p:childTnLst>
+                                </p:cTn>
+                              </p:par>
+                            </p:childTnLst>
+                          </p:cTn>
+                        </p:par>
+                      </p:childTnLst>
+                    </p:cTn>
+                  </p:par>
+                  <p:par>
+                    <p:cTn id="23" fill="hold">
+                      <p:stCondLst>
+                        <p:cond delay="indefinite"/>
+                      </p:stCondLst>
+                      <p:childTnLst>
+                        <p:par>
+                          <p:cTn id="24" fill="hold">
+                            <p:stCondLst>
+                              <p:cond delay="0"/>
+                            </p:stCondLst>
+                            <p:childTnLst>
+                              <p:par>
+                                <p:cTn id="25" presetID="1" presetClass="entr" presetSubtype="0" fill="hold" grpId="0" nodeType="clickEffect">
+                                  <p:stCondLst>
+                                    <p:cond delay="0"/>
+                                  </p:stCondLst>
+                                  <p:childTnLst>
+                                    <p:set>
+                                      <p:cBhvr>
+                                        <p:cTn id="26" dur="1" fill="hold">
+                                          <p:stCondLst>
+                                            <p:cond delay="0"/>
+                                          </p:stCondLst>
+                                        </p:cTn>
+                                        <p:tgtEl>
+                                          <p:spTgt spid="8"/>
+                                        </p:tgtEl>
+                                        <p:attrNameLst>
+                                          <p:attrName>style.visibility</p:attrName>
+                                        </p:attrNameLst>
+                                      </p:cBhvr>
+                                      <p:to>
+                                        <p:strVal val="visible"/>
+                                      </p:to>
+                                    </p:set>
+                                  </p:childTnLst>
+                                </p:cTn>
+                              </p:par>
+                            </p:childTnLst>
+                          </p:cTn>
+                        </p:par>
+                      </p:childTnLst>
+                    </p:cTn>
+                  </p:par>
+                  <p:par>
+                    <p:cTn id="27" fill="hold">
+                      <p:stCondLst>
+                        <p:cond delay="indefinite"/>
+                      </p:stCondLst>
+                      <p:childTnLst>
+                        <p:par>
+                          <p:cTn id="28" fill="hold">
+                            <p:stCondLst>
+                              <p:cond delay="0"/>
+                            </p:stCondLst>
+                            <p:childTnLst>
+                              <p:par>
+                                <p:cTn id="29" presetID="1" presetClass="entr" presetSubtype="0" fill="hold" grpId="0" nodeType="clickEffect">
+                                  <p:stCondLst>
+                                    <p:cond delay="0"/>
+                                  </p:stCondLst>
+                                  <p:childTnLst>
+                                    <p:set>
+                                      <p:cBhvr>
+                                        <p:cTn id="30" dur="1" fill="hold">
+                                          <p:stCondLst>
+                                            <p:cond delay="0"/>
+                                          </p:stCondLst>
+                                        </p:cTn>
+                                        <p:tgtEl>
+                                          <p:spTgt spid="16"/>
                                         </p:tgtEl>
                                         <p:attrNameLst>
                                           <p:attrName>style.visibility</p:attrName>
@@ -9144,11 +9322,13 @@
       </p:par>
     </p:tnLst>
     <p:bldLst>
-      <p:bldP spid="3" grpId="0"/>
-      <p:bldP spid="4" grpId="0"/>
-      <p:bldP spid="5" grpId="0"/>
-      <p:bldP spid="6" grpId="0"/>
-      <p:bldP spid="7" grpId="0"/>
+      <p:bldP spid="8" grpId="0"/>
+      <p:bldP spid="11" grpId="0"/>
+      <p:bldP spid="12" grpId="0"/>
+      <p:bldP spid="13" grpId="0"/>
+      <p:bldP spid="14" grpId="0"/>
+      <p:bldP spid="15" grpId="0"/>
+      <p:bldP spid="16" grpId="0"/>
     </p:bldLst>
   </p:timing>
 </p:sld>

</xml_diff>

<commit_message>
Removed second demo slide to showcase code on slides
</commit_message>
<xml_diff>
--- a/t18-event-mongodb.pptx
+++ b/t18-event-mongodb.pptx
@@ -5,10 +5,10 @@
     <p:sldMasterId id="2147483668" r:id="rId1"/>
   </p:sldMasterIdLst>
   <p:notesMasterIdLst>
-    <p:notesMasterId r:id="rId24"/>
+    <p:notesMasterId r:id="rId25"/>
   </p:notesMasterIdLst>
   <p:handoutMasterIdLst>
-    <p:handoutMasterId r:id="rId25"/>
+    <p:handoutMasterId r:id="rId26"/>
   </p:handoutMasterIdLst>
   <p:sldIdLst>
     <p:sldId id="274" r:id="rId2"/>
@@ -29,10 +29,11 @@
     <p:sldId id="272" r:id="rId17"/>
     <p:sldId id="273" r:id="rId18"/>
     <p:sldId id="265" r:id="rId19"/>
-    <p:sldId id="278" r:id="rId20"/>
-    <p:sldId id="279" r:id="rId21"/>
+    <p:sldId id="279" r:id="rId20"/>
+    <p:sldId id="278" r:id="rId21"/>
     <p:sldId id="281" r:id="rId22"/>
-    <p:sldId id="280" r:id="rId23"/>
+    <p:sldId id="282" r:id="rId23"/>
+    <p:sldId id="280" r:id="rId24"/>
   </p:sldIdLst>
   <p:sldSz cx="12192000" cy="6858000"/>
   <p:notesSz cx="6858000" cy="9144000"/>
@@ -224,7 +225,7 @@
           <a:p>
             <a:fld id="{17E652B7-3AE9-4B68-8899-8042A7E05A17}" type="datetimeFigureOut">
               <a:rPr lang="en-US" smtClean="0"/>
-              <a:t>12/5/2018</a:t>
+              <a:t>12/6/2018</a:t>
             </a:fld>
             <a:endParaRPr lang="en-US"/>
           </a:p>
@@ -389,7 +390,7 @@
           <a:p>
             <a:fld id="{E6B37F5D-8EED-4947-BE1B-6329FDDEF37E}" type="datetimeFigureOut">
               <a:rPr lang="en-US" smtClean="0"/>
-              <a:t>12/5/2018</a:t>
+              <a:t>12/6/2018</a:t>
             </a:fld>
             <a:endParaRPr lang="en-US"/>
           </a:p>
@@ -939,7 +940,7 @@
           <a:p>
             <a:fld id="{6D679973-E0F4-4AD1-8DEC-9AEE404E80A0}" type="slidenum">
               <a:rPr lang="en-US" smtClean="0"/>
-              <a:t>19</a:t>
+              <a:t>20</a:t>
             </a:fld>
             <a:endParaRPr lang="en-US"/>
           </a:p>
@@ -1023,7 +1024,7 @@
           <a:p>
             <a:fld id="{6D679973-E0F4-4AD1-8DEC-9AEE404E80A0}" type="slidenum">
               <a:rPr lang="en-US" smtClean="0"/>
-              <a:t>22</a:t>
+              <a:t>23</a:t>
             </a:fld>
             <a:endParaRPr lang="en-US"/>
           </a:p>
@@ -1571,21 +1572,20 @@
           <a:p>
             <a:r>
               <a:rPr lang="en-US" dirty="0" smtClean="0"/>
-              <a:t>A</a:t>
-            </a:r>
+              <a:t>What to do with No-SQL?</a:t>
+            </a:r>
+          </a:p>
+          <a:p>
+            <a:endParaRPr lang="en-US" baseline="0" dirty="0" smtClean="0"/>
+          </a:p>
+          <a:p>
             <a:r>
               <a:rPr lang="en-US" baseline="0" dirty="0" smtClean="0"/>
-              <a:t>ll ACID SQL DB engines</a:t>
+              <a:t>Searching conferences/talking to people. Not right-away obvious.</a:t>
             </a:r>
           </a:p>
           <a:p>
             <a:endParaRPr lang="en-US" baseline="0" dirty="0" smtClean="0"/>
-          </a:p>
-          <a:p>
-            <a:r>
-              <a:rPr lang="en-US" baseline="0" dirty="0" smtClean="0"/>
-              <a:t>Some No-SQL DB engines</a:t>
-            </a:r>
           </a:p>
           <a:p>
             <a:endParaRPr lang="en-US" dirty="0"/>
@@ -2205,7 +2205,7 @@
             <a:fld id="{B61BEF0D-F0BB-DE4B-95CE-6DB70DBA9567}" type="datetimeFigureOut">
               <a:rPr lang="en-US" smtClean="0"/>
               <a:pPr/>
-              <a:t>12/5/2018</a:t>
+              <a:t>12/6/2018</a:t>
             </a:fld>
             <a:endParaRPr lang="en-US" dirty="0"/>
           </a:p>
@@ -2505,7 +2505,7 @@
             <a:fld id="{B61BEF0D-F0BB-DE4B-95CE-6DB70DBA9567}" type="datetimeFigureOut">
               <a:rPr lang="en-US" smtClean="0"/>
               <a:pPr/>
-              <a:t>12/5/2018</a:t>
+              <a:t>12/6/2018</a:t>
             </a:fld>
             <a:endParaRPr lang="en-US" dirty="0"/>
           </a:p>
@@ -2766,7 +2766,7 @@
             <a:fld id="{B61BEF0D-F0BB-DE4B-95CE-6DB70DBA9567}" type="datetimeFigureOut">
               <a:rPr lang="en-US" smtClean="0"/>
               <a:pPr/>
-              <a:t>12/5/2018</a:t>
+              <a:t>12/6/2018</a:t>
             </a:fld>
             <a:endParaRPr lang="en-US" dirty="0"/>
           </a:p>
@@ -3237,7 +3237,7 @@
             <a:fld id="{B61BEF0D-F0BB-DE4B-95CE-6DB70DBA9567}" type="datetimeFigureOut">
               <a:rPr lang="en-US" smtClean="0"/>
               <a:pPr/>
-              <a:t>12/5/2018</a:t>
+              <a:t>12/6/2018</a:t>
             </a:fld>
             <a:endParaRPr lang="en-US" dirty="0"/>
           </a:p>
@@ -3419,7 +3419,7 @@
             <a:fld id="{B61BEF0D-F0BB-DE4B-95CE-6DB70DBA9567}" type="datetimeFigureOut">
               <a:rPr lang="en-US" smtClean="0"/>
               <a:pPr/>
-              <a:t>12/5/2018</a:t>
+              <a:t>12/6/2018</a:t>
             </a:fld>
             <a:endParaRPr lang="en-US" dirty="0"/>
           </a:p>
@@ -3997,7 +3997,7 @@
             <a:fld id="{B61BEF0D-F0BB-DE4B-95CE-6DB70DBA9567}" type="datetimeFigureOut">
               <a:rPr lang="en-US" smtClean="0"/>
               <a:pPr/>
-              <a:t>12/5/2018</a:t>
+              <a:t>12/6/2018</a:t>
             </a:fld>
             <a:endParaRPr lang="en-US" dirty="0"/>
           </a:p>
@@ -4331,7 +4331,7 @@
             <a:fld id="{B61BEF0D-F0BB-DE4B-95CE-6DB70DBA9567}" type="datetimeFigureOut">
               <a:rPr lang="en-US" smtClean="0"/>
               <a:pPr/>
-              <a:t>12/5/2018</a:t>
+              <a:t>12/6/2018</a:t>
             </a:fld>
             <a:endParaRPr lang="en-US" dirty="0"/>
           </a:p>
@@ -4508,7 +4508,7 @@
             <a:fld id="{B61BEF0D-F0BB-DE4B-95CE-6DB70DBA9567}" type="datetimeFigureOut">
               <a:rPr lang="en-US" smtClean="0"/>
               <a:pPr/>
-              <a:t>12/5/2018</a:t>
+              <a:t>12/6/2018</a:t>
             </a:fld>
             <a:endParaRPr lang="en-US" dirty="0"/>
           </a:p>
@@ -4690,7 +4690,7 @@
             <a:fld id="{B61BEF0D-F0BB-DE4B-95CE-6DB70DBA9567}" type="datetimeFigureOut">
               <a:rPr lang="en-US" smtClean="0"/>
               <a:pPr/>
-              <a:t>12/5/2018</a:t>
+              <a:t>12/6/2018</a:t>
             </a:fld>
             <a:endParaRPr lang="en-US" dirty="0"/>
           </a:p>
@@ -4862,7 +4862,7 @@
             <a:fld id="{B61BEF0D-F0BB-DE4B-95CE-6DB70DBA9567}" type="datetimeFigureOut">
               <a:rPr lang="en-US" smtClean="0"/>
               <a:pPr/>
-              <a:t>12/5/2018</a:t>
+              <a:t>12/6/2018</a:t>
             </a:fld>
             <a:endParaRPr lang="en-US" dirty="0"/>
           </a:p>
@@ -5128,7 +5128,7 @@
             <a:fld id="{B61BEF0D-F0BB-DE4B-95CE-6DB70DBA9567}" type="datetimeFigureOut">
               <a:rPr lang="en-US" smtClean="0"/>
               <a:pPr/>
-              <a:t>12/5/2018</a:t>
+              <a:t>12/6/2018</a:t>
             </a:fld>
             <a:endParaRPr lang="en-US" dirty="0"/>
           </a:p>
@@ -5429,7 +5429,7 @@
             <a:fld id="{B61BEF0D-F0BB-DE4B-95CE-6DB70DBA9567}" type="datetimeFigureOut">
               <a:rPr lang="en-US" smtClean="0"/>
               <a:pPr/>
-              <a:t>12/5/2018</a:t>
+              <a:t>12/6/2018</a:t>
             </a:fld>
             <a:endParaRPr lang="en-US" dirty="0"/>
           </a:p>
@@ -5861,7 +5861,7 @@
             <a:fld id="{B61BEF0D-F0BB-DE4B-95CE-6DB70DBA9567}" type="datetimeFigureOut">
               <a:rPr lang="en-US" smtClean="0"/>
               <a:pPr/>
-              <a:t>12/5/2018</a:t>
+              <a:t>12/6/2018</a:t>
             </a:fld>
             <a:endParaRPr lang="en-US" dirty="0"/>
           </a:p>
@@ -5981,7 +5981,7 @@
             <a:fld id="{B61BEF0D-F0BB-DE4B-95CE-6DB70DBA9567}" type="datetimeFigureOut">
               <a:rPr lang="en-US" smtClean="0"/>
               <a:pPr/>
-              <a:t>12/5/2018</a:t>
+              <a:t>12/6/2018</a:t>
             </a:fld>
             <a:endParaRPr lang="en-US" dirty="0"/>
           </a:p>
@@ -6085,7 +6085,7 @@
             <a:fld id="{B61BEF0D-F0BB-DE4B-95CE-6DB70DBA9567}" type="datetimeFigureOut">
               <a:rPr lang="en-US" smtClean="0"/>
               <a:pPr/>
-              <a:t>12/5/2018</a:t>
+              <a:t>12/6/2018</a:t>
             </a:fld>
             <a:endParaRPr lang="en-US" dirty="0"/>
           </a:p>
@@ -6370,7 +6370,7 @@
             <a:fld id="{B61BEF0D-F0BB-DE4B-95CE-6DB70DBA9567}" type="datetimeFigureOut">
               <a:rPr lang="en-US" smtClean="0"/>
               <a:pPr/>
-              <a:t>12/5/2018</a:t>
+              <a:t>12/6/2018</a:t>
             </a:fld>
             <a:endParaRPr lang="en-US" dirty="0"/>
           </a:p>
@@ -6663,7 +6663,7 @@
             <a:fld id="{B61BEF0D-F0BB-DE4B-95CE-6DB70DBA9567}" type="datetimeFigureOut">
               <a:rPr lang="en-US" smtClean="0"/>
               <a:pPr/>
-              <a:t>12/5/2018</a:t>
+              <a:t>12/6/2018</a:t>
             </a:fld>
             <a:endParaRPr lang="en-US" dirty="0"/>
           </a:p>
@@ -6896,7 +6896,7 @@
             <a:fld id="{B61BEF0D-F0BB-DE4B-95CE-6DB70DBA9567}" type="datetimeFigureOut">
               <a:rPr lang="en-US" smtClean="0"/>
               <a:pPr/>
-              <a:t>12/5/2018</a:t>
+              <a:t>12/6/2018</a:t>
             </a:fld>
             <a:endParaRPr lang="en-US" dirty="0"/>
           </a:p>
@@ -7658,8 +7658,8 @@
         </p:blipFill>
         <p:spPr>
           <a:xfrm>
-            <a:off x="1698762" y="517672"/>
-            <a:ext cx="2857500" cy="2857500"/>
+            <a:off x="1308758" y="272636"/>
+            <a:ext cx="3827222" cy="3827222"/>
           </a:xfrm>
           <a:prstGeom prst="rect">
             <a:avLst/>
@@ -7974,15 +7974,7 @@
           <a:p>
             <a:r>
               <a:rPr lang="en-US" sz="3200" dirty="0" smtClean="0"/>
-              <a:t>• MongoDB 3.6 </a:t>
-            </a:r>
-            <a:r>
-              <a:rPr lang="en-US" sz="3200" dirty="0" smtClean="0"/>
-              <a:t>change </a:t>
-            </a:r>
-            <a:r>
-              <a:rPr lang="en-US" sz="3200" dirty="0" smtClean="0"/>
-              <a:t>Streams just released</a:t>
+              <a:t>• MongoDB 3.6 change Streams just released</a:t>
             </a:r>
             <a:endParaRPr lang="en-US" sz="3200" dirty="0"/>
           </a:p>
@@ -8012,11 +8004,7 @@
           <a:p>
             <a:r>
               <a:rPr lang="en-US" sz="3200" dirty="0" smtClean="0"/>
-              <a:t>• MongoDB </a:t>
-            </a:r>
-            <a:r>
-              <a:rPr lang="en-US" sz="3200" dirty="0" smtClean="0"/>
-              <a:t>3.4</a:t>
+              <a:t>• MongoDB 3.4</a:t>
             </a:r>
             <a:endParaRPr lang="en-US" sz="3200" dirty="0"/>
           </a:p>
@@ -8364,7 +8352,7 @@
         </p:nvSpPr>
         <p:spPr>
           <a:xfrm>
-            <a:off x="582603" y="272151"/>
+            <a:off x="1249920" y="279382"/>
             <a:ext cx="10467113" cy="1262743"/>
           </a:xfrm>
         </p:spPr>
@@ -8394,7 +8382,7 @@
         <p:spPr>
           <a:xfrm>
             <a:off x="1999446" y="4440968"/>
-            <a:ext cx="6579045" cy="461665"/>
+            <a:ext cx="8715848" cy="584775"/>
           </a:xfrm>
           <a:prstGeom prst="rect">
             <a:avLst/>
@@ -8408,11 +8396,11 @@
           <a:lstStyle/>
           <a:p>
             <a:r>
-              <a:rPr lang="en-US" sz="2400" dirty="0" smtClean="0"/>
+              <a:rPr lang="en-US" sz="3200" dirty="0" smtClean="0"/>
               <a:t>• More efforts to implement </a:t>
             </a:r>
             <a:r>
-              <a:rPr lang="en-US" sz="2400" dirty="0" smtClean="0">
+              <a:rPr lang="en-US" sz="3200" dirty="0" smtClean="0">
                 <a:solidFill>
                   <a:srgbClr val="FFFF00"/>
                 </a:solidFill>
@@ -8420,14 +8408,14 @@
               <a:t>{ </a:t>
             </a:r>
             <a:r>
-              <a:rPr lang="en-US" sz="2400" dirty="0">
+              <a:rPr lang="en-US" sz="3200" dirty="0">
                 <a:solidFill>
                   <a:srgbClr val="FFFF00"/>
                 </a:solidFill>
               </a:rPr>
               <a:t>w: "majority" }</a:t>
             </a:r>
-            <a:endParaRPr lang="en-US" sz="2400" dirty="0"/>
+            <a:endParaRPr lang="en-US" sz="3200" dirty="0"/>
           </a:p>
         </p:txBody>
       </p:sp>
@@ -8440,7 +8428,7 @@
         <p:spPr>
           <a:xfrm>
             <a:off x="1999446" y="2298620"/>
-            <a:ext cx="5897127" cy="461665"/>
+            <a:ext cx="8954695" cy="584775"/>
           </a:xfrm>
           <a:prstGeom prst="rect">
             <a:avLst/>
@@ -8454,10 +8442,10 @@
           <a:lstStyle/>
           <a:p>
             <a:r>
-              <a:rPr lang="en-US" sz="2400" dirty="0" smtClean="0"/>
+              <a:rPr lang="en-US" sz="3200" dirty="0" smtClean="0"/>
               <a:t>• Proven, reliable, widely used in production</a:t>
             </a:r>
-            <a:endParaRPr lang="en-US" sz="2400" dirty="0"/>
+            <a:endParaRPr lang="en-US" sz="3200" dirty="0"/>
           </a:p>
         </p:txBody>
       </p:sp>
@@ -8470,7 +8458,7 @@
         <p:spPr>
           <a:xfrm>
             <a:off x="1999446" y="2760285"/>
-            <a:ext cx="5030544" cy="461665"/>
+            <a:ext cx="6652783" cy="584775"/>
           </a:xfrm>
           <a:prstGeom prst="rect">
             <a:avLst/>
@@ -8484,15 +8472,11 @@
           <a:lstStyle/>
           <a:p>
             <a:r>
-              <a:rPr lang="en-US" sz="2400" dirty="0" smtClean="0"/>
-              <a:t>• </a:t>
-            </a:r>
-            <a:r>
-              <a:rPr lang="en-US" sz="2400" dirty="0" smtClean="0"/>
-              <a:t>Emit event from Primary </a:t>
-            </a:r>
-            <a:r>
-              <a:rPr lang="en-US" sz="2400" dirty="0">
+              <a:rPr lang="en-US" sz="3200" dirty="0" smtClean="0"/>
+              <a:t>• Emit event from Primary </a:t>
+            </a:r>
+            <a:r>
+              <a:rPr lang="en-US" sz="3200" dirty="0">
                 <a:solidFill>
                   <a:srgbClr val="FFFF00"/>
                 </a:solidFill>
@@ -8500,7 +8484,7 @@
               <a:t>{ w: </a:t>
             </a:r>
             <a:r>
-              <a:rPr lang="en-US" sz="2400" dirty="0" smtClean="0">
+              <a:rPr lang="en-US" sz="3200" dirty="0" smtClean="0">
                 <a:solidFill>
                   <a:srgbClr val="FFFF00"/>
                 </a:solidFill>
@@ -8508,7 +8492,7 @@
               <a:t>1 </a:t>
             </a:r>
             <a:r>
-              <a:rPr lang="en-US" sz="2400" dirty="0">
+              <a:rPr lang="en-US" sz="3200" dirty="0">
                 <a:solidFill>
                   <a:srgbClr val="FFFF00"/>
                 </a:solidFill>
@@ -8527,7 +8511,7 @@
         <p:spPr>
           <a:xfrm>
             <a:off x="1261872" y="1836955"/>
-            <a:ext cx="782587" cy="461665"/>
+            <a:ext cx="979755" cy="584775"/>
           </a:xfrm>
           <a:prstGeom prst="rect">
             <a:avLst/>
@@ -8541,10 +8525,10 @@
           <a:lstStyle/>
           <a:p>
             <a:r>
-              <a:rPr lang="en-US" sz="2400" dirty="0" smtClean="0"/>
+              <a:rPr lang="en-US" sz="3200" dirty="0" smtClean="0"/>
               <a:t>Pros</a:t>
             </a:r>
-            <a:endParaRPr lang="en-US" sz="2400" dirty="0"/>
+            <a:endParaRPr lang="en-US" sz="3200" dirty="0"/>
           </a:p>
         </p:txBody>
       </p:sp>
@@ -8557,7 +8541,7 @@
         <p:spPr>
           <a:xfrm>
             <a:off x="1261872" y="3369794"/>
-            <a:ext cx="792205" cy="461665"/>
+            <a:ext cx="1196161" cy="584775"/>
           </a:xfrm>
           <a:prstGeom prst="rect">
             <a:avLst/>
@@ -8571,10 +8555,10 @@
           <a:lstStyle/>
           <a:p>
             <a:r>
-              <a:rPr lang="en-US" sz="2400" dirty="0" smtClean="0"/>
+              <a:rPr lang="en-US" sz="3200" dirty="0" smtClean="0"/>
               <a:t>Cons</a:t>
             </a:r>
-            <a:endParaRPr lang="en-US" sz="2400" dirty="0"/>
+            <a:endParaRPr lang="en-US" sz="3200" dirty="0"/>
           </a:p>
         </p:txBody>
       </p:sp>
@@ -8587,7 +8571,7 @@
         <p:spPr>
           <a:xfrm>
             <a:off x="1999446" y="3979303"/>
-            <a:ext cx="4493538" cy="461665"/>
+            <a:ext cx="5929828" cy="584775"/>
           </a:xfrm>
           <a:prstGeom prst="rect">
             <a:avLst/>
@@ -8601,10 +8585,10 @@
           <a:lstStyle/>
           <a:p>
             <a:r>
-              <a:rPr lang="en-US" sz="2400" dirty="0" smtClean="0"/>
+              <a:rPr lang="en-US" sz="3200" dirty="0" smtClean="0"/>
               <a:t>• Private undocumented API</a:t>
             </a:r>
-            <a:endParaRPr lang="en-US" sz="2400" dirty="0"/>
+            <a:endParaRPr lang="en-US" sz="3200" dirty="0"/>
           </a:p>
         </p:txBody>
       </p:sp>
@@ -8617,7 +8601,7 @@
         <p:spPr>
           <a:xfrm>
             <a:off x="1999446" y="4944042"/>
-            <a:ext cx="4873450" cy="461665"/>
+            <a:ext cx="6436377" cy="584775"/>
           </a:xfrm>
           <a:prstGeom prst="rect">
             <a:avLst/>
@@ -8631,11 +8615,11 @@
           <a:lstStyle/>
           <a:p>
             <a:r>
-              <a:rPr lang="en-US" sz="2400" dirty="0" smtClean="0"/>
+              <a:rPr lang="en-US" sz="3200" dirty="0" smtClean="0"/>
               <a:t>• </a:t>
             </a:r>
             <a:r>
-              <a:rPr lang="en-US" sz="2400" dirty="0" smtClean="0">
+              <a:rPr lang="en-US" sz="3200" dirty="0" smtClean="0">
                 <a:solidFill>
                   <a:srgbClr val="FFC000"/>
                 </a:solidFill>
@@ -8643,10 +8627,10 @@
               <a:t>Advised against</a:t>
             </a:r>
             <a:r>
-              <a:rPr lang="en-US" sz="2400" dirty="0" smtClean="0"/>
+              <a:rPr lang="en-US" sz="3200" dirty="0" smtClean="0"/>
               <a:t> by MongoDB</a:t>
             </a:r>
-            <a:endParaRPr lang="en-US" sz="2400" dirty="0"/>
+            <a:endParaRPr lang="en-US" sz="3200" dirty="0"/>
           </a:p>
         </p:txBody>
       </p:sp>
@@ -9283,11 +9267,7 @@
           <a:p>
             <a:r>
               <a:rPr lang="en-US" sz="3200" dirty="0" smtClean="0"/>
-              <a:t>• No way to </a:t>
-            </a:r>
-            <a:r>
-              <a:rPr lang="en-US" sz="3200" dirty="0" smtClean="0"/>
-              <a:t>emit from Primary </a:t>
+              <a:t>• No way to emit from Primary </a:t>
             </a:r>
             <a:r>
               <a:rPr lang="en-US" sz="3200" dirty="0">
@@ -9973,7 +9953,7 @@
         </p:nvSpPr>
         <p:spPr>
           <a:xfrm>
-            <a:off x="1261872" y="269457"/>
+            <a:off x="1040734" y="568280"/>
             <a:ext cx="10467113" cy="1262743"/>
           </a:xfrm>
         </p:spPr>
@@ -10003,8 +9983,8 @@
         </p:nvSpPr>
         <p:spPr>
           <a:xfrm>
-            <a:off x="1999446" y="3221950"/>
-            <a:ext cx="4231030" cy="461665"/>
+            <a:off x="1778308" y="3520773"/>
+            <a:ext cx="6381875" cy="584775"/>
           </a:xfrm>
           <a:prstGeom prst="rect">
             <a:avLst/>
@@ -10018,11 +9998,11 @@
           <a:lstStyle/>
           <a:p>
             <a:r>
-              <a:rPr lang="en-US" sz="2400" dirty="0" smtClean="0"/>
+              <a:rPr lang="en-US" sz="3200" dirty="0" smtClean="0"/>
               <a:t>• </a:t>
             </a:r>
             <a:r>
-              <a:rPr lang="en-US" sz="2400" dirty="0">
+              <a:rPr lang="en-US" sz="3200" dirty="0">
                 <a:solidFill>
                   <a:srgbClr val="FFFF00"/>
                 </a:solidFill>
@@ -10030,14 +10010,14 @@
               <a:t>{ w: "majority" }</a:t>
             </a:r>
             <a:r>
-              <a:rPr lang="en-US" sz="2400" dirty="0"/>
+              <a:rPr lang="en-US" sz="3200" dirty="0"/>
               <a:t> </a:t>
             </a:r>
             <a:r>
-              <a:rPr lang="en-US" sz="2400" dirty="0" smtClean="0"/>
+              <a:rPr lang="en-US" sz="3200" dirty="0" smtClean="0"/>
               <a:t>out of the box</a:t>
             </a:r>
-            <a:endParaRPr lang="en-US" sz="2400" dirty="0"/>
+            <a:endParaRPr lang="en-US" sz="3200" dirty="0"/>
           </a:p>
         </p:txBody>
       </p:sp>
@@ -10049,8 +10029,8 @@
         </p:nvSpPr>
         <p:spPr>
           <a:xfrm>
-            <a:off x="1999446" y="2298620"/>
-            <a:ext cx="7572922" cy="461665"/>
+            <a:off x="1778307" y="2597443"/>
+            <a:ext cx="9571001" cy="584775"/>
           </a:xfrm>
           <a:prstGeom prst="rect">
             <a:avLst/>
@@ -10064,7 +10044,7 @@
           <a:lstStyle/>
           <a:p>
             <a:r>
-              <a:rPr lang="en-US" sz="2400" dirty="0"/>
+              <a:rPr lang="en-US" sz="3200" dirty="0"/>
               <a:t>• Option to resume from a given Timestamp</a:t>
             </a:r>
           </a:p>
@@ -10078,8 +10058,8 @@
         </p:nvSpPr>
         <p:spPr>
           <a:xfrm>
-            <a:off x="1999446" y="2760285"/>
-            <a:ext cx="7637347" cy="461665"/>
+            <a:off x="1778308" y="3059108"/>
+            <a:ext cx="9361858" cy="584775"/>
           </a:xfrm>
           <a:prstGeom prst="rect">
             <a:avLst/>
@@ -10093,26 +10073,26 @@
           <a:lstStyle/>
           <a:p>
             <a:r>
-              <a:rPr lang="en-US" sz="2400" dirty="0" smtClean="0"/>
+              <a:rPr lang="en-US" sz="3200" dirty="0" smtClean="0"/>
               <a:t>• </a:t>
             </a:r>
             <a:r>
-              <a:rPr lang="en-US" sz="2400" dirty="0"/>
-              <a:t>Subscribe to changes from </a:t>
-            </a:r>
-            <a:r>
-              <a:rPr lang="en-US" sz="2400" dirty="0" smtClean="0"/>
+              <a:rPr lang="en-US" sz="3200" dirty="0"/>
+              <a:t>Subscribe to </a:t>
+            </a:r>
+            <a:r>
+              <a:rPr lang="en-US" sz="3200" dirty="0" smtClean="0"/>
               <a:t>database </a:t>
             </a:r>
             <a:r>
-              <a:rPr lang="en-US" sz="2400" dirty="0"/>
+              <a:rPr lang="en-US" sz="3200" dirty="0"/>
               <a:t>or entire </a:t>
             </a:r>
             <a:r>
-              <a:rPr lang="en-US" sz="2400" dirty="0" smtClean="0"/>
+              <a:rPr lang="en-US" sz="3200" dirty="0" smtClean="0"/>
               <a:t>deployment</a:t>
             </a:r>
-            <a:endParaRPr lang="en-US" sz="2400" dirty="0"/>
+            <a:endParaRPr lang="en-US" sz="3200" dirty="0"/>
           </a:p>
         </p:txBody>
       </p:sp>
@@ -10124,8 +10104,8 @@
         </p:nvSpPr>
         <p:spPr>
           <a:xfrm>
-            <a:off x="1261872" y="1836955"/>
-            <a:ext cx="782587" cy="461665"/>
+            <a:off x="1040734" y="2135778"/>
+            <a:ext cx="979755" cy="584775"/>
           </a:xfrm>
           <a:prstGeom prst="rect">
             <a:avLst/>
@@ -10139,10 +10119,10 @@
           <a:lstStyle/>
           <a:p>
             <a:r>
-              <a:rPr lang="en-US" sz="2400" dirty="0" smtClean="0"/>
+              <a:rPr lang="en-US" sz="3200" dirty="0" smtClean="0"/>
               <a:t>Pros</a:t>
             </a:r>
-            <a:endParaRPr lang="en-US" sz="2400" dirty="0"/>
+            <a:endParaRPr lang="en-US" sz="3200" dirty="0"/>
           </a:p>
         </p:txBody>
       </p:sp>
@@ -10154,8 +10134,8 @@
         </p:nvSpPr>
         <p:spPr>
           <a:xfrm>
-            <a:off x="1261872" y="4145280"/>
-            <a:ext cx="792205" cy="461665"/>
+            <a:off x="1040734" y="4444103"/>
+            <a:ext cx="1196161" cy="584775"/>
           </a:xfrm>
           <a:prstGeom prst="rect">
             <a:avLst/>
@@ -10169,10 +10149,10 @@
           <a:lstStyle/>
           <a:p>
             <a:r>
-              <a:rPr lang="en-US" sz="2400" dirty="0" smtClean="0"/>
+              <a:rPr lang="en-US" sz="3200" dirty="0" smtClean="0"/>
               <a:t>Cons</a:t>
             </a:r>
-            <a:endParaRPr lang="en-US" sz="2400" dirty="0"/>
+            <a:endParaRPr lang="en-US" sz="3200" dirty="0"/>
           </a:p>
         </p:txBody>
       </p:sp>
@@ -10184,8 +10164,8 @@
         </p:nvSpPr>
         <p:spPr>
           <a:xfrm>
-            <a:off x="1999445" y="4606945"/>
-            <a:ext cx="9147525" cy="461665"/>
+            <a:off x="1778307" y="4905768"/>
+            <a:ext cx="8590869" cy="584775"/>
           </a:xfrm>
           <a:prstGeom prst="rect">
             <a:avLst/>
@@ -10199,11 +10179,11 @@
           <a:lstStyle/>
           <a:p>
             <a:r>
-              <a:rPr lang="en-US" sz="2400" dirty="0" smtClean="0"/>
+              <a:rPr lang="en-US" sz="3200" dirty="0" smtClean="0"/>
               <a:t>• Only supports </a:t>
             </a:r>
             <a:r>
-              <a:rPr lang="en-US" sz="2400" dirty="0" smtClean="0">
+              <a:rPr lang="en-US" sz="3200" dirty="0" smtClean="0">
                 <a:solidFill>
                   <a:srgbClr val="FFFF00"/>
                 </a:solidFill>
@@ -10211,26 +10191,34 @@
               <a:t>{ w: "majority" }</a:t>
             </a:r>
             <a:r>
-              <a:rPr lang="en-US" sz="2400" dirty="0" smtClean="0"/>
-              <a:t>, no way to achieve </a:t>
-            </a:r>
-            <a:r>
-              <a:rPr lang="en-US" sz="2400" dirty="0">
+              <a:rPr lang="en-US" sz="3200" dirty="0" smtClean="0"/>
+              <a:t>, no </a:t>
+            </a:r>
+            <a:r>
+              <a:rPr lang="en-US" sz="3200" dirty="0" smtClean="0">
                 <a:solidFill>
                   <a:srgbClr val="FFFF00"/>
                 </a:solidFill>
               </a:rPr>
-              <a:t>{ w: </a:t>
-            </a:r>
-            <a:r>
-              <a:rPr lang="en-US" sz="2400" dirty="0" smtClean="0">
+              <a:t>{ </a:t>
+            </a:r>
+            <a:r>
+              <a:rPr lang="en-US" sz="3200" dirty="0">
+                <a:solidFill>
+                  <a:srgbClr val="FFFF00"/>
+                </a:solidFill>
+              </a:rPr>
+              <a:t>w: </a:t>
+            </a:r>
+            <a:r>
+              <a:rPr lang="en-US" sz="3200" dirty="0" smtClean="0">
                 <a:solidFill>
                   <a:srgbClr val="FFFF00"/>
                 </a:solidFill>
               </a:rPr>
               <a:t>1}</a:t>
             </a:r>
-            <a:endParaRPr lang="en-US" sz="2400" dirty="0">
+            <a:endParaRPr lang="en-US" sz="3200" dirty="0">
               <a:solidFill>
                 <a:srgbClr val="FFFF00"/>
               </a:solidFill>
@@ -10246,8 +10234,8 @@
         </p:nvSpPr>
         <p:spPr>
           <a:xfrm>
-            <a:off x="1999446" y="3683615"/>
-            <a:ext cx="3980257" cy="461665"/>
+            <a:off x="1778308" y="3982438"/>
+            <a:ext cx="6420347" cy="584775"/>
           </a:xfrm>
           <a:prstGeom prst="rect">
             <a:avLst/>
@@ -10261,11 +10249,11 @@
           <a:lstStyle/>
           <a:p>
             <a:r>
-              <a:rPr lang="en-US" sz="2400" dirty="0" smtClean="0"/>
+              <a:rPr lang="en-US" sz="3200" dirty="0" smtClean="0"/>
               <a:t>• </a:t>
             </a:r>
             <a:r>
-              <a:rPr lang="en-US" sz="2400" dirty="0" smtClean="0">
+              <a:rPr lang="en-US" sz="3200" dirty="0" smtClean="0">
                 <a:solidFill>
                   <a:srgbClr val="92D050"/>
                 </a:solidFill>
@@ -10273,10 +10261,10 @@
               <a:t>Recommended</a:t>
             </a:r>
             <a:r>
-              <a:rPr lang="en-US" sz="2400" dirty="0" smtClean="0"/>
+              <a:rPr lang="en-US" sz="3200" dirty="0" smtClean="0"/>
               <a:t> by MongoDB</a:t>
             </a:r>
-            <a:endParaRPr lang="en-US" sz="2400" dirty="0"/>
+            <a:endParaRPr lang="en-US" sz="3200" dirty="0"/>
           </a:p>
         </p:txBody>
       </p:sp>
@@ -10855,240 +10843,6 @@
             <p:ph type="title"/>
           </p:nvPr>
         </p:nvSpPr>
-        <p:spPr>
-          <a:xfrm>
-            <a:off x="1261872" y="269457"/>
-            <a:ext cx="10467113" cy="1262743"/>
-          </a:xfrm>
-        </p:spPr>
-        <p:txBody>
-          <a:bodyPr>
-            <a:noAutofit/>
-          </a:bodyPr>
-          <a:lstStyle/>
-          <a:p>
-            <a:r>
-              <a:rPr lang="en-US" sz="7200" dirty="0" smtClean="0"/>
-              <a:t>Resources</a:t>
-            </a:r>
-            <a:endParaRPr lang="en-US" sz="7200" dirty="0"/>
-          </a:p>
-        </p:txBody>
-      </p:sp>
-      <p:sp>
-        <p:nvSpPr>
-          <p:cNvPr id="3" name="Rectangle 2"/>
-          <p:cNvSpPr/>
-          <p:nvPr/>
-        </p:nvSpPr>
-        <p:spPr>
-          <a:xfrm>
-            <a:off x="140678" y="1836400"/>
-            <a:ext cx="12004431" cy="3693319"/>
-          </a:xfrm>
-          <a:prstGeom prst="rect">
-            <a:avLst/>
-          </a:prstGeom>
-        </p:spPr>
-        <p:txBody>
-          <a:bodyPr wrap="square">
-            <a:spAutoFit/>
-          </a:bodyPr>
-          <a:lstStyle/>
-          <a:p>
-            <a:r>
-              <a:rPr lang="en-US" dirty="0"/>
-              <a:t>Replication</a:t>
-            </a:r>
-          </a:p>
-          <a:p>
-            <a:r>
-              <a:rPr lang="en-US" dirty="0"/>
-              <a:t>    </a:t>
-            </a:r>
-            <a:r>
-              <a:rPr lang="en-US" dirty="0">
-                <a:hlinkClick r:id="rId3"/>
-              </a:rPr>
-              <a:t>https://www.slideshare.net/Stripe_talks/mongo-db-oplog</a:t>
-            </a:r>
-            <a:endParaRPr lang="en-US" dirty="0"/>
-          </a:p>
-          <a:p>
-            <a:r>
-              <a:rPr lang="en-US" dirty="0"/>
-              <a:t>    </a:t>
-            </a:r>
-            <a:r>
-              <a:rPr lang="en-US" dirty="0">
-                <a:hlinkClick r:id="rId4"/>
-              </a:rPr>
-              <a:t>https://www.compose.com/articles/the-mongodb-oplog-and-node-js/</a:t>
-            </a:r>
-            <a:endParaRPr lang="en-US" dirty="0"/>
-          </a:p>
-          <a:p>
-            <a:r>
-              <a:rPr lang="en-US" dirty="0"/>
-              <a:t>    </a:t>
-            </a:r>
-            <a:r>
-              <a:rPr lang="en-US" dirty="0">
-                <a:hlinkClick r:id="rId5"/>
-              </a:rPr>
-              <a:t>https://stackoverflow.com/questions/17878835/what-does-the-h-in-oplog-rs-document-stand-for</a:t>
-            </a:r>
-            <a:endParaRPr lang="en-US" dirty="0"/>
-          </a:p>
-          <a:p>
-            <a:r>
-              <a:rPr lang="en-US" dirty="0"/>
-              <a:t>    </a:t>
-            </a:r>
-            <a:r>
-              <a:rPr lang="en-US" dirty="0">
-                <a:hlinkClick r:id="rId6"/>
-              </a:rPr>
-              <a:t>https://stackoverflow.com/questions/26935419/what-do-the-oplog-fields-actually-mean</a:t>
-            </a:r>
-            <a:endParaRPr lang="en-US" dirty="0"/>
-          </a:p>
-          <a:p>
-            <a:endParaRPr lang="en-US" dirty="0"/>
-          </a:p>
-          <a:p>
-            <a:r>
-              <a:rPr lang="en-US" dirty="0"/>
-              <a:t>Event-Driven-Architecture</a:t>
-            </a:r>
-          </a:p>
-          <a:p>
-            <a:r>
-              <a:rPr lang="en-US" dirty="0"/>
-              <a:t>    </a:t>
-            </a:r>
-            <a:r>
-              <a:rPr lang="en-US" dirty="0">
-                <a:hlinkClick r:id="rId7"/>
-              </a:rPr>
-              <a:t>https://www.nginx.com/blog/event-driven-data-management-microservices/</a:t>
-            </a:r>
-            <a:endParaRPr lang="en-US" dirty="0"/>
-          </a:p>
-          <a:p>
-            <a:r>
-              <a:rPr lang="en-US" dirty="0"/>
-              <a:t>    </a:t>
-            </a:r>
-            <a:r>
-              <a:rPr lang="en-US" dirty="0">
-                <a:hlinkClick r:id="rId8"/>
-              </a:rPr>
-              <a:t>https://microservices.io/</a:t>
-            </a:r>
-            <a:endParaRPr lang="en-US" dirty="0"/>
-          </a:p>
-          <a:p>
-            <a:r>
-              <a:rPr lang="en-US" dirty="0"/>
-              <a:t>    </a:t>
-            </a:r>
-            <a:r>
-              <a:rPr lang="en-US" dirty="0">
-                <a:hlinkClick r:id="rId9"/>
-              </a:rPr>
-              <a:t>https://</a:t>
-            </a:r>
-            <a:r>
-              <a:rPr lang="en-US" dirty="0">
-                <a:solidFill>
-                  <a:schemeClr val="accent3"/>
-                </a:solidFill>
-                <a:hlinkClick r:id="rId9"/>
-              </a:rPr>
-              <a:t>skillsmatter.com/skillscasts/12115-keynote-not-just-events-developing-asynchronous-microservices</a:t>
-            </a:r>
-            <a:endParaRPr lang="en-US" dirty="0">
-              <a:solidFill>
-                <a:schemeClr val="accent3"/>
-              </a:solidFill>
-            </a:endParaRPr>
-          </a:p>
-          <a:p>
-            <a:endParaRPr lang="en-US" dirty="0">
-              <a:solidFill>
-                <a:srgbClr val="92D050"/>
-              </a:solidFill>
-            </a:endParaRPr>
-          </a:p>
-          <a:p>
-            <a:r>
-              <a:rPr lang="en-US" dirty="0"/>
-              <a:t>Domain model</a:t>
-            </a:r>
-          </a:p>
-          <a:p>
-            <a:r>
-              <a:rPr lang="en-US" dirty="0"/>
-              <a:t>    </a:t>
-            </a:r>
-            <a:r>
-              <a:rPr lang="en-US" dirty="0">
-                <a:hlinkClick r:id="rId10"/>
-              </a:rPr>
-              <a:t>http://dddcommunity.org/library/vernon_2011/</a:t>
-            </a:r>
-            <a:endParaRPr lang="en-US" dirty="0"/>
-          </a:p>
-        </p:txBody>
-      </p:sp>
-    </p:spTree>
-    <p:extLst>
-      <p:ext uri="{BB962C8B-B14F-4D97-AF65-F5344CB8AC3E}">
-        <p14:creationId xmlns:p14="http://schemas.microsoft.com/office/powerpoint/2010/main" val="2548005871"/>
-      </p:ext>
-    </p:extLst>
-  </p:cSld>
-  <p:clrMapOvr>
-    <a:masterClrMapping/>
-  </p:clrMapOvr>
-  <p:timing>
-    <p:tnLst>
-      <p:par>
-        <p:cTn id="1" dur="indefinite" restart="never" nodeType="tmRoot"/>
-      </p:par>
-    </p:tnLst>
-  </p:timing>
-</p:sld>
-</file>
-
-<file path=ppt/slides/slide2.xml><?xml version="1.0" encoding="utf-8"?>
-<p:sld xmlns:a="http://schemas.openxmlformats.org/drawingml/2006/main" xmlns:r="http://schemas.openxmlformats.org/officeDocument/2006/relationships" xmlns:p="http://schemas.openxmlformats.org/presentationml/2006/main">
-  <p:cSld>
-    <p:spTree>
-      <p:nvGrpSpPr>
-        <p:cNvPr id="1" name=""/>
-        <p:cNvGrpSpPr/>
-        <p:nvPr/>
-      </p:nvGrpSpPr>
-      <p:grpSpPr>
-        <a:xfrm>
-          <a:off x="0" y="0"/>
-          <a:ext cx="0" cy="0"/>
-          <a:chOff x="0" y="0"/>
-          <a:chExt cx="0" cy="0"/>
-        </a:xfrm>
-      </p:grpSpPr>
-      <p:sp>
-        <p:nvSpPr>
-          <p:cNvPr id="2" name="Title 1"/>
-          <p:cNvSpPr>
-            <a:spLocks noGrp="1"/>
-          </p:cNvSpPr>
-          <p:nvPr>
-            <p:ph type="title"/>
-          </p:nvPr>
-        </p:nvSpPr>
         <p:spPr/>
         <p:txBody>
           <a:bodyPr>
@@ -11097,73 +10851,28 @@
           <a:lstStyle/>
           <a:p>
             <a:r>
-              <a:rPr lang="en-US" sz="6000" dirty="0"/>
-              <a:t>Andrii </a:t>
-            </a:r>
-            <a:r>
-              <a:rPr lang="en-US" sz="6000" dirty="0" smtClean="0"/>
-              <a:t>Litvinov</a:t>
-            </a:r>
-            <a:endParaRPr lang="en-US" sz="6000" dirty="0"/>
-          </a:p>
-        </p:txBody>
-      </p:sp>
-      <p:pic>
-        <p:nvPicPr>
-          <p:cNvPr id="3" name="Picture 2" descr="https://scontent.fiev12-1.fna.fbcdn.net/v/t1.0-9/c0.0.215.215/12494928_1139995499368714_8989582005896967223_n.png?_nc_cat=109&amp;_nc_ht=scontent.fiev12-1.fna&amp;oh=ee4c679202e74d6262c8803b45612cb9&amp;oe=5C7304DF"/>
-          <p:cNvPicPr>
-            <a:picLocks noChangeAspect="1" noChangeArrowheads="1"/>
-          </p:cNvPicPr>
+              <a:rPr lang="en-US" sz="7200" dirty="0" smtClean="0"/>
+              <a:t>Summary</a:t>
+            </a:r>
+            <a:endParaRPr lang="en-US" sz="7200" dirty="0"/>
+          </a:p>
+        </p:txBody>
+      </p:sp>
+      <p:sp>
+        <p:nvSpPr>
+          <p:cNvPr id="4" name="TextBox 3"/>
+          <p:cNvSpPr txBox="1"/>
           <p:nvPr/>
-        </p:nvPicPr>
-        <p:blipFill>
-          <a:blip r:embed="rId3">
-            <a:extLst>
-              <a:ext uri="{28A0092B-C50C-407E-A947-70E740481C1C}">
-                <a14:useLocalDpi xmlns:a14="http://schemas.microsoft.com/office/drawing/2010/main" val="0"/>
-              </a:ext>
-            </a:extLst>
-          </a:blip>
-          <a:srcRect/>
-          <a:stretch>
-            <a:fillRect/>
-          </a:stretch>
-        </p:blipFill>
-        <p:spPr bwMode="auto">
-          <a:xfrm>
-            <a:off x="9465733" y="3679654"/>
-            <a:ext cx="2047875" cy="2047876"/>
+        </p:nvSpPr>
+        <p:spPr>
+          <a:xfrm>
+            <a:off x="1141413" y="4473977"/>
+            <a:ext cx="8613353" cy="1077218"/>
           </a:xfrm>
           <a:prstGeom prst="rect">
             <a:avLst/>
           </a:prstGeom>
           <a:noFill/>
-          <a:extLst>
-            <a:ext uri="{909E8E84-426E-40DD-AFC4-6F175D3DCCD1}">
-              <a14:hiddenFill xmlns:a14="http://schemas.microsoft.com/office/drawing/2010/main">
-                <a:solidFill>
-                  <a:srgbClr val="FFFFFF"/>
-                </a:solidFill>
-              </a14:hiddenFill>
-            </a:ext>
-          </a:extLst>
-        </p:spPr>
-      </p:pic>
-      <p:sp>
-        <p:nvSpPr>
-          <p:cNvPr id="4" name="TextBox 3"/>
-          <p:cNvSpPr txBox="1"/>
-          <p:nvPr/>
-        </p:nvSpPr>
-        <p:spPr>
-          <a:xfrm>
-            <a:off x="1141413" y="3918762"/>
-            <a:ext cx="8464731" cy="1569660"/>
-          </a:xfrm>
-          <a:prstGeom prst="rect">
-            <a:avLst/>
-          </a:prstGeom>
-          <a:noFill/>
         </p:spPr>
         <p:txBody>
           <a:bodyPr wrap="square" rtlCol="0">
@@ -11172,104 +10881,8 @@
           <a:lstStyle/>
           <a:p>
             <a:r>
-              <a:rPr lang="en-US" sz="4800" dirty="0" smtClean="0"/>
-              <a:t>Platform engineer at Synergy Sports Technology</a:t>
-            </a:r>
-            <a:endParaRPr lang="en-US" sz="4800" dirty="0"/>
-          </a:p>
-        </p:txBody>
-      </p:sp>
-    </p:spTree>
-    <p:extLst>
-      <p:ext uri="{BB962C8B-B14F-4D97-AF65-F5344CB8AC3E}">
-        <p14:creationId xmlns:p14="http://schemas.microsoft.com/office/powerpoint/2010/main" val="1499444302"/>
-      </p:ext>
-    </p:extLst>
-  </p:cSld>
-  <p:clrMapOvr>
-    <a:masterClrMapping/>
-  </p:clrMapOvr>
-  <p:timing>
-    <p:tnLst>
-      <p:par>
-        <p:cTn id="1" dur="indefinite" restart="never" nodeType="tmRoot"/>
-      </p:par>
-    </p:tnLst>
-  </p:timing>
-</p:sld>
-</file>
-
-<file path=ppt/slides/slide20.xml><?xml version="1.0" encoding="utf-8"?>
-<p:sld xmlns:a="http://schemas.openxmlformats.org/drawingml/2006/main" xmlns:r="http://schemas.openxmlformats.org/officeDocument/2006/relationships" xmlns:p="http://schemas.openxmlformats.org/presentationml/2006/main">
-  <p:cSld>
-    <p:spTree>
-      <p:nvGrpSpPr>
-        <p:cNvPr id="1" name=""/>
-        <p:cNvGrpSpPr/>
-        <p:nvPr/>
-      </p:nvGrpSpPr>
-      <p:grpSpPr>
-        <a:xfrm>
-          <a:off x="0" y="0"/>
-          <a:ext cx="0" cy="0"/>
-          <a:chOff x="0" y="0"/>
-          <a:chExt cx="0" cy="0"/>
-        </a:xfrm>
-      </p:grpSpPr>
-      <p:sp>
-        <p:nvSpPr>
-          <p:cNvPr id="2" name="Title 1"/>
-          <p:cNvSpPr>
-            <a:spLocks noGrp="1"/>
-          </p:cNvSpPr>
-          <p:nvPr>
-            <p:ph type="title"/>
-          </p:nvPr>
-        </p:nvSpPr>
-        <p:spPr/>
-        <p:txBody>
-          <a:bodyPr>
-            <a:normAutofit/>
-          </a:bodyPr>
-          <a:lstStyle/>
-          <a:p>
-            <a:r>
-              <a:rPr lang="en-US" sz="7200" dirty="0" smtClean="0"/>
-              <a:t>Summary</a:t>
-            </a:r>
-            <a:endParaRPr lang="en-US" sz="7200" dirty="0"/>
-          </a:p>
-        </p:txBody>
-      </p:sp>
-      <p:sp>
-        <p:nvSpPr>
-          <p:cNvPr id="4" name="TextBox 3"/>
-          <p:cNvSpPr txBox="1"/>
-          <p:nvPr/>
-        </p:nvSpPr>
-        <p:spPr>
-          <a:xfrm>
-            <a:off x="1141413" y="4473977"/>
-            <a:ext cx="8613353" cy="1077218"/>
-          </a:xfrm>
-          <a:prstGeom prst="rect">
-            <a:avLst/>
-          </a:prstGeom>
-          <a:noFill/>
-        </p:spPr>
-        <p:txBody>
-          <a:bodyPr wrap="square" rtlCol="0">
-            <a:spAutoFit/>
-          </a:bodyPr>
-          <a:lstStyle/>
-          <a:p>
-            <a:r>
               <a:rPr lang="en-US" sz="3200" dirty="0" smtClean="0"/>
-              <a:t>• </a:t>
-            </a:r>
-            <a:r>
-              <a:rPr lang="en-US" sz="3200" dirty="0" smtClean="0"/>
-              <a:t>Use </a:t>
+              <a:t>• Use </a:t>
             </a:r>
             <a:r>
               <a:rPr lang="en-US" sz="3200" dirty="0" smtClean="0">
@@ -11311,11 +10924,7 @@
           <a:p>
             <a:r>
               <a:rPr lang="en-US" sz="3200" dirty="0" smtClean="0"/>
-              <a:t>• </a:t>
-            </a:r>
-            <a:r>
-              <a:rPr lang="en-US" sz="3200" dirty="0" smtClean="0"/>
-              <a:t>Write state and publish event </a:t>
+              <a:t>• Write state and publish event </a:t>
             </a:r>
             <a:r>
               <a:rPr lang="en-US" sz="3200" dirty="0" smtClean="0">
@@ -11357,11 +10966,7 @@
           <a:p>
             <a:r>
               <a:rPr lang="en-US" sz="3200" dirty="0" smtClean="0"/>
-              <a:t>• </a:t>
-            </a:r>
-            <a:r>
-              <a:rPr lang="en-US" sz="3200" dirty="0" smtClean="0"/>
-              <a:t>Use </a:t>
+              <a:t>• Use </a:t>
             </a:r>
             <a:r>
               <a:rPr lang="en-US" sz="3200" dirty="0" err="1" smtClean="0">
@@ -11385,11 +10990,7 @@
             </a:r>
             <a:r>
               <a:rPr lang="en-US" sz="3200" dirty="0" smtClean="0"/>
-              <a:t>prior </a:t>
-            </a:r>
-            <a:r>
-              <a:rPr lang="en-US" sz="3200" dirty="0" smtClean="0"/>
-              <a:t>MongoDB 4.0 	or with 2 data-bearing nodes</a:t>
+              <a:t>prior MongoDB 4.0 	or with 2 data-bearing nodes</a:t>
             </a:r>
             <a:endParaRPr lang="en-US" sz="3200" dirty="0"/>
           </a:p>
@@ -11578,6 +11179,377 @@
 </p:sld>
 </file>
 
+<file path=ppt/slides/slide2.xml><?xml version="1.0" encoding="utf-8"?>
+<p:sld xmlns:a="http://schemas.openxmlformats.org/drawingml/2006/main" xmlns:r="http://schemas.openxmlformats.org/officeDocument/2006/relationships" xmlns:p="http://schemas.openxmlformats.org/presentationml/2006/main">
+  <p:cSld>
+    <p:spTree>
+      <p:nvGrpSpPr>
+        <p:cNvPr id="1" name=""/>
+        <p:cNvGrpSpPr/>
+        <p:nvPr/>
+      </p:nvGrpSpPr>
+      <p:grpSpPr>
+        <a:xfrm>
+          <a:off x="0" y="0"/>
+          <a:ext cx="0" cy="0"/>
+          <a:chOff x="0" y="0"/>
+          <a:chExt cx="0" cy="0"/>
+        </a:xfrm>
+      </p:grpSpPr>
+      <p:sp>
+        <p:nvSpPr>
+          <p:cNvPr id="2" name="Title 1"/>
+          <p:cNvSpPr>
+            <a:spLocks noGrp="1"/>
+          </p:cNvSpPr>
+          <p:nvPr>
+            <p:ph type="title"/>
+          </p:nvPr>
+        </p:nvSpPr>
+        <p:spPr/>
+        <p:txBody>
+          <a:bodyPr>
+            <a:normAutofit/>
+          </a:bodyPr>
+          <a:lstStyle/>
+          <a:p>
+            <a:r>
+              <a:rPr lang="en-US" sz="6000" dirty="0"/>
+              <a:t>Andrii </a:t>
+            </a:r>
+            <a:r>
+              <a:rPr lang="en-US" sz="6000" dirty="0" smtClean="0"/>
+              <a:t>Litvinov</a:t>
+            </a:r>
+            <a:endParaRPr lang="en-US" sz="6000" dirty="0"/>
+          </a:p>
+        </p:txBody>
+      </p:sp>
+      <p:pic>
+        <p:nvPicPr>
+          <p:cNvPr id="3" name="Picture 2" descr="https://scontent.fiev12-1.fna.fbcdn.net/v/t1.0-9/c0.0.215.215/12494928_1139995499368714_8989582005896967223_n.png?_nc_cat=109&amp;_nc_ht=scontent.fiev12-1.fna&amp;oh=ee4c679202e74d6262c8803b45612cb9&amp;oe=5C7304DF"/>
+          <p:cNvPicPr>
+            <a:picLocks noChangeAspect="1" noChangeArrowheads="1"/>
+          </p:cNvPicPr>
+          <p:nvPr/>
+        </p:nvPicPr>
+        <p:blipFill>
+          <a:blip r:embed="rId3">
+            <a:extLst>
+              <a:ext uri="{28A0092B-C50C-407E-A947-70E740481C1C}">
+                <a14:useLocalDpi xmlns:a14="http://schemas.microsoft.com/office/drawing/2010/main" val="0"/>
+              </a:ext>
+            </a:extLst>
+          </a:blip>
+          <a:srcRect/>
+          <a:stretch>
+            <a:fillRect/>
+          </a:stretch>
+        </p:blipFill>
+        <p:spPr bwMode="auto">
+          <a:xfrm>
+            <a:off x="9465733" y="3679654"/>
+            <a:ext cx="2047875" cy="2047876"/>
+          </a:xfrm>
+          <a:prstGeom prst="rect">
+            <a:avLst/>
+          </a:prstGeom>
+          <a:noFill/>
+          <a:extLst>
+            <a:ext uri="{909E8E84-426E-40DD-AFC4-6F175D3DCCD1}">
+              <a14:hiddenFill xmlns:a14="http://schemas.microsoft.com/office/drawing/2010/main">
+                <a:solidFill>
+                  <a:srgbClr val="FFFFFF"/>
+                </a:solidFill>
+              </a14:hiddenFill>
+            </a:ext>
+          </a:extLst>
+        </p:spPr>
+      </p:pic>
+      <p:sp>
+        <p:nvSpPr>
+          <p:cNvPr id="4" name="TextBox 3"/>
+          <p:cNvSpPr txBox="1"/>
+          <p:nvPr/>
+        </p:nvSpPr>
+        <p:spPr>
+          <a:xfrm>
+            <a:off x="1141413" y="3918762"/>
+            <a:ext cx="8464731" cy="1569660"/>
+          </a:xfrm>
+          <a:prstGeom prst="rect">
+            <a:avLst/>
+          </a:prstGeom>
+          <a:noFill/>
+        </p:spPr>
+        <p:txBody>
+          <a:bodyPr wrap="square" rtlCol="0">
+            <a:spAutoFit/>
+          </a:bodyPr>
+          <a:lstStyle/>
+          <a:p>
+            <a:r>
+              <a:rPr lang="en-US" sz="4800" dirty="0" smtClean="0"/>
+              <a:t>Platform engineer at Synergy Sports Technology</a:t>
+            </a:r>
+            <a:endParaRPr lang="en-US" sz="4800" dirty="0"/>
+          </a:p>
+        </p:txBody>
+      </p:sp>
+    </p:spTree>
+    <p:extLst>
+      <p:ext uri="{BB962C8B-B14F-4D97-AF65-F5344CB8AC3E}">
+        <p14:creationId xmlns:p14="http://schemas.microsoft.com/office/powerpoint/2010/main" val="1499444302"/>
+      </p:ext>
+    </p:extLst>
+  </p:cSld>
+  <p:clrMapOvr>
+    <a:masterClrMapping/>
+  </p:clrMapOvr>
+  <p:timing>
+    <p:tnLst>
+      <p:par>
+        <p:cTn id="1" dur="indefinite" restart="never" nodeType="tmRoot"/>
+      </p:par>
+    </p:tnLst>
+  </p:timing>
+</p:sld>
+</file>
+
+<file path=ppt/slides/slide20.xml><?xml version="1.0" encoding="utf-8"?>
+<p:sld xmlns:a="http://schemas.openxmlformats.org/drawingml/2006/main" xmlns:r="http://schemas.openxmlformats.org/officeDocument/2006/relationships" xmlns:p="http://schemas.openxmlformats.org/presentationml/2006/main">
+  <p:cSld>
+    <p:spTree>
+      <p:nvGrpSpPr>
+        <p:cNvPr id="1" name=""/>
+        <p:cNvGrpSpPr/>
+        <p:nvPr/>
+      </p:nvGrpSpPr>
+      <p:grpSpPr>
+        <a:xfrm>
+          <a:off x="0" y="0"/>
+          <a:ext cx="0" cy="0"/>
+          <a:chOff x="0" y="0"/>
+          <a:chExt cx="0" cy="0"/>
+        </a:xfrm>
+      </p:grpSpPr>
+      <p:sp>
+        <p:nvSpPr>
+          <p:cNvPr id="2" name="Title 1"/>
+          <p:cNvSpPr>
+            <a:spLocks noGrp="1"/>
+          </p:cNvSpPr>
+          <p:nvPr>
+            <p:ph type="title"/>
+          </p:nvPr>
+        </p:nvSpPr>
+        <p:spPr>
+          <a:xfrm>
+            <a:off x="140678" y="287386"/>
+            <a:ext cx="10467113" cy="1262743"/>
+          </a:xfrm>
+        </p:spPr>
+        <p:txBody>
+          <a:bodyPr>
+            <a:noAutofit/>
+          </a:bodyPr>
+          <a:lstStyle/>
+          <a:p>
+            <a:r>
+              <a:rPr lang="en-US" sz="7200" dirty="0" smtClean="0"/>
+              <a:t>Resources</a:t>
+            </a:r>
+            <a:endParaRPr lang="en-US" sz="7200" dirty="0"/>
+          </a:p>
+        </p:txBody>
+      </p:sp>
+      <p:sp>
+        <p:nvSpPr>
+          <p:cNvPr id="3" name="Rectangle 2"/>
+          <p:cNvSpPr/>
+          <p:nvPr/>
+        </p:nvSpPr>
+        <p:spPr>
+          <a:xfrm>
+            <a:off x="140678" y="1836400"/>
+            <a:ext cx="12004431" cy="3693319"/>
+          </a:xfrm>
+          <a:prstGeom prst="rect">
+            <a:avLst/>
+          </a:prstGeom>
+        </p:spPr>
+        <p:txBody>
+          <a:bodyPr wrap="square">
+            <a:spAutoFit/>
+          </a:bodyPr>
+          <a:lstStyle/>
+          <a:p>
+            <a:r>
+              <a:rPr lang="en-US" dirty="0"/>
+              <a:t>Replication</a:t>
+            </a:r>
+          </a:p>
+          <a:p>
+            <a:r>
+              <a:rPr lang="en-US" dirty="0"/>
+              <a:t>    </a:t>
+            </a:r>
+            <a:r>
+              <a:rPr lang="en-US" dirty="0">
+                <a:hlinkClick r:id="rId3"/>
+              </a:rPr>
+              <a:t>https://www.slideshare.net/Stripe_talks/mongo-db-oplog</a:t>
+            </a:r>
+            <a:endParaRPr lang="en-US" dirty="0"/>
+          </a:p>
+          <a:p>
+            <a:r>
+              <a:rPr lang="en-US" dirty="0"/>
+              <a:t>    </a:t>
+            </a:r>
+            <a:r>
+              <a:rPr lang="en-US" dirty="0">
+                <a:hlinkClick r:id="rId4"/>
+              </a:rPr>
+              <a:t>https://www.compose.com/articles/the-mongodb-oplog-and-node-js/</a:t>
+            </a:r>
+            <a:endParaRPr lang="en-US" dirty="0"/>
+          </a:p>
+          <a:p>
+            <a:r>
+              <a:rPr lang="en-US" dirty="0"/>
+              <a:t>    </a:t>
+            </a:r>
+            <a:r>
+              <a:rPr lang="en-US" dirty="0">
+                <a:hlinkClick r:id="rId5"/>
+              </a:rPr>
+              <a:t>https://stackoverflow.com/questions/17878835/what-does-the-h-in-oplog-rs-document-stand-for</a:t>
+            </a:r>
+            <a:endParaRPr lang="en-US" dirty="0"/>
+          </a:p>
+          <a:p>
+            <a:r>
+              <a:rPr lang="en-US" dirty="0"/>
+              <a:t>    </a:t>
+            </a:r>
+            <a:r>
+              <a:rPr lang="en-US" dirty="0">
+                <a:hlinkClick r:id="rId6"/>
+              </a:rPr>
+              <a:t>https://stackoverflow.com/questions/26935419/what-do-the-oplog-fields-actually-mean</a:t>
+            </a:r>
+            <a:endParaRPr lang="en-US" dirty="0"/>
+          </a:p>
+          <a:p>
+            <a:endParaRPr lang="en-US" dirty="0"/>
+          </a:p>
+          <a:p>
+            <a:r>
+              <a:rPr lang="en-US" dirty="0"/>
+              <a:t>Event-Driven-Architecture</a:t>
+            </a:r>
+          </a:p>
+          <a:p>
+            <a:r>
+              <a:rPr lang="en-US" dirty="0"/>
+              <a:t>    </a:t>
+            </a:r>
+            <a:r>
+              <a:rPr lang="en-US" dirty="0">
+                <a:hlinkClick r:id="rId7"/>
+              </a:rPr>
+              <a:t>https://www.nginx.com/blog/event-driven-data-management-microservices/</a:t>
+            </a:r>
+            <a:endParaRPr lang="en-US" dirty="0"/>
+          </a:p>
+          <a:p>
+            <a:r>
+              <a:rPr lang="en-US" dirty="0"/>
+              <a:t>    </a:t>
+            </a:r>
+            <a:r>
+              <a:rPr lang="en-US" dirty="0">
+                <a:hlinkClick r:id="rId8"/>
+              </a:rPr>
+              <a:t>https://microservices.io/</a:t>
+            </a:r>
+            <a:endParaRPr lang="en-US" dirty="0"/>
+          </a:p>
+          <a:p>
+            <a:r>
+              <a:rPr lang="en-US" dirty="0"/>
+              <a:t>    </a:t>
+            </a:r>
+            <a:r>
+              <a:rPr lang="en-US" dirty="0">
+                <a:hlinkClick r:id="rId9"/>
+              </a:rPr>
+              <a:t>https://</a:t>
+            </a:r>
+            <a:r>
+              <a:rPr lang="en-US" dirty="0">
+                <a:solidFill>
+                  <a:schemeClr val="accent3"/>
+                </a:solidFill>
+                <a:hlinkClick r:id="rId9"/>
+              </a:rPr>
+              <a:t>skillsmatter.com/skillscasts/12115-keynote-not-just-events-developing-asynchronous-microservices</a:t>
+            </a:r>
+            <a:endParaRPr lang="en-US" dirty="0">
+              <a:solidFill>
+                <a:schemeClr val="accent3"/>
+              </a:solidFill>
+            </a:endParaRPr>
+          </a:p>
+          <a:p>
+            <a:endParaRPr lang="en-US" dirty="0">
+              <a:solidFill>
+                <a:srgbClr val="92D050"/>
+              </a:solidFill>
+            </a:endParaRPr>
+          </a:p>
+          <a:p>
+            <a:r>
+              <a:rPr lang="en-US" dirty="0"/>
+              <a:t>Domain model</a:t>
+            </a:r>
+          </a:p>
+          <a:p>
+            <a:r>
+              <a:rPr lang="en-US" dirty="0"/>
+              <a:t>    </a:t>
+            </a:r>
+            <a:r>
+              <a:rPr lang="en-US" dirty="0">
+                <a:hlinkClick r:id="rId10"/>
+              </a:rPr>
+              <a:t>http://dddcommunity.org/library/vernon_2011/</a:t>
+            </a:r>
+            <a:endParaRPr lang="en-US" dirty="0"/>
+          </a:p>
+        </p:txBody>
+      </p:sp>
+    </p:spTree>
+    <p:extLst>
+      <p:ext uri="{BB962C8B-B14F-4D97-AF65-F5344CB8AC3E}">
+        <p14:creationId xmlns:p14="http://schemas.microsoft.com/office/powerpoint/2010/main" val="2548005871"/>
+      </p:ext>
+    </p:extLst>
+  </p:cSld>
+  <p:clrMapOvr>
+    <a:masterClrMapping/>
+  </p:clrMapOvr>
+  <p:timing>
+    <p:tnLst>
+      <p:par>
+        <p:cTn id="1" dur="indefinite" restart="never" nodeType="tmRoot"/>
+      </p:par>
+    </p:tnLst>
+  </p:timing>
+</p:sld>
+</file>
+
 <file path=ppt/slides/slide21.xml><?xml version="1.0" encoding="utf-8"?>
 <p:sld xmlns:a="http://schemas.openxmlformats.org/drawingml/2006/main" xmlns:r="http://schemas.openxmlformats.org/officeDocument/2006/relationships" xmlns:p="http://schemas.openxmlformats.org/presentationml/2006/main">
   <p:cSld>
@@ -11605,7 +11577,12 @@
             <p:ph type="title"/>
           </p:nvPr>
         </p:nvSpPr>
-        <p:spPr/>
+        <p:spPr>
+          <a:xfrm>
+            <a:off x="513286" y="128954"/>
+            <a:ext cx="9905998" cy="1905000"/>
+          </a:xfrm>
+        </p:spPr>
         <p:txBody>
           <a:bodyPr>
             <a:normAutofit/>
@@ -11614,9 +11591,166 @@
           <a:p>
             <a:r>
               <a:rPr lang="en-US" sz="7200" dirty="0" smtClean="0"/>
-              <a:t>Thank You!</a:t>
+              <a:t>Contacts</a:t>
             </a:r>
             <a:endParaRPr lang="en-US" sz="7200" dirty="0"/>
+          </a:p>
+        </p:txBody>
+      </p:sp>
+      <p:sp>
+        <p:nvSpPr>
+          <p:cNvPr id="3" name="Rectangle 2"/>
+          <p:cNvSpPr/>
+          <p:nvPr/>
+        </p:nvSpPr>
+        <p:spPr>
+          <a:xfrm>
+            <a:off x="513286" y="2157515"/>
+            <a:ext cx="6664737" cy="584775"/>
+          </a:xfrm>
+          <a:prstGeom prst="rect">
+            <a:avLst/>
+          </a:prstGeom>
+        </p:spPr>
+        <p:txBody>
+          <a:bodyPr wrap="square">
+            <a:spAutoFit/>
+          </a:bodyPr>
+          <a:lstStyle/>
+          <a:p>
+            <a:r>
+              <a:rPr lang="en-US" sz="3200" dirty="0">
+                <a:hlinkClick r:id="rId2"/>
+              </a:rPr>
+              <a:t>https://twitter.com/andriilitvinov</a:t>
+            </a:r>
+            <a:endParaRPr lang="en-US" sz="3200" dirty="0"/>
+          </a:p>
+        </p:txBody>
+      </p:sp>
+      <p:sp>
+        <p:nvSpPr>
+          <p:cNvPr id="4" name="Rectangle 3">
+            <a:hlinkClick r:id="rId3"/>
+          </p:cNvPr>
+          <p:cNvSpPr/>
+          <p:nvPr/>
+        </p:nvSpPr>
+        <p:spPr>
+          <a:xfrm>
+            <a:off x="513286" y="3058626"/>
+            <a:ext cx="11502868" cy="584775"/>
+          </a:xfrm>
+          <a:prstGeom prst="rect">
+            <a:avLst/>
+          </a:prstGeom>
+        </p:spPr>
+        <p:txBody>
+          <a:bodyPr wrap="square">
+            <a:spAutoFit/>
+          </a:bodyPr>
+          <a:lstStyle/>
+          <a:p>
+            <a:r>
+              <a:rPr lang="en-US" sz="3200" dirty="0">
+                <a:hlinkClick r:id="rId3"/>
+              </a:rPr>
+              <a:t>https://stackoverflow.com/users/2138959/andrii-litvinov</a:t>
+            </a:r>
+            <a:endParaRPr lang="en-US" sz="3200" dirty="0"/>
+          </a:p>
+        </p:txBody>
+      </p:sp>
+      <p:sp>
+        <p:nvSpPr>
+          <p:cNvPr id="5" name="Rectangle 4"/>
+          <p:cNvSpPr/>
+          <p:nvPr/>
+        </p:nvSpPr>
+        <p:spPr>
+          <a:xfrm>
+            <a:off x="513287" y="3959737"/>
+            <a:ext cx="6846772" cy="584775"/>
+          </a:xfrm>
+          <a:prstGeom prst="rect">
+            <a:avLst/>
+          </a:prstGeom>
+        </p:spPr>
+        <p:txBody>
+          <a:bodyPr wrap="square">
+            <a:spAutoFit/>
+          </a:bodyPr>
+          <a:lstStyle/>
+          <a:p>
+            <a:r>
+              <a:rPr lang="en-US" sz="3200" dirty="0">
+                <a:hlinkClick r:id="rId4"/>
+              </a:rPr>
+              <a:t>https://github.com/andrii-litvinov</a:t>
+            </a:r>
+            <a:endParaRPr lang="en-US" sz="3200" dirty="0"/>
+          </a:p>
+        </p:txBody>
+      </p:sp>
+      <p:sp>
+        <p:nvSpPr>
+          <p:cNvPr id="6" name="Rectangle 5"/>
+          <p:cNvSpPr/>
+          <p:nvPr/>
+        </p:nvSpPr>
+        <p:spPr>
+          <a:xfrm>
+            <a:off x="551037" y="5761960"/>
+            <a:ext cx="8425353" cy="584775"/>
+          </a:xfrm>
+          <a:prstGeom prst="rect">
+            <a:avLst/>
+          </a:prstGeom>
+        </p:spPr>
+        <p:txBody>
+          <a:bodyPr wrap="square">
+            <a:spAutoFit/>
+          </a:bodyPr>
+          <a:lstStyle/>
+          <a:p>
+            <a:r>
+              <a:rPr lang="en-US" sz="3200" dirty="0">
+                <a:hlinkClick r:id="rId5"/>
+              </a:rPr>
+              <a:t>https://www.upwork.com/fl/andriilitvinov</a:t>
+            </a:r>
+            <a:endParaRPr lang="en-US" sz="3200" dirty="0"/>
+          </a:p>
+        </p:txBody>
+      </p:sp>
+      <p:sp>
+        <p:nvSpPr>
+          <p:cNvPr id="7" name="Rectangle 6"/>
+          <p:cNvSpPr/>
+          <p:nvPr/>
+        </p:nvSpPr>
+        <p:spPr>
+          <a:xfrm>
+            <a:off x="551037" y="4860848"/>
+            <a:ext cx="8851996" cy="584775"/>
+          </a:xfrm>
+          <a:prstGeom prst="rect">
+            <a:avLst/>
+          </a:prstGeom>
+        </p:spPr>
+        <p:txBody>
+          <a:bodyPr wrap="square">
+            <a:spAutoFit/>
+          </a:bodyPr>
+          <a:lstStyle/>
+          <a:p>
+            <a:r>
+              <a:rPr lang="en-US" sz="3200" dirty="0">
+                <a:hlinkClick r:id="rId6"/>
+              </a:rPr>
+              <a:t>https://dou.ua/users/andrii.litvinov/articles/</a:t>
+            </a:r>
+            <a:endParaRPr lang="en-US" sz="3200" dirty="0"/>
           </a:p>
         </p:txBody>
       </p:sp>
@@ -11676,6 +11810,68 @@
           <a:p>
             <a:r>
               <a:rPr lang="en-US" sz="7200" dirty="0" smtClean="0"/>
+              <a:t>Thank You!</a:t>
+            </a:r>
+            <a:endParaRPr lang="en-US" sz="7200" dirty="0"/>
+          </a:p>
+        </p:txBody>
+      </p:sp>
+    </p:spTree>
+    <p:extLst>
+      <p:ext uri="{BB962C8B-B14F-4D97-AF65-F5344CB8AC3E}">
+        <p14:creationId xmlns:p14="http://schemas.microsoft.com/office/powerpoint/2010/main" val="517990129"/>
+      </p:ext>
+    </p:extLst>
+  </p:cSld>
+  <p:clrMapOvr>
+    <a:masterClrMapping/>
+  </p:clrMapOvr>
+  <p:timing>
+    <p:tnLst>
+      <p:par>
+        <p:cTn id="1" dur="indefinite" restart="never" nodeType="tmRoot"/>
+      </p:par>
+    </p:tnLst>
+  </p:timing>
+</p:sld>
+</file>
+
+<file path=ppt/slides/slide23.xml><?xml version="1.0" encoding="utf-8"?>
+<p:sld xmlns:a="http://schemas.openxmlformats.org/drawingml/2006/main" xmlns:r="http://schemas.openxmlformats.org/officeDocument/2006/relationships" xmlns:p="http://schemas.openxmlformats.org/presentationml/2006/main">
+  <p:cSld>
+    <p:spTree>
+      <p:nvGrpSpPr>
+        <p:cNvPr id="1" name=""/>
+        <p:cNvGrpSpPr/>
+        <p:nvPr/>
+      </p:nvGrpSpPr>
+      <p:grpSpPr>
+        <a:xfrm>
+          <a:off x="0" y="0"/>
+          <a:ext cx="0" cy="0"/>
+          <a:chOff x="0" y="0"/>
+          <a:chExt cx="0" cy="0"/>
+        </a:xfrm>
+      </p:grpSpPr>
+      <p:sp>
+        <p:nvSpPr>
+          <p:cNvPr id="2" name="Title 1"/>
+          <p:cNvSpPr>
+            <a:spLocks noGrp="1"/>
+          </p:cNvSpPr>
+          <p:nvPr>
+            <p:ph type="title"/>
+          </p:nvPr>
+        </p:nvSpPr>
+        <p:spPr/>
+        <p:txBody>
+          <a:bodyPr>
+            <a:normAutofit/>
+          </a:bodyPr>
+          <a:lstStyle/>
+          <a:p>
+            <a:r>
+              <a:rPr lang="en-US" sz="7200" dirty="0" smtClean="0"/>
               <a:t>Questions?</a:t>
             </a:r>
             <a:endParaRPr lang="en-US" sz="7200" dirty="0"/>
@@ -11752,7 +11948,7 @@
         <p:spPr>
           <a:xfrm>
             <a:off x="1141413" y="4708922"/>
-            <a:ext cx="4172937" cy="584775"/>
+            <a:ext cx="6143028" cy="584775"/>
           </a:xfrm>
           <a:prstGeom prst="rect">
             <a:avLst/>
@@ -11767,7 +11963,7 @@
           <a:p>
             <a:r>
               <a:rPr lang="en-US" sz="3200" dirty="0" smtClean="0"/>
-              <a:t>• Keep data in-sync</a:t>
+              <a:t>• Duplicate records matching</a:t>
             </a:r>
             <a:endParaRPr lang="en-US" sz="3200" dirty="0"/>
           </a:p>
@@ -11782,7 +11978,7 @@
         <p:spPr>
           <a:xfrm>
             <a:off x="1141413" y="3234794"/>
-            <a:ext cx="6978192" cy="584775"/>
+            <a:ext cx="6644434" cy="584775"/>
           </a:xfrm>
           <a:prstGeom prst="rect">
             <a:avLst/>
@@ -11790,18 +11986,14 @@
           <a:noFill/>
         </p:spPr>
         <p:txBody>
-          <a:bodyPr wrap="none" rtlCol="0">
+          <a:bodyPr wrap="square" rtlCol="0">
             <a:spAutoFit/>
           </a:bodyPr>
           <a:lstStyle/>
           <a:p>
             <a:r>
-              <a:rPr lang="en-US" sz="3200" dirty="0" smtClean="0"/>
-              <a:t>• Reports </a:t>
-            </a:r>
-            <a:r>
               <a:rPr lang="en-US" sz="3200" dirty="0"/>
-              <a:t>read model </a:t>
+              <a:t>• Game statistics </a:t>
             </a:r>
             <a:r>
               <a:rPr lang="en-US" sz="3200" dirty="0" smtClean="0"/>
@@ -11820,7 +12012,7 @@
         <p:spPr>
           <a:xfrm>
             <a:off x="1141413" y="3971858"/>
-            <a:ext cx="6074099" cy="584775"/>
+            <a:ext cx="7013458" cy="584775"/>
           </a:xfrm>
           <a:prstGeom prst="rect">
             <a:avLst/>
@@ -11835,7 +12027,15 @@
           <a:p>
             <a:r>
               <a:rPr lang="en-US" sz="3200" dirty="0" smtClean="0"/>
-              <a:t>• Game statistics calculations</a:t>
+              <a:t>• </a:t>
+            </a:r>
+            <a:r>
+              <a:rPr lang="en-US" sz="3200" dirty="0"/>
+              <a:t>Reports read model </a:t>
+            </a:r>
+            <a:r>
+              <a:rPr lang="en-US" sz="3200" dirty="0" smtClean="0"/>
+              <a:t>calculations</a:t>
             </a:r>
             <a:endParaRPr lang="en-US" sz="3200" dirty="0"/>
           </a:p>
@@ -12536,7 +12736,7 @@
           <a:p>
             <a:pPr algn="ctr"/>
             <a:r>
-              <a:rPr lang="en-US" dirty="0" smtClean="0">
+              <a:rPr lang="en-US" sz="2000" dirty="0" smtClean="0">
                 <a:solidFill>
                   <a:schemeClr val="accent3">
                     <a:lumMod val="75000"/>
@@ -14035,7 +14235,7 @@
           <a:p>
             <a:pPr algn="ctr"/>
             <a:r>
-              <a:rPr lang="en-US" dirty="0" smtClean="0">
+              <a:rPr lang="en-US" sz="2000" dirty="0" smtClean="0">
                 <a:solidFill>
                   <a:schemeClr val="accent3">
                     <a:lumMod val="75000"/>

</xml_diff>

<commit_message>
Fix the issue with command id
</commit_message>
<xml_diff>
--- a/t18-event-mongodb.pptx
+++ b/t18-event-mongodb.pptx
@@ -5,10 +5,10 @@
     <p:sldMasterId id="2147483668" r:id="rId1"/>
   </p:sldMasterIdLst>
   <p:notesMasterIdLst>
-    <p:notesMasterId r:id="rId28"/>
+    <p:notesMasterId r:id="rId29"/>
   </p:notesMasterIdLst>
   <p:handoutMasterIdLst>
-    <p:handoutMasterId r:id="rId29"/>
+    <p:handoutMasterId r:id="rId30"/>
   </p:handoutMasterIdLst>
   <p:sldIdLst>
     <p:sldId id="274" r:id="rId2"/>
@@ -25,18 +25,19 @@
     <p:sldId id="277" r:id="rId13"/>
     <p:sldId id="268" r:id="rId14"/>
     <p:sldId id="269" r:id="rId15"/>
-    <p:sldId id="271" r:id="rId16"/>
-    <p:sldId id="272" r:id="rId17"/>
-    <p:sldId id="273" r:id="rId18"/>
-    <p:sldId id="283" r:id="rId19"/>
-    <p:sldId id="284" r:id="rId20"/>
-    <p:sldId id="288" r:id="rId21"/>
-    <p:sldId id="285" r:id="rId22"/>
-    <p:sldId id="286" r:id="rId23"/>
-    <p:sldId id="287" r:id="rId24"/>
-    <p:sldId id="279" r:id="rId25"/>
-    <p:sldId id="278" r:id="rId26"/>
-    <p:sldId id="282" r:id="rId27"/>
+    <p:sldId id="289" r:id="rId16"/>
+    <p:sldId id="271" r:id="rId17"/>
+    <p:sldId id="272" r:id="rId18"/>
+    <p:sldId id="273" r:id="rId19"/>
+    <p:sldId id="283" r:id="rId20"/>
+    <p:sldId id="284" r:id="rId21"/>
+    <p:sldId id="288" r:id="rId22"/>
+    <p:sldId id="285" r:id="rId23"/>
+    <p:sldId id="286" r:id="rId24"/>
+    <p:sldId id="287" r:id="rId25"/>
+    <p:sldId id="279" r:id="rId26"/>
+    <p:sldId id="278" r:id="rId27"/>
+    <p:sldId id="282" r:id="rId28"/>
   </p:sldIdLst>
   <p:sldSz cx="12192000" cy="6858000"/>
   <p:notesSz cx="6858000" cy="9144000"/>
@@ -2153,7 +2154,7 @@
           <a:p>
             <a:fld id="{6D679973-E0F4-4AD1-8DEC-9AEE404E80A0}" type="slidenum">
               <a:rPr lang="en-US" smtClean="0"/>
-              <a:t>15</a:t>
+              <a:t>16</a:t>
             </a:fld>
             <a:endParaRPr lang="en-US"/>
           </a:p>
@@ -2237,7 +2238,7 @@
           <a:p>
             <a:fld id="{6D679973-E0F4-4AD1-8DEC-9AEE404E80A0}" type="slidenum">
               <a:rPr lang="en-US" smtClean="0"/>
-              <a:t>20</a:t>
+              <a:t>21</a:t>
             </a:fld>
             <a:endParaRPr lang="en-US"/>
           </a:p>
@@ -2321,7 +2322,7 @@
           <a:p>
             <a:fld id="{6D679973-E0F4-4AD1-8DEC-9AEE404E80A0}" type="slidenum">
               <a:rPr lang="en-US" smtClean="0"/>
-              <a:t>25</a:t>
+              <a:t>26</a:t>
             </a:fld>
             <a:endParaRPr lang="en-US"/>
           </a:p>
@@ -9247,7 +9248,15 @@
           <a:p>
             <a:r>
               <a:rPr lang="en-US" sz="3200" dirty="0" smtClean="0"/>
-              <a:t>• MongoDB 3.6 change Streams just released</a:t>
+              <a:t>• MongoDB </a:t>
+            </a:r>
+            <a:r>
+              <a:rPr lang="en-US" sz="3200" smtClean="0"/>
+              <a:t>3.6 Change </a:t>
+            </a:r>
+            <a:r>
+              <a:rPr lang="en-US" sz="3200" dirty="0" smtClean="0"/>
+              <a:t>Streams just released</a:t>
             </a:r>
             <a:endParaRPr lang="en-US" sz="3200" dirty="0"/>
           </a:p>
@@ -11102,6 +11111,92 @@
 <file path=ppt/slides/slide15.xml><?xml version="1.0" encoding="utf-8"?>
 <p:sld xmlns:a="http://schemas.openxmlformats.org/drawingml/2006/main" xmlns:r="http://schemas.openxmlformats.org/officeDocument/2006/relationships" xmlns:p="http://schemas.openxmlformats.org/presentationml/2006/main">
   <p:cSld>
+    <p:bg>
+      <p:bgPr>
+        <a:solidFill>
+          <a:schemeClr val="bg1"/>
+        </a:solidFill>
+        <a:effectLst/>
+      </p:bgPr>
+    </p:bg>
+    <p:spTree>
+      <p:nvGrpSpPr>
+        <p:cNvPr id="1" name=""/>
+        <p:cNvGrpSpPr/>
+        <p:nvPr/>
+      </p:nvGrpSpPr>
+      <p:grpSpPr>
+        <a:xfrm>
+          <a:off x="0" y="0"/>
+          <a:ext cx="0" cy="0"/>
+          <a:chOff x="0" y="0"/>
+          <a:chExt cx="0" cy="0"/>
+        </a:xfrm>
+      </p:grpSpPr>
+      <p:pic>
+        <p:nvPicPr>
+          <p:cNvPr id="1026" name="Picture 2" descr="http://www.niceiphonewallpapers.com/wallpapers/iphone/fire_explosion_rock_7917.jpg"/>
+          <p:cNvPicPr>
+            <a:picLocks noChangeAspect="1" noChangeArrowheads="1"/>
+          </p:cNvPicPr>
+          <p:nvPr/>
+        </p:nvPicPr>
+        <p:blipFill>
+          <a:blip r:embed="rId2">
+            <a:extLst>
+              <a:ext uri="{28A0092B-C50C-407E-A947-70E740481C1C}">
+                <a14:useLocalDpi xmlns:a14="http://schemas.microsoft.com/office/drawing/2010/main" val="0"/>
+              </a:ext>
+            </a:extLst>
+          </a:blip>
+          <a:srcRect/>
+          <a:stretch>
+            <a:fillRect/>
+          </a:stretch>
+        </p:blipFill>
+        <p:spPr bwMode="auto">
+          <a:xfrm>
+            <a:off x="3250732" y="-539208"/>
+            <a:ext cx="5510549" cy="8265824"/>
+          </a:xfrm>
+          <a:prstGeom prst="rect">
+            <a:avLst/>
+          </a:prstGeom>
+          <a:noFill/>
+          <a:extLst>
+            <a:ext uri="{909E8E84-426E-40DD-AFC4-6F175D3DCCD1}">
+              <a14:hiddenFill xmlns:a14="http://schemas.microsoft.com/office/drawing/2010/main">
+                <a:solidFill>
+                  <a:srgbClr val="FFFFFF"/>
+                </a:solidFill>
+              </a14:hiddenFill>
+            </a:ext>
+          </a:extLst>
+        </p:spPr>
+      </p:pic>
+    </p:spTree>
+    <p:extLst>
+      <p:ext uri="{BB962C8B-B14F-4D97-AF65-F5344CB8AC3E}">
+        <p14:creationId xmlns:p14="http://schemas.microsoft.com/office/powerpoint/2010/main" val="1702450565"/>
+      </p:ext>
+    </p:extLst>
+  </p:cSld>
+  <p:clrMapOvr>
+    <a:masterClrMapping/>
+  </p:clrMapOvr>
+  <p:timing>
+    <p:tnLst>
+      <p:par>
+        <p:cTn id="1" dur="indefinite" restart="never" nodeType="tmRoot"/>
+      </p:par>
+    </p:tnLst>
+  </p:timing>
+</p:sld>
+</file>
+
+<file path=ppt/slides/slide16.xml><?xml version="1.0" encoding="utf-8"?>
+<p:sld xmlns:a="http://schemas.openxmlformats.org/drawingml/2006/main" xmlns:r="http://schemas.openxmlformats.org/officeDocument/2006/relationships" xmlns:p="http://schemas.openxmlformats.org/presentationml/2006/main">
+  <p:cSld>
     <p:spTree>
       <p:nvGrpSpPr>
         <p:cNvPr id="1" name=""/>
@@ -11197,7 +11292,7 @@
 </p:sld>
 </file>
 
-<file path=ppt/slides/slide16.xml><?xml version="1.0" encoding="utf-8"?>
+<file path=ppt/slides/slide17.xml><?xml version="1.0" encoding="utf-8"?>
 <p:sld xmlns:a="http://schemas.openxmlformats.org/drawingml/2006/main" xmlns:r="http://schemas.openxmlformats.org/officeDocument/2006/relationships" xmlns:p="http://schemas.openxmlformats.org/presentationml/2006/main">
   <p:cSld>
     <p:spTree>
@@ -11908,7 +12003,7 @@
 </p:sld>
 </file>
 
-<file path=ppt/slides/slide17.xml><?xml version="1.0" encoding="utf-8"?>
+<file path=ppt/slides/slide18.xml><?xml version="1.0" encoding="utf-8"?>
 <p:sld xmlns:a="http://schemas.openxmlformats.org/drawingml/2006/main" xmlns:r="http://schemas.openxmlformats.org/officeDocument/2006/relationships" xmlns:p="http://schemas.openxmlformats.org/presentationml/2006/main">
   <p:cSld>
     <p:spTree>
@@ -11998,7 +12093,7 @@
 </p:sld>
 </file>
 
-<file path=ppt/slides/slide18.xml><?xml version="1.0" encoding="utf-8"?>
+<file path=ppt/slides/slide19.xml><?xml version="1.0" encoding="utf-8"?>
 <p:sld xmlns:a="http://schemas.openxmlformats.org/drawingml/2006/main" xmlns:r="http://schemas.openxmlformats.org/officeDocument/2006/relationships" xmlns:p="http://schemas.openxmlformats.org/presentationml/2006/main">
   <p:cSld>
     <p:spTree>
@@ -13295,7 +13390,144 @@
 </p:sld>
 </file>
 
-<file path=ppt/slides/slide19.xml><?xml version="1.0" encoding="utf-8"?>
+<file path=ppt/slides/slide2.xml><?xml version="1.0" encoding="utf-8"?>
+<p:sld xmlns:a="http://schemas.openxmlformats.org/drawingml/2006/main" xmlns:r="http://schemas.openxmlformats.org/officeDocument/2006/relationships" xmlns:p="http://schemas.openxmlformats.org/presentationml/2006/main">
+  <p:cSld>
+    <p:spTree>
+      <p:nvGrpSpPr>
+        <p:cNvPr id="1" name=""/>
+        <p:cNvGrpSpPr/>
+        <p:nvPr/>
+      </p:nvGrpSpPr>
+      <p:grpSpPr>
+        <a:xfrm>
+          <a:off x="0" y="0"/>
+          <a:ext cx="0" cy="0"/>
+          <a:chOff x="0" y="0"/>
+          <a:chExt cx="0" cy="0"/>
+        </a:xfrm>
+      </p:grpSpPr>
+      <p:sp>
+        <p:nvSpPr>
+          <p:cNvPr id="2" name="Title 1"/>
+          <p:cNvSpPr>
+            <a:spLocks noGrp="1"/>
+          </p:cNvSpPr>
+          <p:nvPr>
+            <p:ph type="title"/>
+          </p:nvPr>
+        </p:nvSpPr>
+        <p:spPr/>
+        <p:txBody>
+          <a:bodyPr>
+            <a:normAutofit/>
+          </a:bodyPr>
+          <a:lstStyle/>
+          <a:p>
+            <a:r>
+              <a:rPr lang="en-US" sz="6000" dirty="0"/>
+              <a:t>Andrii </a:t>
+            </a:r>
+            <a:r>
+              <a:rPr lang="en-US" sz="6000" dirty="0" smtClean="0"/>
+              <a:t>Litvinov</a:t>
+            </a:r>
+            <a:endParaRPr lang="en-US" sz="6000" dirty="0"/>
+          </a:p>
+        </p:txBody>
+      </p:sp>
+      <p:pic>
+        <p:nvPicPr>
+          <p:cNvPr id="3" name="Picture 2" descr="https://scontent.fiev12-1.fna.fbcdn.net/v/t1.0-9/c0.0.215.215/12494928_1139995499368714_8989582005896967223_n.png?_nc_cat=109&amp;_nc_ht=scontent.fiev12-1.fna&amp;oh=ee4c679202e74d6262c8803b45612cb9&amp;oe=5C7304DF"/>
+          <p:cNvPicPr>
+            <a:picLocks noChangeAspect="1" noChangeArrowheads="1"/>
+          </p:cNvPicPr>
+          <p:nvPr/>
+        </p:nvPicPr>
+        <p:blipFill>
+          <a:blip r:embed="rId3">
+            <a:extLst>
+              <a:ext uri="{28A0092B-C50C-407E-A947-70E740481C1C}">
+                <a14:useLocalDpi xmlns:a14="http://schemas.microsoft.com/office/drawing/2010/main" val="0"/>
+              </a:ext>
+            </a:extLst>
+          </a:blip>
+          <a:srcRect/>
+          <a:stretch>
+            <a:fillRect/>
+          </a:stretch>
+        </p:blipFill>
+        <p:spPr bwMode="auto">
+          <a:xfrm>
+            <a:off x="9465733" y="3679654"/>
+            <a:ext cx="2047875" cy="2047876"/>
+          </a:xfrm>
+          <a:prstGeom prst="rect">
+            <a:avLst/>
+          </a:prstGeom>
+          <a:noFill/>
+          <a:extLst>
+            <a:ext uri="{909E8E84-426E-40DD-AFC4-6F175D3DCCD1}">
+              <a14:hiddenFill xmlns:a14="http://schemas.microsoft.com/office/drawing/2010/main">
+                <a:solidFill>
+                  <a:srgbClr val="FFFFFF"/>
+                </a:solidFill>
+              </a14:hiddenFill>
+            </a:ext>
+          </a:extLst>
+        </p:spPr>
+      </p:pic>
+      <p:sp>
+        <p:nvSpPr>
+          <p:cNvPr id="4" name="TextBox 3"/>
+          <p:cNvSpPr txBox="1"/>
+          <p:nvPr/>
+        </p:nvSpPr>
+        <p:spPr>
+          <a:xfrm>
+            <a:off x="1141413" y="3918762"/>
+            <a:ext cx="8464731" cy="1569660"/>
+          </a:xfrm>
+          <a:prstGeom prst="rect">
+            <a:avLst/>
+          </a:prstGeom>
+          <a:noFill/>
+        </p:spPr>
+        <p:txBody>
+          <a:bodyPr wrap="square" rtlCol="0">
+            <a:spAutoFit/>
+          </a:bodyPr>
+          <a:lstStyle/>
+          <a:p>
+            <a:r>
+              <a:rPr lang="en-US" sz="4800" dirty="0" smtClean="0"/>
+              <a:t>Platform engineer at Synergy Sports Technology</a:t>
+            </a:r>
+            <a:endParaRPr lang="en-US" sz="4800" dirty="0"/>
+          </a:p>
+        </p:txBody>
+      </p:sp>
+    </p:spTree>
+    <p:extLst>
+      <p:ext uri="{BB962C8B-B14F-4D97-AF65-F5344CB8AC3E}">
+        <p14:creationId xmlns:p14="http://schemas.microsoft.com/office/powerpoint/2010/main" val="1499444302"/>
+      </p:ext>
+    </p:extLst>
+  </p:cSld>
+  <p:clrMapOvr>
+    <a:masterClrMapping/>
+  </p:clrMapOvr>
+  <p:timing>
+    <p:tnLst>
+      <p:par>
+        <p:cTn id="1" dur="indefinite" restart="never" nodeType="tmRoot"/>
+      </p:par>
+    </p:tnLst>
+  </p:timing>
+</p:sld>
+</file>
+
+<file path=ppt/slides/slide20.xml><?xml version="1.0" encoding="utf-8"?>
 <p:sld xmlns:a="http://schemas.openxmlformats.org/drawingml/2006/main" xmlns:r="http://schemas.openxmlformats.org/officeDocument/2006/relationships" xmlns:p="http://schemas.openxmlformats.org/presentationml/2006/main">
   <p:cSld>
     <p:spTree>
@@ -14214,7 +14446,7 @@
 </p:sld>
 </file>
 
-<file path=ppt/slides/slide2.xml><?xml version="1.0" encoding="utf-8"?>
+<file path=ppt/slides/slide21.xml><?xml version="1.0" encoding="utf-8"?>
 <p:sld xmlns:a="http://schemas.openxmlformats.org/drawingml/2006/main" xmlns:r="http://schemas.openxmlformats.org/officeDocument/2006/relationships" xmlns:p="http://schemas.openxmlformats.org/presentationml/2006/main">
   <p:cSld>
     <p:spTree>
@@ -14231,145 +14463,8 @@
           <a:chExt cx="0" cy="0"/>
         </a:xfrm>
       </p:grpSpPr>
-      <p:sp>
-        <p:nvSpPr>
-          <p:cNvPr id="2" name="Title 1"/>
-          <p:cNvSpPr>
-            <a:spLocks noGrp="1"/>
-          </p:cNvSpPr>
-          <p:nvPr>
-            <p:ph type="title"/>
-          </p:nvPr>
-        </p:nvSpPr>
-        <p:spPr/>
-        <p:txBody>
-          <a:bodyPr>
-            <a:normAutofit/>
-          </a:bodyPr>
-          <a:lstStyle/>
-          <a:p>
-            <a:r>
-              <a:rPr lang="en-US" sz="6000" dirty="0"/>
-              <a:t>Andrii </a:t>
-            </a:r>
-            <a:r>
-              <a:rPr lang="en-US" sz="6000" dirty="0" smtClean="0"/>
-              <a:t>Litvinov</a:t>
-            </a:r>
-            <a:endParaRPr lang="en-US" sz="6000" dirty="0"/>
-          </a:p>
-        </p:txBody>
-      </p:sp>
-      <p:pic>
-        <p:nvPicPr>
-          <p:cNvPr id="3" name="Picture 2" descr="https://scontent.fiev12-1.fna.fbcdn.net/v/t1.0-9/c0.0.215.215/12494928_1139995499368714_8989582005896967223_n.png?_nc_cat=109&amp;_nc_ht=scontent.fiev12-1.fna&amp;oh=ee4c679202e74d6262c8803b45612cb9&amp;oe=5C7304DF"/>
-          <p:cNvPicPr>
-            <a:picLocks noChangeAspect="1" noChangeArrowheads="1"/>
-          </p:cNvPicPr>
-          <p:nvPr/>
-        </p:nvPicPr>
-        <p:blipFill>
-          <a:blip r:embed="rId3">
-            <a:extLst>
-              <a:ext uri="{28A0092B-C50C-407E-A947-70E740481C1C}">
-                <a14:useLocalDpi xmlns:a14="http://schemas.microsoft.com/office/drawing/2010/main" val="0"/>
-              </a:ext>
-            </a:extLst>
-          </a:blip>
-          <a:srcRect/>
-          <a:stretch>
-            <a:fillRect/>
-          </a:stretch>
-        </p:blipFill>
-        <p:spPr bwMode="auto">
-          <a:xfrm>
-            <a:off x="9465733" y="3679654"/>
-            <a:ext cx="2047875" cy="2047876"/>
-          </a:xfrm>
-          <a:prstGeom prst="rect">
-            <a:avLst/>
-          </a:prstGeom>
-          <a:noFill/>
-          <a:extLst>
-            <a:ext uri="{909E8E84-426E-40DD-AFC4-6F175D3DCCD1}">
-              <a14:hiddenFill xmlns:a14="http://schemas.microsoft.com/office/drawing/2010/main">
-                <a:solidFill>
-                  <a:srgbClr val="FFFFFF"/>
-                </a:solidFill>
-              </a14:hiddenFill>
-            </a:ext>
-          </a:extLst>
-        </p:spPr>
-      </p:pic>
-      <p:sp>
-        <p:nvSpPr>
-          <p:cNvPr id="4" name="TextBox 3"/>
-          <p:cNvSpPr txBox="1"/>
-          <p:nvPr/>
-        </p:nvSpPr>
-        <p:spPr>
-          <a:xfrm>
-            <a:off x="1141413" y="3918762"/>
-            <a:ext cx="8464731" cy="1569660"/>
-          </a:xfrm>
-          <a:prstGeom prst="rect">
-            <a:avLst/>
-          </a:prstGeom>
-          <a:noFill/>
-        </p:spPr>
-        <p:txBody>
-          <a:bodyPr wrap="square" rtlCol="0">
-            <a:spAutoFit/>
-          </a:bodyPr>
-          <a:lstStyle/>
-          <a:p>
-            <a:r>
-              <a:rPr lang="en-US" sz="4800" dirty="0" smtClean="0"/>
-              <a:t>Platform engineer at Synergy Sports Technology</a:t>
-            </a:r>
-            <a:endParaRPr lang="en-US" sz="4800" dirty="0"/>
-          </a:p>
-        </p:txBody>
-      </p:sp>
-    </p:spTree>
-    <p:extLst>
-      <p:ext uri="{BB962C8B-B14F-4D97-AF65-F5344CB8AC3E}">
-        <p14:creationId xmlns:p14="http://schemas.microsoft.com/office/powerpoint/2010/main" val="1499444302"/>
-      </p:ext>
-    </p:extLst>
-  </p:cSld>
-  <p:clrMapOvr>
-    <a:masterClrMapping/>
-  </p:clrMapOvr>
-  <p:timing>
-    <p:tnLst>
-      <p:par>
-        <p:cTn id="1" dur="indefinite" restart="never" nodeType="tmRoot"/>
-      </p:par>
-    </p:tnLst>
-  </p:timing>
-</p:sld>
-</file>
-
-<file path=ppt/slides/slide20.xml><?xml version="1.0" encoding="utf-8"?>
-<p:sld xmlns:a="http://schemas.openxmlformats.org/drawingml/2006/main" xmlns:r="http://schemas.openxmlformats.org/officeDocument/2006/relationships" xmlns:p="http://schemas.openxmlformats.org/presentationml/2006/main">
-  <p:cSld>
-    <p:spTree>
-      <p:nvGrpSpPr>
-        <p:cNvPr id="1" name=""/>
-        <p:cNvGrpSpPr/>
-        <p:nvPr/>
-      </p:nvGrpSpPr>
-      <p:grpSpPr>
-        <a:xfrm>
-          <a:off x="0" y="0"/>
-          <a:ext cx="0" cy="0"/>
-          <a:chOff x="0" y="0"/>
-          <a:chExt cx="0" cy="0"/>
-        </a:xfrm>
-      </p:grpSpPr>
-      <mc:AlternateContent xmlns:mc="http://schemas.openxmlformats.org/markup-compatibility/2006">
-        <mc:Choice xmlns:p14="http://schemas.microsoft.com/office/powerpoint/2010/main" Requires="p14">
+      <mc:AlternateContent xmlns:mc="http://schemas.openxmlformats.org/markup-compatibility/2006" xmlns:p14="http://schemas.microsoft.com/office/powerpoint/2010/main">
+        <mc:Choice Requires="p14">
           <p:contentPart p14:bwMode="auto" r:id="rId3">
             <p14:nvContentPartPr>
               <p14:cNvPr id="4" name="Ink 3"/>
@@ -14382,7 +14477,7 @@
             </p14:xfrm>
           </p:contentPart>
         </mc:Choice>
-        <mc:Fallback>
+        <mc:Fallback xmlns="">
           <p:pic>
             <p:nvPicPr>
               <p:cNvPr id="4" name="Ink 3"/>
@@ -14407,8 +14502,8 @@
           </p:pic>
         </mc:Fallback>
       </mc:AlternateContent>
-      <mc:AlternateContent xmlns:mc="http://schemas.openxmlformats.org/markup-compatibility/2006">
-        <mc:Choice xmlns:p14="http://schemas.microsoft.com/office/powerpoint/2010/main" Requires="p14">
+      <mc:AlternateContent xmlns:mc="http://schemas.openxmlformats.org/markup-compatibility/2006" xmlns:p14="http://schemas.microsoft.com/office/powerpoint/2010/main">
+        <mc:Choice Requires="p14">
           <p:contentPart p14:bwMode="auto" r:id="rId5">
             <p14:nvContentPartPr>
               <p14:cNvPr id="6" name="Ink 5"/>
@@ -14421,7 +14516,7 @@
             </p14:xfrm>
           </p:contentPart>
         </mc:Choice>
-        <mc:Fallback>
+        <mc:Fallback xmlns="">
           <p:pic>
             <p:nvPicPr>
               <p:cNvPr id="6" name="Ink 5"/>
@@ -14446,8 +14541,8 @@
           </p:pic>
         </mc:Fallback>
       </mc:AlternateContent>
-      <mc:AlternateContent xmlns:mc="http://schemas.openxmlformats.org/markup-compatibility/2006">
-        <mc:Choice xmlns:p14="http://schemas.microsoft.com/office/powerpoint/2010/main" Requires="p14">
+      <mc:AlternateContent xmlns:mc="http://schemas.openxmlformats.org/markup-compatibility/2006" xmlns:p14="http://schemas.microsoft.com/office/powerpoint/2010/main">
+        <mc:Choice Requires="p14">
           <p:contentPart p14:bwMode="auto" r:id="rId7">
             <p14:nvContentPartPr>
               <p14:cNvPr id="8" name="Ink 7"/>
@@ -14460,7 +14555,7 @@
             </p14:xfrm>
           </p:contentPart>
         </mc:Choice>
-        <mc:Fallback>
+        <mc:Fallback xmlns="">
           <p:pic>
             <p:nvPicPr>
               <p:cNvPr id="8" name="Ink 7"/>
@@ -14485,8 +14580,8 @@
           </p:pic>
         </mc:Fallback>
       </mc:AlternateContent>
-      <mc:AlternateContent xmlns:mc="http://schemas.openxmlformats.org/markup-compatibility/2006">
-        <mc:Choice xmlns:p14="http://schemas.microsoft.com/office/powerpoint/2010/main" Requires="p14">
+      <mc:AlternateContent xmlns:mc="http://schemas.openxmlformats.org/markup-compatibility/2006" xmlns:p14="http://schemas.microsoft.com/office/powerpoint/2010/main">
+        <mc:Choice Requires="p14">
           <p:contentPart p14:bwMode="auto" r:id="rId9">
             <p14:nvContentPartPr>
               <p14:cNvPr id="10" name="Ink 9"/>
@@ -14499,7 +14594,7 @@
             </p14:xfrm>
           </p:contentPart>
         </mc:Choice>
-        <mc:Fallback>
+        <mc:Fallback xmlns="">
           <p:pic>
             <p:nvPicPr>
               <p:cNvPr id="10" name="Ink 9"/>
@@ -14524,8 +14619,8 @@
           </p:pic>
         </mc:Fallback>
       </mc:AlternateContent>
-      <mc:AlternateContent xmlns:mc="http://schemas.openxmlformats.org/markup-compatibility/2006">
-        <mc:Choice xmlns:p14="http://schemas.microsoft.com/office/powerpoint/2010/main" Requires="p14">
+      <mc:AlternateContent xmlns:mc="http://schemas.openxmlformats.org/markup-compatibility/2006" xmlns:p14="http://schemas.microsoft.com/office/powerpoint/2010/main">
+        <mc:Choice Requires="p14">
           <p:contentPart p14:bwMode="auto" r:id="rId11">
             <p14:nvContentPartPr>
               <p14:cNvPr id="12" name="Ink 11"/>
@@ -14538,7 +14633,7 @@
             </p14:xfrm>
           </p:contentPart>
         </mc:Choice>
-        <mc:Fallback>
+        <mc:Fallback xmlns="">
           <p:pic>
             <p:nvPicPr>
               <p:cNvPr id="12" name="Ink 11"/>
@@ -14563,8 +14658,8 @@
           </p:pic>
         </mc:Fallback>
       </mc:AlternateContent>
-      <mc:AlternateContent xmlns:mc="http://schemas.openxmlformats.org/markup-compatibility/2006">
-        <mc:Choice xmlns:p14="http://schemas.microsoft.com/office/powerpoint/2010/main" Requires="p14">
+      <mc:AlternateContent xmlns:mc="http://schemas.openxmlformats.org/markup-compatibility/2006" xmlns:p14="http://schemas.microsoft.com/office/powerpoint/2010/main">
+        <mc:Choice Requires="p14">
           <p:contentPart p14:bwMode="auto" r:id="rId13">
             <p14:nvContentPartPr>
               <p14:cNvPr id="14" name="Ink 13"/>
@@ -14577,7 +14672,7 @@
             </p14:xfrm>
           </p:contentPart>
         </mc:Choice>
-        <mc:Fallback>
+        <mc:Fallback xmlns="">
           <p:pic>
             <p:nvPicPr>
               <p:cNvPr id="14" name="Ink 13"/>
@@ -16447,7 +16542,7 @@
 </p:sld>
 </file>
 
-<file path=ppt/slides/slide21.xml><?xml version="1.0" encoding="utf-8"?>
+<file path=ppt/slides/slide22.xml><?xml version="1.0" encoding="utf-8"?>
 <p:sld xmlns:a="http://schemas.openxmlformats.org/drawingml/2006/main" xmlns:r="http://schemas.openxmlformats.org/officeDocument/2006/relationships" xmlns:p="http://schemas.openxmlformats.org/presentationml/2006/main">
   <p:cSld>
     <p:spTree>
@@ -17638,7 +17733,7 @@
 </p:sld>
 </file>
 
-<file path=ppt/slides/slide22.xml><?xml version="1.0" encoding="utf-8"?>
+<file path=ppt/slides/slide23.xml><?xml version="1.0" encoding="utf-8"?>
 <p:sld xmlns:a="http://schemas.openxmlformats.org/drawingml/2006/main" xmlns:r="http://schemas.openxmlformats.org/officeDocument/2006/relationships" xmlns:p="http://schemas.openxmlformats.org/presentationml/2006/main">
   <p:cSld>
     <p:spTree>
@@ -18813,7 +18908,7 @@
 </p:sld>
 </file>
 
-<file path=ppt/slides/slide23.xml><?xml version="1.0" encoding="utf-8"?>
+<file path=ppt/slides/slide24.xml><?xml version="1.0" encoding="utf-8"?>
 <p:sld xmlns:a="http://schemas.openxmlformats.org/drawingml/2006/main" xmlns:r="http://schemas.openxmlformats.org/officeDocument/2006/relationships" xmlns:p="http://schemas.openxmlformats.org/presentationml/2006/main">
   <p:cSld>
     <p:spTree>
@@ -20347,7 +20442,7 @@
 </p:sld>
 </file>
 
-<file path=ppt/slides/slide24.xml><?xml version="1.0" encoding="utf-8"?>
+<file path=ppt/slides/slide25.xml><?xml version="1.0" encoding="utf-8"?>
 <p:sld xmlns:a="http://schemas.openxmlformats.org/drawingml/2006/main" xmlns:r="http://schemas.openxmlformats.org/officeDocument/2006/relationships" xmlns:p="http://schemas.openxmlformats.org/presentationml/2006/main">
   <p:cSld>
     <p:spTree>
@@ -20710,7 +20805,7 @@
 </p:sld>
 </file>
 
-<file path=ppt/slides/slide25.xml><?xml version="1.0" encoding="utf-8"?>
+<file path=ppt/slides/slide26.xml><?xml version="1.0" encoding="utf-8"?>
 <p:sld xmlns:a="http://schemas.openxmlformats.org/drawingml/2006/main" xmlns:r="http://schemas.openxmlformats.org/officeDocument/2006/relationships" xmlns:p="http://schemas.openxmlformats.org/presentationml/2006/main">
   <p:cSld>
     <p:spTree>
@@ -20944,7 +21039,7 @@
 </p:sld>
 </file>
 
-<file path=ppt/slides/slide26.xml><?xml version="1.0" encoding="utf-8"?>
+<file path=ppt/slides/slide27.xml><?xml version="1.0" encoding="utf-8"?>
 <p:sld xmlns:a="http://schemas.openxmlformats.org/drawingml/2006/main" xmlns:r="http://schemas.openxmlformats.org/officeDocument/2006/relationships" xmlns:p="http://schemas.openxmlformats.org/presentationml/2006/main">
   <p:cSld>
     <p:spTree>
@@ -21138,7 +21233,7 @@
         </p:nvSpPr>
         <p:spPr>
           <a:xfrm>
-            <a:off x="513286" y="2157515"/>
+            <a:off x="513286" y="2763581"/>
             <a:ext cx="6664737" cy="584775"/>
           </a:xfrm>
           <a:prstGeom prst="rect">
@@ -21163,46 +21258,13 @@
       </p:sp>
       <p:sp>
         <p:nvSpPr>
-          <p:cNvPr id="5" name="Rectangle 4">
-            <a:hlinkClick r:id="rId3"/>
-          </p:cNvPr>
-          <p:cNvSpPr/>
-          <p:nvPr/>
-        </p:nvSpPr>
-        <p:spPr>
-          <a:xfrm>
-            <a:off x="513286" y="3058626"/>
-            <a:ext cx="11502868" cy="584775"/>
-          </a:xfrm>
-          <a:prstGeom prst="rect">
-            <a:avLst/>
-          </a:prstGeom>
-        </p:spPr>
-        <p:txBody>
-          <a:bodyPr wrap="square">
-            <a:spAutoFit/>
-          </a:bodyPr>
-          <a:lstStyle/>
-          <a:p>
-            <a:r>
-              <a:rPr lang="en-US" sz="3200" dirty="0">
-                <a:hlinkClick r:id="rId3"/>
-              </a:rPr>
-              <a:t>https://stackoverflow.com/users/2138959/andrii-litvinov</a:t>
-            </a:r>
-            <a:endParaRPr lang="en-US" sz="3200" dirty="0"/>
-          </a:p>
-        </p:txBody>
-      </p:sp>
-      <p:sp>
-        <p:nvSpPr>
           <p:cNvPr id="6" name="Rectangle 5"/>
           <p:cNvSpPr/>
           <p:nvPr/>
         </p:nvSpPr>
         <p:spPr>
           <a:xfrm>
-            <a:off x="513287" y="3959737"/>
+            <a:off x="513286" y="3613304"/>
             <a:ext cx="6846772" cy="584775"/>
           </a:xfrm>
           <a:prstGeom prst="rect">
@@ -21217,7 +21279,7 @@
           <a:p>
             <a:r>
               <a:rPr lang="en-US" sz="3200" dirty="0">
-                <a:hlinkClick r:id="rId4"/>
+                <a:hlinkClick r:id="rId3"/>
               </a:rPr>
               <a:t>https://github.com/andrii-litvinov</a:t>
             </a:r>
@@ -21233,7 +21295,7 @@
         </p:nvSpPr>
         <p:spPr>
           <a:xfrm>
-            <a:off x="551037" y="5761960"/>
+            <a:off x="513286" y="4456858"/>
             <a:ext cx="8425353" cy="584775"/>
           </a:xfrm>
           <a:prstGeom prst="rect">
@@ -21248,40 +21310,9 @@
           <a:p>
             <a:r>
               <a:rPr lang="en-US" sz="3200" dirty="0">
-                <a:hlinkClick r:id="rId5"/>
+                <a:hlinkClick r:id="rId4"/>
               </a:rPr>
               <a:t>https://www.upwork.com/fl/andriilitvinov</a:t>
-            </a:r>
-            <a:endParaRPr lang="en-US" sz="3200" dirty="0"/>
-          </a:p>
-        </p:txBody>
-      </p:sp>
-      <p:sp>
-        <p:nvSpPr>
-          <p:cNvPr id="8" name="Rectangle 7"/>
-          <p:cNvSpPr/>
-          <p:nvPr/>
-        </p:nvSpPr>
-        <p:spPr>
-          <a:xfrm>
-            <a:off x="551037" y="4860848"/>
-            <a:ext cx="8851996" cy="584775"/>
-          </a:xfrm>
-          <a:prstGeom prst="rect">
-            <a:avLst/>
-          </a:prstGeom>
-        </p:spPr>
-        <p:txBody>
-          <a:bodyPr wrap="square">
-            <a:spAutoFit/>
-          </a:bodyPr>
-          <a:lstStyle/>
-          <a:p>
-            <a:r>
-              <a:rPr lang="en-US" sz="3200" dirty="0">
-                <a:hlinkClick r:id="rId6"/>
-              </a:rPr>
-              <a:t>https://dou.ua/users/andrii.litvinov/articles/</a:t>
             </a:r>
             <a:endParaRPr lang="en-US" sz="3200" dirty="0"/>
           </a:p>

</xml_diff>